<commit_message>
SEP V003, V006 incorporated, ready for pull
</commit_message>
<xml_diff>
--- a/specification/imgsrc/examples.pptx
+++ b/specification/imgsrc/examples.pptx
@@ -4,6 +4,9 @@
   <p:sldMasterIdLst>
     <p:sldMasterId id="2147483648" r:id="rId1"/>
   </p:sldMasterIdLst>
+  <p:notesMasterIdLst>
+    <p:notesMasterId r:id="rId12"/>
+  </p:notesMasterIdLst>
   <p:sldIdLst>
     <p:sldId id="257" r:id="rId2"/>
     <p:sldId id="259" r:id="rId3"/>
@@ -14,6 +17,7 @@
     <p:sldId id="263" r:id="rId8"/>
     <p:sldId id="264" r:id="rId9"/>
     <p:sldId id="266" r:id="rId10"/>
+    <p:sldId id="267" r:id="rId11"/>
   </p:sldIdLst>
   <p:sldSz cx="9144000" cy="6858000" type="screen4x3"/>
   <p:notesSz cx="6858000" cy="9144000"/>
@@ -131,6 +135,356 @@
 </p:presentation>
 </file>
 
+<file path=ppt/notesMasters/notesMaster1.xml><?xml version="1.0" encoding="utf-8"?>
+<p:notesMaster xmlns:a="http://schemas.openxmlformats.org/drawingml/2006/main" xmlns:r="http://schemas.openxmlformats.org/officeDocument/2006/relationships" xmlns:p="http://schemas.openxmlformats.org/presentationml/2006/main">
+  <p:cSld>
+    <p:bg>
+      <p:bgRef idx="1001">
+        <a:schemeClr val="bg1"/>
+      </p:bgRef>
+    </p:bg>
+    <p:spTree>
+      <p:nvGrpSpPr>
+        <p:cNvPr id="1" name=""/>
+        <p:cNvGrpSpPr/>
+        <p:nvPr/>
+      </p:nvGrpSpPr>
+      <p:grpSpPr>
+        <a:xfrm>
+          <a:off x="0" y="0"/>
+          <a:ext cx="0" cy="0"/>
+          <a:chOff x="0" y="0"/>
+          <a:chExt cx="0" cy="0"/>
+        </a:xfrm>
+      </p:grpSpPr>
+      <p:sp>
+        <p:nvSpPr>
+          <p:cNvPr id="2" name="Header Placeholder 1"/>
+          <p:cNvSpPr>
+            <a:spLocks noGrp="1"/>
+          </p:cNvSpPr>
+          <p:nvPr>
+            <p:ph type="hdr" sz="quarter"/>
+          </p:nvPr>
+        </p:nvSpPr>
+        <p:spPr>
+          <a:xfrm>
+            <a:off x="0" y="0"/>
+            <a:ext cx="2971800" cy="458788"/>
+          </a:xfrm>
+          <a:prstGeom prst="rect">
+            <a:avLst/>
+          </a:prstGeom>
+        </p:spPr>
+        <p:txBody>
+          <a:bodyPr vert="horz" lIns="91440" tIns="45720" rIns="91440" bIns="45720" rtlCol="0"/>
+          <a:lstStyle>
+            <a:lvl1pPr algn="l">
+              <a:defRPr sz="1200"/>
+            </a:lvl1pPr>
+          </a:lstStyle>
+          <a:p>
+            <a:endParaRPr lang="en-US"/>
+          </a:p>
+        </p:txBody>
+      </p:sp>
+      <p:sp>
+        <p:nvSpPr>
+          <p:cNvPr id="3" name="Date Placeholder 2"/>
+          <p:cNvSpPr>
+            <a:spLocks noGrp="1"/>
+          </p:cNvSpPr>
+          <p:nvPr>
+            <p:ph type="dt" idx="1"/>
+          </p:nvPr>
+        </p:nvSpPr>
+        <p:spPr>
+          <a:xfrm>
+            <a:off x="3884613" y="0"/>
+            <a:ext cx="2971800" cy="458788"/>
+          </a:xfrm>
+          <a:prstGeom prst="rect">
+            <a:avLst/>
+          </a:prstGeom>
+        </p:spPr>
+        <p:txBody>
+          <a:bodyPr vert="horz" lIns="91440" tIns="45720" rIns="91440" bIns="45720" rtlCol="0"/>
+          <a:lstStyle>
+            <a:lvl1pPr algn="r">
+              <a:defRPr sz="1200"/>
+            </a:lvl1pPr>
+          </a:lstStyle>
+          <a:p>
+            <a:fld id="{A5398B87-931F-0F48-BDB8-4235032D88C0}" type="datetimeFigureOut">
+              <a:rPr lang="en-US" smtClean="0"/>
+              <a:t>10/11/17</a:t>
+            </a:fld>
+            <a:endParaRPr lang="en-US"/>
+          </a:p>
+        </p:txBody>
+      </p:sp>
+      <p:sp>
+        <p:nvSpPr>
+          <p:cNvPr id="4" name="Slide Image Placeholder 3"/>
+          <p:cNvSpPr>
+            <a:spLocks noGrp="1" noRot="1" noChangeAspect="1"/>
+          </p:cNvSpPr>
+          <p:nvPr>
+            <p:ph type="sldImg" idx="2"/>
+          </p:nvPr>
+        </p:nvSpPr>
+        <p:spPr>
+          <a:xfrm>
+            <a:off x="1371600" y="1143000"/>
+            <a:ext cx="4114800" cy="3086100"/>
+          </a:xfrm>
+          <a:prstGeom prst="rect">
+            <a:avLst/>
+          </a:prstGeom>
+          <a:noFill/>
+          <a:ln w="12700">
+            <a:solidFill>
+              <a:prstClr val="black"/>
+            </a:solidFill>
+          </a:ln>
+        </p:spPr>
+        <p:txBody>
+          <a:bodyPr vert="horz" lIns="91440" tIns="45720" rIns="91440" bIns="45720" rtlCol="0" anchor="ctr"/>
+          <a:lstStyle/>
+          <a:p>
+            <a:endParaRPr lang="en-US"/>
+          </a:p>
+        </p:txBody>
+      </p:sp>
+      <p:sp>
+        <p:nvSpPr>
+          <p:cNvPr id="5" name="Notes Placeholder 4"/>
+          <p:cNvSpPr>
+            <a:spLocks noGrp="1"/>
+          </p:cNvSpPr>
+          <p:nvPr>
+            <p:ph type="body" sz="quarter" idx="3"/>
+          </p:nvPr>
+        </p:nvSpPr>
+        <p:spPr>
+          <a:xfrm>
+            <a:off x="685800" y="4400550"/>
+            <a:ext cx="5486400" cy="3600450"/>
+          </a:xfrm>
+          <a:prstGeom prst="rect">
+            <a:avLst/>
+          </a:prstGeom>
+        </p:spPr>
+        <p:txBody>
+          <a:bodyPr vert="horz" lIns="91440" tIns="45720" rIns="91440" bIns="45720" rtlCol="0"/>
+          <a:lstStyle/>
+          <a:p>
+            <a:pPr lvl="0"/>
+            <a:r>
+              <a:rPr lang="en-US" smtClean="0"/>
+              <a:t>Click to edit Master text styles</a:t>
+            </a:r>
+          </a:p>
+          <a:p>
+            <a:pPr lvl="1"/>
+            <a:r>
+              <a:rPr lang="en-US" smtClean="0"/>
+              <a:t>Second level</a:t>
+            </a:r>
+          </a:p>
+          <a:p>
+            <a:pPr lvl="2"/>
+            <a:r>
+              <a:rPr lang="en-US" smtClean="0"/>
+              <a:t>Third level</a:t>
+            </a:r>
+          </a:p>
+          <a:p>
+            <a:pPr lvl="3"/>
+            <a:r>
+              <a:rPr lang="en-US" smtClean="0"/>
+              <a:t>Fourth level</a:t>
+            </a:r>
+          </a:p>
+          <a:p>
+            <a:pPr lvl="4"/>
+            <a:r>
+              <a:rPr lang="en-US" smtClean="0"/>
+              <a:t>Fifth level</a:t>
+            </a:r>
+            <a:endParaRPr lang="en-US"/>
+          </a:p>
+        </p:txBody>
+      </p:sp>
+      <p:sp>
+        <p:nvSpPr>
+          <p:cNvPr id="6" name="Footer Placeholder 5"/>
+          <p:cNvSpPr>
+            <a:spLocks noGrp="1"/>
+          </p:cNvSpPr>
+          <p:nvPr>
+            <p:ph type="ftr" sz="quarter" idx="4"/>
+          </p:nvPr>
+        </p:nvSpPr>
+        <p:spPr>
+          <a:xfrm>
+            <a:off x="0" y="8685213"/>
+            <a:ext cx="2971800" cy="458787"/>
+          </a:xfrm>
+          <a:prstGeom prst="rect">
+            <a:avLst/>
+          </a:prstGeom>
+        </p:spPr>
+        <p:txBody>
+          <a:bodyPr vert="horz" lIns="91440" tIns="45720" rIns="91440" bIns="45720" rtlCol="0" anchor="b"/>
+          <a:lstStyle>
+            <a:lvl1pPr algn="l">
+              <a:defRPr sz="1200"/>
+            </a:lvl1pPr>
+          </a:lstStyle>
+          <a:p>
+            <a:endParaRPr lang="en-US"/>
+          </a:p>
+        </p:txBody>
+      </p:sp>
+      <p:sp>
+        <p:nvSpPr>
+          <p:cNvPr id="7" name="Slide Number Placeholder 6"/>
+          <p:cNvSpPr>
+            <a:spLocks noGrp="1"/>
+          </p:cNvSpPr>
+          <p:nvPr>
+            <p:ph type="sldNum" sz="quarter" idx="5"/>
+          </p:nvPr>
+        </p:nvSpPr>
+        <p:spPr>
+          <a:xfrm>
+            <a:off x="3884613" y="8685213"/>
+            <a:ext cx="2971800" cy="458787"/>
+          </a:xfrm>
+          <a:prstGeom prst="rect">
+            <a:avLst/>
+          </a:prstGeom>
+        </p:spPr>
+        <p:txBody>
+          <a:bodyPr vert="horz" lIns="91440" tIns="45720" rIns="91440" bIns="45720" rtlCol="0" anchor="b"/>
+          <a:lstStyle>
+            <a:lvl1pPr algn="r">
+              <a:defRPr sz="1200"/>
+            </a:lvl1pPr>
+          </a:lstStyle>
+          <a:p>
+            <a:fld id="{B5D6DB32-721E-364D-AAA6-259205ECB092}" type="slidenum">
+              <a:rPr lang="en-US" smtClean="0"/>
+              <a:t>‹#›</a:t>
+            </a:fld>
+            <a:endParaRPr lang="en-US"/>
+          </a:p>
+        </p:txBody>
+      </p:sp>
+    </p:spTree>
+    <p:extLst>
+      <p:ext uri="{BB962C8B-B14F-4D97-AF65-F5344CB8AC3E}">
+        <p14:creationId xmlns:p14="http://schemas.microsoft.com/office/powerpoint/2010/main" val="697887117"/>
+      </p:ext>
+    </p:extLst>
+  </p:cSld>
+  <p:clrMap bg1="lt1" tx1="dk1" bg2="lt2" tx2="dk2" accent1="accent1" accent2="accent2" accent3="accent3" accent4="accent4" accent5="accent5" accent6="accent6" hlink="hlink" folHlink="folHlink"/>
+  <p:notesStyle>
+    <a:lvl1pPr marL="0" algn="l" defTabSz="914400" rtl="0" eaLnBrk="1" latinLnBrk="0" hangingPunct="1">
+      <a:defRPr sz="1200" kern="1200">
+        <a:solidFill>
+          <a:schemeClr val="tx1"/>
+        </a:solidFill>
+        <a:latin typeface="+mn-lt"/>
+        <a:ea typeface="+mn-ea"/>
+        <a:cs typeface="+mn-cs"/>
+      </a:defRPr>
+    </a:lvl1pPr>
+    <a:lvl2pPr marL="457200" algn="l" defTabSz="914400" rtl="0" eaLnBrk="1" latinLnBrk="0" hangingPunct="1">
+      <a:defRPr sz="1200" kern="1200">
+        <a:solidFill>
+          <a:schemeClr val="tx1"/>
+        </a:solidFill>
+        <a:latin typeface="+mn-lt"/>
+        <a:ea typeface="+mn-ea"/>
+        <a:cs typeface="+mn-cs"/>
+      </a:defRPr>
+    </a:lvl2pPr>
+    <a:lvl3pPr marL="914400" algn="l" defTabSz="914400" rtl="0" eaLnBrk="1" latinLnBrk="0" hangingPunct="1">
+      <a:defRPr sz="1200" kern="1200">
+        <a:solidFill>
+          <a:schemeClr val="tx1"/>
+        </a:solidFill>
+        <a:latin typeface="+mn-lt"/>
+        <a:ea typeface="+mn-ea"/>
+        <a:cs typeface="+mn-cs"/>
+      </a:defRPr>
+    </a:lvl3pPr>
+    <a:lvl4pPr marL="1371600" algn="l" defTabSz="914400" rtl="0" eaLnBrk="1" latinLnBrk="0" hangingPunct="1">
+      <a:defRPr sz="1200" kern="1200">
+        <a:solidFill>
+          <a:schemeClr val="tx1"/>
+        </a:solidFill>
+        <a:latin typeface="+mn-lt"/>
+        <a:ea typeface="+mn-ea"/>
+        <a:cs typeface="+mn-cs"/>
+      </a:defRPr>
+    </a:lvl4pPr>
+    <a:lvl5pPr marL="1828800" algn="l" defTabSz="914400" rtl="0" eaLnBrk="1" latinLnBrk="0" hangingPunct="1">
+      <a:defRPr sz="1200" kern="1200">
+        <a:solidFill>
+          <a:schemeClr val="tx1"/>
+        </a:solidFill>
+        <a:latin typeface="+mn-lt"/>
+        <a:ea typeface="+mn-ea"/>
+        <a:cs typeface="+mn-cs"/>
+      </a:defRPr>
+    </a:lvl5pPr>
+    <a:lvl6pPr marL="2286000" algn="l" defTabSz="914400" rtl="0" eaLnBrk="1" latinLnBrk="0" hangingPunct="1">
+      <a:defRPr sz="1200" kern="1200">
+        <a:solidFill>
+          <a:schemeClr val="tx1"/>
+        </a:solidFill>
+        <a:latin typeface="+mn-lt"/>
+        <a:ea typeface="+mn-ea"/>
+        <a:cs typeface="+mn-cs"/>
+      </a:defRPr>
+    </a:lvl6pPr>
+    <a:lvl7pPr marL="2743200" algn="l" defTabSz="914400" rtl="0" eaLnBrk="1" latinLnBrk="0" hangingPunct="1">
+      <a:defRPr sz="1200" kern="1200">
+        <a:solidFill>
+          <a:schemeClr val="tx1"/>
+        </a:solidFill>
+        <a:latin typeface="+mn-lt"/>
+        <a:ea typeface="+mn-ea"/>
+        <a:cs typeface="+mn-cs"/>
+      </a:defRPr>
+    </a:lvl7pPr>
+    <a:lvl8pPr marL="3200400" algn="l" defTabSz="914400" rtl="0" eaLnBrk="1" latinLnBrk="0" hangingPunct="1">
+      <a:defRPr sz="1200" kern="1200">
+        <a:solidFill>
+          <a:schemeClr val="tx1"/>
+        </a:solidFill>
+        <a:latin typeface="+mn-lt"/>
+        <a:ea typeface="+mn-ea"/>
+        <a:cs typeface="+mn-cs"/>
+      </a:defRPr>
+    </a:lvl8pPr>
+    <a:lvl9pPr marL="3657600" algn="l" defTabSz="914400" rtl="0" eaLnBrk="1" latinLnBrk="0" hangingPunct="1">
+      <a:defRPr sz="1200" kern="1200">
+        <a:solidFill>
+          <a:schemeClr val="tx1"/>
+        </a:solidFill>
+        <a:latin typeface="+mn-lt"/>
+        <a:ea typeface="+mn-ea"/>
+        <a:cs typeface="+mn-cs"/>
+      </a:defRPr>
+    </a:lvl9pPr>
+  </p:notesStyle>
+</p:notesMaster>
+</file>
+
 <file path=ppt/slideLayouts/slideLayout1.xml><?xml version="1.0" encoding="utf-8"?>
 <p:sldLayout xmlns:a="http://schemas.openxmlformats.org/drawingml/2006/main" xmlns:r="http://schemas.openxmlformats.org/officeDocument/2006/relationships" xmlns:p="http://schemas.openxmlformats.org/presentationml/2006/main" type="title" preserve="1">
   <p:cSld name="Title Slide">
@@ -312,7 +666,7 @@
           <a:p>
             <a:fld id="{B519623D-D8C4-D246-A1F7-180DFBDF806B}" type="datetimeFigureOut">
               <a:rPr lang="en-US" smtClean="0"/>
-              <a:t>10/8/17</a:t>
+              <a:t>10/11/17</a:t>
             </a:fld>
             <a:endParaRPr lang="en-US"/>
           </a:p>
@@ -482,7 +836,7 @@
           <a:p>
             <a:fld id="{B519623D-D8C4-D246-A1F7-180DFBDF806B}" type="datetimeFigureOut">
               <a:rPr lang="en-US" smtClean="0"/>
-              <a:t>10/8/17</a:t>
+              <a:t>10/11/17</a:t>
             </a:fld>
             <a:endParaRPr lang="en-US"/>
           </a:p>
@@ -662,7 +1016,7 @@
           <a:p>
             <a:fld id="{B519623D-D8C4-D246-A1F7-180DFBDF806B}" type="datetimeFigureOut">
               <a:rPr lang="en-US" smtClean="0"/>
-              <a:t>10/8/17</a:t>
+              <a:t>10/11/17</a:t>
             </a:fld>
             <a:endParaRPr lang="en-US"/>
           </a:p>
@@ -832,7 +1186,7 @@
           <a:p>
             <a:fld id="{B519623D-D8C4-D246-A1F7-180DFBDF806B}" type="datetimeFigureOut">
               <a:rPr lang="en-US" smtClean="0"/>
-              <a:t>10/8/17</a:t>
+              <a:t>10/11/17</a:t>
             </a:fld>
             <a:endParaRPr lang="en-US"/>
           </a:p>
@@ -1078,7 +1432,7 @@
           <a:p>
             <a:fld id="{B519623D-D8C4-D246-A1F7-180DFBDF806B}" type="datetimeFigureOut">
               <a:rPr lang="en-US" smtClean="0"/>
-              <a:t>10/8/17</a:t>
+              <a:t>10/11/17</a:t>
             </a:fld>
             <a:endParaRPr lang="en-US"/>
           </a:p>
@@ -1366,7 +1720,7 @@
           <a:p>
             <a:fld id="{B519623D-D8C4-D246-A1F7-180DFBDF806B}" type="datetimeFigureOut">
               <a:rPr lang="en-US" smtClean="0"/>
-              <a:t>10/8/17</a:t>
+              <a:t>10/11/17</a:t>
             </a:fld>
             <a:endParaRPr lang="en-US"/>
           </a:p>
@@ -1788,7 +2142,7 @@
           <a:p>
             <a:fld id="{B519623D-D8C4-D246-A1F7-180DFBDF806B}" type="datetimeFigureOut">
               <a:rPr lang="en-US" smtClean="0"/>
-              <a:t>10/8/17</a:t>
+              <a:t>10/11/17</a:t>
             </a:fld>
             <a:endParaRPr lang="en-US"/>
           </a:p>
@@ -1906,7 +2260,7 @@
           <a:p>
             <a:fld id="{B519623D-D8C4-D246-A1F7-180DFBDF806B}" type="datetimeFigureOut">
               <a:rPr lang="en-US" smtClean="0"/>
-              <a:t>10/8/17</a:t>
+              <a:t>10/11/17</a:t>
             </a:fld>
             <a:endParaRPr lang="en-US"/>
           </a:p>
@@ -2001,7 +2355,7 @@
           <a:p>
             <a:fld id="{B519623D-D8C4-D246-A1F7-180DFBDF806B}" type="datetimeFigureOut">
               <a:rPr lang="en-US" smtClean="0"/>
-              <a:t>10/8/17</a:t>
+              <a:t>10/11/17</a:t>
             </a:fld>
             <a:endParaRPr lang="en-US"/>
           </a:p>
@@ -2278,7 +2632,7 @@
           <a:p>
             <a:fld id="{B519623D-D8C4-D246-A1F7-180DFBDF806B}" type="datetimeFigureOut">
               <a:rPr lang="en-US" smtClean="0"/>
-              <a:t>10/8/17</a:t>
+              <a:t>10/11/17</a:t>
             </a:fld>
             <a:endParaRPr lang="en-US"/>
           </a:p>
@@ -2531,7 +2885,7 @@
           <a:p>
             <a:fld id="{B519623D-D8C4-D246-A1F7-180DFBDF806B}" type="datetimeFigureOut">
               <a:rPr lang="en-US" smtClean="0"/>
-              <a:t>10/8/17</a:t>
+              <a:t>10/11/17</a:t>
             </a:fld>
             <a:endParaRPr lang="en-US"/>
           </a:p>
@@ -2744,7 +3098,7 @@
           <a:p>
             <a:fld id="{B519623D-D8C4-D246-A1F7-180DFBDF806B}" type="datetimeFigureOut">
               <a:rPr lang="en-US" smtClean="0"/>
-              <a:t>10/8/17</a:t>
+              <a:t>10/11/17</a:t>
             </a:fld>
             <a:endParaRPr lang="en-US"/>
           </a:p>
@@ -3488,6 +3842,419 @@
 </p:sld>
 </file>
 
+<file path=ppt/slides/slide10.xml><?xml version="1.0" encoding="utf-8"?>
+<p:sld xmlns:a="http://schemas.openxmlformats.org/drawingml/2006/main" xmlns:r="http://schemas.openxmlformats.org/officeDocument/2006/relationships" xmlns:p="http://schemas.openxmlformats.org/presentationml/2006/main">
+  <p:cSld>
+    <p:spTree>
+      <p:nvGrpSpPr>
+        <p:cNvPr id="1" name=""/>
+        <p:cNvGrpSpPr/>
+        <p:nvPr/>
+      </p:nvGrpSpPr>
+      <p:grpSpPr>
+        <a:xfrm>
+          <a:off x="0" y="0"/>
+          <a:ext cx="0" cy="0"/>
+          <a:chOff x="0" y="0"/>
+          <a:chExt cx="0" cy="0"/>
+        </a:xfrm>
+      </p:grpSpPr>
+      <p:sp>
+        <p:nvSpPr>
+          <p:cNvPr id="37" name="Rectangle 36"/>
+          <p:cNvSpPr/>
+          <p:nvPr/>
+        </p:nvSpPr>
+        <p:spPr>
+          <a:xfrm>
+            <a:off x="2679700" y="2884704"/>
+            <a:ext cx="275302" cy="221921"/>
+          </a:xfrm>
+          <a:prstGeom prst="rect">
+            <a:avLst/>
+          </a:prstGeom>
+          <a:solidFill>
+            <a:schemeClr val="bg1"/>
+          </a:solidFill>
+          <a:ln>
+            <a:noFill/>
+          </a:ln>
+          <a:effectLst/>
+        </p:spPr>
+        <p:style>
+          <a:lnRef idx="1">
+            <a:schemeClr val="accent1"/>
+          </a:lnRef>
+          <a:fillRef idx="3">
+            <a:schemeClr val="accent1"/>
+          </a:fillRef>
+          <a:effectRef idx="2">
+            <a:schemeClr val="accent1"/>
+          </a:effectRef>
+          <a:fontRef idx="minor">
+            <a:schemeClr val="lt1"/>
+          </a:fontRef>
+        </p:style>
+        <p:txBody>
+          <a:bodyPr rtlCol="0" anchor="ctr"/>
+          <a:lstStyle/>
+          <a:p>
+            <a:pPr algn="ctr"/>
+            <a:endParaRPr lang="en-US" dirty="0"/>
+          </a:p>
+        </p:txBody>
+      </p:sp>
+      <p:cxnSp>
+        <p:nvCxnSpPr>
+          <p:cNvPr id="6" name="Straight Connector 5"/>
+          <p:cNvCxnSpPr/>
+          <p:nvPr/>
+        </p:nvCxnSpPr>
+        <p:spPr>
+          <a:xfrm>
+            <a:off x="2387824" y="2974184"/>
+            <a:ext cx="4191000" cy="0"/>
+          </a:xfrm>
+          <a:prstGeom prst="line">
+            <a:avLst/>
+          </a:prstGeom>
+          <a:ln w="38100" cap="flat" cmpd="sng" algn="ctr">
+            <a:solidFill>
+              <a:srgbClr val="000000"/>
+            </a:solidFill>
+            <a:prstDash val="solid"/>
+            <a:round/>
+            <a:headEnd type="none" w="med" len="med"/>
+            <a:tailEnd type="none" w="med" len="med"/>
+          </a:ln>
+        </p:spPr>
+        <p:style>
+          <a:lnRef idx="2">
+            <a:schemeClr val="accent1"/>
+          </a:lnRef>
+          <a:fillRef idx="0">
+            <a:schemeClr val="accent1"/>
+          </a:fillRef>
+          <a:effectRef idx="1">
+            <a:schemeClr val="accent1"/>
+          </a:effectRef>
+          <a:fontRef idx="minor">
+            <a:schemeClr val="tx1"/>
+          </a:fontRef>
+        </p:style>
+      </p:cxnSp>
+      <p:sp>
+        <p:nvSpPr>
+          <p:cNvPr id="9" name="Chord 8"/>
+          <p:cNvSpPr/>
+          <p:nvPr/>
+        </p:nvSpPr>
+        <p:spPr>
+          <a:xfrm>
+            <a:off x="3660618" y="2618584"/>
+            <a:ext cx="632206" cy="632206"/>
+          </a:xfrm>
+          <a:prstGeom prst="chord">
+            <a:avLst>
+              <a:gd name="adj1" fmla="val 10506229"/>
+              <a:gd name="adj2" fmla="val 301460"/>
+            </a:avLst>
+          </a:prstGeom>
+          <a:solidFill>
+            <a:schemeClr val="accent4">
+              <a:lumMod val="60000"/>
+              <a:lumOff val="40000"/>
+            </a:schemeClr>
+          </a:solidFill>
+          <a:ln w="38100" cap="flat" cmpd="sng" algn="ctr">
+            <a:solidFill>
+              <a:srgbClr val="000000"/>
+            </a:solidFill>
+            <a:prstDash val="solid"/>
+            <a:round/>
+            <a:headEnd type="none" w="med" len="med"/>
+            <a:tailEnd type="none" w="med" len="med"/>
+          </a:ln>
+        </p:spPr>
+        <p:style>
+          <a:lnRef idx="1">
+            <a:schemeClr val="accent1"/>
+          </a:lnRef>
+          <a:fillRef idx="3">
+            <a:schemeClr val="accent1"/>
+          </a:fillRef>
+          <a:effectRef idx="2">
+            <a:schemeClr val="accent1"/>
+          </a:effectRef>
+          <a:fontRef idx="minor">
+            <a:schemeClr val="lt1"/>
+          </a:fontRef>
+        </p:style>
+        <p:txBody>
+          <a:bodyPr rtlCol="0" anchor="ctr"/>
+          <a:lstStyle/>
+          <a:p>
+            <a:pPr algn="ctr"/>
+            <a:endParaRPr lang="en-US"/>
+          </a:p>
+        </p:txBody>
+      </p:sp>
+      <p:sp>
+        <p:nvSpPr>
+          <p:cNvPr id="10" name="Bent Arrow 9"/>
+          <p:cNvSpPr/>
+          <p:nvPr/>
+        </p:nvSpPr>
+        <p:spPr>
+          <a:xfrm>
+            <a:off x="2696733" y="2155732"/>
+            <a:ext cx="889000" cy="820040"/>
+          </a:xfrm>
+          <a:prstGeom prst="bentArrow">
+            <a:avLst/>
+          </a:prstGeom>
+          <a:solidFill>
+            <a:schemeClr val="tx2">
+              <a:lumMod val="60000"/>
+              <a:lumOff val="40000"/>
+            </a:schemeClr>
+          </a:solidFill>
+          <a:ln w="38100" cap="flat" cmpd="sng" algn="ctr">
+            <a:solidFill>
+              <a:srgbClr val="000000"/>
+            </a:solidFill>
+            <a:prstDash val="solid"/>
+            <a:round/>
+            <a:headEnd type="none" w="med" len="med"/>
+            <a:tailEnd type="none" w="med" len="med"/>
+          </a:ln>
+        </p:spPr>
+        <p:style>
+          <a:lnRef idx="1">
+            <a:schemeClr val="accent1"/>
+          </a:lnRef>
+          <a:fillRef idx="3">
+            <a:schemeClr val="accent1"/>
+          </a:fillRef>
+          <a:effectRef idx="2">
+            <a:schemeClr val="accent1"/>
+          </a:effectRef>
+          <a:fontRef idx="minor">
+            <a:schemeClr val="lt1"/>
+          </a:fontRef>
+        </p:style>
+        <p:txBody>
+          <a:bodyPr rtlCol="0" anchor="ctr"/>
+          <a:lstStyle/>
+          <a:p>
+            <a:pPr algn="ctr"/>
+            <a:endParaRPr lang="en-US">
+              <a:solidFill>
+                <a:schemeClr val="tx1"/>
+              </a:solidFill>
+            </a:endParaRPr>
+          </a:p>
+        </p:txBody>
+      </p:sp>
+      <p:sp>
+        <p:nvSpPr>
+          <p:cNvPr id="12" name="Left-Right-Up Arrow 11"/>
+          <p:cNvSpPr/>
+          <p:nvPr/>
+        </p:nvSpPr>
+        <p:spPr>
+          <a:xfrm rot="10800000">
+            <a:off x="5804124" y="2341914"/>
+            <a:ext cx="774700" cy="629540"/>
+          </a:xfrm>
+          <a:prstGeom prst="leftRightUpArrow">
+            <a:avLst>
+              <a:gd name="adj1" fmla="val 50000"/>
+              <a:gd name="adj2" fmla="val 14159"/>
+              <a:gd name="adj3" fmla="val 0"/>
+            </a:avLst>
+          </a:prstGeom>
+          <a:solidFill>
+            <a:schemeClr val="accent2">
+              <a:lumMod val="60000"/>
+              <a:lumOff val="40000"/>
+            </a:schemeClr>
+          </a:solidFill>
+          <a:ln w="38100" cap="flat" cmpd="sng" algn="ctr">
+            <a:solidFill>
+              <a:srgbClr val="000000"/>
+            </a:solidFill>
+            <a:prstDash val="solid"/>
+            <a:round/>
+            <a:headEnd type="none" w="med" len="med"/>
+            <a:tailEnd type="none" w="med" len="med"/>
+          </a:ln>
+        </p:spPr>
+        <p:style>
+          <a:lnRef idx="1">
+            <a:schemeClr val="accent1"/>
+          </a:lnRef>
+          <a:fillRef idx="3">
+            <a:schemeClr val="accent1"/>
+          </a:fillRef>
+          <a:effectRef idx="2">
+            <a:schemeClr val="accent1"/>
+          </a:effectRef>
+          <a:fontRef idx="minor">
+            <a:schemeClr val="lt1"/>
+          </a:fontRef>
+        </p:style>
+        <p:txBody>
+          <a:bodyPr rtlCol="0" anchor="ctr"/>
+          <a:lstStyle/>
+          <a:p>
+            <a:pPr algn="ctr"/>
+            <a:endParaRPr lang="en-US"/>
+          </a:p>
+        </p:txBody>
+      </p:sp>
+      <p:sp>
+        <p:nvSpPr>
+          <p:cNvPr id="38" name="TextBox 37"/>
+          <p:cNvSpPr txBox="1"/>
+          <p:nvPr/>
+        </p:nvSpPr>
+        <p:spPr>
+          <a:xfrm>
+            <a:off x="2911412" y="2906808"/>
+            <a:ext cx="588848" cy="369332"/>
+          </a:xfrm>
+          <a:prstGeom prst="rect">
+            <a:avLst/>
+          </a:prstGeom>
+          <a:noFill/>
+        </p:spPr>
+        <p:txBody>
+          <a:bodyPr wrap="none" rtlCol="0">
+            <a:spAutoFit/>
+          </a:bodyPr>
+          <a:lstStyle/>
+          <a:p>
+            <a:r>
+              <a:rPr lang="en-US" dirty="0" err="1"/>
+              <a:t>pTet</a:t>
+            </a:r>
+            <a:endParaRPr lang="en-US" dirty="0"/>
+          </a:p>
+        </p:txBody>
+      </p:sp>
+      <p:grpSp>
+        <p:nvGrpSpPr>
+          <p:cNvPr id="2" name="Group 1"/>
+          <p:cNvGrpSpPr/>
+          <p:nvPr/>
+        </p:nvGrpSpPr>
+        <p:grpSpPr>
+          <a:xfrm>
+            <a:off x="4836225" y="2419990"/>
+            <a:ext cx="424498" cy="461665"/>
+            <a:chOff x="2917611" y="3791800"/>
+            <a:chExt cx="424498" cy="461665"/>
+          </a:xfrm>
+        </p:grpSpPr>
+        <p:sp>
+          <p:nvSpPr>
+            <p:cNvPr id="11" name="Rectangle 10"/>
+            <p:cNvSpPr/>
+            <p:nvPr/>
+          </p:nvSpPr>
+          <p:spPr>
+            <a:xfrm rot="2700000">
+              <a:off x="2919548" y="3823346"/>
+              <a:ext cx="420624" cy="424498"/>
+            </a:xfrm>
+            <a:prstGeom prst="rect">
+              <a:avLst/>
+            </a:prstGeom>
+            <a:solidFill>
+              <a:srgbClr val="00B050"/>
+            </a:solidFill>
+            <a:ln w="19050" cmpd="sng">
+              <a:solidFill>
+                <a:srgbClr val="000000"/>
+              </a:solidFill>
+            </a:ln>
+            <a:effectLst/>
+          </p:spPr>
+          <p:style>
+            <a:lnRef idx="1">
+              <a:schemeClr val="accent1"/>
+            </a:lnRef>
+            <a:fillRef idx="3">
+              <a:schemeClr val="accent1"/>
+            </a:fillRef>
+            <a:effectRef idx="2">
+              <a:schemeClr val="accent1"/>
+            </a:effectRef>
+            <a:fontRef idx="minor">
+              <a:schemeClr val="lt1"/>
+            </a:fontRef>
+          </p:style>
+          <p:txBody>
+            <a:bodyPr rtlCol="0" anchor="ctr"/>
+            <a:lstStyle/>
+            <a:p>
+              <a:pPr algn="ctr"/>
+              <a:endParaRPr lang="en-US"/>
+            </a:p>
+          </p:txBody>
+        </p:sp>
+        <p:sp>
+          <p:nvSpPr>
+            <p:cNvPr id="13" name="TextBox 12"/>
+            <p:cNvSpPr txBox="1"/>
+            <p:nvPr/>
+          </p:nvSpPr>
+          <p:spPr>
+            <a:xfrm>
+              <a:off x="2961377" y="3791800"/>
+              <a:ext cx="327334" cy="461665"/>
+            </a:xfrm>
+            <a:prstGeom prst="rect">
+              <a:avLst/>
+            </a:prstGeom>
+            <a:noFill/>
+          </p:spPr>
+          <p:txBody>
+            <a:bodyPr wrap="none" rtlCol="0">
+              <a:spAutoFit/>
+            </a:bodyPr>
+            <a:lstStyle/>
+            <a:p>
+              <a:r>
+                <a:rPr lang="en-US" sz="2400" b="1" dirty="0" smtClean="0"/>
+                <a:t>?</a:t>
+              </a:r>
+              <a:endParaRPr lang="en-US" sz="2400" b="1" dirty="0"/>
+            </a:p>
+          </p:txBody>
+        </p:sp>
+      </p:grpSp>
+    </p:spTree>
+    <p:extLst>
+      <p:ext uri="{BB962C8B-B14F-4D97-AF65-F5344CB8AC3E}">
+        <p14:creationId xmlns:p14="http://schemas.microsoft.com/office/powerpoint/2010/main" val="1980579152"/>
+      </p:ext>
+    </p:extLst>
+  </p:cSld>
+  <p:clrMapOvr>
+    <a:masterClrMapping/>
+  </p:clrMapOvr>
+  <p:timing>
+    <p:tnLst>
+      <p:par>
+        <p:cTn id="1" dur="indefinite" restart="never" nodeType="tmRoot"/>
+      </p:par>
+    </p:tnLst>
+  </p:timing>
+</p:sld>
+</file>
+
 <file path=ppt/slides/slide2.xml><?xml version="1.0" encoding="utf-8"?>
 <p:sld xmlns:a="http://schemas.openxmlformats.org/drawingml/2006/main" xmlns:r="http://schemas.openxmlformats.org/officeDocument/2006/relationships" xmlns:p="http://schemas.openxmlformats.org/presentationml/2006/main">
   <p:cSld>
@@ -6054,6 +6821,317 @@
           </a:prstGeom>
         </p:spPr>
       </p:pic>
+      <p:cxnSp>
+        <p:nvCxnSpPr>
+          <p:cNvPr id="12" name="Straight Connector 11"/>
+          <p:cNvCxnSpPr/>
+          <p:nvPr/>
+        </p:nvCxnSpPr>
+        <p:spPr>
+          <a:xfrm>
+            <a:off x="3136900" y="4150144"/>
+            <a:ext cx="1143000" cy="0"/>
+          </a:xfrm>
+          <a:prstGeom prst="line">
+            <a:avLst/>
+          </a:prstGeom>
+          <a:ln w="38100" cap="flat" cmpd="sng" algn="ctr">
+            <a:solidFill>
+              <a:srgbClr val="000000"/>
+            </a:solidFill>
+            <a:prstDash val="solid"/>
+            <a:round/>
+            <a:headEnd type="none" w="med" len="med"/>
+            <a:tailEnd type="none" w="med" len="med"/>
+          </a:ln>
+        </p:spPr>
+        <p:style>
+          <a:lnRef idx="2">
+            <a:schemeClr val="accent1"/>
+          </a:lnRef>
+          <a:fillRef idx="0">
+            <a:schemeClr val="accent1"/>
+          </a:fillRef>
+          <a:effectRef idx="1">
+            <a:schemeClr val="accent1"/>
+          </a:effectRef>
+          <a:fontRef idx="minor">
+            <a:schemeClr val="tx1"/>
+          </a:fontRef>
+        </p:style>
+      </p:cxnSp>
+      <p:sp>
+        <p:nvSpPr>
+          <p:cNvPr id="14" name="Right Arrow 13"/>
+          <p:cNvSpPr/>
+          <p:nvPr/>
+        </p:nvSpPr>
+        <p:spPr>
+          <a:xfrm>
+            <a:off x="4838700" y="3800004"/>
+            <a:ext cx="1168400" cy="350140"/>
+          </a:xfrm>
+          <a:prstGeom prst="rightArrow">
+            <a:avLst>
+              <a:gd name="adj1" fmla="val 100000"/>
+              <a:gd name="adj2" fmla="val 52194"/>
+            </a:avLst>
+          </a:prstGeom>
+          <a:solidFill>
+            <a:srgbClr val="008000"/>
+          </a:solidFill>
+          <a:ln w="38100" cap="flat" cmpd="sng" algn="ctr">
+            <a:solidFill>
+              <a:srgbClr val="000000"/>
+            </a:solidFill>
+            <a:prstDash val="solid"/>
+            <a:round/>
+            <a:headEnd type="none" w="med" len="med"/>
+            <a:tailEnd type="none" w="med" len="med"/>
+          </a:ln>
+        </p:spPr>
+        <p:style>
+          <a:lnRef idx="1">
+            <a:schemeClr val="accent1"/>
+          </a:lnRef>
+          <a:fillRef idx="3">
+            <a:schemeClr val="accent1"/>
+          </a:fillRef>
+          <a:effectRef idx="2">
+            <a:schemeClr val="accent1"/>
+          </a:effectRef>
+          <a:fontRef idx="minor">
+            <a:schemeClr val="lt1"/>
+          </a:fontRef>
+        </p:style>
+        <p:txBody>
+          <a:bodyPr rtlCol="0" anchor="ctr"/>
+          <a:lstStyle/>
+          <a:p>
+            <a:pPr algn="ctr"/>
+            <a:r>
+              <a:rPr lang="en-US" i="1" dirty="0" err="1" smtClean="0">
+                <a:solidFill>
+                  <a:schemeClr val="tx1"/>
+                </a:solidFill>
+              </a:rPr>
+              <a:t>gfp</a:t>
+            </a:r>
+            <a:endParaRPr lang="en-US" i="1" dirty="0">
+              <a:solidFill>
+                <a:schemeClr val="tx1"/>
+              </a:solidFill>
+            </a:endParaRPr>
+          </a:p>
+        </p:txBody>
+      </p:sp>
+      <p:sp>
+        <p:nvSpPr>
+          <p:cNvPr id="16" name="Chord 15"/>
+          <p:cNvSpPr/>
+          <p:nvPr/>
+        </p:nvSpPr>
+        <p:spPr>
+          <a:xfrm>
+            <a:off x="3355594" y="3800004"/>
+            <a:ext cx="632206" cy="632206"/>
+          </a:xfrm>
+          <a:prstGeom prst="chord">
+            <a:avLst>
+              <a:gd name="adj1" fmla="val 10506229"/>
+              <a:gd name="adj2" fmla="val 301460"/>
+            </a:avLst>
+          </a:prstGeom>
+          <a:solidFill>
+            <a:schemeClr val="accent4">
+              <a:lumMod val="60000"/>
+              <a:lumOff val="40000"/>
+            </a:schemeClr>
+          </a:solidFill>
+          <a:ln w="38100" cap="flat" cmpd="sng" algn="ctr">
+            <a:solidFill>
+              <a:srgbClr val="000000"/>
+            </a:solidFill>
+            <a:prstDash val="solid"/>
+            <a:round/>
+            <a:headEnd type="none" w="med" len="med"/>
+            <a:tailEnd type="none" w="med" len="med"/>
+          </a:ln>
+        </p:spPr>
+        <p:style>
+          <a:lnRef idx="1">
+            <a:schemeClr val="accent1"/>
+          </a:lnRef>
+          <a:fillRef idx="3">
+            <a:schemeClr val="accent1"/>
+          </a:fillRef>
+          <a:effectRef idx="2">
+            <a:schemeClr val="accent1"/>
+          </a:effectRef>
+          <a:fontRef idx="minor">
+            <a:schemeClr val="lt1"/>
+          </a:fontRef>
+        </p:style>
+        <p:txBody>
+          <a:bodyPr rtlCol="0" anchor="ctr"/>
+          <a:lstStyle/>
+          <a:p>
+            <a:pPr algn="ctr"/>
+            <a:endParaRPr lang="en-US"/>
+          </a:p>
+        </p:txBody>
+      </p:sp>
+      <p:cxnSp>
+        <p:nvCxnSpPr>
+          <p:cNvPr id="17" name="Straight Connector 16"/>
+          <p:cNvCxnSpPr/>
+          <p:nvPr/>
+        </p:nvCxnSpPr>
+        <p:spPr>
+          <a:xfrm>
+            <a:off x="4635500" y="4150144"/>
+            <a:ext cx="1612900" cy="0"/>
+          </a:xfrm>
+          <a:prstGeom prst="line">
+            <a:avLst/>
+          </a:prstGeom>
+          <a:ln w="38100" cap="flat" cmpd="sng" algn="ctr">
+            <a:solidFill>
+              <a:srgbClr val="000000"/>
+            </a:solidFill>
+            <a:prstDash val="solid"/>
+            <a:round/>
+            <a:headEnd type="none" w="med" len="med"/>
+            <a:tailEnd type="none" w="med" len="med"/>
+          </a:ln>
+        </p:spPr>
+        <p:style>
+          <a:lnRef idx="2">
+            <a:schemeClr val="accent1"/>
+          </a:lnRef>
+          <a:fillRef idx="0">
+            <a:schemeClr val="accent1"/>
+          </a:fillRef>
+          <a:effectRef idx="1">
+            <a:schemeClr val="accent1"/>
+          </a:effectRef>
+          <a:fontRef idx="minor">
+            <a:schemeClr val="tx1"/>
+          </a:fontRef>
+        </p:style>
+      </p:cxnSp>
+      <p:sp>
+        <p:nvSpPr>
+          <p:cNvPr id="5" name="TextBox 4"/>
+          <p:cNvSpPr txBox="1"/>
+          <p:nvPr/>
+        </p:nvSpPr>
+        <p:spPr>
+          <a:xfrm>
+            <a:off x="4303380" y="3880124"/>
+            <a:ext cx="367408" cy="400110"/>
+          </a:xfrm>
+          <a:prstGeom prst="rect">
+            <a:avLst/>
+          </a:prstGeom>
+          <a:noFill/>
+        </p:spPr>
+        <p:txBody>
+          <a:bodyPr wrap="none" rtlCol="0">
+            <a:spAutoFit/>
+          </a:bodyPr>
+          <a:lstStyle/>
+          <a:p>
+            <a:r>
+              <a:rPr lang="mr-IN" sz="2000" b="1" dirty="0" smtClean="0"/>
+              <a:t>…</a:t>
+            </a:r>
+            <a:endParaRPr lang="en-US" sz="2000" b="1" dirty="0"/>
+          </a:p>
+        </p:txBody>
+      </p:sp>
+      <p:cxnSp>
+        <p:nvCxnSpPr>
+          <p:cNvPr id="20" name="Straight Connector 19"/>
+          <p:cNvCxnSpPr/>
+          <p:nvPr/>
+        </p:nvCxnSpPr>
+        <p:spPr>
+          <a:xfrm>
+            <a:off x="5156200" y="2974184"/>
+            <a:ext cx="1102980" cy="1175960"/>
+          </a:xfrm>
+          <a:prstGeom prst="line">
+            <a:avLst/>
+          </a:prstGeom>
+          <a:ln w="12700" cap="flat" cmpd="sng" algn="ctr">
+            <a:solidFill>
+              <a:schemeClr val="bg1">
+                <a:lumMod val="50000"/>
+              </a:schemeClr>
+            </a:solidFill>
+            <a:prstDash val="dash"/>
+            <a:round/>
+            <a:headEnd type="none" w="med" len="med"/>
+            <a:tailEnd type="none" w="med" len="med"/>
+          </a:ln>
+        </p:spPr>
+        <p:style>
+          <a:lnRef idx="2">
+            <a:schemeClr val="accent1"/>
+          </a:lnRef>
+          <a:fillRef idx="0">
+            <a:schemeClr val="accent1"/>
+          </a:fillRef>
+          <a:effectRef idx="1">
+            <a:schemeClr val="accent1"/>
+          </a:effectRef>
+          <a:fontRef idx="minor">
+            <a:schemeClr val="tx1"/>
+          </a:fontRef>
+        </p:style>
+      </p:cxnSp>
+      <p:cxnSp>
+        <p:nvCxnSpPr>
+          <p:cNvPr id="24" name="Straight Connector 23"/>
+          <p:cNvCxnSpPr/>
+          <p:nvPr/>
+        </p:nvCxnSpPr>
+        <p:spPr>
+          <a:xfrm flipH="1">
+            <a:off x="3136900" y="2974183"/>
+            <a:ext cx="901699" cy="1175961"/>
+          </a:xfrm>
+          <a:prstGeom prst="line">
+            <a:avLst/>
+          </a:prstGeom>
+          <a:ln w="12700" cap="flat" cmpd="sng" algn="ctr">
+            <a:solidFill>
+              <a:schemeClr val="bg1">
+                <a:lumMod val="50000"/>
+              </a:schemeClr>
+            </a:solidFill>
+            <a:prstDash val="dash"/>
+            <a:round/>
+            <a:headEnd type="none" w="med" len="med"/>
+            <a:tailEnd type="none" w="med" len="med"/>
+          </a:ln>
+        </p:spPr>
+        <p:style>
+          <a:lnRef idx="2">
+            <a:schemeClr val="accent1"/>
+          </a:lnRef>
+          <a:fillRef idx="0">
+            <a:schemeClr val="accent1"/>
+          </a:fillRef>
+          <a:effectRef idx="1">
+            <a:schemeClr val="accent1"/>
+          </a:effectRef>
+          <a:fontRef idx="minor">
+            <a:schemeClr val="tx1"/>
+          </a:fontRef>
+        </p:style>
+      </p:cxnSp>
     </p:spTree>
     <p:extLst>
       <p:ext uri="{BB962C8B-B14F-4D97-AF65-F5344CB8AC3E}">
@@ -6558,4 +7636,265 @@
   </a:objectDefaults>
   <a:extraClrSchemeLst/>
 </a:theme>
+</file>
+
+<file path=ppt/theme/theme2.xml><?xml version="1.0" encoding="utf-8"?>
+<a:theme xmlns:a="http://schemas.openxmlformats.org/drawingml/2006/main" name="Office Theme">
+  <a:themeElements>
+    <a:clrScheme name="Office">
+      <a:dk1>
+        <a:sysClr val="windowText" lastClr="000000"/>
+      </a:dk1>
+      <a:lt1>
+        <a:sysClr val="window" lastClr="FFFFFF"/>
+      </a:lt1>
+      <a:dk2>
+        <a:srgbClr val="44546A"/>
+      </a:dk2>
+      <a:lt2>
+        <a:srgbClr val="E7E6E6"/>
+      </a:lt2>
+      <a:accent1>
+        <a:srgbClr val="4472C4"/>
+      </a:accent1>
+      <a:accent2>
+        <a:srgbClr val="ED7D31"/>
+      </a:accent2>
+      <a:accent3>
+        <a:srgbClr val="A5A5A5"/>
+      </a:accent3>
+      <a:accent4>
+        <a:srgbClr val="FFC000"/>
+      </a:accent4>
+      <a:accent5>
+        <a:srgbClr val="5B9BD5"/>
+      </a:accent5>
+      <a:accent6>
+        <a:srgbClr val="70AD47"/>
+      </a:accent6>
+      <a:hlink>
+        <a:srgbClr val="0563C1"/>
+      </a:hlink>
+      <a:folHlink>
+        <a:srgbClr val="954F72"/>
+      </a:folHlink>
+    </a:clrScheme>
+    <a:fontScheme name="Office">
+      <a:majorFont>
+        <a:latin typeface="Calibri Light" panose="020F0302020204030204"/>
+        <a:ea typeface=""/>
+        <a:cs typeface=""/>
+        <a:font script="Jpan" typeface="Yu Gothic Light"/>
+        <a:font script="Hang" typeface="맑은 고딕"/>
+        <a:font script="Hans" typeface="DengXian Light"/>
+        <a:font script="Hant" typeface="新細明體"/>
+        <a:font script="Arab" typeface="Times New Roman"/>
+        <a:font script="Hebr" typeface="Times New Roman"/>
+        <a:font script="Thai" typeface="Angsana New"/>
+        <a:font script="Ethi" typeface="Nyala"/>
+        <a:font script="Beng" typeface="Vrinda"/>
+        <a:font script="Gujr" typeface="Shruti"/>
+        <a:font script="Khmr" typeface="MoolBoran"/>
+        <a:font script="Knda" typeface="Tunga"/>
+        <a:font script="Guru" typeface="Raavi"/>
+        <a:font script="Cans" typeface="Euphemia"/>
+        <a:font script="Cher" typeface="Plantagenet Cherokee"/>
+        <a:font script="Yiii" typeface="Microsoft Yi Baiti"/>
+        <a:font script="Tibt" typeface="Microsoft Himalaya"/>
+        <a:font script="Thaa" typeface="MV Boli"/>
+        <a:font script="Deva" typeface="Mangal"/>
+        <a:font script="Telu" typeface="Gautami"/>
+        <a:font script="Taml" typeface="Latha"/>
+        <a:font script="Syrc" typeface="Estrangelo Edessa"/>
+        <a:font script="Orya" typeface="Kalinga"/>
+        <a:font script="Mlym" typeface="Kartika"/>
+        <a:font script="Laoo" typeface="DokChampa"/>
+        <a:font script="Sinh" typeface="Iskoola Pota"/>
+        <a:font script="Mong" typeface="Mongolian Baiti"/>
+        <a:font script="Viet" typeface="Times New Roman"/>
+        <a:font script="Uigh" typeface="Microsoft Uighur"/>
+        <a:font script="Geor" typeface="Sylfaen"/>
+      </a:majorFont>
+      <a:minorFont>
+        <a:latin typeface="Calibri" panose="020F0502020204030204"/>
+        <a:ea typeface=""/>
+        <a:cs typeface=""/>
+        <a:font script="Jpan" typeface="Yu Gothic"/>
+        <a:font script="Hang" typeface="맑은 고딕"/>
+        <a:font script="Hans" typeface="DengXian"/>
+        <a:font script="Hant" typeface="新細明體"/>
+        <a:font script="Arab" typeface="Arial"/>
+        <a:font script="Hebr" typeface="Arial"/>
+        <a:font script="Thai" typeface="Cordia New"/>
+        <a:font script="Ethi" typeface="Nyala"/>
+        <a:font script="Beng" typeface="Vrinda"/>
+        <a:font script="Gujr" typeface="Shruti"/>
+        <a:font script="Khmr" typeface="DaunPenh"/>
+        <a:font script="Knda" typeface="Tunga"/>
+        <a:font script="Guru" typeface="Raavi"/>
+        <a:font script="Cans" typeface="Euphemia"/>
+        <a:font script="Cher" typeface="Plantagenet Cherokee"/>
+        <a:font script="Yiii" typeface="Microsoft Yi Baiti"/>
+        <a:font script="Tibt" typeface="Microsoft Himalaya"/>
+        <a:font script="Thaa" typeface="MV Boli"/>
+        <a:font script="Deva" typeface="Mangal"/>
+        <a:font script="Telu" typeface="Gautami"/>
+        <a:font script="Taml" typeface="Latha"/>
+        <a:font script="Syrc" typeface="Estrangelo Edessa"/>
+        <a:font script="Orya" typeface="Kalinga"/>
+        <a:font script="Mlym" typeface="Kartika"/>
+        <a:font script="Laoo" typeface="DokChampa"/>
+        <a:font script="Sinh" typeface="Iskoola Pota"/>
+        <a:font script="Mong" typeface="Mongolian Baiti"/>
+        <a:font script="Viet" typeface="Arial"/>
+        <a:font script="Uigh" typeface="Microsoft Uighur"/>
+        <a:font script="Geor" typeface="Sylfaen"/>
+      </a:minorFont>
+    </a:fontScheme>
+    <a:fmtScheme name="Office">
+      <a:fillStyleLst>
+        <a:solidFill>
+          <a:schemeClr val="phClr"/>
+        </a:solidFill>
+        <a:gradFill rotWithShape="1">
+          <a:gsLst>
+            <a:gs pos="0">
+              <a:schemeClr val="phClr">
+                <a:lumMod val="110000"/>
+                <a:satMod val="105000"/>
+                <a:tint val="67000"/>
+              </a:schemeClr>
+            </a:gs>
+            <a:gs pos="50000">
+              <a:schemeClr val="phClr">
+                <a:lumMod val="105000"/>
+                <a:satMod val="103000"/>
+                <a:tint val="73000"/>
+              </a:schemeClr>
+            </a:gs>
+            <a:gs pos="100000">
+              <a:schemeClr val="phClr">
+                <a:lumMod val="105000"/>
+                <a:satMod val="109000"/>
+                <a:tint val="81000"/>
+              </a:schemeClr>
+            </a:gs>
+          </a:gsLst>
+          <a:lin ang="5400000" scaled="0"/>
+        </a:gradFill>
+        <a:gradFill rotWithShape="1">
+          <a:gsLst>
+            <a:gs pos="0">
+              <a:schemeClr val="phClr">
+                <a:satMod val="103000"/>
+                <a:lumMod val="102000"/>
+                <a:tint val="94000"/>
+              </a:schemeClr>
+            </a:gs>
+            <a:gs pos="50000">
+              <a:schemeClr val="phClr">
+                <a:satMod val="110000"/>
+                <a:lumMod val="100000"/>
+                <a:shade val="100000"/>
+              </a:schemeClr>
+            </a:gs>
+            <a:gs pos="100000">
+              <a:schemeClr val="phClr">
+                <a:lumMod val="99000"/>
+                <a:satMod val="120000"/>
+                <a:shade val="78000"/>
+              </a:schemeClr>
+            </a:gs>
+          </a:gsLst>
+          <a:lin ang="5400000" scaled="0"/>
+        </a:gradFill>
+      </a:fillStyleLst>
+      <a:lnStyleLst>
+        <a:ln w="6350" cap="flat" cmpd="sng" algn="ctr">
+          <a:solidFill>
+            <a:schemeClr val="phClr"/>
+          </a:solidFill>
+          <a:prstDash val="solid"/>
+          <a:miter lim="800000"/>
+        </a:ln>
+        <a:ln w="12700" cap="flat" cmpd="sng" algn="ctr">
+          <a:solidFill>
+            <a:schemeClr val="phClr"/>
+          </a:solidFill>
+          <a:prstDash val="solid"/>
+          <a:miter lim="800000"/>
+        </a:ln>
+        <a:ln w="19050" cap="flat" cmpd="sng" algn="ctr">
+          <a:solidFill>
+            <a:schemeClr val="phClr"/>
+          </a:solidFill>
+          <a:prstDash val="solid"/>
+          <a:miter lim="800000"/>
+        </a:ln>
+      </a:lnStyleLst>
+      <a:effectStyleLst>
+        <a:effectStyle>
+          <a:effectLst/>
+        </a:effectStyle>
+        <a:effectStyle>
+          <a:effectLst/>
+        </a:effectStyle>
+        <a:effectStyle>
+          <a:effectLst>
+            <a:outerShdw blurRad="57150" dist="19050" dir="5400000" algn="ctr" rotWithShape="0">
+              <a:srgbClr val="000000">
+                <a:alpha val="63000"/>
+              </a:srgbClr>
+            </a:outerShdw>
+          </a:effectLst>
+        </a:effectStyle>
+      </a:effectStyleLst>
+      <a:bgFillStyleLst>
+        <a:solidFill>
+          <a:schemeClr val="phClr"/>
+        </a:solidFill>
+        <a:solidFill>
+          <a:schemeClr val="phClr">
+            <a:tint val="95000"/>
+            <a:satMod val="170000"/>
+          </a:schemeClr>
+        </a:solidFill>
+        <a:gradFill rotWithShape="1">
+          <a:gsLst>
+            <a:gs pos="0">
+              <a:schemeClr val="phClr">
+                <a:tint val="93000"/>
+                <a:satMod val="150000"/>
+                <a:shade val="98000"/>
+                <a:lumMod val="102000"/>
+              </a:schemeClr>
+            </a:gs>
+            <a:gs pos="50000">
+              <a:schemeClr val="phClr">
+                <a:tint val="98000"/>
+                <a:satMod val="130000"/>
+                <a:shade val="90000"/>
+                <a:lumMod val="103000"/>
+              </a:schemeClr>
+            </a:gs>
+            <a:gs pos="100000">
+              <a:schemeClr val="phClr">
+                <a:shade val="63000"/>
+                <a:satMod val="120000"/>
+              </a:schemeClr>
+            </a:gs>
+          </a:gsLst>
+          <a:lin ang="5400000" scaled="0"/>
+        </a:gradFill>
+      </a:bgFillStyleLst>
+    </a:fmtScheme>
+  </a:themeElements>
+  <a:objectDefaults/>
+  <a:extraClrSchemeLst/>
+  <a:extLst>
+    <a:ext uri="{05A4C25C-085E-4340-85A3-A5531E510DB2}">
+      <thm15:themeFamily xmlns:thm15="http://schemas.microsoft.com/office/thememl/2012/main" name="Office Theme" id="{62F939B6-93AF-4DB8-9C6B-D6C7DFDC589F}" vid="{4A3C46E8-61CC-4603-A589-7422A47A8E4A}"/>
+    </a:ext>
+  </a:extLst>
+</a:theme>
 </file>
</xml_diff>

<commit_message>
updated figures for SEP V005; still need updates for CDSs in language chapter
</commit_message>
<xml_diff>
--- a/specification/imgsrc/examples.pptx
+++ b/specification/imgsrc/examples.pptx
@@ -217,7 +217,7 @@
           <a:p>
             <a:fld id="{A5398B87-931F-0F48-BDB8-4235032D88C0}" type="datetimeFigureOut">
               <a:rPr lang="en-US" smtClean="0"/>
-              <a:t>10/11/17</a:t>
+              <a:t>10/12/17</a:t>
             </a:fld>
             <a:endParaRPr lang="en-US"/>
           </a:p>
@@ -666,7 +666,7 @@
           <a:p>
             <a:fld id="{B519623D-D8C4-D246-A1F7-180DFBDF806B}" type="datetimeFigureOut">
               <a:rPr lang="en-US" smtClean="0"/>
-              <a:t>10/11/17</a:t>
+              <a:t>10/12/17</a:t>
             </a:fld>
             <a:endParaRPr lang="en-US"/>
           </a:p>
@@ -836,7 +836,7 @@
           <a:p>
             <a:fld id="{B519623D-D8C4-D246-A1F7-180DFBDF806B}" type="datetimeFigureOut">
               <a:rPr lang="en-US" smtClean="0"/>
-              <a:t>10/11/17</a:t>
+              <a:t>10/12/17</a:t>
             </a:fld>
             <a:endParaRPr lang="en-US"/>
           </a:p>
@@ -1016,7 +1016,7 @@
           <a:p>
             <a:fld id="{B519623D-D8C4-D246-A1F7-180DFBDF806B}" type="datetimeFigureOut">
               <a:rPr lang="en-US" smtClean="0"/>
-              <a:t>10/11/17</a:t>
+              <a:t>10/12/17</a:t>
             </a:fld>
             <a:endParaRPr lang="en-US"/>
           </a:p>
@@ -1186,7 +1186,7 @@
           <a:p>
             <a:fld id="{B519623D-D8C4-D246-A1F7-180DFBDF806B}" type="datetimeFigureOut">
               <a:rPr lang="en-US" smtClean="0"/>
-              <a:t>10/11/17</a:t>
+              <a:t>10/12/17</a:t>
             </a:fld>
             <a:endParaRPr lang="en-US"/>
           </a:p>
@@ -1432,7 +1432,7 @@
           <a:p>
             <a:fld id="{B519623D-D8C4-D246-A1F7-180DFBDF806B}" type="datetimeFigureOut">
               <a:rPr lang="en-US" smtClean="0"/>
-              <a:t>10/11/17</a:t>
+              <a:t>10/12/17</a:t>
             </a:fld>
             <a:endParaRPr lang="en-US"/>
           </a:p>
@@ -1720,7 +1720,7 @@
           <a:p>
             <a:fld id="{B519623D-D8C4-D246-A1F7-180DFBDF806B}" type="datetimeFigureOut">
               <a:rPr lang="en-US" smtClean="0"/>
-              <a:t>10/11/17</a:t>
+              <a:t>10/12/17</a:t>
             </a:fld>
             <a:endParaRPr lang="en-US"/>
           </a:p>
@@ -2142,7 +2142,7 @@
           <a:p>
             <a:fld id="{B519623D-D8C4-D246-A1F7-180DFBDF806B}" type="datetimeFigureOut">
               <a:rPr lang="en-US" smtClean="0"/>
-              <a:t>10/11/17</a:t>
+              <a:t>10/12/17</a:t>
             </a:fld>
             <a:endParaRPr lang="en-US"/>
           </a:p>
@@ -2260,7 +2260,7 @@
           <a:p>
             <a:fld id="{B519623D-D8C4-D246-A1F7-180DFBDF806B}" type="datetimeFigureOut">
               <a:rPr lang="en-US" smtClean="0"/>
-              <a:t>10/11/17</a:t>
+              <a:t>10/12/17</a:t>
             </a:fld>
             <a:endParaRPr lang="en-US"/>
           </a:p>
@@ -2355,7 +2355,7 @@
           <a:p>
             <a:fld id="{B519623D-D8C4-D246-A1F7-180DFBDF806B}" type="datetimeFigureOut">
               <a:rPr lang="en-US" smtClean="0"/>
-              <a:t>10/11/17</a:t>
+              <a:t>10/12/17</a:t>
             </a:fld>
             <a:endParaRPr lang="en-US"/>
           </a:p>
@@ -2632,7 +2632,7 @@
           <a:p>
             <a:fld id="{B519623D-D8C4-D246-A1F7-180DFBDF806B}" type="datetimeFigureOut">
               <a:rPr lang="en-US" smtClean="0"/>
-              <a:t>10/11/17</a:t>
+              <a:t>10/12/17</a:t>
             </a:fld>
             <a:endParaRPr lang="en-US"/>
           </a:p>
@@ -2885,7 +2885,7 @@
           <a:p>
             <a:fld id="{B519623D-D8C4-D246-A1F7-180DFBDF806B}" type="datetimeFigureOut">
               <a:rPr lang="en-US" smtClean="0"/>
-              <a:t>10/11/17</a:t>
+              <a:t>10/12/17</a:t>
             </a:fld>
             <a:endParaRPr lang="en-US"/>
           </a:p>
@@ -3098,7 +3098,7 @@
           <a:p>
             <a:fld id="{B519623D-D8C4-D246-A1F7-180DFBDF806B}" type="datetimeFigureOut">
               <a:rPr lang="en-US" smtClean="0"/>
-              <a:t>10/11/17</a:t>
+              <a:t>10/12/17</a:t>
             </a:fld>
             <a:endParaRPr lang="en-US"/>
           </a:p>
@@ -3565,7 +3565,7 @@
         </p:nvSpPr>
         <p:spPr>
           <a:xfrm>
-            <a:off x="4559524" y="2618584"/>
+            <a:off x="4559524" y="2783684"/>
             <a:ext cx="1168400" cy="350140"/>
           </a:xfrm>
           <a:prstGeom prst="rightArrow">
@@ -4319,14 +4319,14 @@
       </p:sp>
       <p:cxnSp>
         <p:nvCxnSpPr>
-          <p:cNvPr id="6" name="Straight Connector 5"/>
+          <p:cNvPr id="11" name="Straight Connector 10"/>
           <p:cNvCxnSpPr/>
           <p:nvPr/>
         </p:nvCxnSpPr>
         <p:spPr>
           <a:xfrm>
-            <a:off x="2222500" y="2974184"/>
-            <a:ext cx="4864100" cy="0"/>
+            <a:off x="2425924" y="3075784"/>
+            <a:ext cx="4432076" cy="0"/>
           </a:xfrm>
           <a:prstGeom prst="line">
             <a:avLst/>
@@ -4356,6 +4356,45 @@
           </a:fontRef>
         </p:style>
       </p:cxnSp>
+      <p:cxnSp>
+        <p:nvCxnSpPr>
+          <p:cNvPr id="6" name="Straight Connector 5"/>
+          <p:cNvCxnSpPr/>
+          <p:nvPr/>
+        </p:nvCxnSpPr>
+        <p:spPr>
+          <a:xfrm>
+            <a:off x="2222500" y="2974184"/>
+            <a:ext cx="4864100" cy="0"/>
+          </a:xfrm>
+          <a:prstGeom prst="line">
+            <a:avLst/>
+          </a:prstGeom>
+          <a:ln w="38100" cap="flat" cmpd="sng" algn="ctr">
+            <a:solidFill>
+              <a:srgbClr val="000000"/>
+            </a:solidFill>
+            <a:prstDash val="solid"/>
+            <a:round/>
+            <a:headEnd type="none" w="med" len="med"/>
+            <a:tailEnd type="none" w="med" len="med"/>
+          </a:ln>
+        </p:spPr>
+        <p:style>
+          <a:lnRef idx="2">
+            <a:schemeClr val="accent1"/>
+          </a:lnRef>
+          <a:fillRef idx="0">
+            <a:schemeClr val="accent1"/>
+          </a:fillRef>
+          <a:effectRef idx="1">
+            <a:schemeClr val="accent1"/>
+          </a:effectRef>
+          <a:fontRef idx="minor">
+            <a:schemeClr val="tx1"/>
+          </a:fontRef>
+        </p:style>
+      </p:cxnSp>
       <p:sp>
         <p:nvSpPr>
           <p:cNvPr id="8" name="Right Arrow 7"/>
@@ -4364,7 +4403,7 @@
         </p:nvSpPr>
         <p:spPr>
           <a:xfrm>
-            <a:off x="4762724" y="2618584"/>
+            <a:off x="4762724" y="2834484"/>
             <a:ext cx="1168400" cy="350140"/>
           </a:xfrm>
           <a:prstGeom prst="rightArrow">
@@ -4621,45 +4660,6 @@
           </a:p>
         </p:txBody>
       </p:sp>
-      <p:cxnSp>
-        <p:nvCxnSpPr>
-          <p:cNvPr id="11" name="Straight Connector 10"/>
-          <p:cNvCxnSpPr/>
-          <p:nvPr/>
-        </p:nvCxnSpPr>
-        <p:spPr>
-          <a:xfrm>
-            <a:off x="2425924" y="3101184"/>
-            <a:ext cx="4432076" cy="0"/>
-          </a:xfrm>
-          <a:prstGeom prst="line">
-            <a:avLst/>
-          </a:prstGeom>
-          <a:ln w="38100" cap="flat" cmpd="sng" algn="ctr">
-            <a:solidFill>
-              <a:srgbClr val="000000"/>
-            </a:solidFill>
-            <a:prstDash val="solid"/>
-            <a:round/>
-            <a:headEnd type="none" w="med" len="med"/>
-            <a:tailEnd type="none" w="med" len="med"/>
-          </a:ln>
-        </p:spPr>
-        <p:style>
-          <a:lnRef idx="2">
-            <a:schemeClr val="accent1"/>
-          </a:lnRef>
-          <a:fillRef idx="0">
-            <a:schemeClr val="accent1"/>
-          </a:fillRef>
-          <a:effectRef idx="1">
-            <a:schemeClr val="accent1"/>
-          </a:effectRef>
-          <a:fontRef idx="minor">
-            <a:schemeClr val="tx1"/>
-          </a:fontRef>
-        </p:style>
-      </p:cxnSp>
       <p:grpSp>
         <p:nvGrpSpPr>
           <p:cNvPr id="16" name="Group 15"/>
@@ -4753,6 +4753,51 @@
           </p:style>
         </p:cxnSp>
       </p:grpSp>
+      <p:sp>
+        <p:nvSpPr>
+          <p:cNvPr id="19" name="Rectangle 18"/>
+          <p:cNvSpPr/>
+          <p:nvPr/>
+        </p:nvSpPr>
+        <p:spPr>
+          <a:xfrm>
+            <a:off x="3617672" y="2936967"/>
+            <a:ext cx="275302" cy="221921"/>
+          </a:xfrm>
+          <a:prstGeom prst="rect">
+            <a:avLst/>
+          </a:prstGeom>
+          <a:solidFill>
+            <a:schemeClr val="bg1"/>
+          </a:solidFill>
+          <a:ln>
+            <a:noFill/>
+          </a:ln>
+          <a:effectLst/>
+        </p:spPr>
+        <p:style>
+          <a:lnRef idx="1">
+            <a:schemeClr val="accent1"/>
+          </a:lnRef>
+          <a:fillRef idx="3">
+            <a:schemeClr val="accent1"/>
+          </a:fillRef>
+          <a:effectRef idx="2">
+            <a:schemeClr val="accent1"/>
+          </a:effectRef>
+          <a:fontRef idx="minor">
+            <a:schemeClr val="lt1"/>
+          </a:fontRef>
+        </p:style>
+        <p:txBody>
+          <a:bodyPr rtlCol="0" anchor="ctr"/>
+          <a:lstStyle/>
+          <a:p>
+            <a:pPr algn="ctr"/>
+            <a:endParaRPr lang="en-US" dirty="0"/>
+          </a:p>
+        </p:txBody>
+      </p:sp>
     </p:spTree>
     <p:extLst>
       <p:ext uri="{BB962C8B-B14F-4D97-AF65-F5344CB8AC3E}">
@@ -5014,7 +5059,7 @@
       </p:sp>
       <p:pic>
         <p:nvPicPr>
-          <p:cNvPr id="17" name="Picture 16" descr="five-prime-sticky-restriction-site.pdf"/>
+          <p:cNvPr id="25" name="Picture 24" descr="signature.pdf"/>
           <p:cNvPicPr>
             <a:picLocks noChangeAspect="1"/>
           </p:cNvPicPr>
@@ -5034,7 +5079,7 @@
         </p:blipFill>
         <p:spPr>
           <a:xfrm>
-            <a:off x="1896633" y="2247900"/>
+            <a:off x="4838700" y="2391572"/>
             <a:ext cx="635000" cy="1270000"/>
           </a:xfrm>
           <a:prstGeom prst="rect">
@@ -5042,9 +5087,99 @@
           </a:prstGeom>
         </p:spPr>
       </p:pic>
+      <p:sp>
+        <p:nvSpPr>
+          <p:cNvPr id="11" name="Rectangle 10"/>
+          <p:cNvSpPr/>
+          <p:nvPr/>
+        </p:nvSpPr>
+        <p:spPr>
+          <a:xfrm>
+            <a:off x="3617672" y="2873816"/>
+            <a:ext cx="458186" cy="182010"/>
+          </a:xfrm>
+          <a:prstGeom prst="rect">
+            <a:avLst/>
+          </a:prstGeom>
+          <a:solidFill>
+            <a:schemeClr val="bg1"/>
+          </a:solidFill>
+          <a:ln>
+            <a:noFill/>
+          </a:ln>
+          <a:effectLst/>
+        </p:spPr>
+        <p:style>
+          <a:lnRef idx="1">
+            <a:schemeClr val="accent1"/>
+          </a:lnRef>
+          <a:fillRef idx="3">
+            <a:schemeClr val="accent1"/>
+          </a:fillRef>
+          <a:effectRef idx="2">
+            <a:schemeClr val="accent1"/>
+          </a:effectRef>
+          <a:fontRef idx="minor">
+            <a:schemeClr val="lt1"/>
+          </a:fontRef>
+        </p:style>
+        <p:txBody>
+          <a:bodyPr rtlCol="0" anchor="ctr"/>
+          <a:lstStyle/>
+          <a:p>
+            <a:pPr algn="ctr"/>
+            <a:endParaRPr lang="en-US" dirty="0"/>
+          </a:p>
+        </p:txBody>
+      </p:sp>
+      <p:sp>
+        <p:nvSpPr>
+          <p:cNvPr id="12" name="Rectangle 11"/>
+          <p:cNvSpPr/>
+          <p:nvPr/>
+        </p:nvSpPr>
+        <p:spPr>
+          <a:xfrm>
+            <a:off x="1978776" y="2886242"/>
+            <a:ext cx="458186" cy="182010"/>
+          </a:xfrm>
+          <a:prstGeom prst="rect">
+            <a:avLst/>
+          </a:prstGeom>
+          <a:solidFill>
+            <a:schemeClr val="bg1"/>
+          </a:solidFill>
+          <a:ln>
+            <a:noFill/>
+          </a:ln>
+          <a:effectLst/>
+        </p:spPr>
+        <p:style>
+          <a:lnRef idx="1">
+            <a:schemeClr val="accent1"/>
+          </a:lnRef>
+          <a:fillRef idx="3">
+            <a:schemeClr val="accent1"/>
+          </a:fillRef>
+          <a:effectRef idx="2">
+            <a:schemeClr val="accent1"/>
+          </a:effectRef>
+          <a:fontRef idx="minor">
+            <a:schemeClr val="lt1"/>
+          </a:fontRef>
+        </p:style>
+        <p:txBody>
+          <a:bodyPr rtlCol="0" anchor="ctr"/>
+          <a:lstStyle/>
+          <a:p>
+            <a:pPr algn="ctr"/>
+            <a:endParaRPr lang="en-US" dirty="0"/>
+          </a:p>
+        </p:txBody>
+      </p:sp>
       <p:pic>
         <p:nvPicPr>
-          <p:cNvPr id="20" name="Picture 19" descr="three-prime-sticky-restriction-site.pdf"/>
+          <p:cNvPr id="17" name="Picture 16" descr="five-prime-sticky-restriction-site.pdf"/>
           <p:cNvPicPr>
             <a:picLocks noChangeAspect="1"/>
           </p:cNvPicPr>
@@ -5064,7 +5199,7 @@
         </p:blipFill>
         <p:spPr>
           <a:xfrm>
-            <a:off x="3530600" y="2247900"/>
+            <a:off x="1896633" y="2336800"/>
             <a:ext cx="635000" cy="1270000"/>
           </a:xfrm>
           <a:prstGeom prst="rect">
@@ -5074,7 +5209,7 @@
       </p:pic>
       <p:pic>
         <p:nvPicPr>
-          <p:cNvPr id="25" name="Picture 24" descr="signature.pdf"/>
+          <p:cNvPr id="20" name="Picture 19" descr="three-prime-sticky-restriction-site.pdf"/>
           <p:cNvPicPr>
             <a:picLocks noChangeAspect="1"/>
           </p:cNvPicPr>
@@ -5094,7 +5229,7 @@
         </p:blipFill>
         <p:spPr>
           <a:xfrm>
-            <a:off x="4838700" y="2391572"/>
+            <a:off x="3530600" y="2336800"/>
             <a:ext cx="635000" cy="1270000"/>
           </a:xfrm>
           <a:prstGeom prst="rect">
@@ -6265,37 +6400,7 @@
         </p:blipFill>
         <p:spPr>
           <a:xfrm>
-            <a:off x="1409700" y="2349040"/>
-            <a:ext cx="635000" cy="1270000"/>
-          </a:xfrm>
-          <a:prstGeom prst="rect">
-            <a:avLst/>
-          </a:prstGeom>
-        </p:spPr>
-      </p:pic>
-      <p:pic>
-        <p:nvPicPr>
-          <p:cNvPr id="5" name="Picture 4" descr="operator.pdf"/>
-          <p:cNvPicPr>
-            <a:picLocks noChangeAspect="1"/>
-          </p:cNvPicPr>
-          <p:nvPr/>
-        </p:nvPicPr>
-        <p:blipFill>
-          <a:blip r:embed="rId3">
-            <a:extLst>
-              <a:ext uri="{28A0092B-C50C-407E-A947-70E740481C1C}">
-                <a14:useLocalDpi xmlns:a14="http://schemas.microsoft.com/office/drawing/2010/main" val="0"/>
-              </a:ext>
-            </a:extLst>
-          </a:blip>
-          <a:stretch>
-            <a:fillRect/>
-          </a:stretch>
-        </p:blipFill>
-        <p:spPr>
-          <a:xfrm>
-            <a:off x="1866900" y="2206532"/>
+            <a:off x="1409700" y="2158540"/>
             <a:ext cx="635000" cy="1270000"/>
           </a:xfrm>
           <a:prstGeom prst="rect">
@@ -6342,36 +6447,6 @@
           </a:fontRef>
         </p:style>
       </p:cxnSp>
-      <p:pic>
-        <p:nvPicPr>
-          <p:cNvPr id="19" name="Picture 18" descr="operator.pdf"/>
-          <p:cNvPicPr>
-            <a:picLocks noChangeAspect="1"/>
-          </p:cNvPicPr>
-          <p:nvPr/>
-        </p:nvPicPr>
-        <p:blipFill>
-          <a:blip r:embed="rId3">
-            <a:extLst>
-              <a:ext uri="{28A0092B-C50C-407E-A947-70E740481C1C}">
-                <a14:useLocalDpi xmlns:a14="http://schemas.microsoft.com/office/drawing/2010/main" val="0"/>
-              </a:ext>
-            </a:extLst>
-          </a:blip>
-          <a:stretch>
-            <a:fillRect/>
-          </a:stretch>
-        </p:blipFill>
-        <p:spPr>
-          <a:xfrm>
-            <a:off x="2256502" y="2206532"/>
-            <a:ext cx="635000" cy="1270000"/>
-          </a:xfrm>
-          <a:prstGeom prst="rect">
-            <a:avLst/>
-          </a:prstGeom>
-        </p:spPr>
-      </p:pic>
       <p:pic>
         <p:nvPicPr>
           <p:cNvPr id="20" name="Picture 19" descr="insulator.pdf"/>
@@ -6394,7 +6469,7 @@
         </p:blipFill>
         <p:spPr>
           <a:xfrm>
-            <a:off x="3767802" y="2339184"/>
+            <a:off x="3767802" y="2148684"/>
             <a:ext cx="635000" cy="1270000"/>
           </a:xfrm>
           <a:prstGeom prst="rect">
@@ -6402,6 +6477,186 @@
           </a:prstGeom>
         </p:spPr>
       </p:pic>
+      <p:grpSp>
+        <p:nvGrpSpPr>
+          <p:cNvPr id="6" name="Group 5"/>
+          <p:cNvGrpSpPr/>
+          <p:nvPr/>
+        </p:nvGrpSpPr>
+        <p:grpSpPr>
+          <a:xfrm>
+            <a:off x="1993900" y="2734472"/>
+            <a:ext cx="457200" cy="457200"/>
+            <a:chOff x="2345402" y="3408369"/>
+            <a:chExt cx="457200" cy="457200"/>
+          </a:xfrm>
+        </p:grpSpPr>
+        <p:sp>
+          <p:nvSpPr>
+            <p:cNvPr id="11" name="Rectangle 10"/>
+            <p:cNvSpPr/>
+            <p:nvPr/>
+          </p:nvSpPr>
+          <p:spPr>
+            <a:xfrm>
+              <a:off x="2476500" y="3528108"/>
+              <a:ext cx="203200" cy="212041"/>
+            </a:xfrm>
+            <a:prstGeom prst="rect">
+              <a:avLst/>
+            </a:prstGeom>
+            <a:solidFill>
+              <a:schemeClr val="bg1"/>
+            </a:solidFill>
+            <a:ln>
+              <a:noFill/>
+            </a:ln>
+            <a:effectLst/>
+          </p:spPr>
+          <p:style>
+            <a:lnRef idx="1">
+              <a:schemeClr val="accent1"/>
+            </a:lnRef>
+            <a:fillRef idx="3">
+              <a:schemeClr val="accent1"/>
+            </a:fillRef>
+            <a:effectRef idx="2">
+              <a:schemeClr val="accent1"/>
+            </a:effectRef>
+            <a:fontRef idx="minor">
+              <a:schemeClr val="lt1"/>
+            </a:fontRef>
+          </p:style>
+          <p:txBody>
+            <a:bodyPr rtlCol="0" anchor="ctr"/>
+            <a:lstStyle/>
+            <a:p>
+              <a:pPr algn="ctr"/>
+              <a:endParaRPr lang="en-US" dirty="0"/>
+            </a:p>
+          </p:txBody>
+        </p:sp>
+        <p:pic>
+          <p:nvPicPr>
+            <p:cNvPr id="3" name="Picture 2"/>
+            <p:cNvPicPr>
+              <a:picLocks noChangeAspect="1"/>
+            </p:cNvPicPr>
+            <p:nvPr/>
+          </p:nvPicPr>
+          <p:blipFill>
+            <a:blip r:embed="rId3">
+              <a:extLst>
+                <a:ext uri="{28A0092B-C50C-407E-A947-70E740481C1C}">
+                  <a14:useLocalDpi xmlns:a14="http://schemas.microsoft.com/office/drawing/2010/main" val="0"/>
+                </a:ext>
+              </a:extLst>
+            </a:blip>
+            <a:stretch>
+              <a:fillRect/>
+            </a:stretch>
+          </p:blipFill>
+          <p:spPr>
+            <a:xfrm>
+              <a:off x="2345402" y="3408369"/>
+              <a:ext cx="457200" cy="457200"/>
+            </a:xfrm>
+            <a:prstGeom prst="rect">
+              <a:avLst/>
+            </a:prstGeom>
+          </p:spPr>
+        </p:pic>
+      </p:grpSp>
+      <p:grpSp>
+        <p:nvGrpSpPr>
+          <p:cNvPr id="13" name="Group 12"/>
+          <p:cNvGrpSpPr/>
+          <p:nvPr/>
+        </p:nvGrpSpPr>
+        <p:grpSpPr>
+          <a:xfrm>
+            <a:off x="2360151" y="2734472"/>
+            <a:ext cx="457200" cy="457200"/>
+            <a:chOff x="2345402" y="3408369"/>
+            <a:chExt cx="457200" cy="457200"/>
+          </a:xfrm>
+        </p:grpSpPr>
+        <p:sp>
+          <p:nvSpPr>
+            <p:cNvPr id="14" name="Rectangle 13"/>
+            <p:cNvSpPr/>
+            <p:nvPr/>
+          </p:nvSpPr>
+          <p:spPr>
+            <a:xfrm>
+              <a:off x="2476500" y="3528108"/>
+              <a:ext cx="203200" cy="212041"/>
+            </a:xfrm>
+            <a:prstGeom prst="rect">
+              <a:avLst/>
+            </a:prstGeom>
+            <a:solidFill>
+              <a:schemeClr val="bg1"/>
+            </a:solidFill>
+            <a:ln>
+              <a:noFill/>
+            </a:ln>
+            <a:effectLst/>
+          </p:spPr>
+          <p:style>
+            <a:lnRef idx="1">
+              <a:schemeClr val="accent1"/>
+            </a:lnRef>
+            <a:fillRef idx="3">
+              <a:schemeClr val="accent1"/>
+            </a:fillRef>
+            <a:effectRef idx="2">
+              <a:schemeClr val="accent1"/>
+            </a:effectRef>
+            <a:fontRef idx="minor">
+              <a:schemeClr val="lt1"/>
+            </a:fontRef>
+          </p:style>
+          <p:txBody>
+            <a:bodyPr rtlCol="0" anchor="ctr"/>
+            <a:lstStyle/>
+            <a:p>
+              <a:pPr algn="ctr"/>
+              <a:endParaRPr lang="en-US" dirty="0"/>
+            </a:p>
+          </p:txBody>
+        </p:sp>
+        <p:pic>
+          <p:nvPicPr>
+            <p:cNvPr id="15" name="Picture 14"/>
+            <p:cNvPicPr>
+              <a:picLocks noChangeAspect="1"/>
+            </p:cNvPicPr>
+            <p:nvPr/>
+          </p:nvPicPr>
+          <p:blipFill>
+            <a:blip r:embed="rId3">
+              <a:extLst>
+                <a:ext uri="{28A0092B-C50C-407E-A947-70E740481C1C}">
+                  <a14:useLocalDpi xmlns:a14="http://schemas.microsoft.com/office/drawing/2010/main" val="0"/>
+                </a:ext>
+              </a:extLst>
+            </a:blip>
+            <a:stretch>
+              <a:fillRect/>
+            </a:stretch>
+          </p:blipFill>
+          <p:spPr>
+            <a:xfrm>
+              <a:off x="2345402" y="3408369"/>
+              <a:ext cx="457200" cy="457200"/>
+            </a:xfrm>
+            <a:prstGeom prst="rect">
+              <a:avLst/>
+            </a:prstGeom>
+          </p:spPr>
+        </p:pic>
+      </p:grpSp>
     </p:spTree>
     <p:extLst>
       <p:ext uri="{BB962C8B-B14F-4D97-AF65-F5344CB8AC3E}">
@@ -6862,71 +7117,6 @@
       </p:cxnSp>
       <p:sp>
         <p:nvSpPr>
-          <p:cNvPr id="14" name="Right Arrow 13"/>
-          <p:cNvSpPr/>
-          <p:nvPr/>
-        </p:nvSpPr>
-        <p:spPr>
-          <a:xfrm>
-            <a:off x="4838700" y="3800004"/>
-            <a:ext cx="1168400" cy="350140"/>
-          </a:xfrm>
-          <a:prstGeom prst="rightArrow">
-            <a:avLst>
-              <a:gd name="adj1" fmla="val 100000"/>
-              <a:gd name="adj2" fmla="val 52194"/>
-            </a:avLst>
-          </a:prstGeom>
-          <a:solidFill>
-            <a:srgbClr val="008000"/>
-          </a:solidFill>
-          <a:ln w="38100" cap="flat" cmpd="sng" algn="ctr">
-            <a:solidFill>
-              <a:srgbClr val="000000"/>
-            </a:solidFill>
-            <a:prstDash val="solid"/>
-            <a:round/>
-            <a:headEnd type="none" w="med" len="med"/>
-            <a:tailEnd type="none" w="med" len="med"/>
-          </a:ln>
-        </p:spPr>
-        <p:style>
-          <a:lnRef idx="1">
-            <a:schemeClr val="accent1"/>
-          </a:lnRef>
-          <a:fillRef idx="3">
-            <a:schemeClr val="accent1"/>
-          </a:fillRef>
-          <a:effectRef idx="2">
-            <a:schemeClr val="accent1"/>
-          </a:effectRef>
-          <a:fontRef idx="minor">
-            <a:schemeClr val="lt1"/>
-          </a:fontRef>
-        </p:style>
-        <p:txBody>
-          <a:bodyPr rtlCol="0" anchor="ctr"/>
-          <a:lstStyle/>
-          <a:p>
-            <a:pPr algn="ctr"/>
-            <a:r>
-              <a:rPr lang="en-US" i="1" dirty="0" err="1" smtClean="0">
-                <a:solidFill>
-                  <a:schemeClr val="tx1"/>
-                </a:solidFill>
-              </a:rPr>
-              <a:t>gfp</a:t>
-            </a:r>
-            <a:endParaRPr lang="en-US" i="1" dirty="0">
-              <a:solidFill>
-                <a:schemeClr val="tx1"/>
-              </a:solidFill>
-            </a:endParaRPr>
-          </a:p>
-        </p:txBody>
-      </p:sp>
-      <p:sp>
-        <p:nvSpPr>
           <p:cNvPr id="16" name="Chord 15"/>
           <p:cNvSpPr/>
           <p:nvPr/>
@@ -7132,6 +7322,71 @@
           </a:fontRef>
         </p:style>
       </p:cxnSp>
+      <p:sp>
+        <p:nvSpPr>
+          <p:cNvPr id="14" name="Right Arrow 13"/>
+          <p:cNvSpPr/>
+          <p:nvPr/>
+        </p:nvSpPr>
+        <p:spPr>
+          <a:xfrm>
+            <a:off x="4838700" y="3975368"/>
+            <a:ext cx="1168400" cy="350140"/>
+          </a:xfrm>
+          <a:prstGeom prst="rightArrow">
+            <a:avLst>
+              <a:gd name="adj1" fmla="val 100000"/>
+              <a:gd name="adj2" fmla="val 52194"/>
+            </a:avLst>
+          </a:prstGeom>
+          <a:solidFill>
+            <a:srgbClr val="008000"/>
+          </a:solidFill>
+          <a:ln w="38100" cap="flat" cmpd="sng" algn="ctr">
+            <a:solidFill>
+              <a:srgbClr val="000000"/>
+            </a:solidFill>
+            <a:prstDash val="solid"/>
+            <a:round/>
+            <a:headEnd type="none" w="med" len="med"/>
+            <a:tailEnd type="none" w="med" len="med"/>
+          </a:ln>
+        </p:spPr>
+        <p:style>
+          <a:lnRef idx="1">
+            <a:schemeClr val="accent1"/>
+          </a:lnRef>
+          <a:fillRef idx="3">
+            <a:schemeClr val="accent1"/>
+          </a:fillRef>
+          <a:effectRef idx="2">
+            <a:schemeClr val="accent1"/>
+          </a:effectRef>
+          <a:fontRef idx="minor">
+            <a:schemeClr val="lt1"/>
+          </a:fontRef>
+        </p:style>
+        <p:txBody>
+          <a:bodyPr rtlCol="0" anchor="ctr"/>
+          <a:lstStyle/>
+          <a:p>
+            <a:pPr algn="ctr"/>
+            <a:r>
+              <a:rPr lang="en-US" i="1" dirty="0" err="1" smtClean="0">
+                <a:solidFill>
+                  <a:schemeClr val="tx1"/>
+                </a:solidFill>
+              </a:rPr>
+              <a:t>gfp</a:t>
+            </a:r>
+            <a:endParaRPr lang="en-US" i="1" dirty="0">
+              <a:solidFill>
+                <a:schemeClr val="tx1"/>
+              </a:solidFill>
+            </a:endParaRPr>
+          </a:p>
+        </p:txBody>
+      </p:sp>
     </p:spTree>
     <p:extLst>
       <p:ext uri="{BB962C8B-B14F-4D97-AF65-F5344CB8AC3E}">

</xml_diff>

<commit_message>
user versions of glyphs, spec updated to include them all
</commit_message>
<xml_diff>
--- a/specification/imgsrc/examples.pptx
+++ b/specification/imgsrc/examples.pptx
@@ -5,7 +5,7 @@
     <p:sldMasterId id="2147483648" r:id="rId1"/>
   </p:sldMasterIdLst>
   <p:notesMasterIdLst>
-    <p:notesMasterId r:id="rId12"/>
+    <p:notesMasterId r:id="rId13"/>
   </p:notesMasterIdLst>
   <p:sldIdLst>
     <p:sldId id="257" r:id="rId2"/>
@@ -18,6 +18,7 @@
     <p:sldId id="264" r:id="rId9"/>
     <p:sldId id="266" r:id="rId10"/>
     <p:sldId id="267" r:id="rId11"/>
+    <p:sldId id="268" r:id="rId12"/>
   </p:sldIdLst>
   <p:sldSz cx="9144000" cy="6858000" type="screen4x3"/>
   <p:notesSz cx="6858000" cy="9144000"/>
@@ -217,7 +218,7 @@
           <a:p>
             <a:fld id="{A5398B87-931F-0F48-BDB8-4235032D88C0}" type="datetimeFigureOut">
               <a:rPr lang="en-US" smtClean="0"/>
-              <a:t>10/12/17</a:t>
+              <a:t>10/13/17</a:t>
             </a:fld>
             <a:endParaRPr lang="en-US"/>
           </a:p>
@@ -666,7 +667,7 @@
           <a:p>
             <a:fld id="{B519623D-D8C4-D246-A1F7-180DFBDF806B}" type="datetimeFigureOut">
               <a:rPr lang="en-US" smtClean="0"/>
-              <a:t>10/12/17</a:t>
+              <a:t>10/13/17</a:t>
             </a:fld>
             <a:endParaRPr lang="en-US"/>
           </a:p>
@@ -836,7 +837,7 @@
           <a:p>
             <a:fld id="{B519623D-D8C4-D246-A1F7-180DFBDF806B}" type="datetimeFigureOut">
               <a:rPr lang="en-US" smtClean="0"/>
-              <a:t>10/12/17</a:t>
+              <a:t>10/13/17</a:t>
             </a:fld>
             <a:endParaRPr lang="en-US"/>
           </a:p>
@@ -1016,7 +1017,7 @@
           <a:p>
             <a:fld id="{B519623D-D8C4-D246-A1F7-180DFBDF806B}" type="datetimeFigureOut">
               <a:rPr lang="en-US" smtClean="0"/>
-              <a:t>10/12/17</a:t>
+              <a:t>10/13/17</a:t>
             </a:fld>
             <a:endParaRPr lang="en-US"/>
           </a:p>
@@ -1186,7 +1187,7 @@
           <a:p>
             <a:fld id="{B519623D-D8C4-D246-A1F7-180DFBDF806B}" type="datetimeFigureOut">
               <a:rPr lang="en-US" smtClean="0"/>
-              <a:t>10/12/17</a:t>
+              <a:t>10/13/17</a:t>
             </a:fld>
             <a:endParaRPr lang="en-US"/>
           </a:p>
@@ -1432,7 +1433,7 @@
           <a:p>
             <a:fld id="{B519623D-D8C4-D246-A1F7-180DFBDF806B}" type="datetimeFigureOut">
               <a:rPr lang="en-US" smtClean="0"/>
-              <a:t>10/12/17</a:t>
+              <a:t>10/13/17</a:t>
             </a:fld>
             <a:endParaRPr lang="en-US"/>
           </a:p>
@@ -1720,7 +1721,7 @@
           <a:p>
             <a:fld id="{B519623D-D8C4-D246-A1F7-180DFBDF806B}" type="datetimeFigureOut">
               <a:rPr lang="en-US" smtClean="0"/>
-              <a:t>10/12/17</a:t>
+              <a:t>10/13/17</a:t>
             </a:fld>
             <a:endParaRPr lang="en-US"/>
           </a:p>
@@ -2142,7 +2143,7 @@
           <a:p>
             <a:fld id="{B519623D-D8C4-D246-A1F7-180DFBDF806B}" type="datetimeFigureOut">
               <a:rPr lang="en-US" smtClean="0"/>
-              <a:t>10/12/17</a:t>
+              <a:t>10/13/17</a:t>
             </a:fld>
             <a:endParaRPr lang="en-US"/>
           </a:p>
@@ -2260,7 +2261,7 @@
           <a:p>
             <a:fld id="{B519623D-D8C4-D246-A1F7-180DFBDF806B}" type="datetimeFigureOut">
               <a:rPr lang="en-US" smtClean="0"/>
-              <a:t>10/12/17</a:t>
+              <a:t>10/13/17</a:t>
             </a:fld>
             <a:endParaRPr lang="en-US"/>
           </a:p>
@@ -2355,7 +2356,7 @@
           <a:p>
             <a:fld id="{B519623D-D8C4-D246-A1F7-180DFBDF806B}" type="datetimeFigureOut">
               <a:rPr lang="en-US" smtClean="0"/>
-              <a:t>10/12/17</a:t>
+              <a:t>10/13/17</a:t>
             </a:fld>
             <a:endParaRPr lang="en-US"/>
           </a:p>
@@ -2632,7 +2633,7 @@
           <a:p>
             <a:fld id="{B519623D-D8C4-D246-A1F7-180DFBDF806B}" type="datetimeFigureOut">
               <a:rPr lang="en-US" smtClean="0"/>
-              <a:t>10/12/17</a:t>
+              <a:t>10/13/17</a:t>
             </a:fld>
             <a:endParaRPr lang="en-US"/>
           </a:p>
@@ -2885,7 +2886,7 @@
           <a:p>
             <a:fld id="{B519623D-D8C4-D246-A1F7-180DFBDF806B}" type="datetimeFigureOut">
               <a:rPr lang="en-US" smtClean="0"/>
-              <a:t>10/12/17</a:t>
+              <a:t>10/13/17</a:t>
             </a:fld>
             <a:endParaRPr lang="en-US"/>
           </a:p>
@@ -3098,7 +3099,7 @@
           <a:p>
             <a:fld id="{B519623D-D8C4-D246-A1F7-180DFBDF806B}" type="datetimeFigureOut">
               <a:rPr lang="en-US" smtClean="0"/>
-              <a:t>10/12/17</a:t>
+              <a:t>10/13/17</a:t>
             </a:fld>
             <a:endParaRPr lang="en-US"/>
           </a:p>
@@ -4239,6 +4240,509 @@
     <p:extLst>
       <p:ext uri="{BB962C8B-B14F-4D97-AF65-F5344CB8AC3E}">
         <p14:creationId xmlns:p14="http://schemas.microsoft.com/office/powerpoint/2010/main" val="1980579152"/>
+      </p:ext>
+    </p:extLst>
+  </p:cSld>
+  <p:clrMapOvr>
+    <a:masterClrMapping/>
+  </p:clrMapOvr>
+  <p:timing>
+    <p:tnLst>
+      <p:par>
+        <p:cTn id="1" dur="indefinite" restart="never" nodeType="tmRoot"/>
+      </p:par>
+    </p:tnLst>
+  </p:timing>
+</p:sld>
+</file>
+
+<file path=ppt/slides/slide11.xml><?xml version="1.0" encoding="utf-8"?>
+<p:sld xmlns:a="http://schemas.openxmlformats.org/drawingml/2006/main" xmlns:r="http://schemas.openxmlformats.org/officeDocument/2006/relationships" xmlns:p="http://schemas.openxmlformats.org/presentationml/2006/main">
+  <p:cSld>
+    <p:spTree>
+      <p:nvGrpSpPr>
+        <p:cNvPr id="1" name=""/>
+        <p:cNvGrpSpPr/>
+        <p:nvPr/>
+      </p:nvGrpSpPr>
+      <p:grpSpPr>
+        <a:xfrm>
+          <a:off x="0" y="0"/>
+          <a:ext cx="0" cy="0"/>
+          <a:chOff x="0" y="0"/>
+          <a:chExt cx="0" cy="0"/>
+        </a:xfrm>
+      </p:grpSpPr>
+      <p:sp>
+        <p:nvSpPr>
+          <p:cNvPr id="37" name="Rectangle 36"/>
+          <p:cNvSpPr/>
+          <p:nvPr/>
+        </p:nvSpPr>
+        <p:spPr>
+          <a:xfrm>
+            <a:off x="2679700" y="2872004"/>
+            <a:ext cx="275302" cy="221921"/>
+          </a:xfrm>
+          <a:prstGeom prst="rect">
+            <a:avLst/>
+          </a:prstGeom>
+          <a:solidFill>
+            <a:schemeClr val="bg1"/>
+          </a:solidFill>
+          <a:ln>
+            <a:noFill/>
+          </a:ln>
+          <a:effectLst/>
+        </p:spPr>
+        <p:style>
+          <a:lnRef idx="1">
+            <a:schemeClr val="accent1"/>
+          </a:lnRef>
+          <a:fillRef idx="3">
+            <a:schemeClr val="accent1"/>
+          </a:fillRef>
+          <a:effectRef idx="2">
+            <a:schemeClr val="accent1"/>
+          </a:effectRef>
+          <a:fontRef idx="minor">
+            <a:schemeClr val="lt1"/>
+          </a:fontRef>
+        </p:style>
+        <p:txBody>
+          <a:bodyPr rtlCol="0" anchor="ctr"/>
+          <a:lstStyle/>
+          <a:p>
+            <a:pPr algn="ctr"/>
+            <a:endParaRPr lang="en-US" dirty="0"/>
+          </a:p>
+        </p:txBody>
+      </p:sp>
+      <p:sp>
+        <p:nvSpPr>
+          <p:cNvPr id="10" name="Bent Arrow 9"/>
+          <p:cNvSpPr/>
+          <p:nvPr/>
+        </p:nvSpPr>
+        <p:spPr>
+          <a:xfrm>
+            <a:off x="2486664" y="2143032"/>
+            <a:ext cx="889000" cy="820040"/>
+          </a:xfrm>
+          <a:prstGeom prst="bentArrow">
+            <a:avLst/>
+          </a:prstGeom>
+          <a:solidFill>
+            <a:schemeClr val="tx2">
+              <a:lumMod val="60000"/>
+              <a:lumOff val="40000"/>
+            </a:schemeClr>
+          </a:solidFill>
+          <a:ln w="38100" cap="flat" cmpd="sng" algn="ctr">
+            <a:solidFill>
+              <a:srgbClr val="000000"/>
+            </a:solidFill>
+            <a:prstDash val="solid"/>
+            <a:round/>
+            <a:headEnd type="none" w="med" len="med"/>
+            <a:tailEnd type="none" w="med" len="med"/>
+          </a:ln>
+        </p:spPr>
+        <p:style>
+          <a:lnRef idx="1">
+            <a:schemeClr val="accent1"/>
+          </a:lnRef>
+          <a:fillRef idx="3">
+            <a:schemeClr val="accent1"/>
+          </a:fillRef>
+          <a:effectRef idx="2">
+            <a:schemeClr val="accent1"/>
+          </a:effectRef>
+          <a:fontRef idx="minor">
+            <a:schemeClr val="lt1"/>
+          </a:fontRef>
+        </p:style>
+        <p:txBody>
+          <a:bodyPr rtlCol="0" anchor="ctr"/>
+          <a:lstStyle/>
+          <a:p>
+            <a:pPr algn="ctr"/>
+            <a:endParaRPr lang="en-US">
+              <a:solidFill>
+                <a:schemeClr val="tx1"/>
+              </a:solidFill>
+            </a:endParaRPr>
+          </a:p>
+        </p:txBody>
+      </p:sp>
+      <p:sp>
+        <p:nvSpPr>
+          <p:cNvPr id="3" name="Rounded Rectangle 2"/>
+          <p:cNvSpPr/>
+          <p:nvPr/>
+        </p:nvSpPr>
+        <p:spPr>
+          <a:xfrm>
+            <a:off x="1765299" y="2975772"/>
+            <a:ext cx="4549003" cy="516728"/>
+          </a:xfrm>
+          <a:prstGeom prst="roundRect">
+            <a:avLst/>
+          </a:prstGeom>
+          <a:noFill/>
+          <a:ln w="38100" cmpd="sng">
+            <a:solidFill>
+              <a:schemeClr val="tx1"/>
+            </a:solidFill>
+          </a:ln>
+        </p:spPr>
+        <p:style>
+          <a:lnRef idx="1">
+            <a:schemeClr val="accent1"/>
+          </a:lnRef>
+          <a:fillRef idx="3">
+            <a:schemeClr val="accent1"/>
+          </a:fillRef>
+          <a:effectRef idx="2">
+            <a:schemeClr val="accent1"/>
+          </a:effectRef>
+          <a:fontRef idx="minor">
+            <a:schemeClr val="lt1"/>
+          </a:fontRef>
+        </p:style>
+        <p:txBody>
+          <a:bodyPr rtlCol="0" anchor="ctr"/>
+          <a:lstStyle/>
+          <a:p>
+            <a:pPr algn="ctr"/>
+            <a:endParaRPr lang="en-US"/>
+          </a:p>
+        </p:txBody>
+      </p:sp>
+      <p:sp>
+        <p:nvSpPr>
+          <p:cNvPr id="11" name="Rectangle 10"/>
+          <p:cNvSpPr/>
+          <p:nvPr/>
+        </p:nvSpPr>
+        <p:spPr>
+          <a:xfrm>
+            <a:off x="4552457" y="3421248"/>
+            <a:ext cx="458186" cy="182010"/>
+          </a:xfrm>
+          <a:prstGeom prst="rect">
+            <a:avLst/>
+          </a:prstGeom>
+          <a:solidFill>
+            <a:schemeClr val="bg1"/>
+          </a:solidFill>
+          <a:ln>
+            <a:noFill/>
+          </a:ln>
+          <a:effectLst/>
+        </p:spPr>
+        <p:style>
+          <a:lnRef idx="1">
+            <a:schemeClr val="accent1"/>
+          </a:lnRef>
+          <a:fillRef idx="3">
+            <a:schemeClr val="accent1"/>
+          </a:fillRef>
+          <a:effectRef idx="2">
+            <a:schemeClr val="accent1"/>
+          </a:effectRef>
+          <a:fontRef idx="minor">
+            <a:schemeClr val="lt1"/>
+          </a:fontRef>
+        </p:style>
+        <p:txBody>
+          <a:bodyPr rtlCol="0" anchor="ctr"/>
+          <a:lstStyle/>
+          <a:p>
+            <a:pPr algn="ctr"/>
+            <a:endParaRPr lang="en-US" dirty="0"/>
+          </a:p>
+        </p:txBody>
+      </p:sp>
+      <p:pic>
+        <p:nvPicPr>
+          <p:cNvPr id="2" name="Picture 1"/>
+          <p:cNvPicPr>
+            <a:picLocks noChangeAspect="1"/>
+          </p:cNvPicPr>
+          <p:nvPr/>
+        </p:nvPicPr>
+        <p:blipFill>
+          <a:blip r:embed="rId2">
+            <a:extLst>
+              <a:ext uri="{28A0092B-C50C-407E-A947-70E740481C1C}">
+                <a14:useLocalDpi xmlns:a14="http://schemas.microsoft.com/office/drawing/2010/main" val="0"/>
+              </a:ext>
+            </a:extLst>
+          </a:blip>
+          <a:stretch>
+            <a:fillRect/>
+          </a:stretch>
+        </p:blipFill>
+        <p:spPr>
+          <a:xfrm>
+            <a:off x="4343400" y="3031584"/>
+            <a:ext cx="876300" cy="876300"/>
+          </a:xfrm>
+          <a:prstGeom prst="rect">
+            <a:avLst/>
+          </a:prstGeom>
+        </p:spPr>
+      </p:pic>
+      <p:pic>
+        <p:nvPicPr>
+          <p:cNvPr id="5" name="Picture 4"/>
+          <p:cNvPicPr>
+            <a:picLocks noChangeAspect="1"/>
+          </p:cNvPicPr>
+          <p:nvPr/>
+        </p:nvPicPr>
+        <p:blipFill>
+          <a:blip r:embed="rId3">
+            <a:extLst>
+              <a:ext uri="{28A0092B-C50C-407E-A947-70E740481C1C}">
+                <a14:useLocalDpi xmlns:a14="http://schemas.microsoft.com/office/drawing/2010/main" val="0"/>
+              </a:ext>
+            </a:extLst>
+          </a:blip>
+          <a:stretch>
+            <a:fillRect/>
+          </a:stretch>
+        </p:blipFill>
+        <p:spPr>
+          <a:xfrm>
+            <a:off x="4679299" y="2058841"/>
+            <a:ext cx="1059798" cy="1059798"/>
+          </a:xfrm>
+          <a:prstGeom prst="rect">
+            <a:avLst/>
+          </a:prstGeom>
+        </p:spPr>
+      </p:pic>
+      <p:sp>
+        <p:nvSpPr>
+          <p:cNvPr id="7" name="Triangle 6"/>
+          <p:cNvSpPr/>
+          <p:nvPr/>
+        </p:nvSpPr>
+        <p:spPr>
+          <a:xfrm rot="5400000">
+            <a:off x="1959534" y="2746326"/>
+            <a:ext cx="278791" cy="473274"/>
+          </a:xfrm>
+          <a:prstGeom prst="triangle">
+            <a:avLst/>
+          </a:prstGeom>
+        </p:spPr>
+        <p:style>
+          <a:lnRef idx="2">
+            <a:schemeClr val="accent4">
+              <a:shade val="50000"/>
+            </a:schemeClr>
+          </a:lnRef>
+          <a:fillRef idx="1">
+            <a:schemeClr val="accent4"/>
+          </a:fillRef>
+          <a:effectRef idx="0">
+            <a:schemeClr val="accent4"/>
+          </a:effectRef>
+          <a:fontRef idx="minor">
+            <a:schemeClr val="lt1"/>
+          </a:fontRef>
+        </p:style>
+        <p:txBody>
+          <a:bodyPr rtlCol="0" anchor="ctr"/>
+          <a:lstStyle/>
+          <a:p>
+            <a:pPr algn="ctr"/>
+            <a:endParaRPr lang="en-US"/>
+          </a:p>
+        </p:txBody>
+      </p:sp>
+      <p:sp>
+        <p:nvSpPr>
+          <p:cNvPr id="16" name="Triangle 15"/>
+          <p:cNvSpPr/>
+          <p:nvPr/>
+        </p:nvSpPr>
+        <p:spPr>
+          <a:xfrm rot="5400000">
+            <a:off x="3555785" y="2749879"/>
+            <a:ext cx="278791" cy="473274"/>
+          </a:xfrm>
+          <a:prstGeom prst="triangle">
+            <a:avLst/>
+          </a:prstGeom>
+        </p:spPr>
+        <p:style>
+          <a:lnRef idx="2">
+            <a:schemeClr val="accent4">
+              <a:shade val="50000"/>
+            </a:schemeClr>
+          </a:lnRef>
+          <a:fillRef idx="1">
+            <a:schemeClr val="accent4"/>
+          </a:fillRef>
+          <a:effectRef idx="0">
+            <a:schemeClr val="accent4"/>
+          </a:effectRef>
+          <a:fontRef idx="minor">
+            <a:schemeClr val="lt1"/>
+          </a:fontRef>
+        </p:style>
+        <p:txBody>
+          <a:bodyPr rtlCol="0" anchor="ctr"/>
+          <a:lstStyle/>
+          <a:p>
+            <a:pPr algn="ctr"/>
+            <a:endParaRPr lang="en-US"/>
+          </a:p>
+        </p:txBody>
+      </p:sp>
+      <p:pic>
+        <p:nvPicPr>
+          <p:cNvPr id="8" name="Picture 7"/>
+          <p:cNvPicPr>
+            <a:picLocks noChangeAspect="1"/>
+          </p:cNvPicPr>
+          <p:nvPr/>
+        </p:nvPicPr>
+        <p:blipFill>
+          <a:blip r:embed="rId4">
+            <a:extLst>
+              <a:ext uri="{28A0092B-C50C-407E-A947-70E740481C1C}">
+                <a14:useLocalDpi xmlns:a14="http://schemas.microsoft.com/office/drawing/2010/main" val="0"/>
+              </a:ext>
+            </a:extLst>
+          </a:blip>
+          <a:stretch>
+            <a:fillRect/>
+          </a:stretch>
+        </p:blipFill>
+        <p:spPr>
+          <a:xfrm>
+            <a:off x="5522197" y="2392250"/>
+            <a:ext cx="781768" cy="781768"/>
+          </a:xfrm>
+          <a:prstGeom prst="rect">
+            <a:avLst/>
+          </a:prstGeom>
+        </p:spPr>
+      </p:pic>
+      <p:sp>
+        <p:nvSpPr>
+          <p:cNvPr id="18" name="Right Arrow 17"/>
+          <p:cNvSpPr/>
+          <p:nvPr/>
+        </p:nvSpPr>
+        <p:spPr>
+          <a:xfrm>
+            <a:off x="4015826" y="2783684"/>
+            <a:ext cx="803309" cy="350140"/>
+          </a:xfrm>
+          <a:prstGeom prst="rightArrow">
+            <a:avLst>
+              <a:gd name="adj1" fmla="val 100000"/>
+              <a:gd name="adj2" fmla="val 52194"/>
+            </a:avLst>
+          </a:prstGeom>
+          <a:ln>
+            <a:headEnd type="none" w="med" len="med"/>
+            <a:tailEnd type="none" w="med" len="med"/>
+          </a:ln>
+        </p:spPr>
+        <p:style>
+          <a:lnRef idx="2">
+            <a:schemeClr val="accent3">
+              <a:shade val="50000"/>
+            </a:schemeClr>
+          </a:lnRef>
+          <a:fillRef idx="1">
+            <a:schemeClr val="accent3"/>
+          </a:fillRef>
+          <a:effectRef idx="0">
+            <a:schemeClr val="accent3"/>
+          </a:effectRef>
+          <a:fontRef idx="minor">
+            <a:schemeClr val="lt1"/>
+          </a:fontRef>
+        </p:style>
+        <p:txBody>
+          <a:bodyPr rtlCol="0" anchor="ctr"/>
+          <a:lstStyle/>
+          <a:p>
+            <a:pPr algn="ctr"/>
+            <a:r>
+              <a:rPr lang="en-US" i="1" dirty="0" err="1" smtClean="0">
+                <a:solidFill>
+                  <a:schemeClr val="tx1"/>
+                </a:solidFill>
+              </a:rPr>
+              <a:t>gfp</a:t>
+            </a:r>
+            <a:endParaRPr lang="en-US" i="1" dirty="0">
+              <a:solidFill>
+                <a:schemeClr val="tx1"/>
+              </a:solidFill>
+            </a:endParaRPr>
+          </a:p>
+        </p:txBody>
+      </p:sp>
+      <p:sp>
+        <p:nvSpPr>
+          <p:cNvPr id="19" name="Oval 18"/>
+          <p:cNvSpPr/>
+          <p:nvPr/>
+        </p:nvSpPr>
+        <p:spPr>
+          <a:xfrm>
+            <a:off x="2557001" y="3222577"/>
+            <a:ext cx="520700" cy="520700"/>
+          </a:xfrm>
+          <a:prstGeom prst="ellipse">
+            <a:avLst/>
+          </a:prstGeom>
+          <a:solidFill>
+            <a:schemeClr val="bg1"/>
+          </a:solidFill>
+          <a:ln w="38100" cmpd="sng">
+            <a:solidFill>
+              <a:schemeClr val="tx1"/>
+            </a:solidFill>
+          </a:ln>
+        </p:spPr>
+        <p:style>
+          <a:lnRef idx="1">
+            <a:schemeClr val="accent1"/>
+          </a:lnRef>
+          <a:fillRef idx="3">
+            <a:schemeClr val="accent1"/>
+          </a:fillRef>
+          <a:effectRef idx="2">
+            <a:schemeClr val="accent1"/>
+          </a:effectRef>
+          <a:fontRef idx="minor">
+            <a:schemeClr val="lt1"/>
+          </a:fontRef>
+        </p:style>
+        <p:txBody>
+          <a:bodyPr rtlCol="0" anchor="ctr"/>
+          <a:lstStyle/>
+          <a:p>
+            <a:pPr algn="ctr"/>
+            <a:endParaRPr lang="en-US"/>
+          </a:p>
+        </p:txBody>
+      </p:sp>
+    </p:spTree>
+    <p:extLst>
+      <p:ext uri="{BB962C8B-B14F-4D97-AF65-F5344CB8AC3E}">
+        <p14:creationId xmlns:p14="http://schemas.microsoft.com/office/powerpoint/2010/main" val="1314378457"/>
       </p:ext>
     </p:extLst>
   </p:cSld>

</xml_diff>

<commit_message>
complete draft of SBOL Visual 2.0 specification
</commit_message>
<xml_diff>
--- a/specification/imgsrc/examples.pptx
+++ b/specification/imgsrc/examples.pptx
@@ -5,7 +5,7 @@
     <p:sldMasterId id="2147483648" r:id="rId1"/>
   </p:sldMasterIdLst>
   <p:notesMasterIdLst>
-    <p:notesMasterId r:id="rId13"/>
+    <p:notesMasterId r:id="rId15"/>
   </p:notesMasterIdLst>
   <p:sldIdLst>
     <p:sldId id="257" r:id="rId2"/>
@@ -19,6 +19,8 @@
     <p:sldId id="266" r:id="rId10"/>
     <p:sldId id="267" r:id="rId11"/>
     <p:sldId id="268" r:id="rId12"/>
+    <p:sldId id="270" r:id="rId13"/>
+    <p:sldId id="269" r:id="rId14"/>
   </p:sldIdLst>
   <p:sldSz cx="9144000" cy="6858000" type="screen4x3"/>
   <p:notesSz cx="6858000" cy="9144000"/>
@@ -218,7 +220,7 @@
           <a:p>
             <a:fld id="{A5398B87-931F-0F48-BDB8-4235032D88C0}" type="datetimeFigureOut">
               <a:rPr lang="en-US" smtClean="0"/>
-              <a:t>10/13/17</a:t>
+              <a:t>11/22/17</a:t>
             </a:fld>
             <a:endParaRPr lang="en-US"/>
           </a:p>
@@ -667,7 +669,7 @@
           <a:p>
             <a:fld id="{B519623D-D8C4-D246-A1F7-180DFBDF806B}" type="datetimeFigureOut">
               <a:rPr lang="en-US" smtClean="0"/>
-              <a:t>10/13/17</a:t>
+              <a:t>11/22/17</a:t>
             </a:fld>
             <a:endParaRPr lang="en-US"/>
           </a:p>
@@ -837,7 +839,7 @@
           <a:p>
             <a:fld id="{B519623D-D8C4-D246-A1F7-180DFBDF806B}" type="datetimeFigureOut">
               <a:rPr lang="en-US" smtClean="0"/>
-              <a:t>10/13/17</a:t>
+              <a:t>11/22/17</a:t>
             </a:fld>
             <a:endParaRPr lang="en-US"/>
           </a:p>
@@ -1017,7 +1019,7 @@
           <a:p>
             <a:fld id="{B519623D-D8C4-D246-A1F7-180DFBDF806B}" type="datetimeFigureOut">
               <a:rPr lang="en-US" smtClean="0"/>
-              <a:t>10/13/17</a:t>
+              <a:t>11/22/17</a:t>
             </a:fld>
             <a:endParaRPr lang="en-US"/>
           </a:p>
@@ -1187,7 +1189,7 @@
           <a:p>
             <a:fld id="{B519623D-D8C4-D246-A1F7-180DFBDF806B}" type="datetimeFigureOut">
               <a:rPr lang="en-US" smtClean="0"/>
-              <a:t>10/13/17</a:t>
+              <a:t>11/22/17</a:t>
             </a:fld>
             <a:endParaRPr lang="en-US"/>
           </a:p>
@@ -1433,7 +1435,7 @@
           <a:p>
             <a:fld id="{B519623D-D8C4-D246-A1F7-180DFBDF806B}" type="datetimeFigureOut">
               <a:rPr lang="en-US" smtClean="0"/>
-              <a:t>10/13/17</a:t>
+              <a:t>11/22/17</a:t>
             </a:fld>
             <a:endParaRPr lang="en-US"/>
           </a:p>
@@ -1721,7 +1723,7 @@
           <a:p>
             <a:fld id="{B519623D-D8C4-D246-A1F7-180DFBDF806B}" type="datetimeFigureOut">
               <a:rPr lang="en-US" smtClean="0"/>
-              <a:t>10/13/17</a:t>
+              <a:t>11/22/17</a:t>
             </a:fld>
             <a:endParaRPr lang="en-US"/>
           </a:p>
@@ -2143,7 +2145,7 @@
           <a:p>
             <a:fld id="{B519623D-D8C4-D246-A1F7-180DFBDF806B}" type="datetimeFigureOut">
               <a:rPr lang="en-US" smtClean="0"/>
-              <a:t>10/13/17</a:t>
+              <a:t>11/22/17</a:t>
             </a:fld>
             <a:endParaRPr lang="en-US"/>
           </a:p>
@@ -2261,7 +2263,7 @@
           <a:p>
             <a:fld id="{B519623D-D8C4-D246-A1F7-180DFBDF806B}" type="datetimeFigureOut">
               <a:rPr lang="en-US" smtClean="0"/>
-              <a:t>10/13/17</a:t>
+              <a:t>11/22/17</a:t>
             </a:fld>
             <a:endParaRPr lang="en-US"/>
           </a:p>
@@ -2356,7 +2358,7 @@
           <a:p>
             <a:fld id="{B519623D-D8C4-D246-A1F7-180DFBDF806B}" type="datetimeFigureOut">
               <a:rPr lang="en-US" smtClean="0"/>
-              <a:t>10/13/17</a:t>
+              <a:t>11/22/17</a:t>
             </a:fld>
             <a:endParaRPr lang="en-US"/>
           </a:p>
@@ -2633,7 +2635,7 @@
           <a:p>
             <a:fld id="{B519623D-D8C4-D246-A1F7-180DFBDF806B}" type="datetimeFigureOut">
               <a:rPr lang="en-US" smtClean="0"/>
-              <a:t>10/13/17</a:t>
+              <a:t>11/22/17</a:t>
             </a:fld>
             <a:endParaRPr lang="en-US"/>
           </a:p>
@@ -2886,7 +2888,7 @@
           <a:p>
             <a:fld id="{B519623D-D8C4-D246-A1F7-180DFBDF806B}" type="datetimeFigureOut">
               <a:rPr lang="en-US" smtClean="0"/>
-              <a:t>10/13/17</a:t>
+              <a:t>11/22/17</a:t>
             </a:fld>
             <a:endParaRPr lang="en-US"/>
           </a:p>
@@ -3099,7 +3101,7 @@
           <a:p>
             <a:fld id="{B519623D-D8C4-D246-A1F7-180DFBDF806B}" type="datetimeFigureOut">
               <a:rPr lang="en-US" smtClean="0"/>
-              <a:t>10/13/17</a:t>
+              <a:t>11/22/17</a:t>
             </a:fld>
             <a:endParaRPr lang="en-US"/>
           </a:p>
@@ -4739,6 +4741,138 @@
           </a:p>
         </p:txBody>
       </p:sp>
+      <p:cxnSp>
+        <p:nvCxnSpPr>
+          <p:cNvPr id="6" name="Straight Arrow Connector 5"/>
+          <p:cNvCxnSpPr/>
+          <p:nvPr/>
+        </p:nvCxnSpPr>
+        <p:spPr>
+          <a:xfrm rot="5400000">
+            <a:off x="1761641" y="1589774"/>
+            <a:ext cx="1511319" cy="875405"/>
+          </a:xfrm>
+          <a:prstGeom prst="bentConnector3">
+            <a:avLst>
+              <a:gd name="adj1" fmla="val 30709"/>
+            </a:avLst>
+          </a:prstGeom>
+          <a:ln>
+            <a:tailEnd type="diamond" w="lg" len="lg"/>
+          </a:ln>
+          <a:effectLst/>
+        </p:spPr>
+        <p:style>
+          <a:lnRef idx="2">
+            <a:schemeClr val="accent1"/>
+          </a:lnRef>
+          <a:fillRef idx="0">
+            <a:schemeClr val="accent1"/>
+          </a:fillRef>
+          <a:effectRef idx="1">
+            <a:schemeClr val="accent1"/>
+          </a:effectRef>
+          <a:fontRef idx="minor">
+            <a:schemeClr val="tx1"/>
+          </a:fontRef>
+        </p:style>
+      </p:cxnSp>
+      <p:cxnSp>
+        <p:nvCxnSpPr>
+          <p:cNvPr id="20" name="Straight Arrow Connector 5"/>
+          <p:cNvCxnSpPr/>
+          <p:nvPr/>
+        </p:nvCxnSpPr>
+        <p:spPr>
+          <a:xfrm rot="16200000" flipH="1">
+            <a:off x="2576345" y="1650474"/>
+            <a:ext cx="1517669" cy="760354"/>
+          </a:xfrm>
+          <a:prstGeom prst="bentConnector3">
+            <a:avLst>
+              <a:gd name="adj1" fmla="val 30790"/>
+            </a:avLst>
+          </a:prstGeom>
+          <a:ln>
+            <a:tailEnd type="diamond" w="lg" len="lg"/>
+          </a:ln>
+          <a:effectLst/>
+        </p:spPr>
+        <p:style>
+          <a:lnRef idx="2">
+            <a:schemeClr val="accent1"/>
+          </a:lnRef>
+          <a:fillRef idx="0">
+            <a:schemeClr val="accent1"/>
+          </a:fillRef>
+          <a:effectRef idx="1">
+            <a:schemeClr val="accent1"/>
+          </a:effectRef>
+          <a:fontRef idx="minor">
+            <a:schemeClr val="tx1"/>
+          </a:fontRef>
+        </p:style>
+      </p:cxnSp>
+      <p:pic>
+        <p:nvPicPr>
+          <p:cNvPr id="21" name="Picture 20"/>
+          <p:cNvPicPr>
+            <a:picLocks noChangeAspect="1"/>
+          </p:cNvPicPr>
+          <p:nvPr/>
+        </p:nvPicPr>
+        <p:blipFill>
+          <a:blip r:embed="rId5">
+            <a:extLst>
+              <a:ext uri="{28A0092B-C50C-407E-A947-70E740481C1C}">
+                <a14:useLocalDpi xmlns:a14="http://schemas.microsoft.com/office/drawing/2010/main" val="0"/>
+              </a:ext>
+            </a:extLst>
+          </a:blip>
+          <a:stretch>
+            <a:fillRect/>
+          </a:stretch>
+        </p:blipFill>
+        <p:spPr>
+          <a:xfrm>
+            <a:off x="2278494" y="376852"/>
+            <a:ext cx="1305339" cy="1305339"/>
+          </a:xfrm>
+          <a:prstGeom prst="rect">
+            <a:avLst/>
+          </a:prstGeom>
+        </p:spPr>
+      </p:pic>
+      <p:sp>
+        <p:nvSpPr>
+          <p:cNvPr id="22" name="TextBox 21"/>
+          <p:cNvSpPr txBox="1"/>
+          <p:nvPr/>
+        </p:nvSpPr>
+        <p:spPr>
+          <a:xfrm>
+            <a:off x="2722406" y="819966"/>
+            <a:ext cx="465192" cy="369332"/>
+          </a:xfrm>
+          <a:prstGeom prst="rect">
+            <a:avLst/>
+          </a:prstGeom>
+          <a:noFill/>
+        </p:spPr>
+        <p:txBody>
+          <a:bodyPr wrap="none" rtlCol="0">
+            <a:spAutoFit/>
+          </a:bodyPr>
+          <a:lstStyle/>
+          <a:p>
+            <a:r>
+              <a:rPr lang="en-US" smtClean="0"/>
+              <a:t>Flp</a:t>
+            </a:r>
+            <a:endParaRPr lang="en-US" dirty="0"/>
+          </a:p>
+        </p:txBody>
+      </p:sp>
     </p:spTree>
     <p:extLst>
       <p:ext uri="{BB962C8B-B14F-4D97-AF65-F5344CB8AC3E}">
@@ -4756,6 +4890,1518 @@
       </p:par>
     </p:tnLst>
   </p:timing>
+</p:sld>
+</file>
+
+<file path=ppt/slides/slide12.xml><?xml version="1.0" encoding="utf-8"?>
+<p:sld xmlns:a="http://schemas.openxmlformats.org/drawingml/2006/main" xmlns:r="http://schemas.openxmlformats.org/officeDocument/2006/relationships" xmlns:p="http://schemas.openxmlformats.org/presentationml/2006/main">
+  <p:cSld>
+    <p:spTree>
+      <p:nvGrpSpPr>
+        <p:cNvPr id="1" name=""/>
+        <p:cNvGrpSpPr/>
+        <p:nvPr/>
+      </p:nvGrpSpPr>
+      <p:grpSpPr>
+        <a:xfrm>
+          <a:off x="0" y="0"/>
+          <a:ext cx="0" cy="0"/>
+          <a:chOff x="0" y="0"/>
+          <a:chExt cx="0" cy="0"/>
+        </a:xfrm>
+      </p:grpSpPr>
+      <p:cxnSp>
+        <p:nvCxnSpPr>
+          <p:cNvPr id="2" name="Straight Arrow Connector 5"/>
+          <p:cNvCxnSpPr/>
+          <p:nvPr/>
+        </p:nvCxnSpPr>
+        <p:spPr>
+          <a:xfrm rot="16200000" flipV="1">
+            <a:off x="3876539" y="2170540"/>
+            <a:ext cx="129642" cy="2087761"/>
+          </a:xfrm>
+          <a:prstGeom prst="bentConnector3">
+            <a:avLst>
+              <a:gd name="adj1" fmla="val 276332"/>
+            </a:avLst>
+          </a:prstGeom>
+          <a:ln>
+            <a:solidFill>
+              <a:srgbClr val="008000"/>
+            </a:solidFill>
+            <a:headEnd type="none"/>
+            <a:tailEnd type="triangle" w="lg" len="lg"/>
+          </a:ln>
+          <a:effectLst/>
+        </p:spPr>
+        <p:style>
+          <a:lnRef idx="2">
+            <a:schemeClr val="accent1"/>
+          </a:lnRef>
+          <a:fillRef idx="0">
+            <a:schemeClr val="accent1"/>
+          </a:fillRef>
+          <a:effectRef idx="1">
+            <a:schemeClr val="accent1"/>
+          </a:effectRef>
+          <a:fontRef idx="minor">
+            <a:schemeClr val="tx1"/>
+          </a:fontRef>
+        </p:style>
+      </p:cxnSp>
+      <p:sp>
+        <p:nvSpPr>
+          <p:cNvPr id="3" name="Rectangle 2"/>
+          <p:cNvSpPr/>
+          <p:nvPr/>
+        </p:nvSpPr>
+        <p:spPr>
+          <a:xfrm>
+            <a:off x="4847589" y="3279242"/>
+            <a:ext cx="275302" cy="221921"/>
+          </a:xfrm>
+          <a:prstGeom prst="rect">
+            <a:avLst/>
+          </a:prstGeom>
+          <a:solidFill>
+            <a:schemeClr val="bg1"/>
+          </a:solidFill>
+          <a:ln>
+            <a:noFill/>
+          </a:ln>
+          <a:effectLst/>
+        </p:spPr>
+        <p:style>
+          <a:lnRef idx="1">
+            <a:schemeClr val="accent1"/>
+          </a:lnRef>
+          <a:fillRef idx="3">
+            <a:schemeClr val="accent1"/>
+          </a:fillRef>
+          <a:effectRef idx="2">
+            <a:schemeClr val="accent1"/>
+          </a:effectRef>
+          <a:fontRef idx="minor">
+            <a:schemeClr val="lt1"/>
+          </a:fontRef>
+        </p:style>
+        <p:txBody>
+          <a:bodyPr rtlCol="0" anchor="ctr"/>
+          <a:lstStyle/>
+          <a:p>
+            <a:pPr algn="ctr"/>
+            <a:endParaRPr lang="en-US"/>
+          </a:p>
+        </p:txBody>
+      </p:sp>
+      <p:sp>
+        <p:nvSpPr>
+          <p:cNvPr id="4" name="Rectangle 3"/>
+          <p:cNvSpPr/>
+          <p:nvPr/>
+        </p:nvSpPr>
+        <p:spPr>
+          <a:xfrm>
+            <a:off x="2759828" y="3149600"/>
+            <a:ext cx="275302" cy="221921"/>
+          </a:xfrm>
+          <a:prstGeom prst="rect">
+            <a:avLst/>
+          </a:prstGeom>
+          <a:solidFill>
+            <a:schemeClr val="bg1"/>
+          </a:solidFill>
+          <a:ln>
+            <a:noFill/>
+          </a:ln>
+          <a:effectLst/>
+        </p:spPr>
+        <p:style>
+          <a:lnRef idx="1">
+            <a:schemeClr val="accent1"/>
+          </a:lnRef>
+          <a:fillRef idx="3">
+            <a:schemeClr val="accent1"/>
+          </a:fillRef>
+          <a:effectRef idx="2">
+            <a:schemeClr val="accent1"/>
+          </a:effectRef>
+          <a:fontRef idx="minor">
+            <a:schemeClr val="lt1"/>
+          </a:fontRef>
+        </p:style>
+        <p:txBody>
+          <a:bodyPr rtlCol="0" anchor="ctr"/>
+          <a:lstStyle/>
+          <a:p>
+            <a:pPr algn="ctr"/>
+            <a:endParaRPr lang="en-US" dirty="0"/>
+          </a:p>
+        </p:txBody>
+      </p:sp>
+      <p:pic>
+        <p:nvPicPr>
+          <p:cNvPr id="5" name="Picture 4" descr="1a-singlestrand.pdf"/>
+          <p:cNvPicPr>
+            <a:picLocks noChangeAspect="1"/>
+          </p:cNvPicPr>
+          <p:nvPr/>
+        </p:nvPicPr>
+        <p:blipFill>
+          <a:blip r:embed="rId2">
+            <a:extLst>
+              <a:ext uri="{28A0092B-C50C-407E-A947-70E740481C1C}">
+                <a14:useLocalDpi xmlns:a14="http://schemas.microsoft.com/office/drawing/2010/main" val="0"/>
+              </a:ext>
+            </a:extLst>
+          </a:blip>
+          <a:stretch>
+            <a:fillRect/>
+          </a:stretch>
+        </p:blipFill>
+        <p:spPr>
+          <a:xfrm>
+            <a:off x="2501900" y="3149600"/>
+            <a:ext cx="4140200" cy="546100"/>
+          </a:xfrm>
+          <a:prstGeom prst="rect">
+            <a:avLst/>
+          </a:prstGeom>
+        </p:spPr>
+      </p:pic>
+      <p:sp>
+        <p:nvSpPr>
+          <p:cNvPr id="6" name="Triangle 5"/>
+          <p:cNvSpPr/>
+          <p:nvPr/>
+        </p:nvSpPr>
+        <p:spPr>
+          <a:xfrm rot="10800000">
+            <a:off x="2860673" y="3037954"/>
+            <a:ext cx="76201" cy="67196"/>
+          </a:xfrm>
+          <a:prstGeom prst="triangle">
+            <a:avLst/>
+          </a:prstGeom>
+          <a:solidFill>
+            <a:schemeClr val="bg1"/>
+          </a:solidFill>
+          <a:ln>
+            <a:noFill/>
+          </a:ln>
+          <a:effectLst/>
+        </p:spPr>
+        <p:style>
+          <a:lnRef idx="1">
+            <a:schemeClr val="accent1"/>
+          </a:lnRef>
+          <a:fillRef idx="3">
+            <a:schemeClr val="accent1"/>
+          </a:fillRef>
+          <a:effectRef idx="2">
+            <a:schemeClr val="accent1"/>
+          </a:effectRef>
+          <a:fontRef idx="minor">
+            <a:schemeClr val="lt1"/>
+          </a:fontRef>
+        </p:style>
+        <p:txBody>
+          <a:bodyPr rtlCol="0" anchor="ctr"/>
+          <a:lstStyle/>
+          <a:p>
+            <a:pPr algn="ctr"/>
+            <a:endParaRPr lang="en-US"/>
+          </a:p>
+        </p:txBody>
+      </p:sp>
+    </p:spTree>
+    <p:extLst>
+      <p:ext uri="{BB962C8B-B14F-4D97-AF65-F5344CB8AC3E}">
+        <p14:creationId xmlns:p14="http://schemas.microsoft.com/office/powerpoint/2010/main" val="1357981611"/>
+      </p:ext>
+    </p:extLst>
+  </p:cSld>
+  <p:clrMapOvr>
+    <a:masterClrMapping/>
+  </p:clrMapOvr>
+</p:sld>
+</file>
+
+<file path=ppt/slides/slide13.xml><?xml version="1.0" encoding="utf-8"?>
+<p:sld xmlns:a="http://schemas.openxmlformats.org/drawingml/2006/main" xmlns:r="http://schemas.openxmlformats.org/officeDocument/2006/relationships" xmlns:p="http://schemas.openxmlformats.org/presentationml/2006/main">
+  <p:cSld>
+    <p:spTree>
+      <p:nvGrpSpPr>
+        <p:cNvPr id="1" name=""/>
+        <p:cNvGrpSpPr/>
+        <p:nvPr/>
+      </p:nvGrpSpPr>
+      <p:grpSpPr>
+        <a:xfrm>
+          <a:off x="0" y="0"/>
+          <a:ext cx="0" cy="0"/>
+          <a:chOff x="0" y="0"/>
+          <a:chExt cx="0" cy="0"/>
+        </a:xfrm>
+      </p:grpSpPr>
+      <p:cxnSp>
+        <p:nvCxnSpPr>
+          <p:cNvPr id="2" name="Elbow Connector 1"/>
+          <p:cNvCxnSpPr/>
+          <p:nvPr/>
+        </p:nvCxnSpPr>
+        <p:spPr>
+          <a:xfrm rot="5400000">
+            <a:off x="4023752" y="3078308"/>
+            <a:ext cx="521446" cy="432701"/>
+          </a:xfrm>
+          <a:prstGeom prst="bentConnector3">
+            <a:avLst>
+              <a:gd name="adj1" fmla="val 100828"/>
+            </a:avLst>
+          </a:prstGeom>
+          <a:ln>
+            <a:solidFill>
+              <a:srgbClr val="FF0000"/>
+            </a:solidFill>
+            <a:headEnd type="none"/>
+            <a:tailEnd type="triangle" w="lg" len="lg"/>
+          </a:ln>
+          <a:effectLst/>
+        </p:spPr>
+        <p:style>
+          <a:lnRef idx="2">
+            <a:schemeClr val="accent1"/>
+          </a:lnRef>
+          <a:fillRef idx="0">
+            <a:schemeClr val="accent1"/>
+          </a:fillRef>
+          <a:effectRef idx="1">
+            <a:schemeClr val="accent1"/>
+          </a:effectRef>
+          <a:fontRef idx="minor">
+            <a:schemeClr val="tx1"/>
+          </a:fontRef>
+        </p:style>
+      </p:cxnSp>
+      <p:cxnSp>
+        <p:nvCxnSpPr>
+          <p:cNvPr id="3" name="Elbow Connector 2"/>
+          <p:cNvCxnSpPr/>
+          <p:nvPr/>
+        </p:nvCxnSpPr>
+        <p:spPr>
+          <a:xfrm flipV="1">
+            <a:off x="4716916" y="3606118"/>
+            <a:ext cx="1278811" cy="135204"/>
+          </a:xfrm>
+          <a:prstGeom prst="bentConnector3">
+            <a:avLst>
+              <a:gd name="adj1" fmla="val 497"/>
+            </a:avLst>
+          </a:prstGeom>
+          <a:ln>
+            <a:solidFill>
+              <a:srgbClr val="008000"/>
+            </a:solidFill>
+            <a:headEnd type="none"/>
+            <a:tailEnd type="triangle" w="lg" len="lg"/>
+          </a:ln>
+          <a:effectLst/>
+        </p:spPr>
+        <p:style>
+          <a:lnRef idx="2">
+            <a:schemeClr val="accent1"/>
+          </a:lnRef>
+          <a:fillRef idx="0">
+            <a:schemeClr val="accent1"/>
+          </a:fillRef>
+          <a:effectRef idx="1">
+            <a:schemeClr val="accent1"/>
+          </a:effectRef>
+          <a:fontRef idx="minor">
+            <a:schemeClr val="tx1"/>
+          </a:fontRef>
+        </p:style>
+      </p:cxnSp>
+      <p:grpSp>
+        <p:nvGrpSpPr>
+          <p:cNvPr id="4" name="Group 3"/>
+          <p:cNvGrpSpPr/>
+          <p:nvPr/>
+        </p:nvGrpSpPr>
+        <p:grpSpPr>
+          <a:xfrm>
+            <a:off x="1804728" y="2123459"/>
+            <a:ext cx="4191000" cy="1146912"/>
+            <a:chOff x="2387824" y="2155732"/>
+            <a:chExt cx="4191000" cy="1146912"/>
+          </a:xfrm>
+        </p:grpSpPr>
+        <p:sp>
+          <p:nvSpPr>
+            <p:cNvPr id="5" name="Rectangle 4"/>
+            <p:cNvSpPr/>
+            <p:nvPr/>
+          </p:nvSpPr>
+          <p:spPr>
+            <a:xfrm>
+              <a:off x="2679700" y="2884704"/>
+              <a:ext cx="275302" cy="221921"/>
+            </a:xfrm>
+            <a:prstGeom prst="rect">
+              <a:avLst/>
+            </a:prstGeom>
+            <a:solidFill>
+              <a:schemeClr val="bg1"/>
+            </a:solidFill>
+            <a:ln>
+              <a:noFill/>
+            </a:ln>
+            <a:effectLst/>
+          </p:spPr>
+          <p:style>
+            <a:lnRef idx="1">
+              <a:schemeClr val="accent1"/>
+            </a:lnRef>
+            <a:fillRef idx="3">
+              <a:schemeClr val="accent1"/>
+            </a:fillRef>
+            <a:effectRef idx="2">
+              <a:schemeClr val="accent1"/>
+            </a:effectRef>
+            <a:fontRef idx="minor">
+              <a:schemeClr val="lt1"/>
+            </a:fontRef>
+          </p:style>
+          <p:txBody>
+            <a:bodyPr rtlCol="0" anchor="ctr"/>
+            <a:lstStyle/>
+            <a:p>
+              <a:pPr algn="ctr"/>
+              <a:endParaRPr lang="en-US" dirty="0"/>
+            </a:p>
+          </p:txBody>
+        </p:sp>
+        <p:cxnSp>
+          <p:nvCxnSpPr>
+            <p:cNvPr id="6" name="Straight Connector 5"/>
+            <p:cNvCxnSpPr/>
+            <p:nvPr/>
+          </p:nvCxnSpPr>
+          <p:spPr>
+            <a:xfrm>
+              <a:off x="2387824" y="2974184"/>
+              <a:ext cx="4191000" cy="0"/>
+            </a:xfrm>
+            <a:prstGeom prst="line">
+              <a:avLst/>
+            </a:prstGeom>
+            <a:ln w="38100" cap="flat" cmpd="sng" algn="ctr">
+              <a:solidFill>
+                <a:srgbClr val="000000"/>
+              </a:solidFill>
+              <a:prstDash val="solid"/>
+              <a:round/>
+              <a:headEnd type="none" w="med" len="med"/>
+              <a:tailEnd type="none" w="med" len="med"/>
+            </a:ln>
+          </p:spPr>
+          <p:style>
+            <a:lnRef idx="2">
+              <a:schemeClr val="accent1"/>
+            </a:lnRef>
+            <a:fillRef idx="0">
+              <a:schemeClr val="accent1"/>
+            </a:fillRef>
+            <a:effectRef idx="1">
+              <a:schemeClr val="accent1"/>
+            </a:effectRef>
+            <a:fontRef idx="minor">
+              <a:schemeClr val="tx1"/>
+            </a:fontRef>
+          </p:style>
+        </p:cxnSp>
+        <p:sp>
+          <p:nvSpPr>
+            <p:cNvPr id="7" name="Right Arrow 6"/>
+            <p:cNvSpPr/>
+            <p:nvPr/>
+          </p:nvSpPr>
+          <p:spPr>
+            <a:xfrm>
+              <a:off x="4559524" y="2790860"/>
+              <a:ext cx="1168400" cy="350140"/>
+            </a:xfrm>
+            <a:prstGeom prst="rightArrow">
+              <a:avLst>
+                <a:gd name="adj1" fmla="val 100000"/>
+                <a:gd name="adj2" fmla="val 52194"/>
+              </a:avLst>
+            </a:prstGeom>
+            <a:solidFill>
+              <a:srgbClr val="3366FF"/>
+            </a:solidFill>
+            <a:ln w="38100" cap="flat" cmpd="sng" algn="ctr">
+              <a:solidFill>
+                <a:srgbClr val="000000"/>
+              </a:solidFill>
+              <a:prstDash val="solid"/>
+              <a:round/>
+              <a:headEnd type="none" w="med" len="med"/>
+              <a:tailEnd type="none" w="med" len="med"/>
+            </a:ln>
+          </p:spPr>
+          <p:style>
+            <a:lnRef idx="1">
+              <a:schemeClr val="accent1"/>
+            </a:lnRef>
+            <a:fillRef idx="3">
+              <a:schemeClr val="accent1"/>
+            </a:fillRef>
+            <a:effectRef idx="2">
+              <a:schemeClr val="accent1"/>
+            </a:effectRef>
+            <a:fontRef idx="minor">
+              <a:schemeClr val="lt1"/>
+            </a:fontRef>
+          </p:style>
+          <p:txBody>
+            <a:bodyPr rtlCol="0" anchor="ctr"/>
+            <a:lstStyle/>
+            <a:p>
+              <a:pPr algn="ctr"/>
+              <a:r>
+                <a:rPr lang="en-US" i="1" dirty="0" err="1">
+                  <a:solidFill>
+                    <a:schemeClr val="tx1"/>
+                  </a:solidFill>
+                </a:rPr>
+                <a:t>t</a:t>
+              </a:r>
+              <a:r>
+                <a:rPr lang="en-US" i="1" dirty="0" err="1" smtClean="0">
+                  <a:solidFill>
+                    <a:schemeClr val="tx1"/>
+                  </a:solidFill>
+                </a:rPr>
+                <a:t>etr</a:t>
+              </a:r>
+              <a:endParaRPr lang="en-US" i="1" dirty="0">
+                <a:solidFill>
+                  <a:schemeClr val="tx1"/>
+                </a:solidFill>
+              </a:endParaRPr>
+            </a:p>
+          </p:txBody>
+        </p:sp>
+        <p:sp>
+          <p:nvSpPr>
+            <p:cNvPr id="8" name="Chord 7"/>
+            <p:cNvSpPr/>
+            <p:nvPr/>
+          </p:nvSpPr>
+          <p:spPr>
+            <a:xfrm>
+              <a:off x="3660618" y="2618584"/>
+              <a:ext cx="632206" cy="632206"/>
+            </a:xfrm>
+            <a:prstGeom prst="chord">
+              <a:avLst>
+                <a:gd name="adj1" fmla="val 10506229"/>
+                <a:gd name="adj2" fmla="val 301460"/>
+              </a:avLst>
+            </a:prstGeom>
+            <a:solidFill>
+              <a:schemeClr val="accent4">
+                <a:lumMod val="60000"/>
+                <a:lumOff val="40000"/>
+              </a:schemeClr>
+            </a:solidFill>
+            <a:ln w="38100" cap="flat" cmpd="sng" algn="ctr">
+              <a:solidFill>
+                <a:srgbClr val="000000"/>
+              </a:solidFill>
+              <a:prstDash val="solid"/>
+              <a:round/>
+              <a:headEnd type="none" w="med" len="med"/>
+              <a:tailEnd type="none" w="med" len="med"/>
+            </a:ln>
+          </p:spPr>
+          <p:style>
+            <a:lnRef idx="1">
+              <a:schemeClr val="accent1"/>
+            </a:lnRef>
+            <a:fillRef idx="3">
+              <a:schemeClr val="accent1"/>
+            </a:fillRef>
+            <a:effectRef idx="2">
+              <a:schemeClr val="accent1"/>
+            </a:effectRef>
+            <a:fontRef idx="minor">
+              <a:schemeClr val="lt1"/>
+            </a:fontRef>
+          </p:style>
+          <p:txBody>
+            <a:bodyPr rtlCol="0" anchor="ctr"/>
+            <a:lstStyle/>
+            <a:p>
+              <a:pPr algn="ctr"/>
+              <a:endParaRPr lang="en-US"/>
+            </a:p>
+          </p:txBody>
+        </p:sp>
+        <p:sp>
+          <p:nvSpPr>
+            <p:cNvPr id="9" name="Bent Arrow 8"/>
+            <p:cNvSpPr/>
+            <p:nvPr/>
+          </p:nvSpPr>
+          <p:spPr>
+            <a:xfrm>
+              <a:off x="2696733" y="2155732"/>
+              <a:ext cx="889000" cy="820040"/>
+            </a:xfrm>
+            <a:prstGeom prst="bentArrow">
+              <a:avLst/>
+            </a:prstGeom>
+            <a:solidFill>
+              <a:schemeClr val="tx2">
+                <a:lumMod val="60000"/>
+                <a:lumOff val="40000"/>
+              </a:schemeClr>
+            </a:solidFill>
+            <a:ln w="38100" cap="flat" cmpd="sng" algn="ctr">
+              <a:solidFill>
+                <a:srgbClr val="000000"/>
+              </a:solidFill>
+              <a:prstDash val="solid"/>
+              <a:round/>
+              <a:headEnd type="none" w="med" len="med"/>
+              <a:tailEnd type="none" w="med" len="med"/>
+            </a:ln>
+          </p:spPr>
+          <p:style>
+            <a:lnRef idx="1">
+              <a:schemeClr val="accent1"/>
+            </a:lnRef>
+            <a:fillRef idx="3">
+              <a:schemeClr val="accent1"/>
+            </a:fillRef>
+            <a:effectRef idx="2">
+              <a:schemeClr val="accent1"/>
+            </a:effectRef>
+            <a:fontRef idx="minor">
+              <a:schemeClr val="lt1"/>
+            </a:fontRef>
+          </p:style>
+          <p:txBody>
+            <a:bodyPr rtlCol="0" anchor="ctr"/>
+            <a:lstStyle/>
+            <a:p>
+              <a:pPr algn="ctr"/>
+              <a:endParaRPr lang="en-US">
+                <a:solidFill>
+                  <a:schemeClr val="tx1"/>
+                </a:solidFill>
+              </a:endParaRPr>
+            </a:p>
+          </p:txBody>
+        </p:sp>
+        <p:sp>
+          <p:nvSpPr>
+            <p:cNvPr id="10" name="Left-Right-Up Arrow 9"/>
+            <p:cNvSpPr/>
+            <p:nvPr/>
+          </p:nvSpPr>
+          <p:spPr>
+            <a:xfrm rot="10800000">
+              <a:off x="5804124" y="2341914"/>
+              <a:ext cx="774700" cy="629540"/>
+            </a:xfrm>
+            <a:prstGeom prst="leftRightUpArrow">
+              <a:avLst>
+                <a:gd name="adj1" fmla="val 50000"/>
+                <a:gd name="adj2" fmla="val 14159"/>
+                <a:gd name="adj3" fmla="val 0"/>
+              </a:avLst>
+            </a:prstGeom>
+            <a:solidFill>
+              <a:schemeClr val="accent2">
+                <a:lumMod val="60000"/>
+                <a:lumOff val="40000"/>
+              </a:schemeClr>
+            </a:solidFill>
+            <a:ln w="38100" cap="flat" cmpd="sng" algn="ctr">
+              <a:solidFill>
+                <a:srgbClr val="000000"/>
+              </a:solidFill>
+              <a:prstDash val="solid"/>
+              <a:round/>
+              <a:headEnd type="none" w="med" len="med"/>
+              <a:tailEnd type="none" w="med" len="med"/>
+            </a:ln>
+          </p:spPr>
+          <p:style>
+            <a:lnRef idx="1">
+              <a:schemeClr val="accent1"/>
+            </a:lnRef>
+            <a:fillRef idx="3">
+              <a:schemeClr val="accent1"/>
+            </a:fillRef>
+            <a:effectRef idx="2">
+              <a:schemeClr val="accent1"/>
+            </a:effectRef>
+            <a:fontRef idx="minor">
+              <a:schemeClr val="lt1"/>
+            </a:fontRef>
+          </p:style>
+          <p:txBody>
+            <a:bodyPr rtlCol="0" anchor="ctr"/>
+            <a:lstStyle/>
+            <a:p>
+              <a:pPr algn="ctr"/>
+              <a:endParaRPr lang="en-US"/>
+            </a:p>
+          </p:txBody>
+        </p:sp>
+        <p:sp>
+          <p:nvSpPr>
+            <p:cNvPr id="11" name="TextBox 10"/>
+            <p:cNvSpPr txBox="1"/>
+            <p:nvPr/>
+          </p:nvSpPr>
+          <p:spPr>
+            <a:xfrm>
+              <a:off x="2619865" y="2933312"/>
+              <a:ext cx="843501" cy="369332"/>
+            </a:xfrm>
+            <a:prstGeom prst="rect">
+              <a:avLst/>
+            </a:prstGeom>
+            <a:noFill/>
+          </p:spPr>
+          <p:txBody>
+            <a:bodyPr wrap="none" rtlCol="0">
+              <a:spAutoFit/>
+            </a:bodyPr>
+            <a:lstStyle/>
+            <a:p>
+              <a:r>
+                <a:rPr lang="en-US" smtClean="0"/>
+                <a:t>J23101</a:t>
+              </a:r>
+              <a:endParaRPr lang="en-US" dirty="0"/>
+            </a:p>
+          </p:txBody>
+        </p:sp>
+      </p:grpSp>
+      <p:grpSp>
+        <p:nvGrpSpPr>
+          <p:cNvPr id="12" name="Group 11"/>
+          <p:cNvGrpSpPr/>
+          <p:nvPr/>
+        </p:nvGrpSpPr>
+        <p:grpSpPr>
+          <a:xfrm>
+            <a:off x="1804728" y="4002479"/>
+            <a:ext cx="4191000" cy="1120408"/>
+            <a:chOff x="2387824" y="3984532"/>
+            <a:chExt cx="4191000" cy="1120408"/>
+          </a:xfrm>
+        </p:grpSpPr>
+        <p:sp>
+          <p:nvSpPr>
+            <p:cNvPr id="13" name="Rectangle 12"/>
+            <p:cNvSpPr/>
+            <p:nvPr/>
+          </p:nvSpPr>
+          <p:spPr>
+            <a:xfrm>
+              <a:off x="2679700" y="4713504"/>
+              <a:ext cx="275302" cy="221921"/>
+            </a:xfrm>
+            <a:prstGeom prst="rect">
+              <a:avLst/>
+            </a:prstGeom>
+            <a:solidFill>
+              <a:schemeClr val="bg1"/>
+            </a:solidFill>
+            <a:ln>
+              <a:noFill/>
+            </a:ln>
+            <a:effectLst/>
+          </p:spPr>
+          <p:style>
+            <a:lnRef idx="1">
+              <a:schemeClr val="accent1"/>
+            </a:lnRef>
+            <a:fillRef idx="3">
+              <a:schemeClr val="accent1"/>
+            </a:fillRef>
+            <a:effectRef idx="2">
+              <a:schemeClr val="accent1"/>
+            </a:effectRef>
+            <a:fontRef idx="minor">
+              <a:schemeClr val="lt1"/>
+            </a:fontRef>
+          </p:style>
+          <p:txBody>
+            <a:bodyPr rtlCol="0" anchor="ctr"/>
+            <a:lstStyle/>
+            <a:p>
+              <a:pPr algn="ctr"/>
+              <a:endParaRPr lang="en-US" dirty="0"/>
+            </a:p>
+          </p:txBody>
+        </p:sp>
+        <p:cxnSp>
+          <p:nvCxnSpPr>
+            <p:cNvPr id="14" name="Straight Connector 13"/>
+            <p:cNvCxnSpPr/>
+            <p:nvPr/>
+          </p:nvCxnSpPr>
+          <p:spPr>
+            <a:xfrm>
+              <a:off x="2387824" y="4802984"/>
+              <a:ext cx="4191000" cy="0"/>
+            </a:xfrm>
+            <a:prstGeom prst="line">
+              <a:avLst/>
+            </a:prstGeom>
+            <a:ln w="38100" cap="flat" cmpd="sng" algn="ctr">
+              <a:solidFill>
+                <a:srgbClr val="000000"/>
+              </a:solidFill>
+              <a:prstDash val="solid"/>
+              <a:round/>
+              <a:headEnd type="none" w="med" len="med"/>
+              <a:tailEnd type="none" w="med" len="med"/>
+            </a:ln>
+          </p:spPr>
+          <p:style>
+            <a:lnRef idx="2">
+              <a:schemeClr val="accent1"/>
+            </a:lnRef>
+            <a:fillRef idx="0">
+              <a:schemeClr val="accent1"/>
+            </a:fillRef>
+            <a:effectRef idx="1">
+              <a:schemeClr val="accent1"/>
+            </a:effectRef>
+            <a:fontRef idx="minor">
+              <a:schemeClr val="tx1"/>
+            </a:fontRef>
+          </p:style>
+        </p:cxnSp>
+        <p:sp>
+          <p:nvSpPr>
+            <p:cNvPr id="15" name="Right Arrow 14"/>
+            <p:cNvSpPr/>
+            <p:nvPr/>
+          </p:nvSpPr>
+          <p:spPr>
+            <a:xfrm>
+              <a:off x="4559524" y="4632914"/>
+              <a:ext cx="1168400" cy="350140"/>
+            </a:xfrm>
+            <a:prstGeom prst="rightArrow">
+              <a:avLst>
+                <a:gd name="adj1" fmla="val 100000"/>
+                <a:gd name="adj2" fmla="val 52194"/>
+              </a:avLst>
+            </a:prstGeom>
+            <a:solidFill>
+              <a:srgbClr val="008000"/>
+            </a:solidFill>
+            <a:ln w="38100" cap="flat" cmpd="sng" algn="ctr">
+              <a:solidFill>
+                <a:srgbClr val="000000"/>
+              </a:solidFill>
+              <a:prstDash val="solid"/>
+              <a:round/>
+              <a:headEnd type="none" w="med" len="med"/>
+              <a:tailEnd type="none" w="med" len="med"/>
+            </a:ln>
+          </p:spPr>
+          <p:style>
+            <a:lnRef idx="1">
+              <a:schemeClr val="accent1"/>
+            </a:lnRef>
+            <a:fillRef idx="3">
+              <a:schemeClr val="accent1"/>
+            </a:fillRef>
+            <a:effectRef idx="2">
+              <a:schemeClr val="accent1"/>
+            </a:effectRef>
+            <a:fontRef idx="minor">
+              <a:schemeClr val="lt1"/>
+            </a:fontRef>
+          </p:style>
+          <p:txBody>
+            <a:bodyPr rtlCol="0" anchor="ctr"/>
+            <a:lstStyle/>
+            <a:p>
+              <a:pPr algn="ctr"/>
+              <a:r>
+                <a:rPr lang="en-US" i="1" dirty="0" err="1" smtClean="0">
+                  <a:solidFill>
+                    <a:schemeClr val="tx1"/>
+                  </a:solidFill>
+                </a:rPr>
+                <a:t>gfp</a:t>
+              </a:r>
+              <a:endParaRPr lang="en-US" i="1" dirty="0">
+                <a:solidFill>
+                  <a:schemeClr val="tx1"/>
+                </a:solidFill>
+              </a:endParaRPr>
+            </a:p>
+          </p:txBody>
+        </p:sp>
+        <p:sp>
+          <p:nvSpPr>
+            <p:cNvPr id="16" name="Chord 15"/>
+            <p:cNvSpPr/>
+            <p:nvPr/>
+          </p:nvSpPr>
+          <p:spPr>
+            <a:xfrm>
+              <a:off x="3660618" y="4447384"/>
+              <a:ext cx="632206" cy="632206"/>
+            </a:xfrm>
+            <a:prstGeom prst="chord">
+              <a:avLst>
+                <a:gd name="adj1" fmla="val 10506229"/>
+                <a:gd name="adj2" fmla="val 301460"/>
+              </a:avLst>
+            </a:prstGeom>
+            <a:solidFill>
+              <a:schemeClr val="accent4">
+                <a:lumMod val="60000"/>
+                <a:lumOff val="40000"/>
+              </a:schemeClr>
+            </a:solidFill>
+            <a:ln w="38100" cap="flat" cmpd="sng" algn="ctr">
+              <a:solidFill>
+                <a:srgbClr val="000000"/>
+              </a:solidFill>
+              <a:prstDash val="solid"/>
+              <a:round/>
+              <a:headEnd type="none" w="med" len="med"/>
+              <a:tailEnd type="none" w="med" len="med"/>
+            </a:ln>
+          </p:spPr>
+          <p:style>
+            <a:lnRef idx="1">
+              <a:schemeClr val="accent1"/>
+            </a:lnRef>
+            <a:fillRef idx="3">
+              <a:schemeClr val="accent1"/>
+            </a:fillRef>
+            <a:effectRef idx="2">
+              <a:schemeClr val="accent1"/>
+            </a:effectRef>
+            <a:fontRef idx="minor">
+              <a:schemeClr val="lt1"/>
+            </a:fontRef>
+          </p:style>
+          <p:txBody>
+            <a:bodyPr rtlCol="0" anchor="ctr"/>
+            <a:lstStyle/>
+            <a:p>
+              <a:pPr algn="ctr"/>
+              <a:endParaRPr lang="en-US"/>
+            </a:p>
+          </p:txBody>
+        </p:sp>
+        <p:sp>
+          <p:nvSpPr>
+            <p:cNvPr id="17" name="Bent Arrow 16"/>
+            <p:cNvSpPr/>
+            <p:nvPr/>
+          </p:nvSpPr>
+          <p:spPr>
+            <a:xfrm>
+              <a:off x="2696733" y="3984532"/>
+              <a:ext cx="889000" cy="820040"/>
+            </a:xfrm>
+            <a:prstGeom prst="bentArrow">
+              <a:avLst/>
+            </a:prstGeom>
+            <a:solidFill>
+              <a:schemeClr val="tx2">
+                <a:lumMod val="60000"/>
+                <a:lumOff val="40000"/>
+              </a:schemeClr>
+            </a:solidFill>
+            <a:ln w="38100" cap="flat" cmpd="sng" algn="ctr">
+              <a:solidFill>
+                <a:srgbClr val="000000"/>
+              </a:solidFill>
+              <a:prstDash val="solid"/>
+              <a:round/>
+              <a:headEnd type="none" w="med" len="med"/>
+              <a:tailEnd type="none" w="med" len="med"/>
+            </a:ln>
+          </p:spPr>
+          <p:style>
+            <a:lnRef idx="1">
+              <a:schemeClr val="accent1"/>
+            </a:lnRef>
+            <a:fillRef idx="3">
+              <a:schemeClr val="accent1"/>
+            </a:fillRef>
+            <a:effectRef idx="2">
+              <a:schemeClr val="accent1"/>
+            </a:effectRef>
+            <a:fontRef idx="minor">
+              <a:schemeClr val="lt1"/>
+            </a:fontRef>
+          </p:style>
+          <p:txBody>
+            <a:bodyPr rtlCol="0" anchor="ctr"/>
+            <a:lstStyle/>
+            <a:p>
+              <a:pPr algn="ctr"/>
+              <a:endParaRPr lang="en-US">
+                <a:solidFill>
+                  <a:schemeClr val="tx1"/>
+                </a:solidFill>
+              </a:endParaRPr>
+            </a:p>
+          </p:txBody>
+        </p:sp>
+        <p:sp>
+          <p:nvSpPr>
+            <p:cNvPr id="18" name="Left-Right-Up Arrow 17"/>
+            <p:cNvSpPr/>
+            <p:nvPr/>
+          </p:nvSpPr>
+          <p:spPr>
+            <a:xfrm rot="10800000">
+              <a:off x="5804124" y="4170714"/>
+              <a:ext cx="774700" cy="629540"/>
+            </a:xfrm>
+            <a:prstGeom prst="leftRightUpArrow">
+              <a:avLst>
+                <a:gd name="adj1" fmla="val 50000"/>
+                <a:gd name="adj2" fmla="val 14159"/>
+                <a:gd name="adj3" fmla="val 0"/>
+              </a:avLst>
+            </a:prstGeom>
+            <a:solidFill>
+              <a:schemeClr val="accent2">
+                <a:lumMod val="60000"/>
+                <a:lumOff val="40000"/>
+              </a:schemeClr>
+            </a:solidFill>
+            <a:ln w="38100" cap="flat" cmpd="sng" algn="ctr">
+              <a:solidFill>
+                <a:srgbClr val="000000"/>
+              </a:solidFill>
+              <a:prstDash val="solid"/>
+              <a:round/>
+              <a:headEnd type="none" w="med" len="med"/>
+              <a:tailEnd type="none" w="med" len="med"/>
+            </a:ln>
+          </p:spPr>
+          <p:style>
+            <a:lnRef idx="1">
+              <a:schemeClr val="accent1"/>
+            </a:lnRef>
+            <a:fillRef idx="3">
+              <a:schemeClr val="accent1"/>
+            </a:fillRef>
+            <a:effectRef idx="2">
+              <a:schemeClr val="accent1"/>
+            </a:effectRef>
+            <a:fontRef idx="minor">
+              <a:schemeClr val="lt1"/>
+            </a:fontRef>
+          </p:style>
+          <p:txBody>
+            <a:bodyPr rtlCol="0" anchor="ctr"/>
+            <a:lstStyle/>
+            <a:p>
+              <a:pPr algn="ctr"/>
+              <a:endParaRPr lang="en-US"/>
+            </a:p>
+          </p:txBody>
+        </p:sp>
+        <p:sp>
+          <p:nvSpPr>
+            <p:cNvPr id="19" name="TextBox 18"/>
+            <p:cNvSpPr txBox="1"/>
+            <p:nvPr/>
+          </p:nvSpPr>
+          <p:spPr>
+            <a:xfrm>
+              <a:off x="2911412" y="4735608"/>
+              <a:ext cx="588848" cy="369332"/>
+            </a:xfrm>
+            <a:prstGeom prst="rect">
+              <a:avLst/>
+            </a:prstGeom>
+            <a:noFill/>
+          </p:spPr>
+          <p:txBody>
+            <a:bodyPr wrap="none" rtlCol="0">
+              <a:spAutoFit/>
+            </a:bodyPr>
+            <a:lstStyle/>
+            <a:p>
+              <a:r>
+                <a:rPr lang="en-US" dirty="0" err="1"/>
+                <a:t>pTet</a:t>
+              </a:r>
+              <a:endParaRPr lang="en-US" dirty="0"/>
+            </a:p>
+          </p:txBody>
+        </p:sp>
+      </p:grpSp>
+      <p:sp>
+        <p:nvSpPr>
+          <p:cNvPr id="20" name="Oval 19"/>
+          <p:cNvSpPr/>
+          <p:nvPr/>
+        </p:nvSpPr>
+        <p:spPr>
+          <a:xfrm>
+            <a:off x="5995727" y="3389639"/>
+            <a:ext cx="734572" cy="432955"/>
+          </a:xfrm>
+          <a:prstGeom prst="ellipse">
+            <a:avLst/>
+          </a:prstGeom>
+          <a:solidFill>
+            <a:srgbClr val="008000"/>
+          </a:solidFill>
+          <a:ln w="38100" cmpd="sng">
+            <a:solidFill>
+              <a:schemeClr val="tx1"/>
+            </a:solidFill>
+          </a:ln>
+        </p:spPr>
+        <p:style>
+          <a:lnRef idx="1">
+            <a:schemeClr val="accent1"/>
+          </a:lnRef>
+          <a:fillRef idx="3">
+            <a:schemeClr val="accent1"/>
+          </a:fillRef>
+          <a:effectRef idx="2">
+            <a:schemeClr val="accent1"/>
+          </a:effectRef>
+          <a:fontRef idx="minor">
+            <a:schemeClr val="lt1"/>
+          </a:fontRef>
+        </p:style>
+        <p:txBody>
+          <a:bodyPr wrap="none" rtlCol="0" anchor="ctr"/>
+          <a:lstStyle/>
+          <a:p>
+            <a:pPr algn="ctr"/>
+            <a:r>
+              <a:rPr lang="en-US" dirty="0" smtClean="0">
+                <a:solidFill>
+                  <a:srgbClr val="000000"/>
+                </a:solidFill>
+              </a:rPr>
+              <a:t>GFP</a:t>
+            </a:r>
+            <a:endParaRPr lang="en-US" dirty="0">
+              <a:solidFill>
+                <a:srgbClr val="000000"/>
+              </a:solidFill>
+            </a:endParaRPr>
+          </a:p>
+        </p:txBody>
+      </p:sp>
+      <p:cxnSp>
+        <p:nvCxnSpPr>
+          <p:cNvPr id="22" name="Elbow Connector 21"/>
+          <p:cNvCxnSpPr/>
+          <p:nvPr/>
+        </p:nvCxnSpPr>
+        <p:spPr>
+          <a:xfrm rot="10800000" flipV="1">
+            <a:off x="2541104" y="3560001"/>
+            <a:ext cx="880356" cy="349390"/>
+          </a:xfrm>
+          <a:prstGeom prst="bentConnector3">
+            <a:avLst>
+              <a:gd name="adj1" fmla="val 101934"/>
+            </a:avLst>
+          </a:prstGeom>
+          <a:ln>
+            <a:solidFill>
+              <a:srgbClr val="FF0000"/>
+            </a:solidFill>
+            <a:headEnd type="none"/>
+            <a:tailEnd type="none"/>
+          </a:ln>
+          <a:effectLst/>
+        </p:spPr>
+        <p:style>
+          <a:lnRef idx="2">
+            <a:schemeClr val="accent1"/>
+          </a:lnRef>
+          <a:fillRef idx="0">
+            <a:schemeClr val="accent1"/>
+          </a:fillRef>
+          <a:effectRef idx="1">
+            <a:schemeClr val="accent1"/>
+          </a:effectRef>
+          <a:fontRef idx="minor">
+            <a:schemeClr val="tx1"/>
+          </a:fontRef>
+        </p:style>
+      </p:cxnSp>
+      <p:cxnSp>
+        <p:nvCxnSpPr>
+          <p:cNvPr id="23" name="Straight Connector 22"/>
+          <p:cNvCxnSpPr/>
+          <p:nvPr/>
+        </p:nvCxnSpPr>
+        <p:spPr>
+          <a:xfrm>
+            <a:off x="2371905" y="3934792"/>
+            <a:ext cx="296199" cy="0"/>
+          </a:xfrm>
+          <a:prstGeom prst="line">
+            <a:avLst/>
+          </a:prstGeom>
+          <a:ln>
+            <a:solidFill>
+              <a:srgbClr val="FF0000"/>
+            </a:solidFill>
+          </a:ln>
+        </p:spPr>
+        <p:style>
+          <a:lnRef idx="2">
+            <a:schemeClr val="accent1"/>
+          </a:lnRef>
+          <a:fillRef idx="0">
+            <a:schemeClr val="accent1"/>
+          </a:fillRef>
+          <a:effectRef idx="1">
+            <a:schemeClr val="accent1"/>
+          </a:effectRef>
+          <a:fontRef idx="minor">
+            <a:schemeClr val="tx1"/>
+          </a:fontRef>
+        </p:style>
+      </p:cxnSp>
+      <p:cxnSp>
+        <p:nvCxnSpPr>
+          <p:cNvPr id="24" name="Elbow Connector 23"/>
+          <p:cNvCxnSpPr>
+            <a:stCxn id="20" idx="6"/>
+          </p:cNvCxnSpPr>
+          <p:nvPr/>
+        </p:nvCxnSpPr>
+        <p:spPr>
+          <a:xfrm>
+            <a:off x="6730299" y="3606117"/>
+            <a:ext cx="577443" cy="12700"/>
+          </a:xfrm>
+          <a:prstGeom prst="straightConnector1">
+            <a:avLst/>
+          </a:prstGeom>
+          <a:ln>
+            <a:solidFill>
+              <a:schemeClr val="tx1"/>
+            </a:solidFill>
+            <a:headEnd type="none"/>
+            <a:tailEnd type="triangle" w="lg" len="lg"/>
+          </a:ln>
+          <a:effectLst/>
+        </p:spPr>
+        <p:style>
+          <a:lnRef idx="2">
+            <a:schemeClr val="accent1"/>
+          </a:lnRef>
+          <a:fillRef idx="0">
+            <a:schemeClr val="accent1"/>
+          </a:fillRef>
+          <a:effectRef idx="1">
+            <a:schemeClr val="accent1"/>
+          </a:effectRef>
+          <a:fontRef idx="minor">
+            <a:schemeClr val="tx1"/>
+          </a:fontRef>
+        </p:style>
+      </p:cxnSp>
+      <p:sp>
+        <p:nvSpPr>
+          <p:cNvPr id="29" name="TextBox 28"/>
+          <p:cNvSpPr txBox="1"/>
+          <p:nvPr/>
+        </p:nvSpPr>
+        <p:spPr>
+          <a:xfrm>
+            <a:off x="7246499" y="3314883"/>
+            <a:ext cx="557573" cy="646331"/>
+          </a:xfrm>
+          <a:prstGeom prst="rect">
+            <a:avLst/>
+          </a:prstGeom>
+          <a:noFill/>
+        </p:spPr>
+        <p:txBody>
+          <a:bodyPr wrap="square" rtlCol="0">
+            <a:spAutoFit/>
+          </a:bodyPr>
+          <a:lstStyle/>
+          <a:p>
+            <a:r>
+              <a:rPr lang="en-US" sz="3600" b="1" smtClean="0"/>
+              <a:t>∅</a:t>
+            </a:r>
+            <a:endParaRPr lang="en-US" sz="3600" b="1"/>
+          </a:p>
+        </p:txBody>
+      </p:sp>
+      <p:grpSp>
+        <p:nvGrpSpPr>
+          <p:cNvPr id="30" name="Group 29"/>
+          <p:cNvGrpSpPr/>
+          <p:nvPr/>
+        </p:nvGrpSpPr>
+        <p:grpSpPr>
+          <a:xfrm>
+            <a:off x="3544198" y="3315302"/>
+            <a:ext cx="424498" cy="461665"/>
+            <a:chOff x="2917611" y="3791800"/>
+            <a:chExt cx="424498" cy="461665"/>
+          </a:xfrm>
+        </p:grpSpPr>
+        <p:sp>
+          <p:nvSpPr>
+            <p:cNvPr id="31" name="Rectangle 30"/>
+            <p:cNvSpPr/>
+            <p:nvPr/>
+          </p:nvSpPr>
+          <p:spPr>
+            <a:xfrm rot="2700000">
+              <a:off x="2919548" y="3823346"/>
+              <a:ext cx="420624" cy="424498"/>
+            </a:xfrm>
+            <a:prstGeom prst="rect">
+              <a:avLst/>
+            </a:prstGeom>
+            <a:solidFill>
+              <a:srgbClr val="00B050"/>
+            </a:solidFill>
+            <a:ln w="19050" cmpd="sng">
+              <a:solidFill>
+                <a:srgbClr val="000000"/>
+              </a:solidFill>
+            </a:ln>
+            <a:effectLst/>
+          </p:spPr>
+          <p:style>
+            <a:lnRef idx="1">
+              <a:schemeClr val="accent1"/>
+            </a:lnRef>
+            <a:fillRef idx="3">
+              <a:schemeClr val="accent1"/>
+            </a:fillRef>
+            <a:effectRef idx="2">
+              <a:schemeClr val="accent1"/>
+            </a:effectRef>
+            <a:fontRef idx="minor">
+              <a:schemeClr val="lt1"/>
+            </a:fontRef>
+          </p:style>
+          <p:txBody>
+            <a:bodyPr rtlCol="0" anchor="ctr"/>
+            <a:lstStyle/>
+            <a:p>
+              <a:pPr algn="ctr"/>
+              <a:endParaRPr lang="en-US"/>
+            </a:p>
+          </p:txBody>
+        </p:sp>
+        <p:sp>
+          <p:nvSpPr>
+            <p:cNvPr id="32" name="TextBox 31"/>
+            <p:cNvSpPr txBox="1"/>
+            <p:nvPr/>
+          </p:nvSpPr>
+          <p:spPr>
+            <a:xfrm>
+              <a:off x="2961377" y="3791800"/>
+              <a:ext cx="327334" cy="461665"/>
+            </a:xfrm>
+            <a:prstGeom prst="rect">
+              <a:avLst/>
+            </a:prstGeom>
+            <a:noFill/>
+          </p:spPr>
+          <p:txBody>
+            <a:bodyPr wrap="none" rtlCol="0">
+              <a:spAutoFit/>
+            </a:bodyPr>
+            <a:lstStyle/>
+            <a:p>
+              <a:r>
+                <a:rPr lang="en-US" sz="2400" b="1" dirty="0" smtClean="0"/>
+                <a:t>?</a:t>
+              </a:r>
+              <a:endParaRPr lang="en-US" sz="2400" b="1" dirty="0"/>
+            </a:p>
+          </p:txBody>
+        </p:sp>
+      </p:grpSp>
+      <p:pic>
+        <p:nvPicPr>
+          <p:cNvPr id="40" name="Picture 39"/>
+          <p:cNvPicPr>
+            <a:picLocks noChangeAspect="1"/>
+          </p:cNvPicPr>
+          <p:nvPr/>
+        </p:nvPicPr>
+        <p:blipFill>
+          <a:blip r:embed="rId2">
+            <a:extLst>
+              <a:ext uri="{28A0092B-C50C-407E-A947-70E740481C1C}">
+                <a14:useLocalDpi xmlns:a14="http://schemas.microsoft.com/office/drawing/2010/main" val="0"/>
+              </a:ext>
+            </a:extLst>
+          </a:blip>
+          <a:stretch>
+            <a:fillRect/>
+          </a:stretch>
+        </p:blipFill>
+        <p:spPr>
+          <a:xfrm>
+            <a:off x="4205361" y="3381726"/>
+            <a:ext cx="1018544" cy="1018544"/>
+          </a:xfrm>
+          <a:prstGeom prst="rect">
+            <a:avLst/>
+          </a:prstGeom>
+        </p:spPr>
+      </p:pic>
+      <p:cxnSp>
+        <p:nvCxnSpPr>
+          <p:cNvPr id="41" name="Elbow Connector 40"/>
+          <p:cNvCxnSpPr/>
+          <p:nvPr/>
+        </p:nvCxnSpPr>
+        <p:spPr>
+          <a:xfrm flipV="1">
+            <a:off x="4720705" y="4037428"/>
+            <a:ext cx="0" cy="589989"/>
+          </a:xfrm>
+          <a:prstGeom prst="straightConnector1">
+            <a:avLst/>
+          </a:prstGeom>
+          <a:ln>
+            <a:solidFill>
+              <a:srgbClr val="008000"/>
+            </a:solidFill>
+            <a:headEnd type="none"/>
+            <a:tailEnd type="triangle" w="lg" len="lg"/>
+          </a:ln>
+          <a:effectLst/>
+        </p:spPr>
+        <p:style>
+          <a:lnRef idx="2">
+            <a:schemeClr val="accent1"/>
+          </a:lnRef>
+          <a:fillRef idx="0">
+            <a:schemeClr val="accent1"/>
+          </a:fillRef>
+          <a:effectRef idx="1">
+            <a:schemeClr val="accent1"/>
+          </a:effectRef>
+          <a:fontRef idx="minor">
+            <a:schemeClr val="tx1"/>
+          </a:fontRef>
+        </p:style>
+      </p:cxnSp>
+      <p:cxnSp>
+        <p:nvCxnSpPr>
+          <p:cNvPr id="45" name="Elbow Connector 23"/>
+          <p:cNvCxnSpPr/>
+          <p:nvPr/>
+        </p:nvCxnSpPr>
+        <p:spPr>
+          <a:xfrm>
+            <a:off x="5166070" y="3876112"/>
+            <a:ext cx="577443" cy="12700"/>
+          </a:xfrm>
+          <a:prstGeom prst="straightConnector1">
+            <a:avLst/>
+          </a:prstGeom>
+          <a:ln>
+            <a:solidFill>
+              <a:schemeClr val="tx1"/>
+            </a:solidFill>
+            <a:headEnd type="none"/>
+            <a:tailEnd type="triangle" w="lg" len="lg"/>
+          </a:ln>
+          <a:effectLst/>
+        </p:spPr>
+        <p:style>
+          <a:lnRef idx="2">
+            <a:schemeClr val="accent1"/>
+          </a:lnRef>
+          <a:fillRef idx="0">
+            <a:schemeClr val="accent1"/>
+          </a:fillRef>
+          <a:effectRef idx="1">
+            <a:schemeClr val="accent1"/>
+          </a:effectRef>
+          <a:fontRef idx="minor">
+            <a:schemeClr val="tx1"/>
+          </a:fontRef>
+        </p:style>
+      </p:cxnSp>
+      <p:sp>
+        <p:nvSpPr>
+          <p:cNvPr id="46" name="TextBox 45"/>
+          <p:cNvSpPr txBox="1"/>
+          <p:nvPr/>
+        </p:nvSpPr>
+        <p:spPr>
+          <a:xfrm>
+            <a:off x="5682270" y="3584878"/>
+            <a:ext cx="557573" cy="646331"/>
+          </a:xfrm>
+          <a:prstGeom prst="rect">
+            <a:avLst/>
+          </a:prstGeom>
+          <a:noFill/>
+        </p:spPr>
+        <p:txBody>
+          <a:bodyPr wrap="square" rtlCol="0">
+            <a:spAutoFit/>
+          </a:bodyPr>
+          <a:lstStyle/>
+          <a:p>
+            <a:r>
+              <a:rPr lang="en-US" sz="3600" b="1" smtClean="0"/>
+              <a:t>∅</a:t>
+            </a:r>
+            <a:endParaRPr lang="en-US" sz="3600" b="1"/>
+          </a:p>
+        </p:txBody>
+      </p:sp>
+    </p:spTree>
+    <p:extLst>
+      <p:ext uri="{BB962C8B-B14F-4D97-AF65-F5344CB8AC3E}">
+        <p14:creationId xmlns:p14="http://schemas.microsoft.com/office/powerpoint/2010/main" val="714300554"/>
+      </p:ext>
+    </p:extLst>
+  </p:cSld>
+  <p:clrMapOvr>
+    <a:masterClrMapping/>
+  </p:clrMapOvr>
 </p:sld>
 </file>
 
@@ -6129,7 +7775,7 @@
       </p:grpSpPr>
       <p:pic>
         <p:nvPicPr>
-          <p:cNvPr id="21" name="Picture 20" descr="restriction-enzyme-recognition-site.pdf"/>
+          <p:cNvPr id="21" name="Picture 20"/>
           <p:cNvPicPr>
             <a:picLocks noChangeAspect="1"/>
           </p:cNvPicPr>
@@ -6149,38 +7795,8 @@
         </p:blipFill>
         <p:spPr>
           <a:xfrm>
-            <a:off x="3500260" y="2336340"/>
-            <a:ext cx="635000" cy="1270000"/>
-          </a:xfrm>
-          <a:prstGeom prst="rect">
-            <a:avLst/>
-          </a:prstGeom>
-        </p:spPr>
-      </p:pic>
-      <p:pic>
-        <p:nvPicPr>
-          <p:cNvPr id="12" name="Picture 11" descr="restriction-enzyme-recognition-site.pdf"/>
-          <p:cNvPicPr>
-            <a:picLocks noChangeAspect="1"/>
-          </p:cNvPicPr>
-          <p:nvPr/>
-        </p:nvPicPr>
-        <p:blipFill>
-          <a:blip r:embed="rId2">
-            <a:extLst>
-              <a:ext uri="{28A0092B-C50C-407E-A947-70E740481C1C}">
-                <a14:useLocalDpi xmlns:a14="http://schemas.microsoft.com/office/drawing/2010/main" val="0"/>
-              </a:ext>
-            </a:extLst>
-          </a:blip>
-          <a:stretch>
-            <a:fillRect/>
-          </a:stretch>
-        </p:blipFill>
-        <p:spPr>
-          <a:xfrm>
-            <a:off x="1896633" y="2336340"/>
-            <a:ext cx="635000" cy="1270000"/>
+            <a:off x="3581768" y="2391572"/>
+            <a:ext cx="635000" cy="635000"/>
           </a:xfrm>
           <a:prstGeom prst="rect">
             <a:avLst/>
@@ -6433,6 +8049,36 @@
           <a:xfrm>
             <a:off x="4838700" y="2391572"/>
             <a:ext cx="635000" cy="1270000"/>
+          </a:xfrm>
+          <a:prstGeom prst="rect">
+            <a:avLst/>
+          </a:prstGeom>
+        </p:spPr>
+      </p:pic>
+      <p:pic>
+        <p:nvPicPr>
+          <p:cNvPr id="11" name="Picture 10"/>
+          <p:cNvPicPr>
+            <a:picLocks noChangeAspect="1"/>
+          </p:cNvPicPr>
+          <p:nvPr/>
+        </p:nvPicPr>
+        <p:blipFill>
+          <a:blip r:embed="rId2">
+            <a:extLst>
+              <a:ext uri="{28A0092B-C50C-407E-A947-70E740481C1C}">
+                <a14:useLocalDpi xmlns:a14="http://schemas.microsoft.com/office/drawing/2010/main" val="0"/>
+              </a:ext>
+            </a:extLst>
+          </a:blip>
+          <a:stretch>
+            <a:fillRect/>
+          </a:stretch>
+        </p:blipFill>
+        <p:spPr>
+          <a:xfrm>
+            <a:off x="1980225" y="2396122"/>
+            <a:ext cx="635000" cy="635000"/>
           </a:xfrm>
           <a:prstGeom prst="rect">
             <a:avLst/>
@@ -6685,7 +8331,7 @@
       </p:pic>
       <p:pic>
         <p:nvPicPr>
-          <p:cNvPr id="11" name="Picture 10" descr="ribonuclease-site.pdf"/>
+          <p:cNvPr id="11" name="Picture 10"/>
           <p:cNvPicPr>
             <a:picLocks noChangeAspect="1"/>
           </p:cNvPicPr>
@@ -6705,8 +8351,8 @@
         </p:blipFill>
         <p:spPr>
           <a:xfrm>
-            <a:off x="1896633" y="2313204"/>
-            <a:ext cx="635000" cy="1270000"/>
+            <a:off x="1896633" y="2408278"/>
+            <a:ext cx="635000" cy="635000"/>
           </a:xfrm>
           <a:prstGeom prst="rect">
             <a:avLst/>
@@ -6715,7 +8361,7 @@
       </p:pic>
       <p:pic>
         <p:nvPicPr>
-          <p:cNvPr id="14" name="Picture 13" descr="ribonuclease-site.pdf"/>
+          <p:cNvPr id="9" name="Picture 8"/>
           <p:cNvPicPr>
             <a:picLocks noChangeAspect="1"/>
           </p:cNvPicPr>
@@ -6735,8 +8381,8 @@
         </p:blipFill>
         <p:spPr>
           <a:xfrm>
-            <a:off x="3496833" y="2340772"/>
-            <a:ext cx="635000" cy="1270000"/>
+            <a:off x="3577216" y="2404272"/>
+            <a:ext cx="635000" cy="635000"/>
           </a:xfrm>
           <a:prstGeom prst="rect">
             <a:avLst/>
@@ -7330,9 +8976,94 @@
           </a:p>
         </p:txBody>
       </p:sp>
+      <p:cxnSp>
+        <p:nvCxnSpPr>
+          <p:cNvPr id="18" name="Straight Connector 17"/>
+          <p:cNvCxnSpPr/>
+          <p:nvPr/>
+        </p:nvCxnSpPr>
+        <p:spPr>
+          <a:xfrm>
+            <a:off x="1841500" y="2974184"/>
+            <a:ext cx="4102100" cy="0"/>
+          </a:xfrm>
+          <a:prstGeom prst="line">
+            <a:avLst/>
+          </a:prstGeom>
+          <a:ln w="38100" cap="flat" cmpd="sng" algn="ctr">
+            <a:solidFill>
+              <a:srgbClr val="000000"/>
+            </a:solidFill>
+            <a:prstDash val="solid"/>
+            <a:round/>
+            <a:headEnd type="none" w="med" len="med"/>
+            <a:tailEnd type="none" w="med" len="med"/>
+          </a:ln>
+        </p:spPr>
+        <p:style>
+          <a:lnRef idx="2">
+            <a:schemeClr val="accent1"/>
+          </a:lnRef>
+          <a:fillRef idx="0">
+            <a:schemeClr val="accent1"/>
+          </a:fillRef>
+          <a:effectRef idx="1">
+            <a:schemeClr val="accent1"/>
+          </a:effectRef>
+          <a:fontRef idx="minor">
+            <a:schemeClr val="tx1"/>
+          </a:fontRef>
+        </p:style>
+      </p:cxnSp>
+      <p:sp>
+        <p:nvSpPr>
+          <p:cNvPr id="15" name="Rectangle 14"/>
+          <p:cNvSpPr/>
+          <p:nvPr/>
+        </p:nvSpPr>
+        <p:spPr>
+          <a:xfrm>
+            <a:off x="4051300" y="2551208"/>
+            <a:ext cx="1104900" cy="410276"/>
+          </a:xfrm>
+          <a:prstGeom prst="rect">
+            <a:avLst/>
+          </a:prstGeom>
+          <a:solidFill>
+            <a:srgbClr val="660066"/>
+          </a:solidFill>
+          <a:ln w="38100" cmpd="sng">
+            <a:solidFill>
+              <a:srgbClr val="000000"/>
+            </a:solidFill>
+          </a:ln>
+        </p:spPr>
+        <p:style>
+          <a:lnRef idx="1">
+            <a:schemeClr val="accent1"/>
+          </a:lnRef>
+          <a:fillRef idx="3">
+            <a:schemeClr val="accent1"/>
+          </a:fillRef>
+          <a:effectRef idx="2">
+            <a:schemeClr val="accent1"/>
+          </a:effectRef>
+          <a:fontRef idx="minor">
+            <a:schemeClr val="lt1"/>
+          </a:fontRef>
+        </p:style>
+        <p:txBody>
+          <a:bodyPr rtlCol="0" anchor="ctr"/>
+          <a:lstStyle/>
+          <a:p>
+            <a:pPr algn="ctr"/>
+            <a:endParaRPr lang="en-US"/>
+          </a:p>
+        </p:txBody>
+      </p:sp>
       <p:pic>
         <p:nvPicPr>
-          <p:cNvPr id="11" name="Picture 10" descr="rna-stability-element.pdf"/>
+          <p:cNvPr id="29" name="Picture 28"/>
           <p:cNvPicPr>
             <a:picLocks noChangeAspect="1"/>
           </p:cNvPicPr>
@@ -7352,228 +9083,8 @@
         </p:blipFill>
         <p:spPr>
           <a:xfrm>
-            <a:off x="5156200" y="2323640"/>
-            <a:ext cx="635000" cy="1270000"/>
-          </a:xfrm>
-          <a:prstGeom prst="rect">
-            <a:avLst/>
-          </a:prstGeom>
-        </p:spPr>
-      </p:pic>
-      <p:cxnSp>
-        <p:nvCxnSpPr>
-          <p:cNvPr id="18" name="Straight Connector 17"/>
-          <p:cNvCxnSpPr/>
-          <p:nvPr/>
-        </p:nvCxnSpPr>
-        <p:spPr>
-          <a:xfrm>
-            <a:off x="1841500" y="2974184"/>
-            <a:ext cx="4102100" cy="0"/>
-          </a:xfrm>
-          <a:prstGeom prst="line">
-            <a:avLst/>
-          </a:prstGeom>
-          <a:ln w="38100" cap="flat" cmpd="sng" algn="ctr">
-            <a:solidFill>
-              <a:srgbClr val="000000"/>
-            </a:solidFill>
-            <a:prstDash val="solid"/>
-            <a:round/>
-            <a:headEnd type="none" w="med" len="med"/>
-            <a:tailEnd type="none" w="med" len="med"/>
-          </a:ln>
-        </p:spPr>
-        <p:style>
-          <a:lnRef idx="2">
-            <a:schemeClr val="accent1"/>
-          </a:lnRef>
-          <a:fillRef idx="0">
-            <a:schemeClr val="accent1"/>
-          </a:fillRef>
-          <a:effectRef idx="1">
-            <a:schemeClr val="accent1"/>
-          </a:effectRef>
-          <a:fontRef idx="minor">
-            <a:schemeClr val="tx1"/>
-          </a:fontRef>
-        </p:style>
-      </p:cxnSp>
-      <p:sp>
-        <p:nvSpPr>
-          <p:cNvPr id="15" name="Rectangle 14"/>
-          <p:cNvSpPr/>
-          <p:nvPr/>
-        </p:nvSpPr>
-        <p:spPr>
-          <a:xfrm>
-            <a:off x="4051300" y="2551208"/>
-            <a:ext cx="1104900" cy="410276"/>
-          </a:xfrm>
-          <a:prstGeom prst="rect">
-            <a:avLst/>
-          </a:prstGeom>
-          <a:solidFill>
-            <a:srgbClr val="660066"/>
-          </a:solidFill>
-          <a:ln w="38100" cmpd="sng">
-            <a:solidFill>
-              <a:srgbClr val="000000"/>
-            </a:solidFill>
-          </a:ln>
-        </p:spPr>
-        <p:style>
-          <a:lnRef idx="1">
-            <a:schemeClr val="accent1"/>
-          </a:lnRef>
-          <a:fillRef idx="3">
-            <a:schemeClr val="accent1"/>
-          </a:fillRef>
-          <a:effectRef idx="2">
-            <a:schemeClr val="accent1"/>
-          </a:effectRef>
-          <a:fontRef idx="minor">
-            <a:schemeClr val="lt1"/>
-          </a:fontRef>
-        </p:style>
-        <p:txBody>
-          <a:bodyPr rtlCol="0" anchor="ctr"/>
-          <a:lstStyle/>
-          <a:p>
-            <a:pPr algn="ctr"/>
-            <a:endParaRPr lang="en-US"/>
-          </a:p>
-        </p:txBody>
-      </p:sp>
-      <p:cxnSp>
-        <p:nvCxnSpPr>
-          <p:cNvPr id="19" name="Straight Connector 18"/>
-          <p:cNvCxnSpPr/>
-          <p:nvPr/>
-        </p:nvCxnSpPr>
-        <p:spPr>
-          <a:xfrm flipV="1">
-            <a:off x="4787900" y="2244632"/>
-            <a:ext cx="0" cy="716852"/>
-          </a:xfrm>
-          <a:prstGeom prst="line">
-            <a:avLst/>
-          </a:prstGeom>
-          <a:ln>
-            <a:solidFill>
-              <a:srgbClr val="000000"/>
-            </a:solidFill>
-          </a:ln>
-        </p:spPr>
-        <p:style>
-          <a:lnRef idx="2">
-            <a:schemeClr val="accent1"/>
-          </a:lnRef>
-          <a:fillRef idx="0">
-            <a:schemeClr val="accent1"/>
-          </a:fillRef>
-          <a:effectRef idx="1">
-            <a:schemeClr val="accent1"/>
-          </a:effectRef>
-          <a:fontRef idx="minor">
-            <a:schemeClr val="tx1"/>
-          </a:fontRef>
-        </p:style>
-      </p:cxnSp>
-      <p:cxnSp>
-        <p:nvCxnSpPr>
-          <p:cNvPr id="23" name="Straight Connector 22"/>
-          <p:cNvCxnSpPr/>
-          <p:nvPr/>
-        </p:nvCxnSpPr>
-        <p:spPr>
-          <a:xfrm flipV="1">
-            <a:off x="4699000" y="2146300"/>
-            <a:ext cx="188580" cy="187232"/>
-          </a:xfrm>
-          <a:prstGeom prst="line">
-            <a:avLst/>
-          </a:prstGeom>
-          <a:ln>
-            <a:solidFill>
-              <a:srgbClr val="000000"/>
-            </a:solidFill>
-          </a:ln>
-        </p:spPr>
-        <p:style>
-          <a:lnRef idx="2">
-            <a:schemeClr val="accent1"/>
-          </a:lnRef>
-          <a:fillRef idx="0">
-            <a:schemeClr val="accent1"/>
-          </a:fillRef>
-          <a:effectRef idx="1">
-            <a:schemeClr val="accent1"/>
-          </a:effectRef>
-          <a:fontRef idx="minor">
-            <a:schemeClr val="tx1"/>
-          </a:fontRef>
-        </p:style>
-      </p:cxnSp>
-      <p:cxnSp>
-        <p:nvCxnSpPr>
-          <p:cNvPr id="28" name="Straight Connector 27"/>
-          <p:cNvCxnSpPr/>
-          <p:nvPr/>
-        </p:nvCxnSpPr>
-        <p:spPr>
-          <a:xfrm flipH="1" flipV="1">
-            <a:off x="4699000" y="2146300"/>
-            <a:ext cx="188580" cy="187232"/>
-          </a:xfrm>
-          <a:prstGeom prst="line">
-            <a:avLst/>
-          </a:prstGeom>
-          <a:ln>
-            <a:solidFill>
-              <a:srgbClr val="000000"/>
-            </a:solidFill>
-          </a:ln>
-        </p:spPr>
-        <p:style>
-          <a:lnRef idx="2">
-            <a:schemeClr val="accent1"/>
-          </a:lnRef>
-          <a:fillRef idx="0">
-            <a:schemeClr val="accent1"/>
-          </a:fillRef>
-          <a:effectRef idx="1">
-            <a:schemeClr val="accent1"/>
-          </a:effectRef>
-          <a:fontRef idx="minor">
-            <a:schemeClr val="tx1"/>
-          </a:fontRef>
-        </p:style>
-      </p:cxnSp>
-      <p:pic>
-        <p:nvPicPr>
-          <p:cNvPr id="29" name="Picture 28" descr="protein-stability-element.pdf"/>
-          <p:cNvPicPr>
-            <a:picLocks noChangeAspect="1"/>
-          </p:cNvPicPr>
-          <p:nvPr/>
-        </p:nvPicPr>
-        <p:blipFill>
-          <a:blip r:embed="rId3">
-            <a:extLst>
-              <a:ext uri="{28A0092B-C50C-407E-A947-70E740481C1C}">
-                <a14:useLocalDpi xmlns:a14="http://schemas.microsoft.com/office/drawing/2010/main" val="0"/>
-              </a:ext>
-            </a:extLst>
-          </a:blip>
-          <a:stretch>
-            <a:fillRect/>
-          </a:stretch>
-        </p:blipFill>
-        <p:spPr>
-          <a:xfrm>
-            <a:off x="4838700" y="1916208"/>
-            <a:ext cx="635000" cy="1270000"/>
+            <a:off x="4640988" y="1998929"/>
+            <a:ext cx="635000" cy="635000"/>
           </a:xfrm>
           <a:prstGeom prst="rect">
             <a:avLst/>
@@ -7891,6 +9402,216 @@
           </a:p>
         </p:txBody>
       </p:sp>
+      <p:pic>
+        <p:nvPicPr>
+          <p:cNvPr id="2" name="Picture 1"/>
+          <p:cNvPicPr>
+            <a:picLocks noChangeAspect="1"/>
+          </p:cNvPicPr>
+          <p:nvPr/>
+        </p:nvPicPr>
+        <p:blipFill>
+          <a:blip r:embed="rId3">
+            <a:extLst>
+              <a:ext uri="{28A0092B-C50C-407E-A947-70E740481C1C}">
+                <a14:useLocalDpi xmlns:a14="http://schemas.microsoft.com/office/drawing/2010/main" val="0"/>
+              </a:ext>
+            </a:extLst>
+          </a:blip>
+          <a:stretch>
+            <a:fillRect/>
+          </a:stretch>
+        </p:blipFill>
+        <p:spPr>
+          <a:xfrm>
+            <a:off x="5219249" y="2384854"/>
+            <a:ext cx="652451" cy="652451"/>
+          </a:xfrm>
+          <a:prstGeom prst="rect">
+            <a:avLst/>
+          </a:prstGeom>
+        </p:spPr>
+      </p:pic>
+      <p:pic>
+        <p:nvPicPr>
+          <p:cNvPr id="3" name="Picture 2"/>
+          <p:cNvPicPr>
+            <a:picLocks noChangeAspect="1"/>
+          </p:cNvPicPr>
+          <p:nvPr/>
+        </p:nvPicPr>
+        <p:blipFill>
+          <a:blip r:embed="rId4">
+            <a:extLst>
+              <a:ext uri="{28A0092B-C50C-407E-A947-70E740481C1C}">
+                <a14:useLocalDpi xmlns:a14="http://schemas.microsoft.com/office/drawing/2010/main" val="0"/>
+              </a:ext>
+            </a:extLst>
+          </a:blip>
+          <a:stretch>
+            <a:fillRect/>
+          </a:stretch>
+        </p:blipFill>
+        <p:spPr>
+          <a:xfrm>
+            <a:off x="4265129" y="2032784"/>
+            <a:ext cx="603432" cy="603432"/>
+          </a:xfrm>
+          <a:prstGeom prst="rect">
+            <a:avLst/>
+          </a:prstGeom>
+        </p:spPr>
+      </p:pic>
+      <p:pic>
+        <p:nvPicPr>
+          <p:cNvPr id="4" name="Picture 3"/>
+          <p:cNvPicPr>
+            <a:picLocks noChangeAspect="1"/>
+          </p:cNvPicPr>
+          <p:nvPr/>
+        </p:nvPicPr>
+        <p:blipFill>
+          <a:blip r:embed="rId5">
+            <a:extLst>
+              <a:ext uri="{28A0092B-C50C-407E-A947-70E740481C1C}">
+                <a14:useLocalDpi xmlns:a14="http://schemas.microsoft.com/office/drawing/2010/main" val="0"/>
+              </a:ext>
+            </a:extLst>
+          </a:blip>
+          <a:stretch>
+            <a:fillRect/>
+          </a:stretch>
+        </p:blipFill>
+        <p:spPr>
+          <a:xfrm>
+            <a:off x="4232188" y="2366595"/>
+            <a:ext cx="636373" cy="636373"/>
+          </a:xfrm>
+          <a:prstGeom prst="rect">
+            <a:avLst/>
+          </a:prstGeom>
+        </p:spPr>
+      </p:pic>
+      <p:pic>
+        <p:nvPicPr>
+          <p:cNvPr id="22" name="Picture 21"/>
+          <p:cNvPicPr>
+            <a:picLocks noChangeAspect="1"/>
+          </p:cNvPicPr>
+          <p:nvPr/>
+        </p:nvPicPr>
+        <p:blipFill>
+          <a:blip r:embed="rId5">
+            <a:extLst>
+              <a:ext uri="{28A0092B-C50C-407E-A947-70E740481C1C}">
+                <a14:useLocalDpi xmlns:a14="http://schemas.microsoft.com/office/drawing/2010/main" val="0"/>
+              </a:ext>
+            </a:extLst>
+          </a:blip>
+          <a:stretch>
+            <a:fillRect/>
+          </a:stretch>
+        </p:blipFill>
+        <p:spPr>
+          <a:xfrm>
+            <a:off x="4643289" y="2365175"/>
+            <a:ext cx="636373" cy="636373"/>
+          </a:xfrm>
+          <a:prstGeom prst="rect">
+            <a:avLst/>
+          </a:prstGeom>
+        </p:spPr>
+      </p:pic>
+      <p:pic>
+        <p:nvPicPr>
+          <p:cNvPr id="6" name="Picture 5"/>
+          <p:cNvPicPr>
+            <a:picLocks noChangeAspect="1"/>
+          </p:cNvPicPr>
+          <p:nvPr/>
+        </p:nvPicPr>
+        <p:blipFill>
+          <a:blip r:embed="rId6">
+            <a:extLst>
+              <a:ext uri="{28A0092B-C50C-407E-A947-70E740481C1C}">
+                <a14:useLocalDpi xmlns:a14="http://schemas.microsoft.com/office/drawing/2010/main" val="0"/>
+              </a:ext>
+            </a:extLst>
+          </a:blip>
+          <a:stretch>
+            <a:fillRect/>
+          </a:stretch>
+        </p:blipFill>
+        <p:spPr>
+          <a:xfrm>
+            <a:off x="1943522" y="2378427"/>
+            <a:ext cx="656485" cy="656485"/>
+          </a:xfrm>
+          <a:prstGeom prst="rect">
+            <a:avLst/>
+          </a:prstGeom>
+        </p:spPr>
+      </p:pic>
+      <p:pic>
+        <p:nvPicPr>
+          <p:cNvPr id="7" name="Picture 6"/>
+          <p:cNvPicPr>
+            <a:picLocks noChangeAspect="1"/>
+          </p:cNvPicPr>
+          <p:nvPr/>
+        </p:nvPicPr>
+        <p:blipFill>
+          <a:blip r:embed="rId7">
+            <a:extLst>
+              <a:ext uri="{28A0092B-C50C-407E-A947-70E740481C1C}">
+                <a14:useLocalDpi xmlns:a14="http://schemas.microsoft.com/office/drawing/2010/main" val="0"/>
+              </a:ext>
+            </a:extLst>
+          </a:blip>
+          <a:stretch>
+            <a:fillRect/>
+          </a:stretch>
+        </p:blipFill>
+        <p:spPr>
+          <a:xfrm>
+            <a:off x="4715492" y="3542394"/>
+            <a:ext cx="667620" cy="667620"/>
+          </a:xfrm>
+          <a:prstGeom prst="rect">
+            <a:avLst/>
+          </a:prstGeom>
+        </p:spPr>
+      </p:pic>
+      <p:pic>
+        <p:nvPicPr>
+          <p:cNvPr id="8" name="Picture 7"/>
+          <p:cNvPicPr>
+            <a:picLocks noChangeAspect="1"/>
+          </p:cNvPicPr>
+          <p:nvPr/>
+        </p:nvPicPr>
+        <p:blipFill>
+          <a:blip r:embed="rId8">
+            <a:extLst>
+              <a:ext uri="{28A0092B-C50C-407E-A947-70E740481C1C}">
+                <a14:useLocalDpi xmlns:a14="http://schemas.microsoft.com/office/drawing/2010/main" val="0"/>
+              </a:ext>
+            </a:extLst>
+          </a:blip>
+          <a:stretch>
+            <a:fillRect/>
+          </a:stretch>
+        </p:blipFill>
+        <p:spPr>
+          <a:xfrm>
+            <a:off x="3813793" y="3531710"/>
+            <a:ext cx="678304" cy="678304"/>
+          </a:xfrm>
+          <a:prstGeom prst="rect">
+            <a:avLst/>
+          </a:prstGeom>
+        </p:spPr>
+      </p:pic>
     </p:spTree>
     <p:extLst>
       <p:ext uri="{BB962C8B-B14F-4D97-AF65-F5344CB8AC3E}">

</xml_diff>

<commit_message>
Add example including spacer
</commit_message>
<xml_diff>
--- a/specification/imgsrc/examples.pptx
+++ b/specification/imgsrc/examples.pptx
@@ -5,7 +5,7 @@
     <p:sldMasterId id="2147483648" r:id="rId1"/>
   </p:sldMasterIdLst>
   <p:notesMasterIdLst>
-    <p:notesMasterId r:id="rId16"/>
+    <p:notesMasterId r:id="rId17"/>
   </p:notesMasterIdLst>
   <p:sldIdLst>
     <p:sldId id="257" r:id="rId2"/>
@@ -22,6 +22,7 @@
     <p:sldId id="270" r:id="rId13"/>
     <p:sldId id="269" r:id="rId14"/>
     <p:sldId id="271" r:id="rId15"/>
+    <p:sldId id="272" r:id="rId16"/>
   </p:sldIdLst>
   <p:sldSz cx="9144000" cy="6858000" type="screen4x3"/>
   <p:notesSz cx="6858000" cy="9144000"/>
@@ -221,7 +222,7 @@
           <a:p>
             <a:fld id="{A5398B87-931F-0F48-BDB8-4235032D88C0}" type="datetimeFigureOut">
               <a:rPr lang="en-US" smtClean="0"/>
-              <a:t>11/4/18</a:t>
+              <a:t>10/4/20</a:t>
             </a:fld>
             <a:endParaRPr lang="en-US"/>
           </a:p>
@@ -667,7 +668,7 @@
           <a:p>
             <a:fld id="{B519623D-D8C4-D246-A1F7-180DFBDF806B}" type="datetimeFigureOut">
               <a:rPr lang="en-US" smtClean="0"/>
-              <a:t>11/4/18</a:t>
+              <a:t>10/4/20</a:t>
             </a:fld>
             <a:endParaRPr lang="en-US"/>
           </a:p>
@@ -835,7 +836,7 @@
           <a:p>
             <a:fld id="{B519623D-D8C4-D246-A1F7-180DFBDF806B}" type="datetimeFigureOut">
               <a:rPr lang="en-US" smtClean="0"/>
-              <a:t>11/4/18</a:t>
+              <a:t>10/4/20</a:t>
             </a:fld>
             <a:endParaRPr lang="en-US"/>
           </a:p>
@@ -1013,7 +1014,7 @@
           <a:p>
             <a:fld id="{B519623D-D8C4-D246-A1F7-180DFBDF806B}" type="datetimeFigureOut">
               <a:rPr lang="en-US" smtClean="0"/>
-              <a:t>11/4/18</a:t>
+              <a:t>10/4/20</a:t>
             </a:fld>
             <a:endParaRPr lang="en-US"/>
           </a:p>
@@ -1181,7 +1182,7 @@
           <a:p>
             <a:fld id="{B519623D-D8C4-D246-A1F7-180DFBDF806B}" type="datetimeFigureOut">
               <a:rPr lang="en-US" smtClean="0"/>
-              <a:t>11/4/18</a:t>
+              <a:t>10/4/20</a:t>
             </a:fld>
             <a:endParaRPr lang="en-US"/>
           </a:p>
@@ -1426,7 +1427,7 @@
           <a:p>
             <a:fld id="{B519623D-D8C4-D246-A1F7-180DFBDF806B}" type="datetimeFigureOut">
               <a:rPr lang="en-US" smtClean="0"/>
-              <a:t>11/4/18</a:t>
+              <a:t>10/4/20</a:t>
             </a:fld>
             <a:endParaRPr lang="en-US"/>
           </a:p>
@@ -1711,7 +1712,7 @@
           <a:p>
             <a:fld id="{B519623D-D8C4-D246-A1F7-180DFBDF806B}" type="datetimeFigureOut">
               <a:rPr lang="en-US" smtClean="0"/>
-              <a:t>11/4/18</a:t>
+              <a:t>10/4/20</a:t>
             </a:fld>
             <a:endParaRPr lang="en-US"/>
           </a:p>
@@ -2130,7 +2131,7 @@
           <a:p>
             <a:fld id="{B519623D-D8C4-D246-A1F7-180DFBDF806B}" type="datetimeFigureOut">
               <a:rPr lang="en-US" smtClean="0"/>
-              <a:t>11/4/18</a:t>
+              <a:t>10/4/20</a:t>
             </a:fld>
             <a:endParaRPr lang="en-US"/>
           </a:p>
@@ -2247,7 +2248,7 @@
           <a:p>
             <a:fld id="{B519623D-D8C4-D246-A1F7-180DFBDF806B}" type="datetimeFigureOut">
               <a:rPr lang="en-US" smtClean="0"/>
-              <a:t>11/4/18</a:t>
+              <a:t>10/4/20</a:t>
             </a:fld>
             <a:endParaRPr lang="en-US"/>
           </a:p>
@@ -2342,7 +2343,7 @@
           <a:p>
             <a:fld id="{B519623D-D8C4-D246-A1F7-180DFBDF806B}" type="datetimeFigureOut">
               <a:rPr lang="en-US" smtClean="0"/>
-              <a:t>11/4/18</a:t>
+              <a:t>10/4/20</a:t>
             </a:fld>
             <a:endParaRPr lang="en-US"/>
           </a:p>
@@ -2617,7 +2618,7 @@
           <a:p>
             <a:fld id="{B519623D-D8C4-D246-A1F7-180DFBDF806B}" type="datetimeFigureOut">
               <a:rPr lang="en-US" smtClean="0"/>
-              <a:t>11/4/18</a:t>
+              <a:t>10/4/20</a:t>
             </a:fld>
             <a:endParaRPr lang="en-US"/>
           </a:p>
@@ -2869,7 +2870,7 @@
           <a:p>
             <a:fld id="{B519623D-D8C4-D246-A1F7-180DFBDF806B}" type="datetimeFigureOut">
               <a:rPr lang="en-US" smtClean="0"/>
-              <a:t>11/4/18</a:t>
+              <a:t>10/4/20</a:t>
             </a:fld>
             <a:endParaRPr lang="en-US"/>
           </a:p>
@@ -3080,7 +3081,7 @@
           <a:p>
             <a:fld id="{B519623D-D8C4-D246-A1F7-180DFBDF806B}" type="datetimeFigureOut">
               <a:rPr lang="en-US" smtClean="0"/>
-              <a:t>11/4/18</a:t>
+              <a:t>10/4/20</a:t>
             </a:fld>
             <a:endParaRPr lang="en-US"/>
           </a:p>
@@ -7736,6 +7737,4377 @@
 </p:sld>
 </file>
 
+<file path=ppt/slides/slide15.xml><?xml version="1.0" encoding="utf-8"?>
+<p:sld xmlns:a="http://schemas.openxmlformats.org/drawingml/2006/main" xmlns:r="http://schemas.openxmlformats.org/officeDocument/2006/relationships" xmlns:p="http://schemas.openxmlformats.org/presentationml/2006/main">
+  <p:cSld>
+    <p:spTree>
+      <p:nvGrpSpPr>
+        <p:cNvPr id="1" name=""/>
+        <p:cNvGrpSpPr/>
+        <p:nvPr/>
+      </p:nvGrpSpPr>
+      <p:grpSpPr>
+        <a:xfrm>
+          <a:off x="0" y="0"/>
+          <a:ext cx="0" cy="0"/>
+          <a:chOff x="0" y="0"/>
+          <a:chExt cx="0" cy="0"/>
+        </a:xfrm>
+      </p:grpSpPr>
+      <p:grpSp>
+        <p:nvGrpSpPr>
+          <p:cNvPr id="68" name="Group 67">
+            <a:extLst>
+              <a:ext uri="{FF2B5EF4-FFF2-40B4-BE49-F238E27FC236}">
+                <a16:creationId xmlns:a16="http://schemas.microsoft.com/office/drawing/2014/main" id="{28CD5E6F-8D18-0B4B-B049-4728DB7FD4A6}"/>
+              </a:ext>
+            </a:extLst>
+          </p:cNvPr>
+          <p:cNvGrpSpPr/>
+          <p:nvPr/>
+        </p:nvGrpSpPr>
+        <p:grpSpPr>
+          <a:xfrm>
+            <a:off x="1285119" y="1130613"/>
+            <a:ext cx="3554940" cy="540787"/>
+            <a:chOff x="370615" y="288133"/>
+            <a:chExt cx="3554940" cy="540787"/>
+          </a:xfrm>
+        </p:grpSpPr>
+        <p:cxnSp>
+          <p:nvCxnSpPr>
+            <p:cNvPr id="2" name="Straight Connector 1">
+              <a:extLst>
+                <a:ext uri="{FF2B5EF4-FFF2-40B4-BE49-F238E27FC236}">
+                  <a16:creationId xmlns:a16="http://schemas.microsoft.com/office/drawing/2014/main" id="{248EAC77-8C0B-D444-A7AD-8FCE7492101B}"/>
+                </a:ext>
+              </a:extLst>
+            </p:cNvPr>
+            <p:cNvCxnSpPr>
+              <a:cxnSpLocks/>
+            </p:cNvCxnSpPr>
+            <p:nvPr/>
+          </p:nvCxnSpPr>
+          <p:spPr>
+            <a:xfrm>
+              <a:off x="595072" y="575804"/>
+              <a:ext cx="3087739" cy="0"/>
+            </a:xfrm>
+            <a:prstGeom prst="line">
+              <a:avLst/>
+            </a:prstGeom>
+            <a:ln w="25400" cap="sq">
+              <a:miter lim="800000"/>
+            </a:ln>
+          </p:spPr>
+          <p:style>
+            <a:lnRef idx="1">
+              <a:schemeClr val="dk1"/>
+            </a:lnRef>
+            <a:fillRef idx="0">
+              <a:schemeClr val="dk1"/>
+            </a:fillRef>
+            <a:effectRef idx="0">
+              <a:schemeClr val="dk1"/>
+            </a:effectRef>
+            <a:fontRef idx="minor">
+              <a:schemeClr val="tx1"/>
+            </a:fontRef>
+          </p:style>
+        </p:cxnSp>
+        <p:grpSp>
+          <p:nvGrpSpPr>
+            <p:cNvPr id="3" name="Group 2">
+              <a:extLst>
+                <a:ext uri="{FF2B5EF4-FFF2-40B4-BE49-F238E27FC236}">
+                  <a16:creationId xmlns:a16="http://schemas.microsoft.com/office/drawing/2014/main" id="{6EDBA7D7-A683-CD48-A6DB-3A3B1F943499}"/>
+                </a:ext>
+              </a:extLst>
+            </p:cNvPr>
+            <p:cNvGrpSpPr/>
+            <p:nvPr/>
+          </p:nvGrpSpPr>
+          <p:grpSpPr>
+            <a:xfrm>
+              <a:off x="2155618" y="486355"/>
+              <a:ext cx="169725" cy="169725"/>
+              <a:chOff x="3540943" y="4902079"/>
+              <a:chExt cx="147594" cy="147594"/>
+            </a:xfrm>
+          </p:grpSpPr>
+          <p:sp>
+            <p:nvSpPr>
+              <p:cNvPr id="4" name="Oval 3">
+                <a:extLst>
+                  <a:ext uri="{FF2B5EF4-FFF2-40B4-BE49-F238E27FC236}">
+                    <a16:creationId xmlns:a16="http://schemas.microsoft.com/office/drawing/2014/main" id="{26E5303C-D9D0-3345-B175-8B3709A70D76}"/>
+                  </a:ext>
+                </a:extLst>
+              </p:cNvPr>
+              <p:cNvSpPr/>
+              <p:nvPr/>
+            </p:nvSpPr>
+            <p:spPr>
+              <a:xfrm>
+                <a:off x="3540943" y="4902079"/>
+                <a:ext cx="147594" cy="147594"/>
+              </a:xfrm>
+              <a:prstGeom prst="ellipse">
+                <a:avLst/>
+              </a:prstGeom>
+              <a:solidFill>
+                <a:schemeClr val="bg1"/>
+              </a:solidFill>
+              <a:ln w="25400" cap="sq">
+                <a:solidFill>
+                  <a:schemeClr val="tx1"/>
+                </a:solidFill>
+                <a:miter lim="800000"/>
+              </a:ln>
+            </p:spPr>
+            <p:style>
+              <a:lnRef idx="2">
+                <a:schemeClr val="accent1">
+                  <a:shade val="50000"/>
+                </a:schemeClr>
+              </a:lnRef>
+              <a:fillRef idx="1">
+                <a:schemeClr val="accent1"/>
+              </a:fillRef>
+              <a:effectRef idx="0">
+                <a:schemeClr val="accent1"/>
+              </a:effectRef>
+              <a:fontRef idx="minor">
+                <a:schemeClr val="lt1"/>
+              </a:fontRef>
+            </p:style>
+            <p:txBody>
+              <a:bodyPr rtlCol="0" anchor="ctr"/>
+              <a:lstStyle/>
+              <a:p>
+                <a:pPr algn="ctr"/>
+                <a:endParaRPr lang="en-US"/>
+              </a:p>
+            </p:txBody>
+          </p:sp>
+          <p:cxnSp>
+            <p:nvCxnSpPr>
+              <p:cNvPr id="5" name="Straight Connector 4">
+                <a:extLst>
+                  <a:ext uri="{FF2B5EF4-FFF2-40B4-BE49-F238E27FC236}">
+                    <a16:creationId xmlns:a16="http://schemas.microsoft.com/office/drawing/2014/main" id="{81A35066-F4AD-4A4A-9B32-BEAC770B0E71}"/>
+                  </a:ext>
+                </a:extLst>
+              </p:cNvPr>
+              <p:cNvCxnSpPr>
+                <a:cxnSpLocks/>
+                <a:stCxn id="4" idx="1"/>
+                <a:endCxn id="4" idx="5"/>
+              </p:cNvCxnSpPr>
+              <p:nvPr/>
+            </p:nvCxnSpPr>
+            <p:spPr>
+              <a:xfrm>
+                <a:off x="3562558" y="4923694"/>
+                <a:ext cx="104364" cy="104364"/>
+              </a:xfrm>
+              <a:prstGeom prst="line">
+                <a:avLst/>
+              </a:prstGeom>
+              <a:ln w="25400" cap="sq">
+                <a:solidFill>
+                  <a:schemeClr val="tx1"/>
+                </a:solidFill>
+                <a:miter lim="800000"/>
+              </a:ln>
+            </p:spPr>
+            <p:style>
+              <a:lnRef idx="1">
+                <a:schemeClr val="accent1"/>
+              </a:lnRef>
+              <a:fillRef idx="0">
+                <a:schemeClr val="accent1"/>
+              </a:fillRef>
+              <a:effectRef idx="0">
+                <a:schemeClr val="accent1"/>
+              </a:effectRef>
+              <a:fontRef idx="minor">
+                <a:schemeClr val="tx1"/>
+              </a:fontRef>
+            </p:style>
+          </p:cxnSp>
+          <p:cxnSp>
+            <p:nvCxnSpPr>
+              <p:cNvPr id="6" name="Straight Connector 5">
+                <a:extLst>
+                  <a:ext uri="{FF2B5EF4-FFF2-40B4-BE49-F238E27FC236}">
+                    <a16:creationId xmlns:a16="http://schemas.microsoft.com/office/drawing/2014/main" id="{925A9670-3F6B-E049-8BA7-421CB8E4F520}"/>
+                  </a:ext>
+                </a:extLst>
+              </p:cNvPr>
+              <p:cNvCxnSpPr>
+                <a:cxnSpLocks/>
+                <a:stCxn id="4" idx="3"/>
+                <a:endCxn id="4" idx="7"/>
+              </p:cNvCxnSpPr>
+              <p:nvPr/>
+            </p:nvCxnSpPr>
+            <p:spPr>
+              <a:xfrm flipV="1">
+                <a:off x="3562558" y="4923694"/>
+                <a:ext cx="104364" cy="104364"/>
+              </a:xfrm>
+              <a:prstGeom prst="line">
+                <a:avLst/>
+              </a:prstGeom>
+              <a:ln w="25400" cap="sq">
+                <a:solidFill>
+                  <a:schemeClr val="tx1"/>
+                </a:solidFill>
+                <a:miter lim="800000"/>
+              </a:ln>
+            </p:spPr>
+            <p:style>
+              <a:lnRef idx="1">
+                <a:schemeClr val="accent1"/>
+              </a:lnRef>
+              <a:fillRef idx="0">
+                <a:schemeClr val="accent1"/>
+              </a:fillRef>
+              <a:effectRef idx="0">
+                <a:schemeClr val="accent1"/>
+              </a:effectRef>
+              <a:fontRef idx="minor">
+                <a:schemeClr val="tx1"/>
+              </a:fontRef>
+            </p:style>
+          </p:cxnSp>
+        </p:grpSp>
+        <p:sp>
+          <p:nvSpPr>
+            <p:cNvPr id="7" name="Freeform: Shape 39">
+              <a:extLst>
+                <a:ext uri="{FF2B5EF4-FFF2-40B4-BE49-F238E27FC236}">
+                  <a16:creationId xmlns:a16="http://schemas.microsoft.com/office/drawing/2014/main" id="{E6C0BA42-57DE-5A46-9675-431287376EF4}"/>
+                </a:ext>
+              </a:extLst>
+            </p:cNvPr>
+            <p:cNvSpPr/>
+            <p:nvPr/>
+          </p:nvSpPr>
+          <p:spPr>
+            <a:xfrm>
+              <a:off x="370615" y="576127"/>
+              <a:ext cx="244894" cy="252793"/>
+            </a:xfrm>
+            <a:custGeom>
+              <a:avLst/>
+              <a:gdLst>
+                <a:gd name="connsiteX0" fmla="*/ 264669 w 264669"/>
+                <a:gd name="connsiteY0" fmla="*/ 0 h 258718"/>
+                <a:gd name="connsiteX1" fmla="*/ 26 w 264669"/>
+                <a:gd name="connsiteY1" fmla="*/ 102697 h 258718"/>
+                <a:gd name="connsiteX2" fmla="*/ 246895 w 264669"/>
+                <a:gd name="connsiteY2" fmla="*/ 185645 h 258718"/>
+                <a:gd name="connsiteX3" fmla="*/ 2001 w 264669"/>
+                <a:gd name="connsiteY3" fmla="*/ 258718 h 258718"/>
+                <a:gd name="connsiteX0" fmla="*/ 246869 w 246869"/>
+                <a:gd name="connsiteY0" fmla="*/ 0 h 252793"/>
+                <a:gd name="connsiteX1" fmla="*/ 0 w 246869"/>
+                <a:gd name="connsiteY1" fmla="*/ 96772 h 252793"/>
+                <a:gd name="connsiteX2" fmla="*/ 246869 w 246869"/>
+                <a:gd name="connsiteY2" fmla="*/ 179720 h 252793"/>
+                <a:gd name="connsiteX3" fmla="*/ 1975 w 246869"/>
+                <a:gd name="connsiteY3" fmla="*/ 252793 h 252793"/>
+                <a:gd name="connsiteX0" fmla="*/ 246869 w 246869"/>
+                <a:gd name="connsiteY0" fmla="*/ 0 h 252793"/>
+                <a:gd name="connsiteX1" fmla="*/ 0 w 246869"/>
+                <a:gd name="connsiteY1" fmla="*/ 96772 h 252793"/>
+                <a:gd name="connsiteX2" fmla="*/ 246869 w 246869"/>
+                <a:gd name="connsiteY2" fmla="*/ 179720 h 252793"/>
+                <a:gd name="connsiteX3" fmla="*/ 1975 w 246869"/>
+                <a:gd name="connsiteY3" fmla="*/ 252793 h 252793"/>
+                <a:gd name="connsiteX0" fmla="*/ 246869 w 246869"/>
+                <a:gd name="connsiteY0" fmla="*/ 0 h 252793"/>
+                <a:gd name="connsiteX1" fmla="*/ 0 w 246869"/>
+                <a:gd name="connsiteY1" fmla="*/ 96772 h 252793"/>
+                <a:gd name="connsiteX2" fmla="*/ 246869 w 246869"/>
+                <a:gd name="connsiteY2" fmla="*/ 179720 h 252793"/>
+                <a:gd name="connsiteX3" fmla="*/ 1975 w 246869"/>
+                <a:gd name="connsiteY3" fmla="*/ 252793 h 252793"/>
+                <a:gd name="connsiteX0" fmla="*/ 246869 w 246869"/>
+                <a:gd name="connsiteY0" fmla="*/ 29 h 252822"/>
+                <a:gd name="connsiteX1" fmla="*/ 0 w 246869"/>
+                <a:gd name="connsiteY1" fmla="*/ 96801 h 252822"/>
+                <a:gd name="connsiteX2" fmla="*/ 246869 w 246869"/>
+                <a:gd name="connsiteY2" fmla="*/ 179749 h 252822"/>
+                <a:gd name="connsiteX3" fmla="*/ 1975 w 246869"/>
+                <a:gd name="connsiteY3" fmla="*/ 252822 h 252822"/>
+                <a:gd name="connsiteX0" fmla="*/ 246869 w 246869"/>
+                <a:gd name="connsiteY0" fmla="*/ 29 h 252822"/>
+                <a:gd name="connsiteX1" fmla="*/ 0 w 246869"/>
+                <a:gd name="connsiteY1" fmla="*/ 96801 h 252822"/>
+                <a:gd name="connsiteX2" fmla="*/ 246869 w 246869"/>
+                <a:gd name="connsiteY2" fmla="*/ 179749 h 252822"/>
+                <a:gd name="connsiteX3" fmla="*/ 1975 w 246869"/>
+                <a:gd name="connsiteY3" fmla="*/ 252822 h 252822"/>
+                <a:gd name="connsiteX0" fmla="*/ 246869 w 246869"/>
+                <a:gd name="connsiteY0" fmla="*/ 29 h 252822"/>
+                <a:gd name="connsiteX1" fmla="*/ 0 w 246869"/>
+                <a:gd name="connsiteY1" fmla="*/ 96801 h 252822"/>
+                <a:gd name="connsiteX2" fmla="*/ 246869 w 246869"/>
+                <a:gd name="connsiteY2" fmla="*/ 179749 h 252822"/>
+                <a:gd name="connsiteX3" fmla="*/ 1975 w 246869"/>
+                <a:gd name="connsiteY3" fmla="*/ 252822 h 252822"/>
+                <a:gd name="connsiteX0" fmla="*/ 246869 w 246869"/>
+                <a:gd name="connsiteY0" fmla="*/ 29 h 252822"/>
+                <a:gd name="connsiteX1" fmla="*/ 0 w 246869"/>
+                <a:gd name="connsiteY1" fmla="*/ 96801 h 252822"/>
+                <a:gd name="connsiteX2" fmla="*/ 246869 w 246869"/>
+                <a:gd name="connsiteY2" fmla="*/ 179749 h 252822"/>
+                <a:gd name="connsiteX3" fmla="*/ 1975 w 246869"/>
+                <a:gd name="connsiteY3" fmla="*/ 252822 h 252822"/>
+                <a:gd name="connsiteX0" fmla="*/ 246869 w 246869"/>
+                <a:gd name="connsiteY0" fmla="*/ 43 h 252836"/>
+                <a:gd name="connsiteX1" fmla="*/ 0 w 246869"/>
+                <a:gd name="connsiteY1" fmla="*/ 96815 h 252836"/>
+                <a:gd name="connsiteX2" fmla="*/ 246869 w 246869"/>
+                <a:gd name="connsiteY2" fmla="*/ 179763 h 252836"/>
+                <a:gd name="connsiteX3" fmla="*/ 1975 w 246869"/>
+                <a:gd name="connsiteY3" fmla="*/ 252836 h 252836"/>
+                <a:gd name="connsiteX0" fmla="*/ 246869 w 246869"/>
+                <a:gd name="connsiteY0" fmla="*/ 0 h 252793"/>
+                <a:gd name="connsiteX1" fmla="*/ 0 w 246869"/>
+                <a:gd name="connsiteY1" fmla="*/ 96772 h 252793"/>
+                <a:gd name="connsiteX2" fmla="*/ 246869 w 246869"/>
+                <a:gd name="connsiteY2" fmla="*/ 179720 h 252793"/>
+                <a:gd name="connsiteX3" fmla="*/ 1975 w 246869"/>
+                <a:gd name="connsiteY3" fmla="*/ 252793 h 252793"/>
+                <a:gd name="connsiteX0" fmla="*/ 244894 w 244894"/>
+                <a:gd name="connsiteY0" fmla="*/ 0 h 252793"/>
+                <a:gd name="connsiteX1" fmla="*/ 0 w 244894"/>
+                <a:gd name="connsiteY1" fmla="*/ 61223 h 252793"/>
+                <a:gd name="connsiteX2" fmla="*/ 244894 w 244894"/>
+                <a:gd name="connsiteY2" fmla="*/ 179720 h 252793"/>
+                <a:gd name="connsiteX3" fmla="*/ 0 w 244894"/>
+                <a:gd name="connsiteY3" fmla="*/ 252793 h 252793"/>
+                <a:gd name="connsiteX0" fmla="*/ 244894 w 244894"/>
+                <a:gd name="connsiteY0" fmla="*/ 0 h 252793"/>
+                <a:gd name="connsiteX1" fmla="*/ 0 w 244894"/>
+                <a:gd name="connsiteY1" fmla="*/ 69123 h 252793"/>
+                <a:gd name="connsiteX2" fmla="*/ 244894 w 244894"/>
+                <a:gd name="connsiteY2" fmla="*/ 179720 h 252793"/>
+                <a:gd name="connsiteX3" fmla="*/ 0 w 244894"/>
+                <a:gd name="connsiteY3" fmla="*/ 252793 h 252793"/>
+                <a:gd name="connsiteX0" fmla="*/ 244894 w 244894"/>
+                <a:gd name="connsiteY0" fmla="*/ 0 h 252793"/>
+                <a:gd name="connsiteX1" fmla="*/ 0 w 244894"/>
+                <a:gd name="connsiteY1" fmla="*/ 69123 h 252793"/>
+                <a:gd name="connsiteX2" fmla="*/ 244894 w 244894"/>
+                <a:gd name="connsiteY2" fmla="*/ 179720 h 252793"/>
+                <a:gd name="connsiteX3" fmla="*/ 0 w 244894"/>
+                <a:gd name="connsiteY3" fmla="*/ 252793 h 252793"/>
+                <a:gd name="connsiteX0" fmla="*/ 244894 w 244894"/>
+                <a:gd name="connsiteY0" fmla="*/ 0 h 252793"/>
+                <a:gd name="connsiteX1" fmla="*/ 0 w 244894"/>
+                <a:gd name="connsiteY1" fmla="*/ 69123 h 252793"/>
+                <a:gd name="connsiteX2" fmla="*/ 244894 w 244894"/>
+                <a:gd name="connsiteY2" fmla="*/ 179720 h 252793"/>
+                <a:gd name="connsiteX3" fmla="*/ 0 w 244894"/>
+                <a:gd name="connsiteY3" fmla="*/ 252793 h 252793"/>
+                <a:gd name="connsiteX0" fmla="*/ 244894 w 244894"/>
+                <a:gd name="connsiteY0" fmla="*/ 242 h 253035"/>
+                <a:gd name="connsiteX1" fmla="*/ 0 w 244894"/>
+                <a:gd name="connsiteY1" fmla="*/ 69365 h 253035"/>
+                <a:gd name="connsiteX2" fmla="*/ 244894 w 244894"/>
+                <a:gd name="connsiteY2" fmla="*/ 179962 h 253035"/>
+                <a:gd name="connsiteX3" fmla="*/ 0 w 244894"/>
+                <a:gd name="connsiteY3" fmla="*/ 253035 h 253035"/>
+                <a:gd name="connsiteX0" fmla="*/ 244894 w 244894"/>
+                <a:gd name="connsiteY0" fmla="*/ 0 h 252793"/>
+                <a:gd name="connsiteX1" fmla="*/ 0 w 244894"/>
+                <a:gd name="connsiteY1" fmla="*/ 69123 h 252793"/>
+                <a:gd name="connsiteX2" fmla="*/ 244894 w 244894"/>
+                <a:gd name="connsiteY2" fmla="*/ 179720 h 252793"/>
+                <a:gd name="connsiteX3" fmla="*/ 0 w 244894"/>
+                <a:gd name="connsiteY3" fmla="*/ 252793 h 252793"/>
+              </a:gdLst>
+              <a:ahLst/>
+              <a:cxnLst>
+                <a:cxn ang="0">
+                  <a:pos x="connsiteX0" y="connsiteY0"/>
+                </a:cxn>
+                <a:cxn ang="0">
+                  <a:pos x="connsiteX1" y="connsiteY1"/>
+                </a:cxn>
+                <a:cxn ang="0">
+                  <a:pos x="connsiteX2" y="connsiteY2"/>
+                </a:cxn>
+                <a:cxn ang="0">
+                  <a:pos x="connsiteX3" y="connsiteY3"/>
+                </a:cxn>
+              </a:cxnLst>
+              <a:rect l="l" t="t" r="r" b="b"/>
+              <a:pathLst>
+                <a:path w="244894" h="252793">
+                  <a:moveTo>
+                    <a:pt x="244894" y="0"/>
+                  </a:moveTo>
+                  <a:cubicBezTo>
+                    <a:pt x="143561" y="1322"/>
+                    <a:pt x="0" y="15471"/>
+                    <a:pt x="0" y="69123"/>
+                  </a:cubicBezTo>
+                  <a:cubicBezTo>
+                    <a:pt x="0" y="122775"/>
+                    <a:pt x="244894" y="141208"/>
+                    <a:pt x="244894" y="179720"/>
+                  </a:cubicBezTo>
+                  <a:cubicBezTo>
+                    <a:pt x="244894" y="218232"/>
+                    <a:pt x="106811" y="249008"/>
+                    <a:pt x="0" y="252793"/>
+                  </a:cubicBezTo>
+                </a:path>
+              </a:pathLst>
+            </a:custGeom>
+            <a:noFill/>
+            <a:ln w="25400" cap="sq">
+              <a:solidFill>
+                <a:schemeClr val="tx1"/>
+              </a:solidFill>
+              <a:miter lim="800000"/>
+            </a:ln>
+          </p:spPr>
+          <p:style>
+            <a:lnRef idx="2">
+              <a:schemeClr val="accent1">
+                <a:shade val="50000"/>
+              </a:schemeClr>
+            </a:lnRef>
+            <a:fillRef idx="1">
+              <a:schemeClr val="accent1"/>
+            </a:fillRef>
+            <a:effectRef idx="0">
+              <a:schemeClr val="accent1"/>
+            </a:effectRef>
+            <a:fontRef idx="minor">
+              <a:schemeClr val="lt1"/>
+            </a:fontRef>
+          </p:style>
+          <p:txBody>
+            <a:bodyPr rtlCol="0" anchor="ctr"/>
+            <a:lstStyle/>
+            <a:p>
+              <a:pPr algn="ctr"/>
+              <a:endParaRPr lang="en-US"/>
+            </a:p>
+          </p:txBody>
+        </p:sp>
+        <p:sp>
+          <p:nvSpPr>
+            <p:cNvPr id="8" name="Graphic 6">
+              <a:extLst>
+                <a:ext uri="{FF2B5EF4-FFF2-40B4-BE49-F238E27FC236}">
+                  <a16:creationId xmlns:a16="http://schemas.microsoft.com/office/drawing/2014/main" id="{CA634894-0903-8A41-80E1-BD76B07F3BCB}"/>
+                </a:ext>
+              </a:extLst>
+            </p:cNvPr>
+            <p:cNvSpPr/>
+            <p:nvPr/>
+          </p:nvSpPr>
+          <p:spPr>
+            <a:xfrm>
+              <a:off x="1210701" y="470734"/>
+              <a:ext cx="419351" cy="216000"/>
+            </a:xfrm>
+            <a:custGeom>
+              <a:avLst/>
+              <a:gdLst>
+                <a:gd name="connsiteX0" fmla="*/ 0 w 350393"/>
+                <a:gd name="connsiteY0" fmla="*/ 231660 h 231660"/>
+                <a:gd name="connsiteX1" fmla="*/ 239890 w 350393"/>
+                <a:gd name="connsiteY1" fmla="*/ 231660 h 231660"/>
+                <a:gd name="connsiteX2" fmla="*/ 350394 w 350393"/>
+                <a:gd name="connsiteY2" fmla="*/ 115830 h 231660"/>
+                <a:gd name="connsiteX3" fmla="*/ 239890 w 350393"/>
+                <a:gd name="connsiteY3" fmla="*/ 0 h 231660"/>
+                <a:gd name="connsiteX4" fmla="*/ 0 w 350393"/>
+                <a:gd name="connsiteY4" fmla="*/ 0 h 231660"/>
+              </a:gdLst>
+              <a:ahLst/>
+              <a:cxnLst>
+                <a:cxn ang="0">
+                  <a:pos x="connsiteX0" y="connsiteY0"/>
+                </a:cxn>
+                <a:cxn ang="0">
+                  <a:pos x="connsiteX1" y="connsiteY1"/>
+                </a:cxn>
+                <a:cxn ang="0">
+                  <a:pos x="connsiteX2" y="connsiteY2"/>
+                </a:cxn>
+                <a:cxn ang="0">
+                  <a:pos x="connsiteX3" y="connsiteY3"/>
+                </a:cxn>
+                <a:cxn ang="0">
+                  <a:pos x="connsiteX4" y="connsiteY4"/>
+                </a:cxn>
+              </a:cxnLst>
+              <a:rect l="l" t="t" r="r" b="b"/>
+              <a:pathLst>
+                <a:path w="350393" h="231660">
+                  <a:moveTo>
+                    <a:pt x="0" y="231660"/>
+                  </a:moveTo>
+                  <a:lnTo>
+                    <a:pt x="239890" y="231660"/>
+                  </a:lnTo>
+                  <a:lnTo>
+                    <a:pt x="350394" y="115830"/>
+                  </a:lnTo>
+                  <a:lnTo>
+                    <a:pt x="239890" y="0"/>
+                  </a:lnTo>
+                  <a:lnTo>
+                    <a:pt x="0" y="0"/>
+                  </a:lnTo>
+                  <a:close/>
+                </a:path>
+              </a:pathLst>
+            </a:custGeom>
+            <a:solidFill>
+              <a:schemeClr val="bg1"/>
+            </a:solidFill>
+            <a:ln w="25400" cap="sq">
+              <a:solidFill>
+                <a:srgbClr val="000000"/>
+              </a:solidFill>
+              <a:prstDash val="solid"/>
+              <a:miter lim="800000"/>
+            </a:ln>
+          </p:spPr>
+          <p:txBody>
+            <a:bodyPr rtlCol="0" anchor="ctr"/>
+            <a:lstStyle/>
+            <a:p>
+              <a:endParaRPr lang="en-US"/>
+            </a:p>
+          </p:txBody>
+        </p:sp>
+        <p:grpSp>
+          <p:nvGrpSpPr>
+            <p:cNvPr id="9" name="Group 8">
+              <a:extLst>
+                <a:ext uri="{FF2B5EF4-FFF2-40B4-BE49-F238E27FC236}">
+                  <a16:creationId xmlns:a16="http://schemas.microsoft.com/office/drawing/2014/main" id="{934C95E0-7CCD-8440-BC38-9C3B4CEE6E5B}"/>
+                </a:ext>
+              </a:extLst>
+            </p:cNvPr>
+            <p:cNvGrpSpPr/>
+            <p:nvPr/>
+          </p:nvGrpSpPr>
+          <p:grpSpPr>
+            <a:xfrm>
+              <a:off x="1681135" y="343043"/>
+              <a:ext cx="216000" cy="216000"/>
+              <a:chOff x="2995494" y="4418880"/>
+              <a:chExt cx="216000" cy="216000"/>
+            </a:xfrm>
+          </p:grpSpPr>
+          <p:cxnSp>
+            <p:nvCxnSpPr>
+              <p:cNvPr id="10" name="Straight Connector 9">
+                <a:extLst>
+                  <a:ext uri="{FF2B5EF4-FFF2-40B4-BE49-F238E27FC236}">
+                    <a16:creationId xmlns:a16="http://schemas.microsoft.com/office/drawing/2014/main" id="{62A8B8FC-6974-C54B-9A12-D7D87F4F5095}"/>
+                  </a:ext>
+                </a:extLst>
+              </p:cNvPr>
+              <p:cNvCxnSpPr>
+                <a:cxnSpLocks/>
+              </p:cNvCxnSpPr>
+              <p:nvPr/>
+            </p:nvCxnSpPr>
+            <p:spPr>
+              <a:xfrm>
+                <a:off x="2995494" y="4418880"/>
+                <a:ext cx="216000" cy="0"/>
+              </a:xfrm>
+              <a:prstGeom prst="line">
+                <a:avLst/>
+              </a:prstGeom>
+              <a:ln w="25400" cap="sq">
+                <a:solidFill>
+                  <a:schemeClr val="tx1"/>
+                </a:solidFill>
+                <a:miter lim="800000"/>
+              </a:ln>
+            </p:spPr>
+            <p:style>
+              <a:lnRef idx="1">
+                <a:schemeClr val="accent1"/>
+              </a:lnRef>
+              <a:fillRef idx="0">
+                <a:schemeClr val="accent1"/>
+              </a:fillRef>
+              <a:effectRef idx="0">
+                <a:schemeClr val="accent1"/>
+              </a:effectRef>
+              <a:fontRef idx="minor">
+                <a:schemeClr val="tx1"/>
+              </a:fontRef>
+            </p:style>
+          </p:cxnSp>
+          <p:cxnSp>
+            <p:nvCxnSpPr>
+              <p:cNvPr id="11" name="Straight Connector 10">
+                <a:extLst>
+                  <a:ext uri="{FF2B5EF4-FFF2-40B4-BE49-F238E27FC236}">
+                    <a16:creationId xmlns:a16="http://schemas.microsoft.com/office/drawing/2014/main" id="{09DCE625-3BCB-5440-8942-D7AE42A0CCE0}"/>
+                  </a:ext>
+                </a:extLst>
+              </p:cNvPr>
+              <p:cNvCxnSpPr>
+                <a:cxnSpLocks/>
+              </p:cNvCxnSpPr>
+              <p:nvPr/>
+            </p:nvCxnSpPr>
+            <p:spPr>
+              <a:xfrm>
+                <a:off x="3103494" y="4418880"/>
+                <a:ext cx="0" cy="216000"/>
+              </a:xfrm>
+              <a:prstGeom prst="line">
+                <a:avLst/>
+              </a:prstGeom>
+              <a:ln w="25400" cap="sq">
+                <a:solidFill>
+                  <a:schemeClr val="tx1"/>
+                </a:solidFill>
+                <a:miter lim="800000"/>
+              </a:ln>
+            </p:spPr>
+            <p:style>
+              <a:lnRef idx="1">
+                <a:schemeClr val="accent1"/>
+              </a:lnRef>
+              <a:fillRef idx="0">
+                <a:schemeClr val="accent1"/>
+              </a:fillRef>
+              <a:effectRef idx="0">
+                <a:schemeClr val="accent1"/>
+              </a:effectRef>
+              <a:fontRef idx="minor">
+                <a:schemeClr val="tx1"/>
+              </a:fontRef>
+            </p:style>
+          </p:cxnSp>
+        </p:grpSp>
+        <p:sp>
+          <p:nvSpPr>
+            <p:cNvPr id="12" name="Freeform: Shape 46">
+              <a:extLst>
+                <a:ext uri="{FF2B5EF4-FFF2-40B4-BE49-F238E27FC236}">
+                  <a16:creationId xmlns:a16="http://schemas.microsoft.com/office/drawing/2014/main" id="{34DB01B6-1274-4A41-B947-43B9FBCBEEE6}"/>
+                </a:ext>
+              </a:extLst>
+            </p:cNvPr>
+            <p:cNvSpPr/>
+            <p:nvPr/>
+          </p:nvSpPr>
+          <p:spPr>
+            <a:xfrm flipH="1">
+              <a:off x="3680661" y="576126"/>
+              <a:ext cx="244894" cy="252793"/>
+            </a:xfrm>
+            <a:custGeom>
+              <a:avLst/>
+              <a:gdLst>
+                <a:gd name="connsiteX0" fmla="*/ 264669 w 264669"/>
+                <a:gd name="connsiteY0" fmla="*/ 0 h 258718"/>
+                <a:gd name="connsiteX1" fmla="*/ 26 w 264669"/>
+                <a:gd name="connsiteY1" fmla="*/ 102697 h 258718"/>
+                <a:gd name="connsiteX2" fmla="*/ 246895 w 264669"/>
+                <a:gd name="connsiteY2" fmla="*/ 185645 h 258718"/>
+                <a:gd name="connsiteX3" fmla="*/ 2001 w 264669"/>
+                <a:gd name="connsiteY3" fmla="*/ 258718 h 258718"/>
+                <a:gd name="connsiteX0" fmla="*/ 246869 w 246869"/>
+                <a:gd name="connsiteY0" fmla="*/ 0 h 252793"/>
+                <a:gd name="connsiteX1" fmla="*/ 0 w 246869"/>
+                <a:gd name="connsiteY1" fmla="*/ 96772 h 252793"/>
+                <a:gd name="connsiteX2" fmla="*/ 246869 w 246869"/>
+                <a:gd name="connsiteY2" fmla="*/ 179720 h 252793"/>
+                <a:gd name="connsiteX3" fmla="*/ 1975 w 246869"/>
+                <a:gd name="connsiteY3" fmla="*/ 252793 h 252793"/>
+                <a:gd name="connsiteX0" fmla="*/ 246869 w 246869"/>
+                <a:gd name="connsiteY0" fmla="*/ 0 h 252793"/>
+                <a:gd name="connsiteX1" fmla="*/ 0 w 246869"/>
+                <a:gd name="connsiteY1" fmla="*/ 96772 h 252793"/>
+                <a:gd name="connsiteX2" fmla="*/ 246869 w 246869"/>
+                <a:gd name="connsiteY2" fmla="*/ 179720 h 252793"/>
+                <a:gd name="connsiteX3" fmla="*/ 1975 w 246869"/>
+                <a:gd name="connsiteY3" fmla="*/ 252793 h 252793"/>
+                <a:gd name="connsiteX0" fmla="*/ 246869 w 246869"/>
+                <a:gd name="connsiteY0" fmla="*/ 0 h 252793"/>
+                <a:gd name="connsiteX1" fmla="*/ 0 w 246869"/>
+                <a:gd name="connsiteY1" fmla="*/ 96772 h 252793"/>
+                <a:gd name="connsiteX2" fmla="*/ 246869 w 246869"/>
+                <a:gd name="connsiteY2" fmla="*/ 179720 h 252793"/>
+                <a:gd name="connsiteX3" fmla="*/ 1975 w 246869"/>
+                <a:gd name="connsiteY3" fmla="*/ 252793 h 252793"/>
+                <a:gd name="connsiteX0" fmla="*/ 246869 w 246869"/>
+                <a:gd name="connsiteY0" fmla="*/ 29 h 252822"/>
+                <a:gd name="connsiteX1" fmla="*/ 0 w 246869"/>
+                <a:gd name="connsiteY1" fmla="*/ 96801 h 252822"/>
+                <a:gd name="connsiteX2" fmla="*/ 246869 w 246869"/>
+                <a:gd name="connsiteY2" fmla="*/ 179749 h 252822"/>
+                <a:gd name="connsiteX3" fmla="*/ 1975 w 246869"/>
+                <a:gd name="connsiteY3" fmla="*/ 252822 h 252822"/>
+                <a:gd name="connsiteX0" fmla="*/ 246869 w 246869"/>
+                <a:gd name="connsiteY0" fmla="*/ 29 h 252822"/>
+                <a:gd name="connsiteX1" fmla="*/ 0 w 246869"/>
+                <a:gd name="connsiteY1" fmla="*/ 96801 h 252822"/>
+                <a:gd name="connsiteX2" fmla="*/ 246869 w 246869"/>
+                <a:gd name="connsiteY2" fmla="*/ 179749 h 252822"/>
+                <a:gd name="connsiteX3" fmla="*/ 1975 w 246869"/>
+                <a:gd name="connsiteY3" fmla="*/ 252822 h 252822"/>
+                <a:gd name="connsiteX0" fmla="*/ 246869 w 246869"/>
+                <a:gd name="connsiteY0" fmla="*/ 29 h 252822"/>
+                <a:gd name="connsiteX1" fmla="*/ 0 w 246869"/>
+                <a:gd name="connsiteY1" fmla="*/ 96801 h 252822"/>
+                <a:gd name="connsiteX2" fmla="*/ 246869 w 246869"/>
+                <a:gd name="connsiteY2" fmla="*/ 179749 h 252822"/>
+                <a:gd name="connsiteX3" fmla="*/ 1975 w 246869"/>
+                <a:gd name="connsiteY3" fmla="*/ 252822 h 252822"/>
+                <a:gd name="connsiteX0" fmla="*/ 246869 w 246869"/>
+                <a:gd name="connsiteY0" fmla="*/ 29 h 252822"/>
+                <a:gd name="connsiteX1" fmla="*/ 0 w 246869"/>
+                <a:gd name="connsiteY1" fmla="*/ 96801 h 252822"/>
+                <a:gd name="connsiteX2" fmla="*/ 246869 w 246869"/>
+                <a:gd name="connsiteY2" fmla="*/ 179749 h 252822"/>
+                <a:gd name="connsiteX3" fmla="*/ 1975 w 246869"/>
+                <a:gd name="connsiteY3" fmla="*/ 252822 h 252822"/>
+                <a:gd name="connsiteX0" fmla="*/ 246869 w 246869"/>
+                <a:gd name="connsiteY0" fmla="*/ 43 h 252836"/>
+                <a:gd name="connsiteX1" fmla="*/ 0 w 246869"/>
+                <a:gd name="connsiteY1" fmla="*/ 96815 h 252836"/>
+                <a:gd name="connsiteX2" fmla="*/ 246869 w 246869"/>
+                <a:gd name="connsiteY2" fmla="*/ 179763 h 252836"/>
+                <a:gd name="connsiteX3" fmla="*/ 1975 w 246869"/>
+                <a:gd name="connsiteY3" fmla="*/ 252836 h 252836"/>
+                <a:gd name="connsiteX0" fmla="*/ 246869 w 246869"/>
+                <a:gd name="connsiteY0" fmla="*/ 0 h 252793"/>
+                <a:gd name="connsiteX1" fmla="*/ 0 w 246869"/>
+                <a:gd name="connsiteY1" fmla="*/ 96772 h 252793"/>
+                <a:gd name="connsiteX2" fmla="*/ 246869 w 246869"/>
+                <a:gd name="connsiteY2" fmla="*/ 179720 h 252793"/>
+                <a:gd name="connsiteX3" fmla="*/ 1975 w 246869"/>
+                <a:gd name="connsiteY3" fmla="*/ 252793 h 252793"/>
+                <a:gd name="connsiteX0" fmla="*/ 244894 w 244894"/>
+                <a:gd name="connsiteY0" fmla="*/ 0 h 252793"/>
+                <a:gd name="connsiteX1" fmla="*/ 0 w 244894"/>
+                <a:gd name="connsiteY1" fmla="*/ 61223 h 252793"/>
+                <a:gd name="connsiteX2" fmla="*/ 244894 w 244894"/>
+                <a:gd name="connsiteY2" fmla="*/ 179720 h 252793"/>
+                <a:gd name="connsiteX3" fmla="*/ 0 w 244894"/>
+                <a:gd name="connsiteY3" fmla="*/ 252793 h 252793"/>
+                <a:gd name="connsiteX0" fmla="*/ 244894 w 244894"/>
+                <a:gd name="connsiteY0" fmla="*/ 0 h 252793"/>
+                <a:gd name="connsiteX1" fmla="*/ 0 w 244894"/>
+                <a:gd name="connsiteY1" fmla="*/ 69123 h 252793"/>
+                <a:gd name="connsiteX2" fmla="*/ 244894 w 244894"/>
+                <a:gd name="connsiteY2" fmla="*/ 179720 h 252793"/>
+                <a:gd name="connsiteX3" fmla="*/ 0 w 244894"/>
+                <a:gd name="connsiteY3" fmla="*/ 252793 h 252793"/>
+                <a:gd name="connsiteX0" fmla="*/ 244894 w 244894"/>
+                <a:gd name="connsiteY0" fmla="*/ 0 h 252793"/>
+                <a:gd name="connsiteX1" fmla="*/ 0 w 244894"/>
+                <a:gd name="connsiteY1" fmla="*/ 69123 h 252793"/>
+                <a:gd name="connsiteX2" fmla="*/ 244894 w 244894"/>
+                <a:gd name="connsiteY2" fmla="*/ 179720 h 252793"/>
+                <a:gd name="connsiteX3" fmla="*/ 0 w 244894"/>
+                <a:gd name="connsiteY3" fmla="*/ 252793 h 252793"/>
+                <a:gd name="connsiteX0" fmla="*/ 244894 w 244894"/>
+                <a:gd name="connsiteY0" fmla="*/ 0 h 252793"/>
+                <a:gd name="connsiteX1" fmla="*/ 0 w 244894"/>
+                <a:gd name="connsiteY1" fmla="*/ 69123 h 252793"/>
+                <a:gd name="connsiteX2" fmla="*/ 244894 w 244894"/>
+                <a:gd name="connsiteY2" fmla="*/ 179720 h 252793"/>
+                <a:gd name="connsiteX3" fmla="*/ 0 w 244894"/>
+                <a:gd name="connsiteY3" fmla="*/ 252793 h 252793"/>
+                <a:gd name="connsiteX0" fmla="*/ 244894 w 244894"/>
+                <a:gd name="connsiteY0" fmla="*/ 242 h 253035"/>
+                <a:gd name="connsiteX1" fmla="*/ 0 w 244894"/>
+                <a:gd name="connsiteY1" fmla="*/ 69365 h 253035"/>
+                <a:gd name="connsiteX2" fmla="*/ 244894 w 244894"/>
+                <a:gd name="connsiteY2" fmla="*/ 179962 h 253035"/>
+                <a:gd name="connsiteX3" fmla="*/ 0 w 244894"/>
+                <a:gd name="connsiteY3" fmla="*/ 253035 h 253035"/>
+                <a:gd name="connsiteX0" fmla="*/ 244894 w 244894"/>
+                <a:gd name="connsiteY0" fmla="*/ 0 h 252793"/>
+                <a:gd name="connsiteX1" fmla="*/ 0 w 244894"/>
+                <a:gd name="connsiteY1" fmla="*/ 69123 h 252793"/>
+                <a:gd name="connsiteX2" fmla="*/ 244894 w 244894"/>
+                <a:gd name="connsiteY2" fmla="*/ 179720 h 252793"/>
+                <a:gd name="connsiteX3" fmla="*/ 0 w 244894"/>
+                <a:gd name="connsiteY3" fmla="*/ 252793 h 252793"/>
+              </a:gdLst>
+              <a:ahLst/>
+              <a:cxnLst>
+                <a:cxn ang="0">
+                  <a:pos x="connsiteX0" y="connsiteY0"/>
+                </a:cxn>
+                <a:cxn ang="0">
+                  <a:pos x="connsiteX1" y="connsiteY1"/>
+                </a:cxn>
+                <a:cxn ang="0">
+                  <a:pos x="connsiteX2" y="connsiteY2"/>
+                </a:cxn>
+                <a:cxn ang="0">
+                  <a:pos x="connsiteX3" y="connsiteY3"/>
+                </a:cxn>
+              </a:cxnLst>
+              <a:rect l="l" t="t" r="r" b="b"/>
+              <a:pathLst>
+                <a:path w="244894" h="252793">
+                  <a:moveTo>
+                    <a:pt x="244894" y="0"/>
+                  </a:moveTo>
+                  <a:cubicBezTo>
+                    <a:pt x="143561" y="1322"/>
+                    <a:pt x="0" y="15471"/>
+                    <a:pt x="0" y="69123"/>
+                  </a:cubicBezTo>
+                  <a:cubicBezTo>
+                    <a:pt x="0" y="122775"/>
+                    <a:pt x="244894" y="141208"/>
+                    <a:pt x="244894" y="179720"/>
+                  </a:cubicBezTo>
+                  <a:cubicBezTo>
+                    <a:pt x="244894" y="218232"/>
+                    <a:pt x="106811" y="249008"/>
+                    <a:pt x="0" y="252793"/>
+                  </a:cubicBezTo>
+                </a:path>
+              </a:pathLst>
+            </a:custGeom>
+            <a:noFill/>
+            <a:ln w="25400" cap="sq">
+              <a:solidFill>
+                <a:schemeClr val="tx1"/>
+              </a:solidFill>
+              <a:miter lim="800000"/>
+            </a:ln>
+          </p:spPr>
+          <p:style>
+            <a:lnRef idx="2">
+              <a:schemeClr val="accent1">
+                <a:shade val="50000"/>
+              </a:schemeClr>
+            </a:lnRef>
+            <a:fillRef idx="1">
+              <a:schemeClr val="accent1"/>
+            </a:fillRef>
+            <a:effectRef idx="0">
+              <a:schemeClr val="accent1"/>
+            </a:effectRef>
+            <a:fontRef idx="minor">
+              <a:schemeClr val="lt1"/>
+            </a:fontRef>
+          </p:style>
+          <p:txBody>
+            <a:bodyPr rtlCol="0" anchor="ctr"/>
+            <a:lstStyle/>
+            <a:p>
+              <a:pPr algn="ctr"/>
+              <a:endParaRPr lang="en-US"/>
+            </a:p>
+          </p:txBody>
+        </p:sp>
+        <p:sp>
+          <p:nvSpPr>
+            <p:cNvPr id="13" name="Freeform: Shape 47">
+              <a:extLst>
+                <a:ext uri="{FF2B5EF4-FFF2-40B4-BE49-F238E27FC236}">
+                  <a16:creationId xmlns:a16="http://schemas.microsoft.com/office/drawing/2014/main" id="{C40F0B6D-78A0-7A4E-9767-D32755259D85}"/>
+                </a:ext>
+              </a:extLst>
+            </p:cNvPr>
+            <p:cNvSpPr/>
+            <p:nvPr/>
+          </p:nvSpPr>
+          <p:spPr>
+            <a:xfrm>
+              <a:off x="656640" y="359804"/>
+              <a:ext cx="216000" cy="216000"/>
+            </a:xfrm>
+            <a:custGeom>
+              <a:avLst/>
+              <a:gdLst>
+                <a:gd name="connsiteX0" fmla="*/ 0 w 183365"/>
+                <a:gd name="connsiteY0" fmla="*/ 247726 h 247726"/>
+                <a:gd name="connsiteX1" fmla="*/ 0 w 183365"/>
+                <a:gd name="connsiteY1" fmla="*/ 0 h 247726"/>
+                <a:gd name="connsiteX2" fmla="*/ 183365 w 183365"/>
+                <a:gd name="connsiteY2" fmla="*/ 0 h 247726"/>
+              </a:gdLst>
+              <a:ahLst/>
+              <a:cxnLst>
+                <a:cxn ang="0">
+                  <a:pos x="connsiteX0" y="connsiteY0"/>
+                </a:cxn>
+                <a:cxn ang="0">
+                  <a:pos x="connsiteX1" y="connsiteY1"/>
+                </a:cxn>
+                <a:cxn ang="0">
+                  <a:pos x="connsiteX2" y="connsiteY2"/>
+                </a:cxn>
+              </a:cxnLst>
+              <a:rect l="l" t="t" r="r" b="b"/>
+              <a:pathLst>
+                <a:path w="183365" h="247726">
+                  <a:moveTo>
+                    <a:pt x="0" y="247726"/>
+                  </a:moveTo>
+                  <a:lnTo>
+                    <a:pt x="0" y="0"/>
+                  </a:lnTo>
+                  <a:lnTo>
+                    <a:pt x="183365" y="0"/>
+                  </a:lnTo>
+                </a:path>
+              </a:pathLst>
+            </a:custGeom>
+            <a:noFill/>
+            <a:ln w="25400" cap="sq">
+              <a:solidFill>
+                <a:schemeClr val="tx1"/>
+              </a:solidFill>
+              <a:miter lim="800000"/>
+              <a:tailEnd type="arrow" w="lg" len="lg"/>
+            </a:ln>
+          </p:spPr>
+          <p:style>
+            <a:lnRef idx="2">
+              <a:schemeClr val="accent1">
+                <a:shade val="50000"/>
+              </a:schemeClr>
+            </a:lnRef>
+            <a:fillRef idx="1">
+              <a:schemeClr val="accent1"/>
+            </a:fillRef>
+            <a:effectRef idx="0">
+              <a:schemeClr val="accent1"/>
+            </a:effectRef>
+            <a:fontRef idx="minor">
+              <a:schemeClr val="lt1"/>
+            </a:fontRef>
+          </p:style>
+          <p:txBody>
+            <a:bodyPr rtlCol="0" anchor="ctr"/>
+            <a:lstStyle/>
+            <a:p>
+              <a:pPr algn="ctr"/>
+              <a:endParaRPr lang="en-US" dirty="0"/>
+            </a:p>
+          </p:txBody>
+        </p:sp>
+        <p:sp>
+          <p:nvSpPr>
+            <p:cNvPr id="14" name="Oval 73">
+              <a:extLst>
+                <a:ext uri="{FF2B5EF4-FFF2-40B4-BE49-F238E27FC236}">
+                  <a16:creationId xmlns:a16="http://schemas.microsoft.com/office/drawing/2014/main" id="{A346AB85-7C29-704E-8F09-54189913AA62}"/>
+                </a:ext>
+              </a:extLst>
+            </p:cNvPr>
+            <p:cNvSpPr/>
+            <p:nvPr/>
+          </p:nvSpPr>
+          <p:spPr>
+            <a:xfrm>
+              <a:off x="921862" y="460674"/>
+              <a:ext cx="194161" cy="110121"/>
+            </a:xfrm>
+            <a:custGeom>
+              <a:avLst/>
+              <a:gdLst>
+                <a:gd name="connsiteX0" fmla="*/ 0 w 274320"/>
+                <a:gd name="connsiteY0" fmla="*/ 137160 h 274320"/>
+                <a:gd name="connsiteX1" fmla="*/ 137160 w 274320"/>
+                <a:gd name="connsiteY1" fmla="*/ 0 h 274320"/>
+                <a:gd name="connsiteX2" fmla="*/ 274320 w 274320"/>
+                <a:gd name="connsiteY2" fmla="*/ 137160 h 274320"/>
+                <a:gd name="connsiteX3" fmla="*/ 137160 w 274320"/>
+                <a:gd name="connsiteY3" fmla="*/ 274320 h 274320"/>
+                <a:gd name="connsiteX4" fmla="*/ 0 w 274320"/>
+                <a:gd name="connsiteY4" fmla="*/ 137160 h 274320"/>
+                <a:gd name="connsiteX0" fmla="*/ 0 w 274320"/>
+                <a:gd name="connsiteY0" fmla="*/ 137160 h 154305"/>
+                <a:gd name="connsiteX1" fmla="*/ 137160 w 274320"/>
+                <a:gd name="connsiteY1" fmla="*/ 0 h 154305"/>
+                <a:gd name="connsiteX2" fmla="*/ 274320 w 274320"/>
+                <a:gd name="connsiteY2" fmla="*/ 137160 h 154305"/>
+                <a:gd name="connsiteX3" fmla="*/ 0 w 274320"/>
+                <a:gd name="connsiteY3" fmla="*/ 137160 h 154305"/>
+                <a:gd name="connsiteX0" fmla="*/ 0 w 274320"/>
+                <a:gd name="connsiteY0" fmla="*/ 137160 h 154305"/>
+                <a:gd name="connsiteX1" fmla="*/ 137160 w 274320"/>
+                <a:gd name="connsiteY1" fmla="*/ 0 h 154305"/>
+                <a:gd name="connsiteX2" fmla="*/ 274320 w 274320"/>
+                <a:gd name="connsiteY2" fmla="*/ 137160 h 154305"/>
+                <a:gd name="connsiteX3" fmla="*/ 0 w 274320"/>
+                <a:gd name="connsiteY3" fmla="*/ 137160 h 154305"/>
+                <a:gd name="connsiteX0" fmla="*/ 0 w 274320"/>
+                <a:gd name="connsiteY0" fmla="*/ 137160 h 149233"/>
+                <a:gd name="connsiteX1" fmla="*/ 137160 w 274320"/>
+                <a:gd name="connsiteY1" fmla="*/ 0 h 149233"/>
+                <a:gd name="connsiteX2" fmla="*/ 274320 w 274320"/>
+                <a:gd name="connsiteY2" fmla="*/ 137160 h 149233"/>
+                <a:gd name="connsiteX3" fmla="*/ 0 w 274320"/>
+                <a:gd name="connsiteY3" fmla="*/ 137160 h 149233"/>
+                <a:gd name="connsiteX0" fmla="*/ 0 w 274320"/>
+                <a:gd name="connsiteY0" fmla="*/ 137160 h 149233"/>
+                <a:gd name="connsiteX1" fmla="*/ 137160 w 274320"/>
+                <a:gd name="connsiteY1" fmla="*/ 0 h 149233"/>
+                <a:gd name="connsiteX2" fmla="*/ 274320 w 274320"/>
+                <a:gd name="connsiteY2" fmla="*/ 137160 h 149233"/>
+                <a:gd name="connsiteX3" fmla="*/ 0 w 274320"/>
+                <a:gd name="connsiteY3" fmla="*/ 137160 h 149233"/>
+                <a:gd name="connsiteX0" fmla="*/ 0 w 274320"/>
+                <a:gd name="connsiteY0" fmla="*/ 137160 h 147756"/>
+                <a:gd name="connsiteX1" fmla="*/ 137160 w 274320"/>
+                <a:gd name="connsiteY1" fmla="*/ 0 h 147756"/>
+                <a:gd name="connsiteX2" fmla="*/ 274320 w 274320"/>
+                <a:gd name="connsiteY2" fmla="*/ 137160 h 147756"/>
+                <a:gd name="connsiteX3" fmla="*/ 0 w 274320"/>
+                <a:gd name="connsiteY3" fmla="*/ 137160 h 147756"/>
+                <a:gd name="connsiteX0" fmla="*/ 0 w 274320"/>
+                <a:gd name="connsiteY0" fmla="*/ 137160 h 147756"/>
+                <a:gd name="connsiteX1" fmla="*/ 137160 w 274320"/>
+                <a:gd name="connsiteY1" fmla="*/ 0 h 147756"/>
+                <a:gd name="connsiteX2" fmla="*/ 274320 w 274320"/>
+                <a:gd name="connsiteY2" fmla="*/ 137160 h 147756"/>
+                <a:gd name="connsiteX3" fmla="*/ 0 w 274320"/>
+                <a:gd name="connsiteY3" fmla="*/ 137160 h 147756"/>
+                <a:gd name="connsiteX0" fmla="*/ 0 w 274320"/>
+                <a:gd name="connsiteY0" fmla="*/ 137160 h 138963"/>
+                <a:gd name="connsiteX1" fmla="*/ 137160 w 274320"/>
+                <a:gd name="connsiteY1" fmla="*/ 0 h 138963"/>
+                <a:gd name="connsiteX2" fmla="*/ 274320 w 274320"/>
+                <a:gd name="connsiteY2" fmla="*/ 137160 h 138963"/>
+                <a:gd name="connsiteX3" fmla="*/ 0 w 274320"/>
+                <a:gd name="connsiteY3" fmla="*/ 137160 h 138963"/>
+                <a:gd name="connsiteX0" fmla="*/ 0 w 274320"/>
+                <a:gd name="connsiteY0" fmla="*/ 137160 h 137830"/>
+                <a:gd name="connsiteX1" fmla="*/ 137160 w 274320"/>
+                <a:gd name="connsiteY1" fmla="*/ 0 h 137830"/>
+                <a:gd name="connsiteX2" fmla="*/ 274320 w 274320"/>
+                <a:gd name="connsiteY2" fmla="*/ 137160 h 137830"/>
+                <a:gd name="connsiteX3" fmla="*/ 0 w 274320"/>
+                <a:gd name="connsiteY3" fmla="*/ 137160 h 137830"/>
+                <a:gd name="connsiteX0" fmla="*/ 0 w 274320"/>
+                <a:gd name="connsiteY0" fmla="*/ 137160 h 137160"/>
+                <a:gd name="connsiteX1" fmla="*/ 137160 w 274320"/>
+                <a:gd name="connsiteY1" fmla="*/ 0 h 137160"/>
+                <a:gd name="connsiteX2" fmla="*/ 274320 w 274320"/>
+                <a:gd name="connsiteY2" fmla="*/ 137160 h 137160"/>
+                <a:gd name="connsiteX3" fmla="*/ 0 w 274320"/>
+                <a:gd name="connsiteY3" fmla="*/ 137160 h 137160"/>
+                <a:gd name="connsiteX0" fmla="*/ 0 w 274320"/>
+                <a:gd name="connsiteY0" fmla="*/ 137160 h 137160"/>
+                <a:gd name="connsiteX1" fmla="*/ 137160 w 274320"/>
+                <a:gd name="connsiteY1" fmla="*/ 0 h 137160"/>
+                <a:gd name="connsiteX2" fmla="*/ 274320 w 274320"/>
+                <a:gd name="connsiteY2" fmla="*/ 137160 h 137160"/>
+                <a:gd name="connsiteX3" fmla="*/ 0 w 274320"/>
+                <a:gd name="connsiteY3" fmla="*/ 137160 h 137160"/>
+                <a:gd name="connsiteX0" fmla="*/ 0 w 274320"/>
+                <a:gd name="connsiteY0" fmla="*/ 137160 h 137160"/>
+                <a:gd name="connsiteX1" fmla="*/ 137160 w 274320"/>
+                <a:gd name="connsiteY1" fmla="*/ 0 h 137160"/>
+                <a:gd name="connsiteX2" fmla="*/ 274320 w 274320"/>
+                <a:gd name="connsiteY2" fmla="*/ 137160 h 137160"/>
+                <a:gd name="connsiteX3" fmla="*/ 0 w 274320"/>
+                <a:gd name="connsiteY3" fmla="*/ 137160 h 137160"/>
+                <a:gd name="connsiteX0" fmla="*/ 0 w 274320"/>
+                <a:gd name="connsiteY0" fmla="*/ 137160 h 137160"/>
+                <a:gd name="connsiteX1" fmla="*/ 137160 w 274320"/>
+                <a:gd name="connsiteY1" fmla="*/ 0 h 137160"/>
+                <a:gd name="connsiteX2" fmla="*/ 274320 w 274320"/>
+                <a:gd name="connsiteY2" fmla="*/ 137160 h 137160"/>
+                <a:gd name="connsiteX3" fmla="*/ 0 w 274320"/>
+                <a:gd name="connsiteY3" fmla="*/ 137160 h 137160"/>
+              </a:gdLst>
+              <a:ahLst/>
+              <a:cxnLst>
+                <a:cxn ang="0">
+                  <a:pos x="connsiteX0" y="connsiteY0"/>
+                </a:cxn>
+                <a:cxn ang="0">
+                  <a:pos x="connsiteX1" y="connsiteY1"/>
+                </a:cxn>
+                <a:cxn ang="0">
+                  <a:pos x="connsiteX2" y="connsiteY2"/>
+                </a:cxn>
+                <a:cxn ang="0">
+                  <a:pos x="connsiteX3" y="connsiteY3"/>
+                </a:cxn>
+              </a:cxnLst>
+              <a:rect l="l" t="t" r="r" b="b"/>
+              <a:pathLst>
+                <a:path w="274320" h="137160">
+                  <a:moveTo>
+                    <a:pt x="0" y="137160"/>
+                  </a:moveTo>
+                  <a:cubicBezTo>
+                    <a:pt x="0" y="61409"/>
+                    <a:pt x="61409" y="0"/>
+                    <a:pt x="137160" y="0"/>
+                  </a:cubicBezTo>
+                  <a:cubicBezTo>
+                    <a:pt x="212911" y="0"/>
+                    <a:pt x="274320" y="61409"/>
+                    <a:pt x="274320" y="137160"/>
+                  </a:cubicBezTo>
+                  <a:cubicBezTo>
+                    <a:pt x="-20954" y="137160"/>
+                    <a:pt x="294323" y="136208"/>
+                    <a:pt x="0" y="137160"/>
+                  </a:cubicBezTo>
+                  <a:close/>
+                </a:path>
+              </a:pathLst>
+            </a:custGeom>
+            <a:solidFill>
+              <a:schemeClr val="bg1"/>
+            </a:solidFill>
+            <a:ln w="25400" cap="sq">
+              <a:solidFill>
+                <a:schemeClr val="tx1"/>
+              </a:solidFill>
+              <a:miter lim="800000"/>
+            </a:ln>
+          </p:spPr>
+          <p:style>
+            <a:lnRef idx="2">
+              <a:schemeClr val="accent1">
+                <a:shade val="50000"/>
+              </a:schemeClr>
+            </a:lnRef>
+            <a:fillRef idx="1">
+              <a:schemeClr val="accent1"/>
+            </a:fillRef>
+            <a:effectRef idx="0">
+              <a:schemeClr val="accent1"/>
+            </a:effectRef>
+            <a:fontRef idx="minor">
+              <a:schemeClr val="lt1"/>
+            </a:fontRef>
+          </p:style>
+          <p:txBody>
+            <a:bodyPr rtlCol="0" anchor="ctr"/>
+            <a:lstStyle/>
+            <a:p>
+              <a:pPr algn="ctr"/>
+              <a:endParaRPr lang="en-US"/>
+            </a:p>
+          </p:txBody>
+        </p:sp>
+        <p:sp>
+          <p:nvSpPr>
+            <p:cNvPr id="15" name="Freeform: Shape 49">
+              <a:extLst>
+                <a:ext uri="{FF2B5EF4-FFF2-40B4-BE49-F238E27FC236}">
+                  <a16:creationId xmlns:a16="http://schemas.microsoft.com/office/drawing/2014/main" id="{BD2B9C54-1E18-244D-A6C9-0173B52A50D9}"/>
+                </a:ext>
+              </a:extLst>
+            </p:cNvPr>
+            <p:cNvSpPr/>
+            <p:nvPr/>
+          </p:nvSpPr>
+          <p:spPr>
+            <a:xfrm>
+              <a:off x="1961910" y="342345"/>
+              <a:ext cx="96702" cy="96702"/>
+            </a:xfrm>
+            <a:custGeom>
+              <a:avLst/>
+              <a:gdLst>
+                <a:gd name="connsiteX0" fmla="*/ 0 w 153279"/>
+                <a:gd name="connsiteY0" fmla="*/ 0 h 153279"/>
+                <a:gd name="connsiteX1" fmla="*/ 153279 w 153279"/>
+                <a:gd name="connsiteY1" fmla="*/ 153279 h 153279"/>
+              </a:gdLst>
+              <a:ahLst/>
+              <a:cxnLst>
+                <a:cxn ang="0">
+                  <a:pos x="connsiteX0" y="connsiteY0"/>
+                </a:cxn>
+                <a:cxn ang="0">
+                  <a:pos x="connsiteX1" y="connsiteY1"/>
+                </a:cxn>
+              </a:cxnLst>
+              <a:rect l="l" t="t" r="r" b="b"/>
+              <a:pathLst>
+                <a:path w="153279" h="153279">
+                  <a:moveTo>
+                    <a:pt x="0" y="0"/>
+                  </a:moveTo>
+                  <a:lnTo>
+                    <a:pt x="153279" y="153279"/>
+                  </a:lnTo>
+                </a:path>
+              </a:pathLst>
+            </a:custGeom>
+            <a:noFill/>
+            <a:ln w="25400" cap="sq">
+              <a:solidFill>
+                <a:srgbClr val="000000"/>
+              </a:solidFill>
+              <a:prstDash val="solid"/>
+              <a:miter lim="800000"/>
+            </a:ln>
+          </p:spPr>
+          <p:txBody>
+            <a:bodyPr rtlCol="0" anchor="ctr"/>
+            <a:lstStyle/>
+            <a:p>
+              <a:endParaRPr lang="en-US"/>
+            </a:p>
+          </p:txBody>
+        </p:sp>
+        <p:sp>
+          <p:nvSpPr>
+            <p:cNvPr id="16" name="Freeform: Shape 50">
+              <a:extLst>
+                <a:ext uri="{FF2B5EF4-FFF2-40B4-BE49-F238E27FC236}">
+                  <a16:creationId xmlns:a16="http://schemas.microsoft.com/office/drawing/2014/main" id="{D5E8F707-27EE-0F4E-80B6-AAB9BE8C4446}"/>
+                </a:ext>
+              </a:extLst>
+            </p:cNvPr>
+            <p:cNvSpPr/>
+            <p:nvPr/>
+          </p:nvSpPr>
+          <p:spPr>
+            <a:xfrm>
+              <a:off x="1961910" y="342345"/>
+              <a:ext cx="96702" cy="96702"/>
+            </a:xfrm>
+            <a:custGeom>
+              <a:avLst/>
+              <a:gdLst>
+                <a:gd name="connsiteX0" fmla="*/ 153279 w 153279"/>
+                <a:gd name="connsiteY0" fmla="*/ 0 h 153279"/>
+                <a:gd name="connsiteX1" fmla="*/ 0 w 153279"/>
+                <a:gd name="connsiteY1" fmla="*/ 153279 h 153279"/>
+              </a:gdLst>
+              <a:ahLst/>
+              <a:cxnLst>
+                <a:cxn ang="0">
+                  <a:pos x="connsiteX0" y="connsiteY0"/>
+                </a:cxn>
+                <a:cxn ang="0">
+                  <a:pos x="connsiteX1" y="connsiteY1"/>
+                </a:cxn>
+              </a:cxnLst>
+              <a:rect l="l" t="t" r="r" b="b"/>
+              <a:pathLst>
+                <a:path w="153279" h="153279">
+                  <a:moveTo>
+                    <a:pt x="153279" y="0"/>
+                  </a:moveTo>
+                  <a:lnTo>
+                    <a:pt x="0" y="153279"/>
+                  </a:lnTo>
+                </a:path>
+              </a:pathLst>
+            </a:custGeom>
+            <a:noFill/>
+            <a:ln w="25400" cap="sq">
+              <a:solidFill>
+                <a:srgbClr val="000000"/>
+              </a:solidFill>
+              <a:prstDash val="solid"/>
+              <a:miter lim="800000"/>
+            </a:ln>
+          </p:spPr>
+          <p:txBody>
+            <a:bodyPr rtlCol="0" anchor="ctr"/>
+            <a:lstStyle/>
+            <a:p>
+              <a:endParaRPr lang="en-US"/>
+            </a:p>
+          </p:txBody>
+        </p:sp>
+        <p:grpSp>
+          <p:nvGrpSpPr>
+            <p:cNvPr id="17" name="Group 16">
+              <a:extLst>
+                <a:ext uri="{FF2B5EF4-FFF2-40B4-BE49-F238E27FC236}">
+                  <a16:creationId xmlns:a16="http://schemas.microsoft.com/office/drawing/2014/main" id="{1AAAEDBF-3054-6941-AFE6-A2AF56246DE0}"/>
+                </a:ext>
+              </a:extLst>
+            </p:cNvPr>
+            <p:cNvGrpSpPr/>
+            <p:nvPr/>
+          </p:nvGrpSpPr>
+          <p:grpSpPr>
+            <a:xfrm>
+              <a:off x="1997661" y="405300"/>
+              <a:ext cx="25200" cy="162000"/>
+              <a:chOff x="3740514" y="4089104"/>
+              <a:chExt cx="81386" cy="588430"/>
+            </a:xfrm>
+          </p:grpSpPr>
+          <p:sp>
+            <p:nvSpPr>
+              <p:cNvPr id="18" name="Freeform: Shape 54">
+                <a:extLst>
+                  <a:ext uri="{FF2B5EF4-FFF2-40B4-BE49-F238E27FC236}">
+                    <a16:creationId xmlns:a16="http://schemas.microsoft.com/office/drawing/2014/main" id="{D8998455-6CA3-1147-A1F6-F459B2D7E088}"/>
+                  </a:ext>
+                </a:extLst>
+              </p:cNvPr>
+              <p:cNvSpPr>
+                <a:spLocks noChangeAspect="1"/>
+              </p:cNvSpPr>
+              <p:nvPr/>
+            </p:nvSpPr>
+            <p:spPr>
+              <a:xfrm>
+                <a:off x="3740514" y="4089104"/>
+                <a:ext cx="81386" cy="294215"/>
+              </a:xfrm>
+              <a:custGeom>
+                <a:avLst/>
+                <a:gdLst>
+                  <a:gd name="connsiteX0" fmla="*/ 11371 w 23499"/>
+                  <a:gd name="connsiteY0" fmla="*/ 84950 h 84949"/>
+                  <a:gd name="connsiteX1" fmla="*/ 11371 w 23499"/>
+                  <a:gd name="connsiteY1" fmla="*/ 1 h 84949"/>
+                </a:gdLst>
+                <a:ahLst/>
+                <a:cxnLst>
+                  <a:cxn ang="0">
+                    <a:pos x="connsiteX0" y="connsiteY0"/>
+                  </a:cxn>
+                  <a:cxn ang="0">
+                    <a:pos x="connsiteX1" y="connsiteY1"/>
+                  </a:cxn>
+                </a:cxnLst>
+                <a:rect l="l" t="t" r="r" b="b"/>
+                <a:pathLst>
+                  <a:path w="23499" h="84949">
+                    <a:moveTo>
+                      <a:pt x="11371" y="84950"/>
+                    </a:moveTo>
+                    <a:cubicBezTo>
+                      <a:pt x="52825" y="38947"/>
+                      <a:pt x="-28566" y="39938"/>
+                      <a:pt x="11371" y="1"/>
+                    </a:cubicBezTo>
+                  </a:path>
+                </a:pathLst>
+              </a:custGeom>
+              <a:noFill/>
+              <a:ln w="25400" cap="sq">
+                <a:solidFill>
+                  <a:srgbClr val="000000"/>
+                </a:solidFill>
+                <a:prstDash val="solid"/>
+                <a:miter lim="800000"/>
+              </a:ln>
+            </p:spPr>
+            <p:txBody>
+              <a:bodyPr rtlCol="0" anchor="ctr"/>
+              <a:lstStyle/>
+              <a:p>
+                <a:endParaRPr lang="en-US"/>
+              </a:p>
+            </p:txBody>
+          </p:sp>
+          <p:sp>
+            <p:nvSpPr>
+              <p:cNvPr id="19" name="Freeform: Shape 56">
+                <a:extLst>
+                  <a:ext uri="{FF2B5EF4-FFF2-40B4-BE49-F238E27FC236}">
+                    <a16:creationId xmlns:a16="http://schemas.microsoft.com/office/drawing/2014/main" id="{5A533B3D-47C8-7345-9A98-647894C4C39C}"/>
+                  </a:ext>
+                </a:extLst>
+              </p:cNvPr>
+              <p:cNvSpPr>
+                <a:spLocks noChangeAspect="1"/>
+              </p:cNvSpPr>
+              <p:nvPr/>
+            </p:nvSpPr>
+            <p:spPr>
+              <a:xfrm>
+                <a:off x="3740514" y="4383319"/>
+                <a:ext cx="81386" cy="294215"/>
+              </a:xfrm>
+              <a:custGeom>
+                <a:avLst/>
+                <a:gdLst>
+                  <a:gd name="connsiteX0" fmla="*/ 11371 w 23499"/>
+                  <a:gd name="connsiteY0" fmla="*/ 84950 h 84949"/>
+                  <a:gd name="connsiteX1" fmla="*/ 11371 w 23499"/>
+                  <a:gd name="connsiteY1" fmla="*/ 1 h 84949"/>
+                </a:gdLst>
+                <a:ahLst/>
+                <a:cxnLst>
+                  <a:cxn ang="0">
+                    <a:pos x="connsiteX0" y="connsiteY0"/>
+                  </a:cxn>
+                  <a:cxn ang="0">
+                    <a:pos x="connsiteX1" y="connsiteY1"/>
+                  </a:cxn>
+                </a:cxnLst>
+                <a:rect l="l" t="t" r="r" b="b"/>
+                <a:pathLst>
+                  <a:path w="23499" h="84949">
+                    <a:moveTo>
+                      <a:pt x="11371" y="84950"/>
+                    </a:moveTo>
+                    <a:cubicBezTo>
+                      <a:pt x="52825" y="38947"/>
+                      <a:pt x="-28566" y="39938"/>
+                      <a:pt x="11371" y="1"/>
+                    </a:cubicBezTo>
+                  </a:path>
+                </a:pathLst>
+              </a:custGeom>
+              <a:noFill/>
+              <a:ln w="25400" cap="sq">
+                <a:solidFill>
+                  <a:srgbClr val="000000"/>
+                </a:solidFill>
+                <a:prstDash val="solid"/>
+                <a:miter lim="800000"/>
+              </a:ln>
+            </p:spPr>
+            <p:txBody>
+              <a:bodyPr rtlCol="0" anchor="ctr"/>
+              <a:lstStyle/>
+              <a:p>
+                <a:endParaRPr lang="en-US"/>
+              </a:p>
+            </p:txBody>
+          </p:sp>
+        </p:grpSp>
+        <p:sp>
+          <p:nvSpPr>
+            <p:cNvPr id="20" name="Rectangle 19">
+              <a:extLst>
+                <a:ext uri="{FF2B5EF4-FFF2-40B4-BE49-F238E27FC236}">
+                  <a16:creationId xmlns:a16="http://schemas.microsoft.com/office/drawing/2014/main" id="{490210AE-C2AC-9A45-9CF4-B178674A96A3}"/>
+                </a:ext>
+              </a:extLst>
+            </p:cNvPr>
+            <p:cNvSpPr/>
+            <p:nvPr/>
+          </p:nvSpPr>
+          <p:spPr>
+            <a:xfrm>
+              <a:off x="1650443" y="288133"/>
+              <a:ext cx="729940" cy="415534"/>
+            </a:xfrm>
+            <a:prstGeom prst="rect">
+              <a:avLst/>
+            </a:prstGeom>
+            <a:noFill/>
+            <a:ln w="12700" cap="sq">
+              <a:prstDash val="dash"/>
+              <a:miter lim="800000"/>
+            </a:ln>
+          </p:spPr>
+          <p:style>
+            <a:lnRef idx="2">
+              <a:schemeClr val="accent1">
+                <a:shade val="50000"/>
+              </a:schemeClr>
+            </a:lnRef>
+            <a:fillRef idx="1">
+              <a:schemeClr val="accent1"/>
+            </a:fillRef>
+            <a:effectRef idx="0">
+              <a:schemeClr val="accent1"/>
+            </a:effectRef>
+            <a:fontRef idx="minor">
+              <a:schemeClr val="lt1"/>
+            </a:fontRef>
+          </p:style>
+          <p:txBody>
+            <a:bodyPr rtlCol="0" anchor="ctr"/>
+            <a:lstStyle/>
+            <a:p>
+              <a:pPr algn="ctr"/>
+              <a:endParaRPr lang="en-US"/>
+            </a:p>
+          </p:txBody>
+        </p:sp>
+        <p:sp>
+          <p:nvSpPr>
+            <p:cNvPr id="21" name="Graphic 6">
+              <a:extLst>
+                <a:ext uri="{FF2B5EF4-FFF2-40B4-BE49-F238E27FC236}">
+                  <a16:creationId xmlns:a16="http://schemas.microsoft.com/office/drawing/2014/main" id="{EA3C3B65-5BB5-6D46-8095-778F3C3650F9}"/>
+                </a:ext>
+              </a:extLst>
+            </p:cNvPr>
+            <p:cNvSpPr/>
+            <p:nvPr/>
+          </p:nvSpPr>
+          <p:spPr>
+            <a:xfrm>
+              <a:off x="3009712" y="470734"/>
+              <a:ext cx="419351" cy="216000"/>
+            </a:xfrm>
+            <a:custGeom>
+              <a:avLst/>
+              <a:gdLst>
+                <a:gd name="connsiteX0" fmla="*/ 0 w 350393"/>
+                <a:gd name="connsiteY0" fmla="*/ 231660 h 231660"/>
+                <a:gd name="connsiteX1" fmla="*/ 239890 w 350393"/>
+                <a:gd name="connsiteY1" fmla="*/ 231660 h 231660"/>
+                <a:gd name="connsiteX2" fmla="*/ 350394 w 350393"/>
+                <a:gd name="connsiteY2" fmla="*/ 115830 h 231660"/>
+                <a:gd name="connsiteX3" fmla="*/ 239890 w 350393"/>
+                <a:gd name="connsiteY3" fmla="*/ 0 h 231660"/>
+                <a:gd name="connsiteX4" fmla="*/ 0 w 350393"/>
+                <a:gd name="connsiteY4" fmla="*/ 0 h 231660"/>
+              </a:gdLst>
+              <a:ahLst/>
+              <a:cxnLst>
+                <a:cxn ang="0">
+                  <a:pos x="connsiteX0" y="connsiteY0"/>
+                </a:cxn>
+                <a:cxn ang="0">
+                  <a:pos x="connsiteX1" y="connsiteY1"/>
+                </a:cxn>
+                <a:cxn ang="0">
+                  <a:pos x="connsiteX2" y="connsiteY2"/>
+                </a:cxn>
+                <a:cxn ang="0">
+                  <a:pos x="connsiteX3" y="connsiteY3"/>
+                </a:cxn>
+                <a:cxn ang="0">
+                  <a:pos x="connsiteX4" y="connsiteY4"/>
+                </a:cxn>
+              </a:cxnLst>
+              <a:rect l="l" t="t" r="r" b="b"/>
+              <a:pathLst>
+                <a:path w="350393" h="231660">
+                  <a:moveTo>
+                    <a:pt x="0" y="231660"/>
+                  </a:moveTo>
+                  <a:lnTo>
+                    <a:pt x="239890" y="231660"/>
+                  </a:lnTo>
+                  <a:lnTo>
+                    <a:pt x="350394" y="115830"/>
+                  </a:lnTo>
+                  <a:lnTo>
+                    <a:pt x="239890" y="0"/>
+                  </a:lnTo>
+                  <a:lnTo>
+                    <a:pt x="0" y="0"/>
+                  </a:lnTo>
+                  <a:close/>
+                </a:path>
+              </a:pathLst>
+            </a:custGeom>
+            <a:solidFill>
+              <a:schemeClr val="bg1"/>
+            </a:solidFill>
+            <a:ln w="25400" cap="sq">
+              <a:solidFill>
+                <a:srgbClr val="000000"/>
+              </a:solidFill>
+              <a:prstDash val="solid"/>
+              <a:miter lim="800000"/>
+            </a:ln>
+          </p:spPr>
+          <p:txBody>
+            <a:bodyPr rtlCol="0" anchor="ctr"/>
+            <a:lstStyle/>
+            <a:p>
+              <a:endParaRPr lang="en-US"/>
+            </a:p>
+          </p:txBody>
+        </p:sp>
+        <p:grpSp>
+          <p:nvGrpSpPr>
+            <p:cNvPr id="22" name="Group 21">
+              <a:extLst>
+                <a:ext uri="{FF2B5EF4-FFF2-40B4-BE49-F238E27FC236}">
+                  <a16:creationId xmlns:a16="http://schemas.microsoft.com/office/drawing/2014/main" id="{5CADC601-BCE6-E74F-BC60-647A59B9A66A}"/>
+                </a:ext>
+              </a:extLst>
+            </p:cNvPr>
+            <p:cNvGrpSpPr/>
+            <p:nvPr/>
+          </p:nvGrpSpPr>
+          <p:grpSpPr>
+            <a:xfrm>
+              <a:off x="3466811" y="343043"/>
+              <a:ext cx="216000" cy="216000"/>
+              <a:chOff x="2995494" y="4418880"/>
+              <a:chExt cx="216000" cy="216000"/>
+            </a:xfrm>
+          </p:grpSpPr>
+          <p:cxnSp>
+            <p:nvCxnSpPr>
+              <p:cNvPr id="23" name="Straight Connector 22">
+                <a:extLst>
+                  <a:ext uri="{FF2B5EF4-FFF2-40B4-BE49-F238E27FC236}">
+                    <a16:creationId xmlns:a16="http://schemas.microsoft.com/office/drawing/2014/main" id="{54ABB4B7-7E41-4742-9A55-755AF909D798}"/>
+                  </a:ext>
+                </a:extLst>
+              </p:cNvPr>
+              <p:cNvCxnSpPr>
+                <a:cxnSpLocks/>
+              </p:cNvCxnSpPr>
+              <p:nvPr/>
+            </p:nvCxnSpPr>
+            <p:spPr>
+              <a:xfrm>
+                <a:off x="2995494" y="4418880"/>
+                <a:ext cx="216000" cy="0"/>
+              </a:xfrm>
+              <a:prstGeom prst="line">
+                <a:avLst/>
+              </a:prstGeom>
+              <a:ln w="25400" cap="sq">
+                <a:solidFill>
+                  <a:schemeClr val="tx1"/>
+                </a:solidFill>
+                <a:miter lim="800000"/>
+              </a:ln>
+            </p:spPr>
+            <p:style>
+              <a:lnRef idx="1">
+                <a:schemeClr val="accent1"/>
+              </a:lnRef>
+              <a:fillRef idx="0">
+                <a:schemeClr val="accent1"/>
+              </a:fillRef>
+              <a:effectRef idx="0">
+                <a:schemeClr val="accent1"/>
+              </a:effectRef>
+              <a:fontRef idx="minor">
+                <a:schemeClr val="tx1"/>
+              </a:fontRef>
+            </p:style>
+          </p:cxnSp>
+          <p:cxnSp>
+            <p:nvCxnSpPr>
+              <p:cNvPr id="24" name="Straight Connector 23">
+                <a:extLst>
+                  <a:ext uri="{FF2B5EF4-FFF2-40B4-BE49-F238E27FC236}">
+                    <a16:creationId xmlns:a16="http://schemas.microsoft.com/office/drawing/2014/main" id="{F125DBBB-80CA-3B41-8F4B-5F7EC616F523}"/>
+                  </a:ext>
+                </a:extLst>
+              </p:cNvPr>
+              <p:cNvCxnSpPr>
+                <a:cxnSpLocks/>
+              </p:cNvCxnSpPr>
+              <p:nvPr/>
+            </p:nvCxnSpPr>
+            <p:spPr>
+              <a:xfrm>
+                <a:off x="3103494" y="4418880"/>
+                <a:ext cx="0" cy="216000"/>
+              </a:xfrm>
+              <a:prstGeom prst="line">
+                <a:avLst/>
+              </a:prstGeom>
+              <a:ln w="25400" cap="sq">
+                <a:solidFill>
+                  <a:schemeClr val="tx1"/>
+                </a:solidFill>
+                <a:miter lim="800000"/>
+              </a:ln>
+            </p:spPr>
+            <p:style>
+              <a:lnRef idx="1">
+                <a:schemeClr val="accent1"/>
+              </a:lnRef>
+              <a:fillRef idx="0">
+                <a:schemeClr val="accent1"/>
+              </a:fillRef>
+              <a:effectRef idx="0">
+                <a:schemeClr val="accent1"/>
+              </a:effectRef>
+              <a:fontRef idx="minor">
+                <a:schemeClr val="tx1"/>
+              </a:fontRef>
+            </p:style>
+          </p:cxnSp>
+        </p:grpSp>
+        <p:sp>
+          <p:nvSpPr>
+            <p:cNvPr id="25" name="Freeform: Shape 63">
+              <a:extLst>
+                <a:ext uri="{FF2B5EF4-FFF2-40B4-BE49-F238E27FC236}">
+                  <a16:creationId xmlns:a16="http://schemas.microsoft.com/office/drawing/2014/main" id="{B4F0C5B9-A60C-8341-9617-BBA3B715E286}"/>
+                </a:ext>
+              </a:extLst>
+            </p:cNvPr>
+            <p:cNvSpPr/>
+            <p:nvPr/>
+          </p:nvSpPr>
+          <p:spPr>
+            <a:xfrm>
+              <a:off x="2455651" y="359804"/>
+              <a:ext cx="216000" cy="216000"/>
+            </a:xfrm>
+            <a:custGeom>
+              <a:avLst/>
+              <a:gdLst>
+                <a:gd name="connsiteX0" fmla="*/ 0 w 183365"/>
+                <a:gd name="connsiteY0" fmla="*/ 247726 h 247726"/>
+                <a:gd name="connsiteX1" fmla="*/ 0 w 183365"/>
+                <a:gd name="connsiteY1" fmla="*/ 0 h 247726"/>
+                <a:gd name="connsiteX2" fmla="*/ 183365 w 183365"/>
+                <a:gd name="connsiteY2" fmla="*/ 0 h 247726"/>
+              </a:gdLst>
+              <a:ahLst/>
+              <a:cxnLst>
+                <a:cxn ang="0">
+                  <a:pos x="connsiteX0" y="connsiteY0"/>
+                </a:cxn>
+                <a:cxn ang="0">
+                  <a:pos x="connsiteX1" y="connsiteY1"/>
+                </a:cxn>
+                <a:cxn ang="0">
+                  <a:pos x="connsiteX2" y="connsiteY2"/>
+                </a:cxn>
+              </a:cxnLst>
+              <a:rect l="l" t="t" r="r" b="b"/>
+              <a:pathLst>
+                <a:path w="183365" h="247726">
+                  <a:moveTo>
+                    <a:pt x="0" y="247726"/>
+                  </a:moveTo>
+                  <a:lnTo>
+                    <a:pt x="0" y="0"/>
+                  </a:lnTo>
+                  <a:lnTo>
+                    <a:pt x="183365" y="0"/>
+                  </a:lnTo>
+                </a:path>
+              </a:pathLst>
+            </a:custGeom>
+            <a:noFill/>
+            <a:ln w="25400" cap="sq">
+              <a:solidFill>
+                <a:schemeClr val="tx1"/>
+              </a:solidFill>
+              <a:miter lim="800000"/>
+              <a:tailEnd type="arrow" w="lg" len="lg"/>
+            </a:ln>
+          </p:spPr>
+          <p:style>
+            <a:lnRef idx="2">
+              <a:schemeClr val="accent1">
+                <a:shade val="50000"/>
+              </a:schemeClr>
+            </a:lnRef>
+            <a:fillRef idx="1">
+              <a:schemeClr val="accent1"/>
+            </a:fillRef>
+            <a:effectRef idx="0">
+              <a:schemeClr val="accent1"/>
+            </a:effectRef>
+            <a:fontRef idx="minor">
+              <a:schemeClr val="lt1"/>
+            </a:fontRef>
+          </p:style>
+          <p:txBody>
+            <a:bodyPr rtlCol="0" anchor="ctr"/>
+            <a:lstStyle/>
+            <a:p>
+              <a:pPr algn="ctr"/>
+              <a:endParaRPr lang="en-US" dirty="0"/>
+            </a:p>
+          </p:txBody>
+        </p:sp>
+        <p:sp>
+          <p:nvSpPr>
+            <p:cNvPr id="26" name="Oval 73">
+              <a:extLst>
+                <a:ext uri="{FF2B5EF4-FFF2-40B4-BE49-F238E27FC236}">
+                  <a16:creationId xmlns:a16="http://schemas.microsoft.com/office/drawing/2014/main" id="{C9E72277-D432-954B-84DA-71453804A6C7}"/>
+                </a:ext>
+              </a:extLst>
+            </p:cNvPr>
+            <p:cNvSpPr/>
+            <p:nvPr/>
+          </p:nvSpPr>
+          <p:spPr>
+            <a:xfrm>
+              <a:off x="2720873" y="460674"/>
+              <a:ext cx="194161" cy="110121"/>
+            </a:xfrm>
+            <a:custGeom>
+              <a:avLst/>
+              <a:gdLst>
+                <a:gd name="connsiteX0" fmla="*/ 0 w 274320"/>
+                <a:gd name="connsiteY0" fmla="*/ 137160 h 274320"/>
+                <a:gd name="connsiteX1" fmla="*/ 137160 w 274320"/>
+                <a:gd name="connsiteY1" fmla="*/ 0 h 274320"/>
+                <a:gd name="connsiteX2" fmla="*/ 274320 w 274320"/>
+                <a:gd name="connsiteY2" fmla="*/ 137160 h 274320"/>
+                <a:gd name="connsiteX3" fmla="*/ 137160 w 274320"/>
+                <a:gd name="connsiteY3" fmla="*/ 274320 h 274320"/>
+                <a:gd name="connsiteX4" fmla="*/ 0 w 274320"/>
+                <a:gd name="connsiteY4" fmla="*/ 137160 h 274320"/>
+                <a:gd name="connsiteX0" fmla="*/ 0 w 274320"/>
+                <a:gd name="connsiteY0" fmla="*/ 137160 h 154305"/>
+                <a:gd name="connsiteX1" fmla="*/ 137160 w 274320"/>
+                <a:gd name="connsiteY1" fmla="*/ 0 h 154305"/>
+                <a:gd name="connsiteX2" fmla="*/ 274320 w 274320"/>
+                <a:gd name="connsiteY2" fmla="*/ 137160 h 154305"/>
+                <a:gd name="connsiteX3" fmla="*/ 0 w 274320"/>
+                <a:gd name="connsiteY3" fmla="*/ 137160 h 154305"/>
+                <a:gd name="connsiteX0" fmla="*/ 0 w 274320"/>
+                <a:gd name="connsiteY0" fmla="*/ 137160 h 154305"/>
+                <a:gd name="connsiteX1" fmla="*/ 137160 w 274320"/>
+                <a:gd name="connsiteY1" fmla="*/ 0 h 154305"/>
+                <a:gd name="connsiteX2" fmla="*/ 274320 w 274320"/>
+                <a:gd name="connsiteY2" fmla="*/ 137160 h 154305"/>
+                <a:gd name="connsiteX3" fmla="*/ 0 w 274320"/>
+                <a:gd name="connsiteY3" fmla="*/ 137160 h 154305"/>
+                <a:gd name="connsiteX0" fmla="*/ 0 w 274320"/>
+                <a:gd name="connsiteY0" fmla="*/ 137160 h 149233"/>
+                <a:gd name="connsiteX1" fmla="*/ 137160 w 274320"/>
+                <a:gd name="connsiteY1" fmla="*/ 0 h 149233"/>
+                <a:gd name="connsiteX2" fmla="*/ 274320 w 274320"/>
+                <a:gd name="connsiteY2" fmla="*/ 137160 h 149233"/>
+                <a:gd name="connsiteX3" fmla="*/ 0 w 274320"/>
+                <a:gd name="connsiteY3" fmla="*/ 137160 h 149233"/>
+                <a:gd name="connsiteX0" fmla="*/ 0 w 274320"/>
+                <a:gd name="connsiteY0" fmla="*/ 137160 h 149233"/>
+                <a:gd name="connsiteX1" fmla="*/ 137160 w 274320"/>
+                <a:gd name="connsiteY1" fmla="*/ 0 h 149233"/>
+                <a:gd name="connsiteX2" fmla="*/ 274320 w 274320"/>
+                <a:gd name="connsiteY2" fmla="*/ 137160 h 149233"/>
+                <a:gd name="connsiteX3" fmla="*/ 0 w 274320"/>
+                <a:gd name="connsiteY3" fmla="*/ 137160 h 149233"/>
+                <a:gd name="connsiteX0" fmla="*/ 0 w 274320"/>
+                <a:gd name="connsiteY0" fmla="*/ 137160 h 147756"/>
+                <a:gd name="connsiteX1" fmla="*/ 137160 w 274320"/>
+                <a:gd name="connsiteY1" fmla="*/ 0 h 147756"/>
+                <a:gd name="connsiteX2" fmla="*/ 274320 w 274320"/>
+                <a:gd name="connsiteY2" fmla="*/ 137160 h 147756"/>
+                <a:gd name="connsiteX3" fmla="*/ 0 w 274320"/>
+                <a:gd name="connsiteY3" fmla="*/ 137160 h 147756"/>
+                <a:gd name="connsiteX0" fmla="*/ 0 w 274320"/>
+                <a:gd name="connsiteY0" fmla="*/ 137160 h 147756"/>
+                <a:gd name="connsiteX1" fmla="*/ 137160 w 274320"/>
+                <a:gd name="connsiteY1" fmla="*/ 0 h 147756"/>
+                <a:gd name="connsiteX2" fmla="*/ 274320 w 274320"/>
+                <a:gd name="connsiteY2" fmla="*/ 137160 h 147756"/>
+                <a:gd name="connsiteX3" fmla="*/ 0 w 274320"/>
+                <a:gd name="connsiteY3" fmla="*/ 137160 h 147756"/>
+                <a:gd name="connsiteX0" fmla="*/ 0 w 274320"/>
+                <a:gd name="connsiteY0" fmla="*/ 137160 h 138963"/>
+                <a:gd name="connsiteX1" fmla="*/ 137160 w 274320"/>
+                <a:gd name="connsiteY1" fmla="*/ 0 h 138963"/>
+                <a:gd name="connsiteX2" fmla="*/ 274320 w 274320"/>
+                <a:gd name="connsiteY2" fmla="*/ 137160 h 138963"/>
+                <a:gd name="connsiteX3" fmla="*/ 0 w 274320"/>
+                <a:gd name="connsiteY3" fmla="*/ 137160 h 138963"/>
+                <a:gd name="connsiteX0" fmla="*/ 0 w 274320"/>
+                <a:gd name="connsiteY0" fmla="*/ 137160 h 137830"/>
+                <a:gd name="connsiteX1" fmla="*/ 137160 w 274320"/>
+                <a:gd name="connsiteY1" fmla="*/ 0 h 137830"/>
+                <a:gd name="connsiteX2" fmla="*/ 274320 w 274320"/>
+                <a:gd name="connsiteY2" fmla="*/ 137160 h 137830"/>
+                <a:gd name="connsiteX3" fmla="*/ 0 w 274320"/>
+                <a:gd name="connsiteY3" fmla="*/ 137160 h 137830"/>
+                <a:gd name="connsiteX0" fmla="*/ 0 w 274320"/>
+                <a:gd name="connsiteY0" fmla="*/ 137160 h 137160"/>
+                <a:gd name="connsiteX1" fmla="*/ 137160 w 274320"/>
+                <a:gd name="connsiteY1" fmla="*/ 0 h 137160"/>
+                <a:gd name="connsiteX2" fmla="*/ 274320 w 274320"/>
+                <a:gd name="connsiteY2" fmla="*/ 137160 h 137160"/>
+                <a:gd name="connsiteX3" fmla="*/ 0 w 274320"/>
+                <a:gd name="connsiteY3" fmla="*/ 137160 h 137160"/>
+                <a:gd name="connsiteX0" fmla="*/ 0 w 274320"/>
+                <a:gd name="connsiteY0" fmla="*/ 137160 h 137160"/>
+                <a:gd name="connsiteX1" fmla="*/ 137160 w 274320"/>
+                <a:gd name="connsiteY1" fmla="*/ 0 h 137160"/>
+                <a:gd name="connsiteX2" fmla="*/ 274320 w 274320"/>
+                <a:gd name="connsiteY2" fmla="*/ 137160 h 137160"/>
+                <a:gd name="connsiteX3" fmla="*/ 0 w 274320"/>
+                <a:gd name="connsiteY3" fmla="*/ 137160 h 137160"/>
+                <a:gd name="connsiteX0" fmla="*/ 0 w 274320"/>
+                <a:gd name="connsiteY0" fmla="*/ 137160 h 137160"/>
+                <a:gd name="connsiteX1" fmla="*/ 137160 w 274320"/>
+                <a:gd name="connsiteY1" fmla="*/ 0 h 137160"/>
+                <a:gd name="connsiteX2" fmla="*/ 274320 w 274320"/>
+                <a:gd name="connsiteY2" fmla="*/ 137160 h 137160"/>
+                <a:gd name="connsiteX3" fmla="*/ 0 w 274320"/>
+                <a:gd name="connsiteY3" fmla="*/ 137160 h 137160"/>
+                <a:gd name="connsiteX0" fmla="*/ 0 w 274320"/>
+                <a:gd name="connsiteY0" fmla="*/ 137160 h 137160"/>
+                <a:gd name="connsiteX1" fmla="*/ 137160 w 274320"/>
+                <a:gd name="connsiteY1" fmla="*/ 0 h 137160"/>
+                <a:gd name="connsiteX2" fmla="*/ 274320 w 274320"/>
+                <a:gd name="connsiteY2" fmla="*/ 137160 h 137160"/>
+                <a:gd name="connsiteX3" fmla="*/ 0 w 274320"/>
+                <a:gd name="connsiteY3" fmla="*/ 137160 h 137160"/>
+              </a:gdLst>
+              <a:ahLst/>
+              <a:cxnLst>
+                <a:cxn ang="0">
+                  <a:pos x="connsiteX0" y="connsiteY0"/>
+                </a:cxn>
+                <a:cxn ang="0">
+                  <a:pos x="connsiteX1" y="connsiteY1"/>
+                </a:cxn>
+                <a:cxn ang="0">
+                  <a:pos x="connsiteX2" y="connsiteY2"/>
+                </a:cxn>
+                <a:cxn ang="0">
+                  <a:pos x="connsiteX3" y="connsiteY3"/>
+                </a:cxn>
+              </a:cxnLst>
+              <a:rect l="l" t="t" r="r" b="b"/>
+              <a:pathLst>
+                <a:path w="274320" h="137160">
+                  <a:moveTo>
+                    <a:pt x="0" y="137160"/>
+                  </a:moveTo>
+                  <a:cubicBezTo>
+                    <a:pt x="0" y="61409"/>
+                    <a:pt x="61409" y="0"/>
+                    <a:pt x="137160" y="0"/>
+                  </a:cubicBezTo>
+                  <a:cubicBezTo>
+                    <a:pt x="212911" y="0"/>
+                    <a:pt x="274320" y="61409"/>
+                    <a:pt x="274320" y="137160"/>
+                  </a:cubicBezTo>
+                  <a:cubicBezTo>
+                    <a:pt x="-20954" y="137160"/>
+                    <a:pt x="294323" y="136208"/>
+                    <a:pt x="0" y="137160"/>
+                  </a:cubicBezTo>
+                  <a:close/>
+                </a:path>
+              </a:pathLst>
+            </a:custGeom>
+            <a:solidFill>
+              <a:schemeClr val="bg1"/>
+            </a:solidFill>
+            <a:ln w="25400" cap="sq">
+              <a:solidFill>
+                <a:schemeClr val="tx1"/>
+              </a:solidFill>
+              <a:miter lim="800000"/>
+            </a:ln>
+          </p:spPr>
+          <p:style>
+            <a:lnRef idx="2">
+              <a:schemeClr val="accent1">
+                <a:shade val="50000"/>
+              </a:schemeClr>
+            </a:lnRef>
+            <a:fillRef idx="1">
+              <a:schemeClr val="accent1"/>
+            </a:fillRef>
+            <a:effectRef idx="0">
+              <a:schemeClr val="accent1"/>
+            </a:effectRef>
+            <a:fontRef idx="minor">
+              <a:schemeClr val="lt1"/>
+            </a:fontRef>
+          </p:style>
+          <p:txBody>
+            <a:bodyPr rtlCol="0" anchor="ctr"/>
+            <a:lstStyle/>
+            <a:p>
+              <a:pPr algn="ctr"/>
+              <a:endParaRPr lang="en-US"/>
+            </a:p>
+          </p:txBody>
+        </p:sp>
+      </p:grpSp>
+      <p:cxnSp>
+        <p:nvCxnSpPr>
+          <p:cNvPr id="27" name="Straight Connector 26">
+            <a:extLst>
+              <a:ext uri="{FF2B5EF4-FFF2-40B4-BE49-F238E27FC236}">
+                <a16:creationId xmlns:a16="http://schemas.microsoft.com/office/drawing/2014/main" id="{4CCF4FDE-CD8F-5B46-B86E-251E7A70F5DC}"/>
+              </a:ext>
+            </a:extLst>
+          </p:cNvPr>
+          <p:cNvCxnSpPr>
+            <a:cxnSpLocks/>
+            <a:stCxn id="32" idx="0"/>
+          </p:cNvCxnSpPr>
+          <p:nvPr/>
+        </p:nvCxnSpPr>
+        <p:spPr>
+          <a:xfrm>
+            <a:off x="1315901" y="3103179"/>
+            <a:ext cx="3604124" cy="0"/>
+          </a:xfrm>
+          <a:prstGeom prst="line">
+            <a:avLst/>
+          </a:prstGeom>
+          <a:ln w="25400" cap="sq">
+            <a:miter lim="800000"/>
+          </a:ln>
+        </p:spPr>
+        <p:style>
+          <a:lnRef idx="1">
+            <a:schemeClr val="dk1"/>
+          </a:lnRef>
+          <a:fillRef idx="0">
+            <a:schemeClr val="dk1"/>
+          </a:fillRef>
+          <a:effectRef idx="0">
+            <a:schemeClr val="dk1"/>
+          </a:effectRef>
+          <a:fontRef idx="minor">
+            <a:schemeClr val="tx1"/>
+          </a:fontRef>
+        </p:style>
+      </p:cxnSp>
+      <p:sp>
+        <p:nvSpPr>
+          <p:cNvPr id="28" name="Graphic 26">
+            <a:extLst>
+              <a:ext uri="{FF2B5EF4-FFF2-40B4-BE49-F238E27FC236}">
+                <a16:creationId xmlns:a16="http://schemas.microsoft.com/office/drawing/2014/main" id="{01759217-3FB4-BB42-9F73-1DEAC76F65F8}"/>
+              </a:ext>
+            </a:extLst>
+          </p:cNvPr>
+          <p:cNvSpPr/>
+          <p:nvPr/>
+        </p:nvSpPr>
+        <p:spPr>
+          <a:xfrm>
+            <a:off x="1762485" y="2897772"/>
+            <a:ext cx="264160" cy="203200"/>
+          </a:xfrm>
+          <a:custGeom>
+            <a:avLst/>
+            <a:gdLst>
+              <a:gd name="connsiteX0" fmla="*/ 0 w 264160"/>
+              <a:gd name="connsiteY0" fmla="*/ 203200 h 203200"/>
+              <a:gd name="connsiteX1" fmla="*/ 264160 w 264160"/>
+              <a:gd name="connsiteY1" fmla="*/ 203200 h 203200"/>
+              <a:gd name="connsiteX2" fmla="*/ 264160 w 264160"/>
+              <a:gd name="connsiteY2" fmla="*/ 152400 h 203200"/>
+              <a:gd name="connsiteX3" fmla="*/ 132080 w 264160"/>
+              <a:gd name="connsiteY3" fmla="*/ 0 h 203200"/>
+              <a:gd name="connsiteX4" fmla="*/ 0 w 264160"/>
+              <a:gd name="connsiteY4" fmla="*/ 152400 h 203200"/>
+            </a:gdLst>
+            <a:ahLst/>
+            <a:cxnLst>
+              <a:cxn ang="0">
+                <a:pos x="connsiteX0" y="connsiteY0"/>
+              </a:cxn>
+              <a:cxn ang="0">
+                <a:pos x="connsiteX1" y="connsiteY1"/>
+              </a:cxn>
+              <a:cxn ang="0">
+                <a:pos x="connsiteX2" y="connsiteY2"/>
+              </a:cxn>
+              <a:cxn ang="0">
+                <a:pos x="connsiteX3" y="connsiteY3"/>
+              </a:cxn>
+              <a:cxn ang="0">
+                <a:pos x="connsiteX4" y="connsiteY4"/>
+              </a:cxn>
+            </a:cxnLst>
+            <a:rect l="l" t="t" r="r" b="b"/>
+            <a:pathLst>
+              <a:path w="264160" h="203200">
+                <a:moveTo>
+                  <a:pt x="0" y="203200"/>
+                </a:moveTo>
+                <a:lnTo>
+                  <a:pt x="264160" y="203200"/>
+                </a:lnTo>
+                <a:lnTo>
+                  <a:pt x="264160" y="152400"/>
+                </a:lnTo>
+                <a:cubicBezTo>
+                  <a:pt x="264160" y="50800"/>
+                  <a:pt x="203200" y="0"/>
+                  <a:pt x="132080" y="0"/>
+                </a:cubicBezTo>
+                <a:cubicBezTo>
+                  <a:pt x="60960" y="0"/>
+                  <a:pt x="0" y="50800"/>
+                  <a:pt x="0" y="152400"/>
+                </a:cubicBezTo>
+                <a:close/>
+              </a:path>
+            </a:pathLst>
+          </a:custGeom>
+          <a:noFill/>
+          <a:ln w="30480" cap="rnd">
+            <a:solidFill>
+              <a:srgbClr val="000000"/>
+            </a:solidFill>
+            <a:prstDash val="solid"/>
+            <a:round/>
+          </a:ln>
+        </p:spPr>
+        <p:txBody>
+          <a:bodyPr rtlCol="0" anchor="ctr"/>
+          <a:lstStyle/>
+          <a:p>
+            <a:endParaRPr lang="en-US"/>
+          </a:p>
+        </p:txBody>
+      </p:sp>
+      <p:grpSp>
+        <p:nvGrpSpPr>
+          <p:cNvPr id="29" name="Graphic 10">
+            <a:extLst>
+              <a:ext uri="{FF2B5EF4-FFF2-40B4-BE49-F238E27FC236}">
+                <a16:creationId xmlns:a16="http://schemas.microsoft.com/office/drawing/2014/main" id="{68522672-B228-8941-BEAE-298023CFAA84}"/>
+              </a:ext>
+            </a:extLst>
+          </p:cNvPr>
+          <p:cNvGrpSpPr/>
+          <p:nvPr/>
+        </p:nvGrpSpPr>
+        <p:grpSpPr>
+          <a:xfrm>
+            <a:off x="1331935" y="2686078"/>
+            <a:ext cx="457200" cy="457200"/>
+            <a:chOff x="1170968" y="1441938"/>
+            <a:chExt cx="457200" cy="457200"/>
+          </a:xfrm>
+        </p:grpSpPr>
+        <p:sp>
+          <p:nvSpPr>
+            <p:cNvPr id="30" name="Freeform: Shape 88">
+              <a:extLst>
+                <a:ext uri="{FF2B5EF4-FFF2-40B4-BE49-F238E27FC236}">
+                  <a16:creationId xmlns:a16="http://schemas.microsoft.com/office/drawing/2014/main" id="{55749CB1-2E08-4C42-A5A1-A2FD22014AD8}"/>
+                </a:ext>
+              </a:extLst>
+            </p:cNvPr>
+            <p:cNvSpPr/>
+            <p:nvPr/>
+          </p:nvSpPr>
+          <p:spPr>
+            <a:xfrm>
+              <a:off x="1465609" y="1495241"/>
+              <a:ext cx="86360" cy="150706"/>
+            </a:xfrm>
+            <a:custGeom>
+              <a:avLst/>
+              <a:gdLst>
+                <a:gd name="connsiteX0" fmla="*/ 0 w 86360"/>
+                <a:gd name="connsiteY0" fmla="*/ 0 h 150706"/>
+                <a:gd name="connsiteX1" fmla="*/ 86360 w 86360"/>
+                <a:gd name="connsiteY1" fmla="*/ 76200 h 150706"/>
+                <a:gd name="connsiteX2" fmla="*/ 0 w 86360"/>
+                <a:gd name="connsiteY2" fmla="*/ 150706 h 150706"/>
+              </a:gdLst>
+              <a:ahLst/>
+              <a:cxnLst>
+                <a:cxn ang="0">
+                  <a:pos x="connsiteX0" y="connsiteY0"/>
+                </a:cxn>
+                <a:cxn ang="0">
+                  <a:pos x="connsiteX1" y="connsiteY1"/>
+                </a:cxn>
+                <a:cxn ang="0">
+                  <a:pos x="connsiteX2" y="connsiteY2"/>
+                </a:cxn>
+              </a:cxnLst>
+              <a:rect l="l" t="t" r="r" b="b"/>
+              <a:pathLst>
+                <a:path w="86360" h="150706">
+                  <a:moveTo>
+                    <a:pt x="0" y="0"/>
+                  </a:moveTo>
+                  <a:lnTo>
+                    <a:pt x="86360" y="76200"/>
+                  </a:lnTo>
+                  <a:lnTo>
+                    <a:pt x="0" y="150706"/>
+                  </a:lnTo>
+                </a:path>
+              </a:pathLst>
+            </a:custGeom>
+            <a:noFill/>
+            <a:ln w="30480" cap="rnd">
+              <a:solidFill>
+                <a:srgbClr val="000000"/>
+              </a:solidFill>
+              <a:prstDash val="solid"/>
+              <a:round/>
+            </a:ln>
+          </p:spPr>
+          <p:txBody>
+            <a:bodyPr rtlCol="0" anchor="ctr"/>
+            <a:lstStyle/>
+            <a:p>
+              <a:endParaRPr lang="en-US"/>
+            </a:p>
+          </p:txBody>
+        </p:sp>
+        <p:sp>
+          <p:nvSpPr>
+            <p:cNvPr id="31" name="Freeform: Shape 89">
+              <a:extLst>
+                <a:ext uri="{FF2B5EF4-FFF2-40B4-BE49-F238E27FC236}">
+                  <a16:creationId xmlns:a16="http://schemas.microsoft.com/office/drawing/2014/main" id="{C6DE6B5A-4586-A74E-B790-37D5C7720B79}"/>
+                </a:ext>
+              </a:extLst>
+            </p:cNvPr>
+            <p:cNvSpPr/>
+            <p:nvPr/>
+          </p:nvSpPr>
+          <p:spPr>
+            <a:xfrm>
+              <a:off x="1247169" y="1571441"/>
+              <a:ext cx="294639" cy="274319"/>
+            </a:xfrm>
+            <a:custGeom>
+              <a:avLst/>
+              <a:gdLst>
+                <a:gd name="connsiteX0" fmla="*/ 0 w 294639"/>
+                <a:gd name="connsiteY0" fmla="*/ 274320 h 274319"/>
+                <a:gd name="connsiteX1" fmla="*/ 0 w 294639"/>
+                <a:gd name="connsiteY1" fmla="*/ 0 h 274319"/>
+                <a:gd name="connsiteX2" fmla="*/ 294640 w 294639"/>
+                <a:gd name="connsiteY2" fmla="*/ 0 h 274319"/>
+              </a:gdLst>
+              <a:ahLst/>
+              <a:cxnLst>
+                <a:cxn ang="0">
+                  <a:pos x="connsiteX0" y="connsiteY0"/>
+                </a:cxn>
+                <a:cxn ang="0">
+                  <a:pos x="connsiteX1" y="connsiteY1"/>
+                </a:cxn>
+                <a:cxn ang="0">
+                  <a:pos x="connsiteX2" y="connsiteY2"/>
+                </a:cxn>
+              </a:cxnLst>
+              <a:rect l="l" t="t" r="r" b="b"/>
+              <a:pathLst>
+                <a:path w="294639" h="274319">
+                  <a:moveTo>
+                    <a:pt x="0" y="274320"/>
+                  </a:moveTo>
+                  <a:lnTo>
+                    <a:pt x="0" y="0"/>
+                  </a:lnTo>
+                  <a:lnTo>
+                    <a:pt x="294640" y="0"/>
+                  </a:lnTo>
+                </a:path>
+              </a:pathLst>
+            </a:custGeom>
+            <a:noFill/>
+            <a:ln w="30480" cap="rnd">
+              <a:solidFill>
+                <a:srgbClr val="000000"/>
+              </a:solidFill>
+              <a:prstDash val="solid"/>
+              <a:round/>
+            </a:ln>
+          </p:spPr>
+          <p:txBody>
+            <a:bodyPr rtlCol="0" anchor="ctr"/>
+            <a:lstStyle/>
+            <a:p>
+              <a:endParaRPr lang="en-US"/>
+            </a:p>
+          </p:txBody>
+        </p:sp>
+      </p:grpSp>
+      <p:sp>
+        <p:nvSpPr>
+          <p:cNvPr id="32" name="Graphic 18">
+            <a:extLst>
+              <a:ext uri="{FF2B5EF4-FFF2-40B4-BE49-F238E27FC236}">
+                <a16:creationId xmlns:a16="http://schemas.microsoft.com/office/drawing/2014/main" id="{3996557A-C211-CD4A-9309-C5F78C4F7688}"/>
+              </a:ext>
+            </a:extLst>
+          </p:cNvPr>
+          <p:cNvSpPr/>
+          <p:nvPr/>
+        </p:nvSpPr>
+        <p:spPr>
+          <a:xfrm>
+            <a:off x="1051830" y="3103549"/>
+            <a:ext cx="265070" cy="157957"/>
+          </a:xfrm>
+          <a:custGeom>
+            <a:avLst/>
+            <a:gdLst>
+              <a:gd name="connsiteX0" fmla="*/ 264071 w 265070"/>
+              <a:gd name="connsiteY0" fmla="*/ -370 h 157957"/>
+              <a:gd name="connsiteX1" fmla="*/ 31681 w 265070"/>
+              <a:gd name="connsiteY1" fmla="*/ 48652 h 157957"/>
+              <a:gd name="connsiteX2" fmla="*/ 264975 w 265070"/>
+              <a:gd name="connsiteY2" fmla="*/ 121276 h 157957"/>
+              <a:gd name="connsiteX3" fmla="*/ -95 w 265070"/>
+              <a:gd name="connsiteY3" fmla="*/ 157588 h 157957"/>
+            </a:gdLst>
+            <a:ahLst/>
+            <a:cxnLst>
+              <a:cxn ang="0">
+                <a:pos x="connsiteX0" y="connsiteY0"/>
+              </a:cxn>
+              <a:cxn ang="0">
+                <a:pos x="connsiteX1" y="connsiteY1"/>
+              </a:cxn>
+              <a:cxn ang="0">
+                <a:pos x="connsiteX2" y="connsiteY2"/>
+              </a:cxn>
+              <a:cxn ang="0">
+                <a:pos x="connsiteX3" y="connsiteY3"/>
+              </a:cxn>
+            </a:cxnLst>
+            <a:rect l="l" t="t" r="r" b="b"/>
+            <a:pathLst>
+              <a:path w="265070" h="157957">
+                <a:moveTo>
+                  <a:pt x="264071" y="-370"/>
+                </a:moveTo>
+                <a:cubicBezTo>
+                  <a:pt x="264071" y="-370"/>
+                  <a:pt x="32585" y="18691"/>
+                  <a:pt x="31681" y="48652"/>
+                </a:cubicBezTo>
+                <a:cubicBezTo>
+                  <a:pt x="30767" y="78604"/>
+                  <a:pt x="264975" y="85868"/>
+                  <a:pt x="264975" y="121276"/>
+                </a:cubicBezTo>
+                <a:cubicBezTo>
+                  <a:pt x="264975" y="156673"/>
+                  <a:pt x="-95" y="157588"/>
+                  <a:pt x="-95" y="157588"/>
+                </a:cubicBezTo>
+              </a:path>
+            </a:pathLst>
+          </a:custGeom>
+          <a:noFill/>
+          <a:ln w="25400" cap="rnd">
+            <a:solidFill>
+              <a:srgbClr val="000000"/>
+            </a:solidFill>
+            <a:prstDash val="solid"/>
+            <a:round/>
+          </a:ln>
+        </p:spPr>
+        <p:txBody>
+          <a:bodyPr rtlCol="0" anchor="ctr"/>
+          <a:lstStyle/>
+          <a:p>
+            <a:endParaRPr lang="en-US"/>
+          </a:p>
+        </p:txBody>
+      </p:sp>
+      <p:sp>
+        <p:nvSpPr>
+          <p:cNvPr id="33" name="Graphic 33">
+            <a:extLst>
+              <a:ext uri="{FF2B5EF4-FFF2-40B4-BE49-F238E27FC236}">
+                <a16:creationId xmlns:a16="http://schemas.microsoft.com/office/drawing/2014/main" id="{AE22594F-01AF-764F-92A4-42FBD90F1B02}"/>
+              </a:ext>
+            </a:extLst>
+          </p:cNvPr>
+          <p:cNvSpPr/>
+          <p:nvPr/>
+        </p:nvSpPr>
+        <p:spPr>
+          <a:xfrm>
+            <a:off x="2158513" y="2987718"/>
+            <a:ext cx="350393" cy="231660"/>
+          </a:xfrm>
+          <a:custGeom>
+            <a:avLst/>
+            <a:gdLst>
+              <a:gd name="connsiteX0" fmla="*/ 0 w 350393"/>
+              <a:gd name="connsiteY0" fmla="*/ 231660 h 231660"/>
+              <a:gd name="connsiteX1" fmla="*/ 239890 w 350393"/>
+              <a:gd name="connsiteY1" fmla="*/ 231660 h 231660"/>
+              <a:gd name="connsiteX2" fmla="*/ 350394 w 350393"/>
+              <a:gd name="connsiteY2" fmla="*/ 115830 h 231660"/>
+              <a:gd name="connsiteX3" fmla="*/ 239890 w 350393"/>
+              <a:gd name="connsiteY3" fmla="*/ 0 h 231660"/>
+              <a:gd name="connsiteX4" fmla="*/ 0 w 350393"/>
+              <a:gd name="connsiteY4" fmla="*/ 0 h 231660"/>
+            </a:gdLst>
+            <a:ahLst/>
+            <a:cxnLst>
+              <a:cxn ang="0">
+                <a:pos x="connsiteX0" y="connsiteY0"/>
+              </a:cxn>
+              <a:cxn ang="0">
+                <a:pos x="connsiteX1" y="connsiteY1"/>
+              </a:cxn>
+              <a:cxn ang="0">
+                <a:pos x="connsiteX2" y="connsiteY2"/>
+              </a:cxn>
+              <a:cxn ang="0">
+                <a:pos x="connsiteX3" y="connsiteY3"/>
+              </a:cxn>
+              <a:cxn ang="0">
+                <a:pos x="connsiteX4" y="connsiteY4"/>
+              </a:cxn>
+            </a:cxnLst>
+            <a:rect l="l" t="t" r="r" b="b"/>
+            <a:pathLst>
+              <a:path w="350393" h="231660">
+                <a:moveTo>
+                  <a:pt x="0" y="231660"/>
+                </a:moveTo>
+                <a:lnTo>
+                  <a:pt x="239890" y="231660"/>
+                </a:lnTo>
+                <a:lnTo>
+                  <a:pt x="350394" y="115830"/>
+                </a:lnTo>
+                <a:lnTo>
+                  <a:pt x="239890" y="0"/>
+                </a:lnTo>
+                <a:lnTo>
+                  <a:pt x="0" y="0"/>
+                </a:lnTo>
+                <a:close/>
+              </a:path>
+            </a:pathLst>
+          </a:custGeom>
+          <a:solidFill>
+            <a:schemeClr val="bg1"/>
+          </a:solidFill>
+          <a:ln w="30434" cap="rnd">
+            <a:solidFill>
+              <a:srgbClr val="000000"/>
+            </a:solidFill>
+            <a:prstDash val="solid"/>
+            <a:round/>
+          </a:ln>
+        </p:spPr>
+        <p:txBody>
+          <a:bodyPr rtlCol="0" anchor="ctr"/>
+          <a:lstStyle/>
+          <a:p>
+            <a:endParaRPr lang="en-US"/>
+          </a:p>
+        </p:txBody>
+      </p:sp>
+      <p:grpSp>
+        <p:nvGrpSpPr>
+          <p:cNvPr id="34" name="Graphic 36">
+            <a:extLst>
+              <a:ext uri="{FF2B5EF4-FFF2-40B4-BE49-F238E27FC236}">
+                <a16:creationId xmlns:a16="http://schemas.microsoft.com/office/drawing/2014/main" id="{DB19D53F-EC04-E64B-A509-2D81DC0E2E9C}"/>
+              </a:ext>
+            </a:extLst>
+          </p:cNvPr>
+          <p:cNvGrpSpPr/>
+          <p:nvPr/>
+        </p:nvGrpSpPr>
+        <p:grpSpPr>
+          <a:xfrm>
+            <a:off x="2489754" y="2847022"/>
+            <a:ext cx="459666" cy="281392"/>
+            <a:chOff x="2337992" y="1583545"/>
+            <a:chExt cx="459666" cy="281392"/>
+          </a:xfrm>
+        </p:grpSpPr>
+        <p:sp>
+          <p:nvSpPr>
+            <p:cNvPr id="35" name="Freeform: Shape 93">
+              <a:extLst>
+                <a:ext uri="{FF2B5EF4-FFF2-40B4-BE49-F238E27FC236}">
+                  <a16:creationId xmlns:a16="http://schemas.microsoft.com/office/drawing/2014/main" id="{19A2789F-0D0C-5B44-ADFF-E867D01B5E20}"/>
+                </a:ext>
+              </a:extLst>
+            </p:cNvPr>
+            <p:cNvSpPr/>
+            <p:nvPr/>
+          </p:nvSpPr>
+          <p:spPr>
+            <a:xfrm>
+              <a:off x="2567354" y="1593705"/>
+              <a:ext cx="10160" cy="243839"/>
+            </a:xfrm>
+            <a:custGeom>
+              <a:avLst/>
+              <a:gdLst>
+                <a:gd name="connsiteX0" fmla="*/ 0 w 10160"/>
+                <a:gd name="connsiteY0" fmla="*/ 243840 h 243839"/>
+                <a:gd name="connsiteX1" fmla="*/ 0 w 10160"/>
+                <a:gd name="connsiteY1" fmla="*/ 0 h 243839"/>
+              </a:gdLst>
+              <a:ahLst/>
+              <a:cxnLst>
+                <a:cxn ang="0">
+                  <a:pos x="connsiteX0" y="connsiteY0"/>
+                </a:cxn>
+                <a:cxn ang="0">
+                  <a:pos x="connsiteX1" y="connsiteY1"/>
+                </a:cxn>
+              </a:cxnLst>
+              <a:rect l="l" t="t" r="r" b="b"/>
+              <a:pathLst>
+                <a:path w="10160" h="243839">
+                  <a:moveTo>
+                    <a:pt x="0" y="243840"/>
+                  </a:moveTo>
+                  <a:lnTo>
+                    <a:pt x="0" y="0"/>
+                  </a:lnTo>
+                </a:path>
+              </a:pathLst>
+            </a:custGeom>
+            <a:noFill/>
+            <a:ln w="30480" cap="rnd">
+              <a:solidFill>
+                <a:srgbClr val="000000"/>
+              </a:solidFill>
+              <a:prstDash val="solid"/>
+              <a:round/>
+            </a:ln>
+          </p:spPr>
+          <p:txBody>
+            <a:bodyPr rtlCol="0" anchor="ctr"/>
+            <a:lstStyle/>
+            <a:p>
+              <a:endParaRPr lang="en-US"/>
+            </a:p>
+          </p:txBody>
+        </p:sp>
+        <p:sp>
+          <p:nvSpPr>
+            <p:cNvPr id="36" name="Freeform: Shape 94">
+              <a:extLst>
+                <a:ext uri="{FF2B5EF4-FFF2-40B4-BE49-F238E27FC236}">
+                  <a16:creationId xmlns:a16="http://schemas.microsoft.com/office/drawing/2014/main" id="{1348842F-ACF0-2544-AE6B-50A4A50B9D2F}"/>
+                </a:ext>
+              </a:extLst>
+            </p:cNvPr>
+            <p:cNvSpPr/>
+            <p:nvPr/>
+          </p:nvSpPr>
+          <p:spPr>
+            <a:xfrm>
+              <a:off x="2414954" y="1583545"/>
+              <a:ext cx="304800" cy="10160"/>
+            </a:xfrm>
+            <a:custGeom>
+              <a:avLst/>
+              <a:gdLst>
+                <a:gd name="connsiteX0" fmla="*/ 0 w 304800"/>
+                <a:gd name="connsiteY0" fmla="*/ 0 h 10160"/>
+                <a:gd name="connsiteX1" fmla="*/ 304800 w 304800"/>
+                <a:gd name="connsiteY1" fmla="*/ 0 h 10160"/>
+              </a:gdLst>
+              <a:ahLst/>
+              <a:cxnLst>
+                <a:cxn ang="0">
+                  <a:pos x="connsiteX0" y="connsiteY0"/>
+                </a:cxn>
+                <a:cxn ang="0">
+                  <a:pos x="connsiteX1" y="connsiteY1"/>
+                </a:cxn>
+              </a:cxnLst>
+              <a:rect l="l" t="t" r="r" b="b"/>
+              <a:pathLst>
+                <a:path w="304800" h="10160">
+                  <a:moveTo>
+                    <a:pt x="0" y="0"/>
+                  </a:moveTo>
+                  <a:lnTo>
+                    <a:pt x="304800" y="0"/>
+                  </a:lnTo>
+                </a:path>
+              </a:pathLst>
+            </a:custGeom>
+            <a:noFill/>
+            <a:ln w="30480" cap="rnd">
+              <a:solidFill>
+                <a:srgbClr val="000000"/>
+              </a:solidFill>
+              <a:prstDash val="solid"/>
+              <a:round/>
+            </a:ln>
+          </p:spPr>
+          <p:txBody>
+            <a:bodyPr rtlCol="0" anchor="ctr"/>
+            <a:lstStyle/>
+            <a:p>
+              <a:endParaRPr lang="en-US"/>
+            </a:p>
+          </p:txBody>
+        </p:sp>
+        <p:sp>
+          <p:nvSpPr>
+            <p:cNvPr id="37" name="Freeform: Shape 95">
+              <a:extLst>
+                <a:ext uri="{FF2B5EF4-FFF2-40B4-BE49-F238E27FC236}">
+                  <a16:creationId xmlns:a16="http://schemas.microsoft.com/office/drawing/2014/main" id="{C9B4754B-C4B4-8841-B9A4-76AFD440C95B}"/>
+                </a:ext>
+              </a:extLst>
+            </p:cNvPr>
+            <p:cNvSpPr/>
+            <p:nvPr/>
+          </p:nvSpPr>
+          <p:spPr>
+            <a:xfrm>
+              <a:off x="2337992" y="1854777"/>
+              <a:ext cx="459666" cy="10160"/>
+            </a:xfrm>
+            <a:custGeom>
+              <a:avLst/>
+              <a:gdLst>
+                <a:gd name="connsiteX0" fmla="*/ 0 w 459666"/>
+                <a:gd name="connsiteY0" fmla="*/ 0 h 10160"/>
+                <a:gd name="connsiteX1" fmla="*/ 459667 w 459666"/>
+                <a:gd name="connsiteY1" fmla="*/ 0 h 10160"/>
+              </a:gdLst>
+              <a:ahLst/>
+              <a:cxnLst>
+                <a:cxn ang="0">
+                  <a:pos x="connsiteX0" y="connsiteY0"/>
+                </a:cxn>
+                <a:cxn ang="0">
+                  <a:pos x="connsiteX1" y="connsiteY1"/>
+                </a:cxn>
+              </a:cxnLst>
+              <a:rect l="l" t="t" r="r" b="b"/>
+              <a:pathLst>
+                <a:path w="459666" h="10160">
+                  <a:moveTo>
+                    <a:pt x="0" y="0"/>
+                  </a:moveTo>
+                  <a:cubicBezTo>
+                    <a:pt x="459667" y="0"/>
+                    <a:pt x="459667" y="0"/>
+                    <a:pt x="459667" y="0"/>
+                  </a:cubicBezTo>
+                </a:path>
+              </a:pathLst>
+            </a:custGeom>
+            <a:noFill/>
+            <a:ln w="5080" cap="rnd">
+              <a:solidFill>
+                <a:srgbClr val="999999">
+                  <a:alpha val="50000"/>
+                </a:srgbClr>
+              </a:solidFill>
+              <a:custDash>
+                <a:ds d="75000" sp="37500"/>
+              </a:custDash>
+              <a:round/>
+            </a:ln>
+          </p:spPr>
+          <p:txBody>
+            <a:bodyPr rtlCol="0" anchor="ctr"/>
+            <a:lstStyle/>
+            <a:p>
+              <a:endParaRPr lang="en-US"/>
+            </a:p>
+          </p:txBody>
+        </p:sp>
+      </p:grpSp>
+      <p:grpSp>
+        <p:nvGrpSpPr>
+          <p:cNvPr id="38" name="Group 37">
+            <a:extLst>
+              <a:ext uri="{FF2B5EF4-FFF2-40B4-BE49-F238E27FC236}">
+                <a16:creationId xmlns:a16="http://schemas.microsoft.com/office/drawing/2014/main" id="{C10C2692-CC0B-2D47-B010-B0ABD5367F02}"/>
+              </a:ext>
+            </a:extLst>
+          </p:cNvPr>
+          <p:cNvGrpSpPr/>
+          <p:nvPr/>
+        </p:nvGrpSpPr>
+        <p:grpSpPr>
+          <a:xfrm>
+            <a:off x="2917720" y="3018685"/>
+            <a:ext cx="169725" cy="169725"/>
+            <a:chOff x="3540943" y="4902079"/>
+            <a:chExt cx="147594" cy="147594"/>
+          </a:xfrm>
+        </p:grpSpPr>
+        <p:sp>
+          <p:nvSpPr>
+            <p:cNvPr id="39" name="Oval 38">
+              <a:extLst>
+                <a:ext uri="{FF2B5EF4-FFF2-40B4-BE49-F238E27FC236}">
+                  <a16:creationId xmlns:a16="http://schemas.microsoft.com/office/drawing/2014/main" id="{0509BA28-9C57-4E4F-9488-69468E012AFF}"/>
+                </a:ext>
+              </a:extLst>
+            </p:cNvPr>
+            <p:cNvSpPr/>
+            <p:nvPr/>
+          </p:nvSpPr>
+          <p:spPr>
+            <a:xfrm>
+              <a:off x="3540943" y="4902079"/>
+              <a:ext cx="147594" cy="147594"/>
+            </a:xfrm>
+            <a:prstGeom prst="ellipse">
+              <a:avLst/>
+            </a:prstGeom>
+            <a:solidFill>
+              <a:schemeClr val="bg1"/>
+            </a:solidFill>
+            <a:ln w="25400" cap="sq">
+              <a:solidFill>
+                <a:schemeClr val="tx1"/>
+              </a:solidFill>
+              <a:miter lim="800000"/>
+            </a:ln>
+          </p:spPr>
+          <p:style>
+            <a:lnRef idx="2">
+              <a:schemeClr val="accent1">
+                <a:shade val="50000"/>
+              </a:schemeClr>
+            </a:lnRef>
+            <a:fillRef idx="1">
+              <a:schemeClr val="accent1"/>
+            </a:fillRef>
+            <a:effectRef idx="0">
+              <a:schemeClr val="accent1"/>
+            </a:effectRef>
+            <a:fontRef idx="minor">
+              <a:schemeClr val="lt1"/>
+            </a:fontRef>
+          </p:style>
+          <p:txBody>
+            <a:bodyPr rtlCol="0" anchor="ctr"/>
+            <a:lstStyle/>
+            <a:p>
+              <a:pPr algn="ctr"/>
+              <a:endParaRPr lang="en-US"/>
+            </a:p>
+          </p:txBody>
+        </p:sp>
+        <p:cxnSp>
+          <p:nvCxnSpPr>
+            <p:cNvPr id="40" name="Straight Connector 39">
+              <a:extLst>
+                <a:ext uri="{FF2B5EF4-FFF2-40B4-BE49-F238E27FC236}">
+                  <a16:creationId xmlns:a16="http://schemas.microsoft.com/office/drawing/2014/main" id="{E675856A-B494-1F49-9A86-364562CE6924}"/>
+                </a:ext>
+              </a:extLst>
+            </p:cNvPr>
+            <p:cNvCxnSpPr>
+              <a:cxnSpLocks/>
+              <a:stCxn id="39" idx="1"/>
+              <a:endCxn id="39" idx="5"/>
+            </p:cNvCxnSpPr>
+            <p:nvPr/>
+          </p:nvCxnSpPr>
+          <p:spPr>
+            <a:xfrm>
+              <a:off x="3562558" y="4923694"/>
+              <a:ext cx="104364" cy="104364"/>
+            </a:xfrm>
+            <a:prstGeom prst="line">
+              <a:avLst/>
+            </a:prstGeom>
+            <a:ln w="25400" cap="sq">
+              <a:solidFill>
+                <a:schemeClr val="tx1"/>
+              </a:solidFill>
+              <a:miter lim="800000"/>
+            </a:ln>
+          </p:spPr>
+          <p:style>
+            <a:lnRef idx="1">
+              <a:schemeClr val="accent1"/>
+            </a:lnRef>
+            <a:fillRef idx="0">
+              <a:schemeClr val="accent1"/>
+            </a:fillRef>
+            <a:effectRef idx="0">
+              <a:schemeClr val="accent1"/>
+            </a:effectRef>
+            <a:fontRef idx="minor">
+              <a:schemeClr val="tx1"/>
+            </a:fontRef>
+          </p:style>
+        </p:cxnSp>
+        <p:cxnSp>
+          <p:nvCxnSpPr>
+            <p:cNvPr id="41" name="Straight Connector 40">
+              <a:extLst>
+                <a:ext uri="{FF2B5EF4-FFF2-40B4-BE49-F238E27FC236}">
+                  <a16:creationId xmlns:a16="http://schemas.microsoft.com/office/drawing/2014/main" id="{10F1EC6D-C2AF-8B4C-8F58-2BE3069B7945}"/>
+                </a:ext>
+              </a:extLst>
+            </p:cNvPr>
+            <p:cNvCxnSpPr>
+              <a:cxnSpLocks/>
+              <a:stCxn id="39" idx="3"/>
+              <a:endCxn id="39" idx="7"/>
+            </p:cNvCxnSpPr>
+            <p:nvPr/>
+          </p:nvCxnSpPr>
+          <p:spPr>
+            <a:xfrm flipV="1">
+              <a:off x="3562558" y="4923694"/>
+              <a:ext cx="104364" cy="104364"/>
+            </a:xfrm>
+            <a:prstGeom prst="line">
+              <a:avLst/>
+            </a:prstGeom>
+            <a:ln w="25400" cap="sq">
+              <a:solidFill>
+                <a:schemeClr val="tx1"/>
+              </a:solidFill>
+              <a:miter lim="800000"/>
+            </a:ln>
+          </p:spPr>
+          <p:style>
+            <a:lnRef idx="1">
+              <a:schemeClr val="accent1"/>
+            </a:lnRef>
+            <a:fillRef idx="0">
+              <a:schemeClr val="accent1"/>
+            </a:fillRef>
+            <a:effectRef idx="0">
+              <a:schemeClr val="accent1"/>
+            </a:effectRef>
+            <a:fontRef idx="minor">
+              <a:schemeClr val="tx1"/>
+            </a:fontRef>
+          </p:style>
+        </p:cxnSp>
+      </p:grpSp>
+      <p:grpSp>
+        <p:nvGrpSpPr>
+          <p:cNvPr id="42" name="Graphic 52">
+            <a:extLst>
+              <a:ext uri="{FF2B5EF4-FFF2-40B4-BE49-F238E27FC236}">
+                <a16:creationId xmlns:a16="http://schemas.microsoft.com/office/drawing/2014/main" id="{8B3F1F05-126C-9040-9F22-9CB16A87742B}"/>
+              </a:ext>
+            </a:extLst>
+          </p:cNvPr>
+          <p:cNvGrpSpPr/>
+          <p:nvPr/>
+        </p:nvGrpSpPr>
+        <p:grpSpPr>
+          <a:xfrm>
+            <a:off x="3005161" y="2697210"/>
+            <a:ext cx="457200" cy="457200"/>
+            <a:chOff x="2893429" y="1444630"/>
+            <a:chExt cx="457200" cy="457200"/>
+          </a:xfrm>
+        </p:grpSpPr>
+        <p:sp>
+          <p:nvSpPr>
+            <p:cNvPr id="43" name="Freeform: Shape 101">
+              <a:extLst>
+                <a:ext uri="{FF2B5EF4-FFF2-40B4-BE49-F238E27FC236}">
+                  <a16:creationId xmlns:a16="http://schemas.microsoft.com/office/drawing/2014/main" id="{C699E7B3-314F-EB47-BB13-6D26490BC67D}"/>
+                </a:ext>
+              </a:extLst>
+            </p:cNvPr>
+            <p:cNvSpPr/>
+            <p:nvPr/>
+          </p:nvSpPr>
+          <p:spPr>
+            <a:xfrm>
+              <a:off x="3040749" y="1500478"/>
+              <a:ext cx="162560" cy="162560"/>
+            </a:xfrm>
+            <a:custGeom>
+              <a:avLst/>
+              <a:gdLst>
+                <a:gd name="connsiteX0" fmla="*/ 0 w 162560"/>
+                <a:gd name="connsiteY0" fmla="*/ 0 h 162560"/>
+                <a:gd name="connsiteX1" fmla="*/ 162560 w 162560"/>
+                <a:gd name="connsiteY1" fmla="*/ 162560 h 162560"/>
+              </a:gdLst>
+              <a:ahLst/>
+              <a:cxnLst>
+                <a:cxn ang="0">
+                  <a:pos x="connsiteX0" y="connsiteY0"/>
+                </a:cxn>
+                <a:cxn ang="0">
+                  <a:pos x="connsiteX1" y="connsiteY1"/>
+                </a:cxn>
+              </a:cxnLst>
+              <a:rect l="l" t="t" r="r" b="b"/>
+              <a:pathLst>
+                <a:path w="162560" h="162560">
+                  <a:moveTo>
+                    <a:pt x="0" y="0"/>
+                  </a:moveTo>
+                  <a:lnTo>
+                    <a:pt x="162560" y="162560"/>
+                  </a:lnTo>
+                </a:path>
+              </a:pathLst>
+            </a:custGeom>
+            <a:noFill/>
+            <a:ln w="30480" cap="rnd">
+              <a:solidFill>
+                <a:srgbClr val="000000"/>
+              </a:solidFill>
+              <a:prstDash val="solid"/>
+              <a:round/>
+            </a:ln>
+          </p:spPr>
+          <p:txBody>
+            <a:bodyPr rtlCol="0" anchor="ctr"/>
+            <a:lstStyle/>
+            <a:p>
+              <a:endParaRPr lang="en-US"/>
+            </a:p>
+          </p:txBody>
+        </p:sp>
+        <p:sp>
+          <p:nvSpPr>
+            <p:cNvPr id="44" name="Freeform: Shape 102">
+              <a:extLst>
+                <a:ext uri="{FF2B5EF4-FFF2-40B4-BE49-F238E27FC236}">
+                  <a16:creationId xmlns:a16="http://schemas.microsoft.com/office/drawing/2014/main" id="{AF7B3740-E843-F349-8415-FCDB3A618A94}"/>
+                </a:ext>
+              </a:extLst>
+            </p:cNvPr>
+            <p:cNvSpPr/>
+            <p:nvPr/>
+          </p:nvSpPr>
+          <p:spPr>
+            <a:xfrm>
+              <a:off x="3040749" y="1500478"/>
+              <a:ext cx="162560" cy="162560"/>
+            </a:xfrm>
+            <a:custGeom>
+              <a:avLst/>
+              <a:gdLst>
+                <a:gd name="connsiteX0" fmla="*/ 162560 w 162560"/>
+                <a:gd name="connsiteY0" fmla="*/ 0 h 162560"/>
+                <a:gd name="connsiteX1" fmla="*/ 0 w 162560"/>
+                <a:gd name="connsiteY1" fmla="*/ 162560 h 162560"/>
+              </a:gdLst>
+              <a:ahLst/>
+              <a:cxnLst>
+                <a:cxn ang="0">
+                  <a:pos x="connsiteX0" y="connsiteY0"/>
+                </a:cxn>
+                <a:cxn ang="0">
+                  <a:pos x="connsiteX1" y="connsiteY1"/>
+                </a:cxn>
+              </a:cxnLst>
+              <a:rect l="l" t="t" r="r" b="b"/>
+              <a:pathLst>
+                <a:path w="162560" h="162560">
+                  <a:moveTo>
+                    <a:pt x="162560" y="0"/>
+                  </a:moveTo>
+                  <a:lnTo>
+                    <a:pt x="0" y="162560"/>
+                  </a:lnTo>
+                </a:path>
+              </a:pathLst>
+            </a:custGeom>
+            <a:noFill/>
+            <a:ln w="30480" cap="rnd">
+              <a:solidFill>
+                <a:srgbClr val="000000"/>
+              </a:solidFill>
+              <a:prstDash val="solid"/>
+              <a:round/>
+            </a:ln>
+          </p:spPr>
+          <p:txBody>
+            <a:bodyPr rtlCol="0" anchor="ctr"/>
+            <a:lstStyle/>
+            <a:p>
+              <a:endParaRPr lang="en-US"/>
+            </a:p>
+          </p:txBody>
+        </p:sp>
+        <p:grpSp>
+          <p:nvGrpSpPr>
+            <p:cNvPr id="45" name="Graphic 52">
+              <a:extLst>
+                <a:ext uri="{FF2B5EF4-FFF2-40B4-BE49-F238E27FC236}">
+                  <a16:creationId xmlns:a16="http://schemas.microsoft.com/office/drawing/2014/main" id="{2A893760-9658-D84F-B263-DE512E4DD6D5}"/>
+                </a:ext>
+              </a:extLst>
+            </p:cNvPr>
+            <p:cNvGrpSpPr/>
+            <p:nvPr/>
+          </p:nvGrpSpPr>
+          <p:grpSpPr>
+            <a:xfrm>
+              <a:off x="3111539" y="1578563"/>
+              <a:ext cx="26534" cy="269830"/>
+              <a:chOff x="3111539" y="1578563"/>
+              <a:chExt cx="26534" cy="269830"/>
+            </a:xfrm>
+            <a:noFill/>
+          </p:grpSpPr>
+          <p:sp>
+            <p:nvSpPr>
+              <p:cNvPr id="46" name="Freeform: Shape 104">
+                <a:extLst>
+                  <a:ext uri="{FF2B5EF4-FFF2-40B4-BE49-F238E27FC236}">
+                    <a16:creationId xmlns:a16="http://schemas.microsoft.com/office/drawing/2014/main" id="{39D9C19F-FACB-5544-A3C9-5295EB365365}"/>
+                  </a:ext>
+                </a:extLst>
+              </p:cNvPr>
+              <p:cNvSpPr/>
+              <p:nvPr/>
+            </p:nvSpPr>
+            <p:spPr>
+              <a:xfrm>
+                <a:off x="3111539" y="1668764"/>
+                <a:ext cx="24922" cy="90093"/>
+              </a:xfrm>
+              <a:custGeom>
+                <a:avLst/>
+                <a:gdLst>
+                  <a:gd name="connsiteX0" fmla="*/ 12059 w 24922"/>
+                  <a:gd name="connsiteY0" fmla="*/ 90094 h 90093"/>
+                  <a:gd name="connsiteX1" fmla="*/ 12059 w 24922"/>
+                  <a:gd name="connsiteY1" fmla="*/ 1 h 90093"/>
+                </a:gdLst>
+                <a:ahLst/>
+                <a:cxnLst>
+                  <a:cxn ang="0">
+                    <a:pos x="connsiteX0" y="connsiteY0"/>
+                  </a:cxn>
+                  <a:cxn ang="0">
+                    <a:pos x="connsiteX1" y="connsiteY1"/>
+                  </a:cxn>
+                </a:cxnLst>
+                <a:rect l="l" t="t" r="r" b="b"/>
+                <a:pathLst>
+                  <a:path w="24922" h="90093">
+                    <a:moveTo>
+                      <a:pt x="12059" y="90094"/>
+                    </a:moveTo>
+                    <a:cubicBezTo>
+                      <a:pt x="56024" y="41305"/>
+                      <a:pt x="-30296" y="42357"/>
+                      <a:pt x="12059" y="1"/>
+                    </a:cubicBezTo>
+                  </a:path>
+                </a:pathLst>
+              </a:custGeom>
+              <a:noFill/>
+              <a:ln w="30480" cap="rnd">
+                <a:solidFill>
+                  <a:srgbClr val="000000"/>
+                </a:solidFill>
+                <a:prstDash val="solid"/>
+                <a:round/>
+              </a:ln>
+            </p:spPr>
+            <p:txBody>
+              <a:bodyPr rtlCol="0" anchor="ctr"/>
+              <a:lstStyle/>
+              <a:p>
+                <a:endParaRPr lang="en-US"/>
+              </a:p>
+            </p:txBody>
+          </p:sp>
+          <p:sp>
+            <p:nvSpPr>
+              <p:cNvPr id="47" name="Freeform: Shape 105">
+                <a:extLst>
+                  <a:ext uri="{FF2B5EF4-FFF2-40B4-BE49-F238E27FC236}">
+                    <a16:creationId xmlns:a16="http://schemas.microsoft.com/office/drawing/2014/main" id="{D34D84D6-CC1F-004E-942E-EFE8F4BB7420}"/>
+                  </a:ext>
+                </a:extLst>
+              </p:cNvPr>
+              <p:cNvSpPr/>
+              <p:nvPr/>
+            </p:nvSpPr>
+            <p:spPr>
+              <a:xfrm>
+                <a:off x="3112075" y="1758300"/>
+                <a:ext cx="24922" cy="90092"/>
+              </a:xfrm>
+              <a:custGeom>
+                <a:avLst/>
+                <a:gdLst>
+                  <a:gd name="connsiteX0" fmla="*/ 12059 w 24922"/>
+                  <a:gd name="connsiteY0" fmla="*/ 90093 h 90092"/>
+                  <a:gd name="connsiteX1" fmla="*/ 12059 w 24922"/>
+                  <a:gd name="connsiteY1" fmla="*/ 1 h 90092"/>
+                </a:gdLst>
+                <a:ahLst/>
+                <a:cxnLst>
+                  <a:cxn ang="0">
+                    <a:pos x="connsiteX0" y="connsiteY0"/>
+                  </a:cxn>
+                  <a:cxn ang="0">
+                    <a:pos x="connsiteX1" y="connsiteY1"/>
+                  </a:cxn>
+                </a:cxnLst>
+                <a:rect l="l" t="t" r="r" b="b"/>
+                <a:pathLst>
+                  <a:path w="24922" h="90092">
+                    <a:moveTo>
+                      <a:pt x="12059" y="90093"/>
+                    </a:moveTo>
+                    <a:cubicBezTo>
+                      <a:pt x="56023" y="41305"/>
+                      <a:pt x="-30296" y="42356"/>
+                      <a:pt x="12059" y="1"/>
+                    </a:cubicBezTo>
+                  </a:path>
+                </a:pathLst>
+              </a:custGeom>
+              <a:noFill/>
+              <a:ln w="30480" cap="rnd">
+                <a:solidFill>
+                  <a:srgbClr val="000000"/>
+                </a:solidFill>
+                <a:prstDash val="solid"/>
+                <a:round/>
+              </a:ln>
+            </p:spPr>
+            <p:txBody>
+              <a:bodyPr rtlCol="0" anchor="ctr"/>
+              <a:lstStyle/>
+              <a:p>
+                <a:endParaRPr lang="en-US"/>
+              </a:p>
+            </p:txBody>
+          </p:sp>
+          <p:sp>
+            <p:nvSpPr>
+              <p:cNvPr id="48" name="Freeform: Shape 106">
+                <a:extLst>
+                  <a:ext uri="{FF2B5EF4-FFF2-40B4-BE49-F238E27FC236}">
+                    <a16:creationId xmlns:a16="http://schemas.microsoft.com/office/drawing/2014/main" id="{7C8A987A-0129-054D-A860-F1AB3688E475}"/>
+                  </a:ext>
+                </a:extLst>
+              </p:cNvPr>
+              <p:cNvSpPr/>
+              <p:nvPr/>
+            </p:nvSpPr>
+            <p:spPr>
+              <a:xfrm>
+                <a:off x="3111539" y="1668764"/>
+                <a:ext cx="24922" cy="90093"/>
+              </a:xfrm>
+              <a:custGeom>
+                <a:avLst/>
+                <a:gdLst>
+                  <a:gd name="connsiteX0" fmla="*/ 12059 w 24922"/>
+                  <a:gd name="connsiteY0" fmla="*/ 90094 h 90093"/>
+                  <a:gd name="connsiteX1" fmla="*/ 12059 w 24922"/>
+                  <a:gd name="connsiteY1" fmla="*/ 1 h 90093"/>
+                </a:gdLst>
+                <a:ahLst/>
+                <a:cxnLst>
+                  <a:cxn ang="0">
+                    <a:pos x="connsiteX0" y="connsiteY0"/>
+                  </a:cxn>
+                  <a:cxn ang="0">
+                    <a:pos x="connsiteX1" y="connsiteY1"/>
+                  </a:cxn>
+                </a:cxnLst>
+                <a:rect l="l" t="t" r="r" b="b"/>
+                <a:pathLst>
+                  <a:path w="24922" h="90093">
+                    <a:moveTo>
+                      <a:pt x="12059" y="90094"/>
+                    </a:moveTo>
+                    <a:cubicBezTo>
+                      <a:pt x="56024" y="41305"/>
+                      <a:pt x="-30296" y="42357"/>
+                      <a:pt x="12059" y="1"/>
+                    </a:cubicBezTo>
+                  </a:path>
+                </a:pathLst>
+              </a:custGeom>
+              <a:noFill/>
+              <a:ln w="30480" cap="rnd">
+                <a:solidFill>
+                  <a:srgbClr val="000000"/>
+                </a:solidFill>
+                <a:prstDash val="solid"/>
+                <a:round/>
+              </a:ln>
+            </p:spPr>
+            <p:txBody>
+              <a:bodyPr rtlCol="0" anchor="ctr"/>
+              <a:lstStyle/>
+              <a:p>
+                <a:endParaRPr lang="en-US"/>
+              </a:p>
+            </p:txBody>
+          </p:sp>
+          <p:sp>
+            <p:nvSpPr>
+              <p:cNvPr id="49" name="Freeform: Shape 107">
+                <a:extLst>
+                  <a:ext uri="{FF2B5EF4-FFF2-40B4-BE49-F238E27FC236}">
+                    <a16:creationId xmlns:a16="http://schemas.microsoft.com/office/drawing/2014/main" id="{F9D16C7A-8A72-B643-A1FF-996C88FAF80F}"/>
+                  </a:ext>
+                </a:extLst>
+              </p:cNvPr>
+              <p:cNvSpPr/>
+              <p:nvPr/>
+            </p:nvSpPr>
+            <p:spPr>
+              <a:xfrm>
+                <a:off x="3113151" y="1578563"/>
+                <a:ext cx="24922" cy="90092"/>
+              </a:xfrm>
+              <a:custGeom>
+                <a:avLst/>
+                <a:gdLst>
+                  <a:gd name="connsiteX0" fmla="*/ 12059 w 24922"/>
+                  <a:gd name="connsiteY0" fmla="*/ 90093 h 90092"/>
+                  <a:gd name="connsiteX1" fmla="*/ 12059 w 24922"/>
+                  <a:gd name="connsiteY1" fmla="*/ 1 h 90092"/>
+                </a:gdLst>
+                <a:ahLst/>
+                <a:cxnLst>
+                  <a:cxn ang="0">
+                    <a:pos x="connsiteX0" y="connsiteY0"/>
+                  </a:cxn>
+                  <a:cxn ang="0">
+                    <a:pos x="connsiteX1" y="connsiteY1"/>
+                  </a:cxn>
+                </a:cxnLst>
+                <a:rect l="l" t="t" r="r" b="b"/>
+                <a:pathLst>
+                  <a:path w="24922" h="90092">
+                    <a:moveTo>
+                      <a:pt x="12059" y="90093"/>
+                    </a:moveTo>
+                    <a:cubicBezTo>
+                      <a:pt x="56024" y="41305"/>
+                      <a:pt x="-30296" y="42356"/>
+                      <a:pt x="12059" y="1"/>
+                    </a:cubicBezTo>
+                  </a:path>
+                </a:pathLst>
+              </a:custGeom>
+              <a:noFill/>
+              <a:ln w="30480" cap="rnd">
+                <a:solidFill>
+                  <a:srgbClr val="000000"/>
+                </a:solidFill>
+                <a:prstDash val="solid"/>
+                <a:round/>
+              </a:ln>
+            </p:spPr>
+            <p:txBody>
+              <a:bodyPr rtlCol="0" anchor="ctr"/>
+              <a:lstStyle/>
+              <a:p>
+                <a:endParaRPr lang="en-US"/>
+              </a:p>
+            </p:txBody>
+          </p:sp>
+        </p:grpSp>
+      </p:grpSp>
+      <p:sp>
+        <p:nvSpPr>
+          <p:cNvPr id="50" name="Graphic 26">
+            <a:extLst>
+              <a:ext uri="{FF2B5EF4-FFF2-40B4-BE49-F238E27FC236}">
+                <a16:creationId xmlns:a16="http://schemas.microsoft.com/office/drawing/2014/main" id="{D51C8317-BB2D-A34D-BF0A-7588D6230512}"/>
+              </a:ext>
+            </a:extLst>
+          </p:cNvPr>
+          <p:cNvSpPr/>
+          <p:nvPr/>
+        </p:nvSpPr>
+        <p:spPr>
+          <a:xfrm>
+            <a:off x="3850618" y="2897772"/>
+            <a:ext cx="264160" cy="203200"/>
+          </a:xfrm>
+          <a:custGeom>
+            <a:avLst/>
+            <a:gdLst>
+              <a:gd name="connsiteX0" fmla="*/ 0 w 264160"/>
+              <a:gd name="connsiteY0" fmla="*/ 203200 h 203200"/>
+              <a:gd name="connsiteX1" fmla="*/ 264160 w 264160"/>
+              <a:gd name="connsiteY1" fmla="*/ 203200 h 203200"/>
+              <a:gd name="connsiteX2" fmla="*/ 264160 w 264160"/>
+              <a:gd name="connsiteY2" fmla="*/ 152400 h 203200"/>
+              <a:gd name="connsiteX3" fmla="*/ 132080 w 264160"/>
+              <a:gd name="connsiteY3" fmla="*/ 0 h 203200"/>
+              <a:gd name="connsiteX4" fmla="*/ 0 w 264160"/>
+              <a:gd name="connsiteY4" fmla="*/ 152400 h 203200"/>
+            </a:gdLst>
+            <a:ahLst/>
+            <a:cxnLst>
+              <a:cxn ang="0">
+                <a:pos x="connsiteX0" y="connsiteY0"/>
+              </a:cxn>
+              <a:cxn ang="0">
+                <a:pos x="connsiteX1" y="connsiteY1"/>
+              </a:cxn>
+              <a:cxn ang="0">
+                <a:pos x="connsiteX2" y="connsiteY2"/>
+              </a:cxn>
+              <a:cxn ang="0">
+                <a:pos x="connsiteX3" y="connsiteY3"/>
+              </a:cxn>
+              <a:cxn ang="0">
+                <a:pos x="connsiteX4" y="connsiteY4"/>
+              </a:cxn>
+            </a:cxnLst>
+            <a:rect l="l" t="t" r="r" b="b"/>
+            <a:pathLst>
+              <a:path w="264160" h="203200">
+                <a:moveTo>
+                  <a:pt x="0" y="203200"/>
+                </a:moveTo>
+                <a:lnTo>
+                  <a:pt x="264160" y="203200"/>
+                </a:lnTo>
+                <a:lnTo>
+                  <a:pt x="264160" y="152400"/>
+                </a:lnTo>
+                <a:cubicBezTo>
+                  <a:pt x="264160" y="50800"/>
+                  <a:pt x="203200" y="0"/>
+                  <a:pt x="132080" y="0"/>
+                </a:cubicBezTo>
+                <a:cubicBezTo>
+                  <a:pt x="60960" y="0"/>
+                  <a:pt x="0" y="50800"/>
+                  <a:pt x="0" y="152400"/>
+                </a:cubicBezTo>
+                <a:close/>
+              </a:path>
+            </a:pathLst>
+          </a:custGeom>
+          <a:noFill/>
+          <a:ln w="30480" cap="rnd">
+            <a:solidFill>
+              <a:srgbClr val="000000"/>
+            </a:solidFill>
+            <a:prstDash val="solid"/>
+            <a:round/>
+          </a:ln>
+        </p:spPr>
+        <p:txBody>
+          <a:bodyPr rtlCol="0" anchor="ctr"/>
+          <a:lstStyle/>
+          <a:p>
+            <a:endParaRPr lang="en-US"/>
+          </a:p>
+        </p:txBody>
+      </p:sp>
+      <p:grpSp>
+        <p:nvGrpSpPr>
+          <p:cNvPr id="51" name="Graphic 10">
+            <a:extLst>
+              <a:ext uri="{FF2B5EF4-FFF2-40B4-BE49-F238E27FC236}">
+                <a16:creationId xmlns:a16="http://schemas.microsoft.com/office/drawing/2014/main" id="{F52FB1CE-BEBB-3046-9E90-250B403F7D27}"/>
+              </a:ext>
+            </a:extLst>
+          </p:cNvPr>
+          <p:cNvGrpSpPr/>
+          <p:nvPr/>
+        </p:nvGrpSpPr>
+        <p:grpSpPr>
+          <a:xfrm>
+            <a:off x="3420068" y="2686078"/>
+            <a:ext cx="457200" cy="457200"/>
+            <a:chOff x="1170968" y="1441938"/>
+            <a:chExt cx="457200" cy="457200"/>
+          </a:xfrm>
+        </p:grpSpPr>
+        <p:sp>
+          <p:nvSpPr>
+            <p:cNvPr id="52" name="Freeform: Shape 110">
+              <a:extLst>
+                <a:ext uri="{FF2B5EF4-FFF2-40B4-BE49-F238E27FC236}">
+                  <a16:creationId xmlns:a16="http://schemas.microsoft.com/office/drawing/2014/main" id="{AF4B1290-9493-2A45-A26D-2E18E81B3018}"/>
+                </a:ext>
+              </a:extLst>
+            </p:cNvPr>
+            <p:cNvSpPr/>
+            <p:nvPr/>
+          </p:nvSpPr>
+          <p:spPr>
+            <a:xfrm>
+              <a:off x="1465609" y="1495241"/>
+              <a:ext cx="86360" cy="150706"/>
+            </a:xfrm>
+            <a:custGeom>
+              <a:avLst/>
+              <a:gdLst>
+                <a:gd name="connsiteX0" fmla="*/ 0 w 86360"/>
+                <a:gd name="connsiteY0" fmla="*/ 0 h 150706"/>
+                <a:gd name="connsiteX1" fmla="*/ 86360 w 86360"/>
+                <a:gd name="connsiteY1" fmla="*/ 76200 h 150706"/>
+                <a:gd name="connsiteX2" fmla="*/ 0 w 86360"/>
+                <a:gd name="connsiteY2" fmla="*/ 150706 h 150706"/>
+              </a:gdLst>
+              <a:ahLst/>
+              <a:cxnLst>
+                <a:cxn ang="0">
+                  <a:pos x="connsiteX0" y="connsiteY0"/>
+                </a:cxn>
+                <a:cxn ang="0">
+                  <a:pos x="connsiteX1" y="connsiteY1"/>
+                </a:cxn>
+                <a:cxn ang="0">
+                  <a:pos x="connsiteX2" y="connsiteY2"/>
+                </a:cxn>
+              </a:cxnLst>
+              <a:rect l="l" t="t" r="r" b="b"/>
+              <a:pathLst>
+                <a:path w="86360" h="150706">
+                  <a:moveTo>
+                    <a:pt x="0" y="0"/>
+                  </a:moveTo>
+                  <a:lnTo>
+                    <a:pt x="86360" y="76200"/>
+                  </a:lnTo>
+                  <a:lnTo>
+                    <a:pt x="0" y="150706"/>
+                  </a:lnTo>
+                </a:path>
+              </a:pathLst>
+            </a:custGeom>
+            <a:noFill/>
+            <a:ln w="30480" cap="rnd">
+              <a:solidFill>
+                <a:srgbClr val="000000"/>
+              </a:solidFill>
+              <a:prstDash val="solid"/>
+              <a:round/>
+            </a:ln>
+          </p:spPr>
+          <p:txBody>
+            <a:bodyPr rtlCol="0" anchor="ctr"/>
+            <a:lstStyle/>
+            <a:p>
+              <a:endParaRPr lang="en-US"/>
+            </a:p>
+          </p:txBody>
+        </p:sp>
+        <p:sp>
+          <p:nvSpPr>
+            <p:cNvPr id="53" name="Freeform: Shape 111">
+              <a:extLst>
+                <a:ext uri="{FF2B5EF4-FFF2-40B4-BE49-F238E27FC236}">
+                  <a16:creationId xmlns:a16="http://schemas.microsoft.com/office/drawing/2014/main" id="{52163263-E517-3F43-8396-6FBF85ED5267}"/>
+                </a:ext>
+              </a:extLst>
+            </p:cNvPr>
+            <p:cNvSpPr/>
+            <p:nvPr/>
+          </p:nvSpPr>
+          <p:spPr>
+            <a:xfrm>
+              <a:off x="1247169" y="1571441"/>
+              <a:ext cx="294639" cy="274319"/>
+            </a:xfrm>
+            <a:custGeom>
+              <a:avLst/>
+              <a:gdLst>
+                <a:gd name="connsiteX0" fmla="*/ 0 w 294639"/>
+                <a:gd name="connsiteY0" fmla="*/ 274320 h 274319"/>
+                <a:gd name="connsiteX1" fmla="*/ 0 w 294639"/>
+                <a:gd name="connsiteY1" fmla="*/ 0 h 274319"/>
+                <a:gd name="connsiteX2" fmla="*/ 294640 w 294639"/>
+                <a:gd name="connsiteY2" fmla="*/ 0 h 274319"/>
+              </a:gdLst>
+              <a:ahLst/>
+              <a:cxnLst>
+                <a:cxn ang="0">
+                  <a:pos x="connsiteX0" y="connsiteY0"/>
+                </a:cxn>
+                <a:cxn ang="0">
+                  <a:pos x="connsiteX1" y="connsiteY1"/>
+                </a:cxn>
+                <a:cxn ang="0">
+                  <a:pos x="connsiteX2" y="connsiteY2"/>
+                </a:cxn>
+              </a:cxnLst>
+              <a:rect l="l" t="t" r="r" b="b"/>
+              <a:pathLst>
+                <a:path w="294639" h="274319">
+                  <a:moveTo>
+                    <a:pt x="0" y="274320"/>
+                  </a:moveTo>
+                  <a:lnTo>
+                    <a:pt x="0" y="0"/>
+                  </a:lnTo>
+                  <a:lnTo>
+                    <a:pt x="294640" y="0"/>
+                  </a:lnTo>
+                </a:path>
+              </a:pathLst>
+            </a:custGeom>
+            <a:noFill/>
+            <a:ln w="30480" cap="rnd">
+              <a:solidFill>
+                <a:srgbClr val="000000"/>
+              </a:solidFill>
+              <a:prstDash val="solid"/>
+              <a:round/>
+            </a:ln>
+          </p:spPr>
+          <p:txBody>
+            <a:bodyPr rtlCol="0" anchor="ctr"/>
+            <a:lstStyle/>
+            <a:p>
+              <a:endParaRPr lang="en-US"/>
+            </a:p>
+          </p:txBody>
+        </p:sp>
+      </p:grpSp>
+      <p:sp>
+        <p:nvSpPr>
+          <p:cNvPr id="54" name="Graphic 33">
+            <a:extLst>
+              <a:ext uri="{FF2B5EF4-FFF2-40B4-BE49-F238E27FC236}">
+                <a16:creationId xmlns:a16="http://schemas.microsoft.com/office/drawing/2014/main" id="{88F65EA5-57A3-174D-98C4-2993F1691785}"/>
+              </a:ext>
+            </a:extLst>
+          </p:cNvPr>
+          <p:cNvSpPr/>
+          <p:nvPr/>
+        </p:nvSpPr>
+        <p:spPr>
+          <a:xfrm>
+            <a:off x="4246646" y="2987718"/>
+            <a:ext cx="350393" cy="231660"/>
+          </a:xfrm>
+          <a:custGeom>
+            <a:avLst/>
+            <a:gdLst>
+              <a:gd name="connsiteX0" fmla="*/ 0 w 350393"/>
+              <a:gd name="connsiteY0" fmla="*/ 231660 h 231660"/>
+              <a:gd name="connsiteX1" fmla="*/ 239890 w 350393"/>
+              <a:gd name="connsiteY1" fmla="*/ 231660 h 231660"/>
+              <a:gd name="connsiteX2" fmla="*/ 350394 w 350393"/>
+              <a:gd name="connsiteY2" fmla="*/ 115830 h 231660"/>
+              <a:gd name="connsiteX3" fmla="*/ 239890 w 350393"/>
+              <a:gd name="connsiteY3" fmla="*/ 0 h 231660"/>
+              <a:gd name="connsiteX4" fmla="*/ 0 w 350393"/>
+              <a:gd name="connsiteY4" fmla="*/ 0 h 231660"/>
+            </a:gdLst>
+            <a:ahLst/>
+            <a:cxnLst>
+              <a:cxn ang="0">
+                <a:pos x="connsiteX0" y="connsiteY0"/>
+              </a:cxn>
+              <a:cxn ang="0">
+                <a:pos x="connsiteX1" y="connsiteY1"/>
+              </a:cxn>
+              <a:cxn ang="0">
+                <a:pos x="connsiteX2" y="connsiteY2"/>
+              </a:cxn>
+              <a:cxn ang="0">
+                <a:pos x="connsiteX3" y="connsiteY3"/>
+              </a:cxn>
+              <a:cxn ang="0">
+                <a:pos x="connsiteX4" y="connsiteY4"/>
+              </a:cxn>
+            </a:cxnLst>
+            <a:rect l="l" t="t" r="r" b="b"/>
+            <a:pathLst>
+              <a:path w="350393" h="231660">
+                <a:moveTo>
+                  <a:pt x="0" y="231660"/>
+                </a:moveTo>
+                <a:lnTo>
+                  <a:pt x="239890" y="231660"/>
+                </a:lnTo>
+                <a:lnTo>
+                  <a:pt x="350394" y="115830"/>
+                </a:lnTo>
+                <a:lnTo>
+                  <a:pt x="239890" y="0"/>
+                </a:lnTo>
+                <a:lnTo>
+                  <a:pt x="0" y="0"/>
+                </a:lnTo>
+                <a:close/>
+              </a:path>
+            </a:pathLst>
+          </a:custGeom>
+          <a:solidFill>
+            <a:schemeClr val="bg1"/>
+          </a:solidFill>
+          <a:ln w="30434" cap="rnd">
+            <a:solidFill>
+              <a:srgbClr val="000000"/>
+            </a:solidFill>
+            <a:prstDash val="solid"/>
+            <a:round/>
+          </a:ln>
+        </p:spPr>
+        <p:txBody>
+          <a:bodyPr rtlCol="0" anchor="ctr"/>
+          <a:lstStyle/>
+          <a:p>
+            <a:endParaRPr lang="en-US"/>
+          </a:p>
+        </p:txBody>
+      </p:sp>
+      <p:grpSp>
+        <p:nvGrpSpPr>
+          <p:cNvPr id="55" name="Graphic 36">
+            <a:extLst>
+              <a:ext uri="{FF2B5EF4-FFF2-40B4-BE49-F238E27FC236}">
+                <a16:creationId xmlns:a16="http://schemas.microsoft.com/office/drawing/2014/main" id="{4D0FE144-85EF-374F-8D95-577C52AA8E2E}"/>
+              </a:ext>
+            </a:extLst>
+          </p:cNvPr>
+          <p:cNvGrpSpPr/>
+          <p:nvPr/>
+        </p:nvGrpSpPr>
+        <p:grpSpPr>
+          <a:xfrm>
+            <a:off x="4538263" y="2847022"/>
+            <a:ext cx="459666" cy="281392"/>
+            <a:chOff x="2337992" y="1583545"/>
+            <a:chExt cx="459666" cy="281392"/>
+          </a:xfrm>
+        </p:grpSpPr>
+        <p:sp>
+          <p:nvSpPr>
+            <p:cNvPr id="56" name="Freeform: Shape 114">
+              <a:extLst>
+                <a:ext uri="{FF2B5EF4-FFF2-40B4-BE49-F238E27FC236}">
+                  <a16:creationId xmlns:a16="http://schemas.microsoft.com/office/drawing/2014/main" id="{03D6B13D-9876-1B4A-883A-1B6DFA7B13A6}"/>
+                </a:ext>
+              </a:extLst>
+            </p:cNvPr>
+            <p:cNvSpPr/>
+            <p:nvPr/>
+          </p:nvSpPr>
+          <p:spPr>
+            <a:xfrm>
+              <a:off x="2567354" y="1593705"/>
+              <a:ext cx="10160" cy="243839"/>
+            </a:xfrm>
+            <a:custGeom>
+              <a:avLst/>
+              <a:gdLst>
+                <a:gd name="connsiteX0" fmla="*/ 0 w 10160"/>
+                <a:gd name="connsiteY0" fmla="*/ 243840 h 243839"/>
+                <a:gd name="connsiteX1" fmla="*/ 0 w 10160"/>
+                <a:gd name="connsiteY1" fmla="*/ 0 h 243839"/>
+              </a:gdLst>
+              <a:ahLst/>
+              <a:cxnLst>
+                <a:cxn ang="0">
+                  <a:pos x="connsiteX0" y="connsiteY0"/>
+                </a:cxn>
+                <a:cxn ang="0">
+                  <a:pos x="connsiteX1" y="connsiteY1"/>
+                </a:cxn>
+              </a:cxnLst>
+              <a:rect l="l" t="t" r="r" b="b"/>
+              <a:pathLst>
+                <a:path w="10160" h="243839">
+                  <a:moveTo>
+                    <a:pt x="0" y="243840"/>
+                  </a:moveTo>
+                  <a:lnTo>
+                    <a:pt x="0" y="0"/>
+                  </a:lnTo>
+                </a:path>
+              </a:pathLst>
+            </a:custGeom>
+            <a:noFill/>
+            <a:ln w="30480" cap="rnd">
+              <a:solidFill>
+                <a:srgbClr val="000000"/>
+              </a:solidFill>
+              <a:prstDash val="solid"/>
+              <a:round/>
+            </a:ln>
+          </p:spPr>
+          <p:txBody>
+            <a:bodyPr rtlCol="0" anchor="ctr"/>
+            <a:lstStyle/>
+            <a:p>
+              <a:endParaRPr lang="en-US"/>
+            </a:p>
+          </p:txBody>
+        </p:sp>
+        <p:sp>
+          <p:nvSpPr>
+            <p:cNvPr id="57" name="Freeform: Shape 115">
+              <a:extLst>
+                <a:ext uri="{FF2B5EF4-FFF2-40B4-BE49-F238E27FC236}">
+                  <a16:creationId xmlns:a16="http://schemas.microsoft.com/office/drawing/2014/main" id="{18C3A9D1-D9A4-634F-B5AC-CC7993423108}"/>
+                </a:ext>
+              </a:extLst>
+            </p:cNvPr>
+            <p:cNvSpPr/>
+            <p:nvPr/>
+          </p:nvSpPr>
+          <p:spPr>
+            <a:xfrm>
+              <a:off x="2414954" y="1583545"/>
+              <a:ext cx="304800" cy="10160"/>
+            </a:xfrm>
+            <a:custGeom>
+              <a:avLst/>
+              <a:gdLst>
+                <a:gd name="connsiteX0" fmla="*/ 0 w 304800"/>
+                <a:gd name="connsiteY0" fmla="*/ 0 h 10160"/>
+                <a:gd name="connsiteX1" fmla="*/ 304800 w 304800"/>
+                <a:gd name="connsiteY1" fmla="*/ 0 h 10160"/>
+              </a:gdLst>
+              <a:ahLst/>
+              <a:cxnLst>
+                <a:cxn ang="0">
+                  <a:pos x="connsiteX0" y="connsiteY0"/>
+                </a:cxn>
+                <a:cxn ang="0">
+                  <a:pos x="connsiteX1" y="connsiteY1"/>
+                </a:cxn>
+              </a:cxnLst>
+              <a:rect l="l" t="t" r="r" b="b"/>
+              <a:pathLst>
+                <a:path w="304800" h="10160">
+                  <a:moveTo>
+                    <a:pt x="0" y="0"/>
+                  </a:moveTo>
+                  <a:lnTo>
+                    <a:pt x="304800" y="0"/>
+                  </a:lnTo>
+                </a:path>
+              </a:pathLst>
+            </a:custGeom>
+            <a:noFill/>
+            <a:ln w="30480" cap="rnd">
+              <a:solidFill>
+                <a:srgbClr val="000000"/>
+              </a:solidFill>
+              <a:prstDash val="solid"/>
+              <a:round/>
+            </a:ln>
+          </p:spPr>
+          <p:txBody>
+            <a:bodyPr rtlCol="0" anchor="ctr"/>
+            <a:lstStyle/>
+            <a:p>
+              <a:endParaRPr lang="en-US"/>
+            </a:p>
+          </p:txBody>
+        </p:sp>
+        <p:sp>
+          <p:nvSpPr>
+            <p:cNvPr id="58" name="Freeform: Shape 116">
+              <a:extLst>
+                <a:ext uri="{FF2B5EF4-FFF2-40B4-BE49-F238E27FC236}">
+                  <a16:creationId xmlns:a16="http://schemas.microsoft.com/office/drawing/2014/main" id="{0F6156C1-0395-1C4C-A880-F6B0617262C3}"/>
+                </a:ext>
+              </a:extLst>
+            </p:cNvPr>
+            <p:cNvSpPr/>
+            <p:nvPr/>
+          </p:nvSpPr>
+          <p:spPr>
+            <a:xfrm>
+              <a:off x="2337992" y="1854777"/>
+              <a:ext cx="459666" cy="10160"/>
+            </a:xfrm>
+            <a:custGeom>
+              <a:avLst/>
+              <a:gdLst>
+                <a:gd name="connsiteX0" fmla="*/ 0 w 459666"/>
+                <a:gd name="connsiteY0" fmla="*/ 0 h 10160"/>
+                <a:gd name="connsiteX1" fmla="*/ 459667 w 459666"/>
+                <a:gd name="connsiteY1" fmla="*/ 0 h 10160"/>
+              </a:gdLst>
+              <a:ahLst/>
+              <a:cxnLst>
+                <a:cxn ang="0">
+                  <a:pos x="connsiteX0" y="connsiteY0"/>
+                </a:cxn>
+                <a:cxn ang="0">
+                  <a:pos x="connsiteX1" y="connsiteY1"/>
+                </a:cxn>
+              </a:cxnLst>
+              <a:rect l="l" t="t" r="r" b="b"/>
+              <a:pathLst>
+                <a:path w="459666" h="10160">
+                  <a:moveTo>
+                    <a:pt x="0" y="0"/>
+                  </a:moveTo>
+                  <a:cubicBezTo>
+                    <a:pt x="459667" y="0"/>
+                    <a:pt x="459667" y="0"/>
+                    <a:pt x="459667" y="0"/>
+                  </a:cubicBezTo>
+                </a:path>
+              </a:pathLst>
+            </a:custGeom>
+            <a:noFill/>
+            <a:ln w="5080" cap="rnd">
+              <a:solidFill>
+                <a:srgbClr val="999999">
+                  <a:alpha val="50000"/>
+                </a:srgbClr>
+              </a:solidFill>
+              <a:custDash>
+                <a:ds d="75000" sp="37500"/>
+              </a:custDash>
+              <a:round/>
+            </a:ln>
+          </p:spPr>
+          <p:txBody>
+            <a:bodyPr rtlCol="0" anchor="ctr"/>
+            <a:lstStyle/>
+            <a:p>
+              <a:endParaRPr lang="en-US"/>
+            </a:p>
+          </p:txBody>
+        </p:sp>
+      </p:grpSp>
+      <p:sp>
+        <p:nvSpPr>
+          <p:cNvPr id="59" name="Graphic 18">
+            <a:extLst>
+              <a:ext uri="{FF2B5EF4-FFF2-40B4-BE49-F238E27FC236}">
+                <a16:creationId xmlns:a16="http://schemas.microsoft.com/office/drawing/2014/main" id="{99F041CD-FFED-8549-ABCC-B7C5E0EAE11A}"/>
+              </a:ext>
+            </a:extLst>
+          </p:cNvPr>
+          <p:cNvSpPr/>
+          <p:nvPr/>
+        </p:nvSpPr>
+        <p:spPr>
+          <a:xfrm flipH="1">
+            <a:off x="4936514" y="3103549"/>
+            <a:ext cx="265070" cy="157957"/>
+          </a:xfrm>
+          <a:custGeom>
+            <a:avLst/>
+            <a:gdLst>
+              <a:gd name="connsiteX0" fmla="*/ 264071 w 265070"/>
+              <a:gd name="connsiteY0" fmla="*/ -370 h 157957"/>
+              <a:gd name="connsiteX1" fmla="*/ 31681 w 265070"/>
+              <a:gd name="connsiteY1" fmla="*/ 48652 h 157957"/>
+              <a:gd name="connsiteX2" fmla="*/ 264975 w 265070"/>
+              <a:gd name="connsiteY2" fmla="*/ 121276 h 157957"/>
+              <a:gd name="connsiteX3" fmla="*/ -95 w 265070"/>
+              <a:gd name="connsiteY3" fmla="*/ 157588 h 157957"/>
+            </a:gdLst>
+            <a:ahLst/>
+            <a:cxnLst>
+              <a:cxn ang="0">
+                <a:pos x="connsiteX0" y="connsiteY0"/>
+              </a:cxn>
+              <a:cxn ang="0">
+                <a:pos x="connsiteX1" y="connsiteY1"/>
+              </a:cxn>
+              <a:cxn ang="0">
+                <a:pos x="connsiteX2" y="connsiteY2"/>
+              </a:cxn>
+              <a:cxn ang="0">
+                <a:pos x="connsiteX3" y="connsiteY3"/>
+              </a:cxn>
+            </a:cxnLst>
+            <a:rect l="l" t="t" r="r" b="b"/>
+            <a:pathLst>
+              <a:path w="265070" h="157957">
+                <a:moveTo>
+                  <a:pt x="264071" y="-370"/>
+                </a:moveTo>
+                <a:cubicBezTo>
+                  <a:pt x="264071" y="-370"/>
+                  <a:pt x="32585" y="18691"/>
+                  <a:pt x="31681" y="48652"/>
+                </a:cubicBezTo>
+                <a:cubicBezTo>
+                  <a:pt x="30767" y="78604"/>
+                  <a:pt x="264975" y="85868"/>
+                  <a:pt x="264975" y="121276"/>
+                </a:cubicBezTo>
+                <a:cubicBezTo>
+                  <a:pt x="264975" y="156673"/>
+                  <a:pt x="-95" y="157588"/>
+                  <a:pt x="-95" y="157588"/>
+                </a:cubicBezTo>
+              </a:path>
+            </a:pathLst>
+          </a:custGeom>
+          <a:noFill/>
+          <a:ln w="25400" cap="rnd">
+            <a:solidFill>
+              <a:srgbClr val="000000"/>
+            </a:solidFill>
+            <a:prstDash val="solid"/>
+            <a:round/>
+          </a:ln>
+        </p:spPr>
+        <p:txBody>
+          <a:bodyPr rtlCol="0" anchor="ctr"/>
+          <a:lstStyle/>
+          <a:p>
+            <a:endParaRPr lang="en-US"/>
+          </a:p>
+        </p:txBody>
+      </p:sp>
+      <p:sp>
+        <p:nvSpPr>
+          <p:cNvPr id="60" name="Rectangle 59">
+            <a:extLst>
+              <a:ext uri="{FF2B5EF4-FFF2-40B4-BE49-F238E27FC236}">
+                <a16:creationId xmlns:a16="http://schemas.microsoft.com/office/drawing/2014/main" id="{908B1655-AC04-7E43-B862-16EDB0286325}"/>
+              </a:ext>
+            </a:extLst>
+          </p:cNvPr>
+          <p:cNvSpPr/>
+          <p:nvPr/>
+        </p:nvSpPr>
+        <p:spPr>
+          <a:xfrm>
+            <a:off x="2527092" y="2707851"/>
+            <a:ext cx="848142" cy="553655"/>
+          </a:xfrm>
+          <a:prstGeom prst="rect">
+            <a:avLst/>
+          </a:prstGeom>
+          <a:noFill/>
+          <a:ln w="12700" cap="sq">
+            <a:prstDash val="dash"/>
+            <a:miter lim="800000"/>
+          </a:ln>
+        </p:spPr>
+        <p:style>
+          <a:lnRef idx="2">
+            <a:schemeClr val="accent1">
+              <a:shade val="50000"/>
+            </a:schemeClr>
+          </a:lnRef>
+          <a:fillRef idx="1">
+            <a:schemeClr val="accent1"/>
+          </a:fillRef>
+          <a:effectRef idx="0">
+            <a:schemeClr val="accent1"/>
+          </a:effectRef>
+          <a:fontRef idx="minor">
+            <a:schemeClr val="lt1"/>
+          </a:fontRef>
+        </p:style>
+        <p:txBody>
+          <a:bodyPr rtlCol="0" anchor="ctr"/>
+          <a:lstStyle/>
+          <a:p>
+            <a:pPr algn="ctr"/>
+            <a:endParaRPr lang="en-US"/>
+          </a:p>
+        </p:txBody>
+      </p:sp>
+      <p:cxnSp>
+        <p:nvCxnSpPr>
+          <p:cNvPr id="61" name="Straight Connector 60">
+            <a:extLst>
+              <a:ext uri="{FF2B5EF4-FFF2-40B4-BE49-F238E27FC236}">
+                <a16:creationId xmlns:a16="http://schemas.microsoft.com/office/drawing/2014/main" id="{F914C760-0872-5248-B36D-20CEF131BA82}"/>
+              </a:ext>
+            </a:extLst>
+          </p:cNvPr>
+          <p:cNvCxnSpPr>
+            <a:cxnSpLocks/>
+          </p:cNvCxnSpPr>
+          <p:nvPr/>
+        </p:nvCxnSpPr>
+        <p:spPr>
+          <a:xfrm>
+            <a:off x="4554752" y="3658461"/>
+            <a:ext cx="381762" cy="0"/>
+          </a:xfrm>
+          <a:prstGeom prst="line">
+            <a:avLst/>
+          </a:prstGeom>
+          <a:ln w="25400" cap="sq">
+            <a:miter lim="800000"/>
+          </a:ln>
+        </p:spPr>
+        <p:style>
+          <a:lnRef idx="1">
+            <a:schemeClr val="dk1"/>
+          </a:lnRef>
+          <a:fillRef idx="0">
+            <a:schemeClr val="dk1"/>
+          </a:fillRef>
+          <a:effectRef idx="0">
+            <a:schemeClr val="dk1"/>
+          </a:effectRef>
+          <a:fontRef idx="minor">
+            <a:schemeClr val="tx1"/>
+          </a:fontRef>
+        </p:style>
+      </p:cxnSp>
+      <p:grpSp>
+        <p:nvGrpSpPr>
+          <p:cNvPr id="62" name="Graphic 36">
+            <a:extLst>
+              <a:ext uri="{FF2B5EF4-FFF2-40B4-BE49-F238E27FC236}">
+                <a16:creationId xmlns:a16="http://schemas.microsoft.com/office/drawing/2014/main" id="{BBF633A7-87F1-8048-A899-21664E4D4A30}"/>
+              </a:ext>
+            </a:extLst>
+          </p:cNvPr>
+          <p:cNvGrpSpPr/>
+          <p:nvPr/>
+        </p:nvGrpSpPr>
+        <p:grpSpPr>
+          <a:xfrm>
+            <a:off x="4554752" y="3402304"/>
+            <a:ext cx="459666" cy="281392"/>
+            <a:chOff x="2337992" y="1583545"/>
+            <a:chExt cx="459666" cy="281392"/>
+          </a:xfrm>
+        </p:grpSpPr>
+        <p:sp>
+          <p:nvSpPr>
+            <p:cNvPr id="63" name="Freeform: Shape 126">
+              <a:extLst>
+                <a:ext uri="{FF2B5EF4-FFF2-40B4-BE49-F238E27FC236}">
+                  <a16:creationId xmlns:a16="http://schemas.microsoft.com/office/drawing/2014/main" id="{89D9985D-99C5-B54B-A61B-6C3138F68948}"/>
+                </a:ext>
+              </a:extLst>
+            </p:cNvPr>
+            <p:cNvSpPr/>
+            <p:nvPr/>
+          </p:nvSpPr>
+          <p:spPr>
+            <a:xfrm>
+              <a:off x="2567354" y="1593705"/>
+              <a:ext cx="10160" cy="243839"/>
+            </a:xfrm>
+            <a:custGeom>
+              <a:avLst/>
+              <a:gdLst>
+                <a:gd name="connsiteX0" fmla="*/ 0 w 10160"/>
+                <a:gd name="connsiteY0" fmla="*/ 243840 h 243839"/>
+                <a:gd name="connsiteX1" fmla="*/ 0 w 10160"/>
+                <a:gd name="connsiteY1" fmla="*/ 0 h 243839"/>
+              </a:gdLst>
+              <a:ahLst/>
+              <a:cxnLst>
+                <a:cxn ang="0">
+                  <a:pos x="connsiteX0" y="connsiteY0"/>
+                </a:cxn>
+                <a:cxn ang="0">
+                  <a:pos x="connsiteX1" y="connsiteY1"/>
+                </a:cxn>
+              </a:cxnLst>
+              <a:rect l="l" t="t" r="r" b="b"/>
+              <a:pathLst>
+                <a:path w="10160" h="243839">
+                  <a:moveTo>
+                    <a:pt x="0" y="243840"/>
+                  </a:moveTo>
+                  <a:lnTo>
+                    <a:pt x="0" y="0"/>
+                  </a:lnTo>
+                </a:path>
+              </a:pathLst>
+            </a:custGeom>
+            <a:noFill/>
+            <a:ln w="30480" cap="rnd">
+              <a:solidFill>
+                <a:srgbClr val="000000"/>
+              </a:solidFill>
+              <a:prstDash val="solid"/>
+              <a:round/>
+            </a:ln>
+          </p:spPr>
+          <p:txBody>
+            <a:bodyPr rtlCol="0" anchor="ctr"/>
+            <a:lstStyle/>
+            <a:p>
+              <a:endParaRPr lang="en-US"/>
+            </a:p>
+          </p:txBody>
+        </p:sp>
+        <p:sp>
+          <p:nvSpPr>
+            <p:cNvPr id="64" name="Freeform: Shape 127">
+              <a:extLst>
+                <a:ext uri="{FF2B5EF4-FFF2-40B4-BE49-F238E27FC236}">
+                  <a16:creationId xmlns:a16="http://schemas.microsoft.com/office/drawing/2014/main" id="{A41F61C1-78A2-CC41-8FAF-4050A078474D}"/>
+                </a:ext>
+              </a:extLst>
+            </p:cNvPr>
+            <p:cNvSpPr/>
+            <p:nvPr/>
+          </p:nvSpPr>
+          <p:spPr>
+            <a:xfrm>
+              <a:off x="2414954" y="1583545"/>
+              <a:ext cx="304800" cy="10160"/>
+            </a:xfrm>
+            <a:custGeom>
+              <a:avLst/>
+              <a:gdLst>
+                <a:gd name="connsiteX0" fmla="*/ 0 w 304800"/>
+                <a:gd name="connsiteY0" fmla="*/ 0 h 10160"/>
+                <a:gd name="connsiteX1" fmla="*/ 304800 w 304800"/>
+                <a:gd name="connsiteY1" fmla="*/ 0 h 10160"/>
+              </a:gdLst>
+              <a:ahLst/>
+              <a:cxnLst>
+                <a:cxn ang="0">
+                  <a:pos x="connsiteX0" y="connsiteY0"/>
+                </a:cxn>
+                <a:cxn ang="0">
+                  <a:pos x="connsiteX1" y="connsiteY1"/>
+                </a:cxn>
+              </a:cxnLst>
+              <a:rect l="l" t="t" r="r" b="b"/>
+              <a:pathLst>
+                <a:path w="304800" h="10160">
+                  <a:moveTo>
+                    <a:pt x="0" y="0"/>
+                  </a:moveTo>
+                  <a:lnTo>
+                    <a:pt x="304800" y="0"/>
+                  </a:lnTo>
+                </a:path>
+              </a:pathLst>
+            </a:custGeom>
+            <a:noFill/>
+            <a:ln w="30480" cap="rnd">
+              <a:solidFill>
+                <a:srgbClr val="000000"/>
+              </a:solidFill>
+              <a:prstDash val="solid"/>
+              <a:round/>
+            </a:ln>
+          </p:spPr>
+          <p:txBody>
+            <a:bodyPr rtlCol="0" anchor="ctr"/>
+            <a:lstStyle/>
+            <a:p>
+              <a:endParaRPr lang="en-US"/>
+            </a:p>
+          </p:txBody>
+        </p:sp>
+        <p:sp>
+          <p:nvSpPr>
+            <p:cNvPr id="65" name="Freeform: Shape 128">
+              <a:extLst>
+                <a:ext uri="{FF2B5EF4-FFF2-40B4-BE49-F238E27FC236}">
+                  <a16:creationId xmlns:a16="http://schemas.microsoft.com/office/drawing/2014/main" id="{51DC9906-74B8-5544-8D0E-5714E45B98B8}"/>
+                </a:ext>
+              </a:extLst>
+            </p:cNvPr>
+            <p:cNvSpPr/>
+            <p:nvPr/>
+          </p:nvSpPr>
+          <p:spPr>
+            <a:xfrm>
+              <a:off x="2337992" y="1854777"/>
+              <a:ext cx="459666" cy="10160"/>
+            </a:xfrm>
+            <a:custGeom>
+              <a:avLst/>
+              <a:gdLst>
+                <a:gd name="connsiteX0" fmla="*/ 0 w 459666"/>
+                <a:gd name="connsiteY0" fmla="*/ 0 h 10160"/>
+                <a:gd name="connsiteX1" fmla="*/ 459667 w 459666"/>
+                <a:gd name="connsiteY1" fmla="*/ 0 h 10160"/>
+              </a:gdLst>
+              <a:ahLst/>
+              <a:cxnLst>
+                <a:cxn ang="0">
+                  <a:pos x="connsiteX0" y="connsiteY0"/>
+                </a:cxn>
+                <a:cxn ang="0">
+                  <a:pos x="connsiteX1" y="connsiteY1"/>
+                </a:cxn>
+              </a:cxnLst>
+              <a:rect l="l" t="t" r="r" b="b"/>
+              <a:pathLst>
+                <a:path w="459666" h="10160">
+                  <a:moveTo>
+                    <a:pt x="0" y="0"/>
+                  </a:moveTo>
+                  <a:cubicBezTo>
+                    <a:pt x="459667" y="0"/>
+                    <a:pt x="459667" y="0"/>
+                    <a:pt x="459667" y="0"/>
+                  </a:cubicBezTo>
+                </a:path>
+              </a:pathLst>
+            </a:custGeom>
+            <a:noFill/>
+            <a:ln w="5080" cap="rnd">
+              <a:solidFill>
+                <a:srgbClr val="999999">
+                  <a:alpha val="50000"/>
+                </a:srgbClr>
+              </a:solidFill>
+              <a:custDash>
+                <a:ds d="75000" sp="37500"/>
+              </a:custDash>
+              <a:round/>
+            </a:ln>
+          </p:spPr>
+          <p:txBody>
+            <a:bodyPr rtlCol="0" anchor="ctr"/>
+            <a:lstStyle/>
+            <a:p>
+              <a:endParaRPr lang="en-US"/>
+            </a:p>
+          </p:txBody>
+        </p:sp>
+      </p:grpSp>
+      <p:sp>
+        <p:nvSpPr>
+          <p:cNvPr id="66" name="Graphic 18">
+            <a:extLst>
+              <a:ext uri="{FF2B5EF4-FFF2-40B4-BE49-F238E27FC236}">
+                <a16:creationId xmlns:a16="http://schemas.microsoft.com/office/drawing/2014/main" id="{A2F16F5C-1673-F546-B153-2B99E56929CF}"/>
+              </a:ext>
+            </a:extLst>
+          </p:cNvPr>
+          <p:cNvSpPr/>
+          <p:nvPr/>
+        </p:nvSpPr>
+        <p:spPr>
+          <a:xfrm rot="10800000" flipH="1">
+            <a:off x="4953003" y="3658831"/>
+            <a:ext cx="265070" cy="157957"/>
+          </a:xfrm>
+          <a:custGeom>
+            <a:avLst/>
+            <a:gdLst>
+              <a:gd name="connsiteX0" fmla="*/ 264071 w 265070"/>
+              <a:gd name="connsiteY0" fmla="*/ -370 h 157957"/>
+              <a:gd name="connsiteX1" fmla="*/ 31681 w 265070"/>
+              <a:gd name="connsiteY1" fmla="*/ 48652 h 157957"/>
+              <a:gd name="connsiteX2" fmla="*/ 264975 w 265070"/>
+              <a:gd name="connsiteY2" fmla="*/ 121276 h 157957"/>
+              <a:gd name="connsiteX3" fmla="*/ -95 w 265070"/>
+              <a:gd name="connsiteY3" fmla="*/ 157588 h 157957"/>
+            </a:gdLst>
+            <a:ahLst/>
+            <a:cxnLst>
+              <a:cxn ang="0">
+                <a:pos x="connsiteX0" y="connsiteY0"/>
+              </a:cxn>
+              <a:cxn ang="0">
+                <a:pos x="connsiteX1" y="connsiteY1"/>
+              </a:cxn>
+              <a:cxn ang="0">
+                <a:pos x="connsiteX2" y="connsiteY2"/>
+              </a:cxn>
+              <a:cxn ang="0">
+                <a:pos x="connsiteX3" y="connsiteY3"/>
+              </a:cxn>
+            </a:cxnLst>
+            <a:rect l="l" t="t" r="r" b="b"/>
+            <a:pathLst>
+              <a:path w="265070" h="157957">
+                <a:moveTo>
+                  <a:pt x="264071" y="-370"/>
+                </a:moveTo>
+                <a:cubicBezTo>
+                  <a:pt x="264071" y="-370"/>
+                  <a:pt x="32585" y="18691"/>
+                  <a:pt x="31681" y="48652"/>
+                </a:cubicBezTo>
+                <a:cubicBezTo>
+                  <a:pt x="30767" y="78604"/>
+                  <a:pt x="264975" y="85868"/>
+                  <a:pt x="264975" y="121276"/>
+                </a:cubicBezTo>
+                <a:cubicBezTo>
+                  <a:pt x="264975" y="156673"/>
+                  <a:pt x="-95" y="157588"/>
+                  <a:pt x="-95" y="157588"/>
+                </a:cubicBezTo>
+              </a:path>
+            </a:pathLst>
+          </a:custGeom>
+          <a:noFill/>
+          <a:ln w="25400" cap="rnd">
+            <a:solidFill>
+              <a:srgbClr val="000000"/>
+            </a:solidFill>
+            <a:prstDash val="solid"/>
+            <a:round/>
+          </a:ln>
+        </p:spPr>
+        <p:txBody>
+          <a:bodyPr rtlCol="0" anchor="ctr"/>
+          <a:lstStyle/>
+          <a:p>
+            <a:endParaRPr lang="en-US"/>
+          </a:p>
+        </p:txBody>
+      </p:sp>
+      <p:sp>
+        <p:nvSpPr>
+          <p:cNvPr id="67" name="TextBox 66">
+            <a:extLst>
+              <a:ext uri="{FF2B5EF4-FFF2-40B4-BE49-F238E27FC236}">
+                <a16:creationId xmlns:a16="http://schemas.microsoft.com/office/drawing/2014/main" id="{F7B774A6-4AAF-A945-896D-F781648D530C}"/>
+              </a:ext>
+            </a:extLst>
+          </p:cNvPr>
+          <p:cNvSpPr txBox="1"/>
+          <p:nvPr/>
+        </p:nvSpPr>
+        <p:spPr>
+          <a:xfrm>
+            <a:off x="3756639" y="3465375"/>
+            <a:ext cx="716278" cy="276999"/>
+          </a:xfrm>
+          <a:prstGeom prst="rect">
+            <a:avLst/>
+          </a:prstGeom>
+          <a:noFill/>
+        </p:spPr>
+        <p:txBody>
+          <a:bodyPr wrap="square" rtlCol="0">
+            <a:spAutoFit/>
+          </a:bodyPr>
+          <a:lstStyle/>
+          <a:p>
+            <a:r>
+              <a:rPr lang="en-US" sz="1200" dirty="0"/>
+              <a:t>Rotated:</a:t>
+            </a:r>
+          </a:p>
+        </p:txBody>
+      </p:sp>
+    </p:spTree>
+    <p:extLst>
+      <p:ext uri="{BB962C8B-B14F-4D97-AF65-F5344CB8AC3E}">
+        <p14:creationId xmlns:p14="http://schemas.microsoft.com/office/powerpoint/2010/main" val="4286045859"/>
+      </p:ext>
+    </p:extLst>
+  </p:cSld>
+  <p:clrMapOvr>
+    <a:masterClrMapping/>
+  </p:clrMapOvr>
+</p:sld>
+</file>
+
 <file path=ppt/slides/slide2.xml><?xml version="1.0" encoding="utf-8"?>
 <p:sld xmlns:a="http://schemas.openxmlformats.org/drawingml/2006/main" xmlns:r="http://schemas.openxmlformats.org/officeDocument/2006/relationships" xmlns:p="http://schemas.openxmlformats.org/presentationml/2006/main">
   <p:cSld>

</xml_diff>

<commit_message>
Add examples for SEP V011 and V012
</commit_message>
<xml_diff>
--- a/specification/imgsrc/examples.pptx
+++ b/specification/imgsrc/examples.pptx
@@ -5,7 +5,7 @@
     <p:sldMasterId id="2147483648" r:id="rId1"/>
   </p:sldMasterIdLst>
   <p:notesMasterIdLst>
-    <p:notesMasterId r:id="rId16"/>
+    <p:notesMasterId r:id="rId17"/>
   </p:notesMasterIdLst>
   <p:sldIdLst>
     <p:sldId id="257" r:id="rId2"/>
@@ -22,6 +22,7 @@
     <p:sldId id="270" r:id="rId13"/>
     <p:sldId id="269" r:id="rId14"/>
     <p:sldId id="271" r:id="rId15"/>
+    <p:sldId id="272" r:id="rId16"/>
   </p:sldIdLst>
   <p:sldSz cx="9144000" cy="6858000" type="screen4x3"/>
   <p:notesSz cx="6858000" cy="9144000"/>
@@ -221,7 +222,7 @@
           <a:p>
             <a:fld id="{A5398B87-931F-0F48-BDB8-4235032D88C0}" type="datetimeFigureOut">
               <a:rPr lang="en-US" smtClean="0"/>
-              <a:t>11/4/18</a:t>
+              <a:t>11/3/20</a:t>
             </a:fld>
             <a:endParaRPr lang="en-US"/>
           </a:p>
@@ -667,7 +668,7 @@
           <a:p>
             <a:fld id="{B519623D-D8C4-D246-A1F7-180DFBDF806B}" type="datetimeFigureOut">
               <a:rPr lang="en-US" smtClean="0"/>
-              <a:t>11/4/18</a:t>
+              <a:t>11/3/20</a:t>
             </a:fld>
             <a:endParaRPr lang="en-US"/>
           </a:p>
@@ -835,7 +836,7 @@
           <a:p>
             <a:fld id="{B519623D-D8C4-D246-A1F7-180DFBDF806B}" type="datetimeFigureOut">
               <a:rPr lang="en-US" smtClean="0"/>
-              <a:t>11/4/18</a:t>
+              <a:t>11/3/20</a:t>
             </a:fld>
             <a:endParaRPr lang="en-US"/>
           </a:p>
@@ -1013,7 +1014,7 @@
           <a:p>
             <a:fld id="{B519623D-D8C4-D246-A1F7-180DFBDF806B}" type="datetimeFigureOut">
               <a:rPr lang="en-US" smtClean="0"/>
-              <a:t>11/4/18</a:t>
+              <a:t>11/3/20</a:t>
             </a:fld>
             <a:endParaRPr lang="en-US"/>
           </a:p>
@@ -1181,7 +1182,7 @@
           <a:p>
             <a:fld id="{B519623D-D8C4-D246-A1F7-180DFBDF806B}" type="datetimeFigureOut">
               <a:rPr lang="en-US" smtClean="0"/>
-              <a:t>11/4/18</a:t>
+              <a:t>11/3/20</a:t>
             </a:fld>
             <a:endParaRPr lang="en-US"/>
           </a:p>
@@ -1426,7 +1427,7 @@
           <a:p>
             <a:fld id="{B519623D-D8C4-D246-A1F7-180DFBDF806B}" type="datetimeFigureOut">
               <a:rPr lang="en-US" smtClean="0"/>
-              <a:t>11/4/18</a:t>
+              <a:t>11/3/20</a:t>
             </a:fld>
             <a:endParaRPr lang="en-US"/>
           </a:p>
@@ -1711,7 +1712,7 @@
           <a:p>
             <a:fld id="{B519623D-D8C4-D246-A1F7-180DFBDF806B}" type="datetimeFigureOut">
               <a:rPr lang="en-US" smtClean="0"/>
-              <a:t>11/4/18</a:t>
+              <a:t>11/3/20</a:t>
             </a:fld>
             <a:endParaRPr lang="en-US"/>
           </a:p>
@@ -2130,7 +2131,7 @@
           <a:p>
             <a:fld id="{B519623D-D8C4-D246-A1F7-180DFBDF806B}" type="datetimeFigureOut">
               <a:rPr lang="en-US" smtClean="0"/>
-              <a:t>11/4/18</a:t>
+              <a:t>11/3/20</a:t>
             </a:fld>
             <a:endParaRPr lang="en-US"/>
           </a:p>
@@ -2247,7 +2248,7 @@
           <a:p>
             <a:fld id="{B519623D-D8C4-D246-A1F7-180DFBDF806B}" type="datetimeFigureOut">
               <a:rPr lang="en-US" smtClean="0"/>
-              <a:t>11/4/18</a:t>
+              <a:t>11/3/20</a:t>
             </a:fld>
             <a:endParaRPr lang="en-US"/>
           </a:p>
@@ -2342,7 +2343,7 @@
           <a:p>
             <a:fld id="{B519623D-D8C4-D246-A1F7-180DFBDF806B}" type="datetimeFigureOut">
               <a:rPr lang="en-US" smtClean="0"/>
-              <a:t>11/4/18</a:t>
+              <a:t>11/3/20</a:t>
             </a:fld>
             <a:endParaRPr lang="en-US"/>
           </a:p>
@@ -2617,7 +2618,7 @@
           <a:p>
             <a:fld id="{B519623D-D8C4-D246-A1F7-180DFBDF806B}" type="datetimeFigureOut">
               <a:rPr lang="en-US" smtClean="0"/>
-              <a:t>11/4/18</a:t>
+              <a:t>11/3/20</a:t>
             </a:fld>
             <a:endParaRPr lang="en-US"/>
           </a:p>
@@ -2869,7 +2870,7 @@
           <a:p>
             <a:fld id="{B519623D-D8C4-D246-A1F7-180DFBDF806B}" type="datetimeFigureOut">
               <a:rPr lang="en-US" smtClean="0"/>
-              <a:t>11/4/18</a:t>
+              <a:t>11/3/20</a:t>
             </a:fld>
             <a:endParaRPr lang="en-US"/>
           </a:p>
@@ -3080,7 +3081,7 @@
           <a:p>
             <a:fld id="{B519623D-D8C4-D246-A1F7-180DFBDF806B}" type="datetimeFigureOut">
               <a:rPr lang="en-US" smtClean="0"/>
-              <a:t>11/4/18</a:t>
+              <a:t>11/3/20</a:t>
             </a:fld>
             <a:endParaRPr lang="en-US"/>
           </a:p>
@@ -7736,6 +7737,202 @@
 </p:sld>
 </file>
 
+<file path=ppt/slides/slide15.xml><?xml version="1.0" encoding="utf-8"?>
+<p:sld xmlns:a="http://schemas.openxmlformats.org/drawingml/2006/main" xmlns:r="http://schemas.openxmlformats.org/officeDocument/2006/relationships" xmlns:p="http://schemas.openxmlformats.org/presentationml/2006/main">
+  <p:cSld>
+    <p:spTree>
+      <p:nvGrpSpPr>
+        <p:cNvPr id="1" name=""/>
+        <p:cNvGrpSpPr/>
+        <p:nvPr/>
+      </p:nvGrpSpPr>
+      <p:grpSpPr>
+        <a:xfrm>
+          <a:off x="0" y="0"/>
+          <a:ext cx="0" cy="0"/>
+          <a:chOff x="0" y="0"/>
+          <a:chExt cx="0" cy="0"/>
+        </a:xfrm>
+      </p:grpSpPr>
+      <p:cxnSp>
+        <p:nvCxnSpPr>
+          <p:cNvPr id="6" name="Straight Connector 5"/>
+          <p:cNvCxnSpPr>
+            <a:cxnSpLocks/>
+          </p:cNvCxnSpPr>
+          <p:nvPr/>
+        </p:nvCxnSpPr>
+        <p:spPr>
+          <a:xfrm>
+            <a:off x="3708972" y="2958754"/>
+            <a:ext cx="2527441" cy="0"/>
+          </a:xfrm>
+          <a:prstGeom prst="line">
+            <a:avLst/>
+          </a:prstGeom>
+          <a:ln w="38100" cap="flat" cmpd="sng" algn="ctr">
+            <a:solidFill>
+              <a:srgbClr val="000000"/>
+            </a:solidFill>
+            <a:prstDash val="solid"/>
+            <a:round/>
+            <a:headEnd type="none" w="med" len="med"/>
+            <a:tailEnd type="none" w="med" len="med"/>
+          </a:ln>
+        </p:spPr>
+        <p:style>
+          <a:lnRef idx="2">
+            <a:schemeClr val="accent1"/>
+          </a:lnRef>
+          <a:fillRef idx="0">
+            <a:schemeClr val="accent1"/>
+          </a:fillRef>
+          <a:effectRef idx="1">
+            <a:schemeClr val="accent1"/>
+          </a:effectRef>
+          <a:fontRef idx="minor">
+            <a:schemeClr val="tx1"/>
+          </a:fontRef>
+        </p:style>
+      </p:cxnSp>
+      <p:sp>
+        <p:nvSpPr>
+          <p:cNvPr id="8" name="Right Arrow 7"/>
+          <p:cNvSpPr/>
+          <p:nvPr/>
+        </p:nvSpPr>
+        <p:spPr>
+          <a:xfrm>
+            <a:off x="3996647" y="2783684"/>
+            <a:ext cx="1741551" cy="350140"/>
+          </a:xfrm>
+          <a:prstGeom prst="rightArrow">
+            <a:avLst>
+              <a:gd name="adj1" fmla="val 100000"/>
+              <a:gd name="adj2" fmla="val 52194"/>
+            </a:avLst>
+          </a:prstGeom>
+          <a:solidFill>
+            <a:srgbClr val="008000"/>
+          </a:solidFill>
+          <a:ln w="38100" cap="flat" cmpd="sng" algn="ctr">
+            <a:solidFill>
+              <a:srgbClr val="000000"/>
+            </a:solidFill>
+            <a:prstDash val="solid"/>
+            <a:round/>
+            <a:headEnd type="none" w="med" len="med"/>
+            <a:tailEnd type="none" w="med" len="med"/>
+          </a:ln>
+        </p:spPr>
+        <p:style>
+          <a:lnRef idx="1">
+            <a:schemeClr val="accent1"/>
+          </a:lnRef>
+          <a:fillRef idx="3">
+            <a:schemeClr val="accent1"/>
+          </a:fillRef>
+          <a:effectRef idx="2">
+            <a:schemeClr val="accent1"/>
+          </a:effectRef>
+          <a:fontRef idx="minor">
+            <a:schemeClr val="lt1"/>
+          </a:fontRef>
+        </p:style>
+        <p:txBody>
+          <a:bodyPr rtlCol="0" anchor="ctr"/>
+          <a:lstStyle/>
+          <a:p>
+            <a:pPr algn="ctr"/>
+            <a:r>
+              <a:rPr lang="en-US" i="1" dirty="0" err="1">
+                <a:solidFill>
+                  <a:schemeClr val="tx1"/>
+                </a:solidFill>
+              </a:rPr>
+              <a:t>gfp</a:t>
+            </a:r>
+            <a:endParaRPr lang="en-US" i="1" dirty="0">
+              <a:solidFill>
+                <a:schemeClr val="tx1"/>
+              </a:solidFill>
+            </a:endParaRPr>
+          </a:p>
+        </p:txBody>
+      </p:sp>
+      <p:pic>
+        <p:nvPicPr>
+          <p:cNvPr id="5" name="Picture 4">
+            <a:extLst>
+              <a:ext uri="{FF2B5EF4-FFF2-40B4-BE49-F238E27FC236}">
+                <a16:creationId xmlns:a16="http://schemas.microsoft.com/office/drawing/2014/main" id="{CFD73A60-6596-CF41-8075-6FA9709AE8D4}"/>
+              </a:ext>
+            </a:extLst>
+          </p:cNvPr>
+          <p:cNvPicPr>
+            <a:picLocks noChangeAspect="1"/>
+          </p:cNvPicPr>
+          <p:nvPr/>
+        </p:nvPicPr>
+        <p:blipFill>
+          <a:blip r:embed="rId2"/>
+          <a:stretch>
+            <a:fillRect/>
+          </a:stretch>
+        </p:blipFill>
+        <p:spPr>
+          <a:xfrm>
+            <a:off x="5868856" y="2465041"/>
+            <a:ext cx="548640" cy="548640"/>
+          </a:xfrm>
+          <a:prstGeom prst="rect">
+            <a:avLst/>
+          </a:prstGeom>
+        </p:spPr>
+      </p:pic>
+      <p:pic>
+        <p:nvPicPr>
+          <p:cNvPr id="11" name="Picture 10">
+            <a:extLst>
+              <a:ext uri="{FF2B5EF4-FFF2-40B4-BE49-F238E27FC236}">
+                <a16:creationId xmlns:a16="http://schemas.microsoft.com/office/drawing/2014/main" id="{E74D5F5B-DE26-1240-987C-733277D3DE73}"/>
+              </a:ext>
+            </a:extLst>
+          </p:cNvPr>
+          <p:cNvPicPr>
+            <a:picLocks noChangeAspect="1"/>
+          </p:cNvPicPr>
+          <p:nvPr/>
+        </p:nvPicPr>
+        <p:blipFill>
+          <a:blip r:embed="rId3"/>
+          <a:stretch>
+            <a:fillRect/>
+          </a:stretch>
+        </p:blipFill>
+        <p:spPr>
+          <a:xfrm>
+            <a:off x="5477233" y="2457298"/>
+            <a:ext cx="548640" cy="548640"/>
+          </a:xfrm>
+          <a:prstGeom prst="rect">
+            <a:avLst/>
+          </a:prstGeom>
+        </p:spPr>
+      </p:pic>
+    </p:spTree>
+    <p:extLst>
+      <p:ext uri="{BB962C8B-B14F-4D97-AF65-F5344CB8AC3E}">
+        <p14:creationId xmlns:p14="http://schemas.microsoft.com/office/powerpoint/2010/main" val="1766675993"/>
+      </p:ext>
+    </p:extLst>
+  </p:cSld>
+  <p:clrMapOvr>
+    <a:masterClrMapping/>
+  </p:clrMapOvr>
+</p:sld>
+</file>
+
 <file path=ppt/slides/slide2.xml><?xml version="1.0" encoding="utf-8"?>
 <p:sld xmlns:a="http://schemas.openxmlformats.org/drawingml/2006/main" xmlns:r="http://schemas.openxmlformats.org/officeDocument/2006/relationships" xmlns:p="http://schemas.openxmlformats.org/presentationml/2006/main">
   <p:cSld>

</xml_diff>

<commit_message>
All SEP examples through SEP V017 incorporated
</commit_message>
<xml_diff>
--- a/specification/imgsrc/examples.pptx
+++ b/specification/imgsrc/examples.pptx
@@ -5,7 +5,7 @@
     <p:sldMasterId id="2147483648" r:id="rId1"/>
   </p:sldMasterIdLst>
   <p:notesMasterIdLst>
-    <p:notesMasterId r:id="rId17"/>
+    <p:notesMasterId r:id="rId18"/>
   </p:notesMasterIdLst>
   <p:sldIdLst>
     <p:sldId id="257" r:id="rId2"/>
@@ -23,6 +23,7 @@
     <p:sldId id="269" r:id="rId14"/>
     <p:sldId id="271" r:id="rId15"/>
     <p:sldId id="272" r:id="rId16"/>
+    <p:sldId id="273" r:id="rId17"/>
   </p:sldIdLst>
   <p:sldSz cx="9144000" cy="6858000" type="screen4x3"/>
   <p:notesSz cx="6858000" cy="9144000"/>
@@ -7933,6 +7934,760 @@
 </p:sld>
 </file>
 
+<file path=ppt/slides/slide16.xml><?xml version="1.0" encoding="utf-8"?>
+<p:sld xmlns:a="http://schemas.openxmlformats.org/drawingml/2006/main" xmlns:r="http://schemas.openxmlformats.org/officeDocument/2006/relationships" xmlns:p="http://schemas.openxmlformats.org/presentationml/2006/main">
+  <p:cSld>
+    <p:spTree>
+      <p:nvGrpSpPr>
+        <p:cNvPr id="1" name=""/>
+        <p:cNvGrpSpPr/>
+        <p:nvPr/>
+      </p:nvGrpSpPr>
+      <p:grpSpPr>
+        <a:xfrm>
+          <a:off x="0" y="0"/>
+          <a:ext cx="0" cy="0"/>
+          <a:chOff x="0" y="0"/>
+          <a:chExt cx="0" cy="0"/>
+        </a:xfrm>
+      </p:grpSpPr>
+      <p:sp>
+        <p:nvSpPr>
+          <p:cNvPr id="14" name="Rounded Rectangle 13">
+            <a:extLst>
+              <a:ext uri="{FF2B5EF4-FFF2-40B4-BE49-F238E27FC236}">
+                <a16:creationId xmlns:a16="http://schemas.microsoft.com/office/drawing/2014/main" id="{26B75D52-90C0-2543-8C23-8E6CB6D25EDC}"/>
+              </a:ext>
+            </a:extLst>
+          </p:cNvPr>
+          <p:cNvSpPr/>
+          <p:nvPr/>
+        </p:nvSpPr>
+        <p:spPr>
+          <a:xfrm>
+            <a:off x="2955792" y="3116352"/>
+            <a:ext cx="731520" cy="274320"/>
+          </a:xfrm>
+          <a:prstGeom prst="roundRect">
+            <a:avLst>
+              <a:gd name="adj" fmla="val 50000"/>
+            </a:avLst>
+          </a:prstGeom>
+          <a:solidFill>
+            <a:srgbClr val="4472C4"/>
+          </a:solidFill>
+          <a:ln w="12700" cap="flat" cmpd="sng" algn="ctr">
+            <a:solidFill>
+              <a:srgbClr val="4472C4">
+                <a:shade val="50000"/>
+              </a:srgbClr>
+            </a:solidFill>
+            <a:prstDash val="solid"/>
+            <a:miter lim="800000"/>
+          </a:ln>
+          <a:effectLst/>
+        </p:spPr>
+        <p:txBody>
+          <a:bodyPr rtlCol="0" anchor="ctr"/>
+          <a:lstStyle/>
+          <a:p>
+            <a:pPr marL="0" marR="0" lvl="0" indent="0" algn="ctr" defTabSz="914400" eaLnBrk="1" fontAlgn="auto" latinLnBrk="0" hangingPunct="1">
+              <a:lnSpc>
+                <a:spcPct val="100000"/>
+              </a:lnSpc>
+              <a:spcBef>
+                <a:spcPts val="0"/>
+              </a:spcBef>
+              <a:spcAft>
+                <a:spcPts val="0"/>
+              </a:spcAft>
+              <a:buClrTx/>
+              <a:buSzTx/>
+              <a:buFontTx/>
+              <a:buNone/>
+              <a:tabLst/>
+              <a:defRPr/>
+            </a:pPr>
+            <a:r>
+              <a:rPr kumimoji="0" lang="en-US" sz="1800" b="0" i="0" u="none" strike="noStrike" kern="0" cap="none" spc="0" normalizeH="0" baseline="0" noProof="0" dirty="0" err="1">
+                <a:ln>
+                  <a:noFill/>
+                </a:ln>
+                <a:solidFill>
+                  <a:prstClr val="white"/>
+                </a:solidFill>
+                <a:effectLst/>
+                <a:uLnTx/>
+                <a:uFillTx/>
+                <a:latin typeface="Calibri" panose="020F0502020204030204"/>
+                <a:ea typeface="+mn-ea"/>
+                <a:cs typeface="+mn-cs"/>
+              </a:rPr>
+              <a:t>AraC</a:t>
+            </a:r>
+            <a:endParaRPr kumimoji="0" lang="en-US" sz="1800" b="0" i="0" u="none" strike="noStrike" kern="0" cap="none" spc="0" normalizeH="0" baseline="0" noProof="0" dirty="0">
+              <a:ln>
+                <a:noFill/>
+              </a:ln>
+              <a:solidFill>
+                <a:prstClr val="white"/>
+              </a:solidFill>
+              <a:effectLst/>
+              <a:uLnTx/>
+              <a:uFillTx/>
+              <a:latin typeface="Calibri" panose="020F0502020204030204"/>
+              <a:ea typeface="+mn-ea"/>
+              <a:cs typeface="+mn-cs"/>
+            </a:endParaRPr>
+          </a:p>
+        </p:txBody>
+      </p:sp>
+      <p:sp>
+        <p:nvSpPr>
+          <p:cNvPr id="15" name="Oval 14">
+            <a:extLst>
+              <a:ext uri="{FF2B5EF4-FFF2-40B4-BE49-F238E27FC236}">
+                <a16:creationId xmlns:a16="http://schemas.microsoft.com/office/drawing/2014/main" id="{79050B21-2A65-4544-BB1C-FAE9FB09E670}"/>
+              </a:ext>
+            </a:extLst>
+          </p:cNvPr>
+          <p:cNvSpPr/>
+          <p:nvPr/>
+        </p:nvSpPr>
+        <p:spPr>
+          <a:xfrm>
+            <a:off x="4180393" y="3170930"/>
+            <a:ext cx="173619" cy="173619"/>
+          </a:xfrm>
+          <a:prstGeom prst="ellipse">
+            <a:avLst/>
+          </a:prstGeom>
+          <a:solidFill>
+            <a:srgbClr val="FF0000"/>
+          </a:solidFill>
+          <a:ln w="12700" cap="flat" cmpd="sng" algn="ctr">
+            <a:solidFill>
+              <a:srgbClr val="FF0000"/>
+            </a:solidFill>
+            <a:prstDash val="solid"/>
+            <a:miter lim="800000"/>
+          </a:ln>
+          <a:effectLst/>
+        </p:spPr>
+        <p:txBody>
+          <a:bodyPr rtlCol="0" anchor="ctr"/>
+          <a:lstStyle/>
+          <a:p>
+            <a:pPr marL="0" marR="0" lvl="0" indent="0" algn="ctr" defTabSz="914400" eaLnBrk="1" fontAlgn="auto" latinLnBrk="0" hangingPunct="1">
+              <a:lnSpc>
+                <a:spcPct val="100000"/>
+              </a:lnSpc>
+              <a:spcBef>
+                <a:spcPts val="0"/>
+              </a:spcBef>
+              <a:spcAft>
+                <a:spcPts val="0"/>
+              </a:spcAft>
+              <a:buClrTx/>
+              <a:buSzTx/>
+              <a:buFontTx/>
+              <a:buNone/>
+              <a:tabLst/>
+              <a:defRPr/>
+            </a:pPr>
+            <a:endParaRPr kumimoji="0" lang="en-US" sz="1800" b="0" i="0" u="none" strike="noStrike" kern="0" cap="none" spc="0" normalizeH="0" baseline="0" noProof="0">
+              <a:ln>
+                <a:noFill/>
+              </a:ln>
+              <a:solidFill>
+                <a:prstClr val="white"/>
+              </a:solidFill>
+              <a:effectLst/>
+              <a:uLnTx/>
+              <a:uFillTx/>
+              <a:latin typeface="Calibri" panose="020F0502020204030204"/>
+              <a:ea typeface="+mn-ea"/>
+              <a:cs typeface="+mn-cs"/>
+            </a:endParaRPr>
+          </a:p>
+        </p:txBody>
+      </p:sp>
+      <p:cxnSp>
+        <p:nvCxnSpPr>
+          <p:cNvPr id="16" name="Straight Connector 15">
+            <a:extLst>
+              <a:ext uri="{FF2B5EF4-FFF2-40B4-BE49-F238E27FC236}">
+                <a16:creationId xmlns:a16="http://schemas.microsoft.com/office/drawing/2014/main" id="{2F5E5F13-2142-054E-949C-865B6CAAAEB6}"/>
+              </a:ext>
+            </a:extLst>
+          </p:cNvPr>
+          <p:cNvCxnSpPr>
+            <a:cxnSpLocks/>
+          </p:cNvCxnSpPr>
+          <p:nvPr/>
+        </p:nvCxnSpPr>
+        <p:spPr>
+          <a:xfrm>
+            <a:off x="5814355" y="3593405"/>
+            <a:ext cx="1028217" cy="0"/>
+          </a:xfrm>
+          <a:prstGeom prst="line">
+            <a:avLst/>
+          </a:prstGeom>
+          <a:noFill/>
+          <a:ln w="38100" cap="flat" cmpd="sng" algn="ctr">
+            <a:solidFill>
+              <a:srgbClr val="4472C4"/>
+            </a:solidFill>
+            <a:prstDash val="solid"/>
+            <a:miter lim="800000"/>
+          </a:ln>
+          <a:effectLst/>
+        </p:spPr>
+      </p:cxnSp>
+      <p:sp>
+        <p:nvSpPr>
+          <p:cNvPr id="17" name="Bent Arrow 16">
+            <a:extLst>
+              <a:ext uri="{FF2B5EF4-FFF2-40B4-BE49-F238E27FC236}">
+                <a16:creationId xmlns:a16="http://schemas.microsoft.com/office/drawing/2014/main" id="{4D923FC1-2AC2-4842-BC63-B557752C5906}"/>
+              </a:ext>
+            </a:extLst>
+          </p:cNvPr>
+          <p:cNvSpPr/>
+          <p:nvPr/>
+        </p:nvSpPr>
+        <p:spPr>
+          <a:xfrm>
+            <a:off x="6068998" y="2922073"/>
+            <a:ext cx="544011" cy="671332"/>
+          </a:xfrm>
+          <a:prstGeom prst="bentArrow">
+            <a:avLst/>
+          </a:prstGeom>
+          <a:solidFill>
+            <a:srgbClr val="4472C4"/>
+          </a:solidFill>
+          <a:ln w="12700" cap="flat" cmpd="sng" algn="ctr">
+            <a:solidFill>
+              <a:srgbClr val="4472C4">
+                <a:shade val="50000"/>
+              </a:srgbClr>
+            </a:solidFill>
+            <a:prstDash val="solid"/>
+            <a:miter lim="800000"/>
+          </a:ln>
+          <a:effectLst/>
+        </p:spPr>
+        <p:txBody>
+          <a:bodyPr rtlCol="0" anchor="ctr"/>
+          <a:lstStyle/>
+          <a:p>
+            <a:pPr marL="0" marR="0" lvl="0" indent="0" algn="ctr" defTabSz="914400" eaLnBrk="1" fontAlgn="auto" latinLnBrk="0" hangingPunct="1">
+              <a:lnSpc>
+                <a:spcPct val="100000"/>
+              </a:lnSpc>
+              <a:spcBef>
+                <a:spcPts val="0"/>
+              </a:spcBef>
+              <a:spcAft>
+                <a:spcPts val="0"/>
+              </a:spcAft>
+              <a:buClrTx/>
+              <a:buSzTx/>
+              <a:buFontTx/>
+              <a:buNone/>
+              <a:tabLst/>
+              <a:defRPr/>
+            </a:pPr>
+            <a:endParaRPr kumimoji="0" lang="en-US" sz="1800" b="0" i="0" u="none" strike="noStrike" kern="0" cap="none" spc="0" normalizeH="0" baseline="0" noProof="0">
+              <a:ln>
+                <a:noFill/>
+              </a:ln>
+              <a:solidFill>
+                <a:prstClr val="black"/>
+              </a:solidFill>
+              <a:effectLst/>
+              <a:uLnTx/>
+              <a:uFillTx/>
+              <a:latin typeface="Calibri" panose="020F0502020204030204"/>
+              <a:ea typeface="+mn-ea"/>
+              <a:cs typeface="+mn-cs"/>
+            </a:endParaRPr>
+          </a:p>
+        </p:txBody>
+      </p:sp>
+      <p:sp>
+        <p:nvSpPr>
+          <p:cNvPr id="18" name="TextBox 17">
+            <a:extLst>
+              <a:ext uri="{FF2B5EF4-FFF2-40B4-BE49-F238E27FC236}">
+                <a16:creationId xmlns:a16="http://schemas.microsoft.com/office/drawing/2014/main" id="{DBA60F69-1A8F-D645-9832-8C3DE86D2C15}"/>
+              </a:ext>
+            </a:extLst>
+          </p:cNvPr>
+          <p:cNvSpPr txBox="1"/>
+          <p:nvPr/>
+        </p:nvSpPr>
+        <p:spPr>
+          <a:xfrm>
+            <a:off x="5814355" y="3593405"/>
+            <a:ext cx="705001" cy="369332"/>
+          </a:xfrm>
+          <a:prstGeom prst="rect">
+            <a:avLst/>
+          </a:prstGeom>
+          <a:noFill/>
+        </p:spPr>
+        <p:txBody>
+          <a:bodyPr wrap="none" rtlCol="0">
+            <a:spAutoFit/>
+          </a:bodyPr>
+          <a:lstStyle/>
+          <a:p>
+            <a:pPr marL="0" marR="0" lvl="0" indent="0" defTabSz="914400" eaLnBrk="1" fontAlgn="auto" latinLnBrk="0" hangingPunct="1">
+              <a:lnSpc>
+                <a:spcPct val="100000"/>
+              </a:lnSpc>
+              <a:spcBef>
+                <a:spcPts val="0"/>
+              </a:spcBef>
+              <a:spcAft>
+                <a:spcPts val="0"/>
+              </a:spcAft>
+              <a:buClrTx/>
+              <a:buSzTx/>
+              <a:buFontTx/>
+              <a:buNone/>
+              <a:tabLst/>
+              <a:defRPr/>
+            </a:pPr>
+            <a:r>
+              <a:rPr kumimoji="0" lang="en-US" sz="1800" b="0" i="0" u="none" strike="noStrike" kern="0" cap="none" spc="0" normalizeH="0" baseline="0" noProof="0" dirty="0" err="1">
+                <a:ln>
+                  <a:noFill/>
+                </a:ln>
+                <a:solidFill>
+                  <a:prstClr val="black"/>
+                </a:solidFill>
+                <a:effectLst/>
+                <a:uLnTx/>
+                <a:uFillTx/>
+              </a:rPr>
+              <a:t>pBAD</a:t>
+            </a:r>
+            <a:endParaRPr kumimoji="0" lang="en-US" sz="1800" b="0" i="0" u="none" strike="noStrike" kern="0" cap="none" spc="0" normalizeH="0" baseline="0" noProof="0" dirty="0">
+              <a:ln>
+                <a:noFill/>
+              </a:ln>
+              <a:solidFill>
+                <a:prstClr val="black"/>
+              </a:solidFill>
+              <a:effectLst/>
+              <a:uLnTx/>
+              <a:uFillTx/>
+            </a:endParaRPr>
+          </a:p>
+        </p:txBody>
+      </p:sp>
+      <p:cxnSp>
+        <p:nvCxnSpPr>
+          <p:cNvPr id="19" name="Straight Connector 18">
+            <a:extLst>
+              <a:ext uri="{FF2B5EF4-FFF2-40B4-BE49-F238E27FC236}">
+                <a16:creationId xmlns:a16="http://schemas.microsoft.com/office/drawing/2014/main" id="{E481CEDD-DB99-C848-86C6-02542F1376ED}"/>
+              </a:ext>
+            </a:extLst>
+          </p:cNvPr>
+          <p:cNvCxnSpPr>
+            <a:cxnSpLocks/>
+            <a:stCxn id="15" idx="0"/>
+          </p:cNvCxnSpPr>
+          <p:nvPr/>
+        </p:nvCxnSpPr>
+        <p:spPr>
+          <a:xfrm flipH="1" flipV="1">
+            <a:off x="4267202" y="2754242"/>
+            <a:ext cx="1" cy="416688"/>
+          </a:xfrm>
+          <a:prstGeom prst="line">
+            <a:avLst/>
+          </a:prstGeom>
+          <a:noFill/>
+          <a:ln w="38100" cap="flat" cmpd="sng" algn="ctr">
+            <a:solidFill>
+              <a:srgbClr val="FF0000"/>
+            </a:solidFill>
+            <a:prstDash val="solid"/>
+            <a:miter lim="800000"/>
+          </a:ln>
+          <a:effectLst/>
+        </p:spPr>
+      </p:cxnSp>
+      <p:cxnSp>
+        <p:nvCxnSpPr>
+          <p:cNvPr id="20" name="Straight Connector 19">
+            <a:extLst>
+              <a:ext uri="{FF2B5EF4-FFF2-40B4-BE49-F238E27FC236}">
+                <a16:creationId xmlns:a16="http://schemas.microsoft.com/office/drawing/2014/main" id="{061F521D-B79A-8D4D-B647-A1CACCF5B8CE}"/>
+              </a:ext>
+            </a:extLst>
+          </p:cNvPr>
+          <p:cNvCxnSpPr>
+            <a:cxnSpLocks/>
+            <a:stCxn id="15" idx="2"/>
+            <a:endCxn id="14" idx="3"/>
+          </p:cNvCxnSpPr>
+          <p:nvPr/>
+        </p:nvCxnSpPr>
+        <p:spPr>
+          <a:xfrm flipH="1" flipV="1">
+            <a:off x="3687312" y="3253512"/>
+            <a:ext cx="493081" cy="4228"/>
+          </a:xfrm>
+          <a:prstGeom prst="line">
+            <a:avLst/>
+          </a:prstGeom>
+          <a:noFill/>
+          <a:ln w="38100" cap="flat" cmpd="sng" algn="ctr">
+            <a:solidFill>
+              <a:srgbClr val="FF0000"/>
+            </a:solidFill>
+            <a:prstDash val="solid"/>
+            <a:miter lim="800000"/>
+          </a:ln>
+          <a:effectLst/>
+        </p:spPr>
+      </p:cxnSp>
+      <p:cxnSp>
+        <p:nvCxnSpPr>
+          <p:cNvPr id="21" name="Straight Connector 20">
+            <a:extLst>
+              <a:ext uri="{FF2B5EF4-FFF2-40B4-BE49-F238E27FC236}">
+                <a16:creationId xmlns:a16="http://schemas.microsoft.com/office/drawing/2014/main" id="{224B1C46-A724-004B-9CCA-FDF4322460E7}"/>
+              </a:ext>
+            </a:extLst>
+          </p:cNvPr>
+          <p:cNvCxnSpPr>
+            <a:cxnSpLocks/>
+            <a:endCxn id="15" idx="6"/>
+          </p:cNvCxnSpPr>
+          <p:nvPr/>
+        </p:nvCxnSpPr>
+        <p:spPr>
+          <a:xfrm flipH="1">
+            <a:off x="4354012" y="3257740"/>
+            <a:ext cx="1562589" cy="0"/>
+          </a:xfrm>
+          <a:prstGeom prst="line">
+            <a:avLst/>
+          </a:prstGeom>
+          <a:noFill/>
+          <a:ln w="38100" cap="flat" cmpd="sng" algn="ctr">
+            <a:solidFill>
+              <a:srgbClr val="FF0000"/>
+            </a:solidFill>
+            <a:prstDash val="solid"/>
+            <a:miter lim="800000"/>
+            <a:headEnd type="triangle" w="med" len="med"/>
+            <a:tailEnd type="none" w="med" len="med"/>
+          </a:ln>
+          <a:effectLst/>
+        </p:spPr>
+      </p:cxnSp>
+      <p:sp>
+        <p:nvSpPr>
+          <p:cNvPr id="22" name="Rounded Rectangle 21">
+            <a:extLst>
+              <a:ext uri="{FF2B5EF4-FFF2-40B4-BE49-F238E27FC236}">
+                <a16:creationId xmlns:a16="http://schemas.microsoft.com/office/drawing/2014/main" id="{22EAEC5A-5CDE-B34E-8CEC-6331C1DC7145}"/>
+              </a:ext>
+            </a:extLst>
+          </p:cNvPr>
+          <p:cNvSpPr/>
+          <p:nvPr/>
+        </p:nvSpPr>
+        <p:spPr>
+          <a:xfrm>
+            <a:off x="4736384" y="3116352"/>
+            <a:ext cx="731520" cy="274320"/>
+          </a:xfrm>
+          <a:prstGeom prst="roundRect">
+            <a:avLst>
+              <a:gd name="adj" fmla="val 50000"/>
+            </a:avLst>
+          </a:prstGeom>
+          <a:solidFill>
+            <a:srgbClr val="4472C4"/>
+          </a:solidFill>
+          <a:ln w="12700" cap="flat" cmpd="sng" algn="ctr">
+            <a:solidFill>
+              <a:srgbClr val="4472C4">
+                <a:shade val="50000"/>
+              </a:srgbClr>
+            </a:solidFill>
+            <a:prstDash val="solid"/>
+            <a:miter lim="800000"/>
+          </a:ln>
+          <a:effectLst/>
+        </p:spPr>
+        <p:txBody>
+          <a:bodyPr rtlCol="0" anchor="ctr"/>
+          <a:lstStyle/>
+          <a:p>
+            <a:pPr marL="0" marR="0" lvl="0" indent="0" algn="ctr" defTabSz="914400" eaLnBrk="1" fontAlgn="auto" latinLnBrk="0" hangingPunct="1">
+              <a:lnSpc>
+                <a:spcPct val="100000"/>
+              </a:lnSpc>
+              <a:spcBef>
+                <a:spcPts val="0"/>
+              </a:spcBef>
+              <a:spcAft>
+                <a:spcPts val="0"/>
+              </a:spcAft>
+              <a:buClrTx/>
+              <a:buSzTx/>
+              <a:buFontTx/>
+              <a:buNone/>
+              <a:tabLst/>
+              <a:defRPr/>
+            </a:pPr>
+            <a:endParaRPr kumimoji="0" lang="en-US" sz="1800" b="0" i="0" u="none" strike="noStrike" kern="0" cap="none" spc="0" normalizeH="0" baseline="0" noProof="0" dirty="0">
+              <a:ln>
+                <a:noFill/>
+              </a:ln>
+              <a:solidFill>
+                <a:prstClr val="white"/>
+              </a:solidFill>
+              <a:effectLst/>
+              <a:uLnTx/>
+              <a:uFillTx/>
+              <a:latin typeface="Calibri" panose="020F0502020204030204"/>
+              <a:ea typeface="+mn-ea"/>
+              <a:cs typeface="+mn-cs"/>
+            </a:endParaRPr>
+          </a:p>
+        </p:txBody>
+      </p:sp>
+      <p:sp>
+        <p:nvSpPr>
+          <p:cNvPr id="23" name="TextBox 22">
+            <a:extLst>
+              <a:ext uri="{FF2B5EF4-FFF2-40B4-BE49-F238E27FC236}">
+                <a16:creationId xmlns:a16="http://schemas.microsoft.com/office/drawing/2014/main" id="{EF53A5DF-F80E-2F46-91C4-C05673694EEE}"/>
+              </a:ext>
+            </a:extLst>
+          </p:cNvPr>
+          <p:cNvSpPr txBox="1"/>
+          <p:nvPr/>
+        </p:nvSpPr>
+        <p:spPr>
+          <a:xfrm>
+            <a:off x="4017384" y="2283535"/>
+            <a:ext cx="503728" cy="369332"/>
+          </a:xfrm>
+          <a:prstGeom prst="rect">
+            <a:avLst/>
+          </a:prstGeom>
+          <a:noFill/>
+        </p:spPr>
+        <p:txBody>
+          <a:bodyPr wrap="none" rtlCol="0">
+            <a:spAutoFit/>
+          </a:bodyPr>
+          <a:lstStyle/>
+          <a:p>
+            <a:pPr marL="0" marR="0" lvl="0" indent="0" defTabSz="914400" eaLnBrk="1" fontAlgn="auto" latinLnBrk="0" hangingPunct="1">
+              <a:lnSpc>
+                <a:spcPct val="100000"/>
+              </a:lnSpc>
+              <a:spcBef>
+                <a:spcPts val="0"/>
+              </a:spcBef>
+              <a:spcAft>
+                <a:spcPts val="0"/>
+              </a:spcAft>
+              <a:buClrTx/>
+              <a:buSzTx/>
+              <a:buFontTx/>
+              <a:buNone/>
+              <a:tabLst/>
+              <a:defRPr/>
+            </a:pPr>
+            <a:r>
+              <a:rPr kumimoji="0" lang="en-US" sz="1800" b="0" i="0" u="none" strike="noStrike" kern="0" cap="none" spc="0" normalizeH="0" baseline="0" noProof="0" dirty="0">
+                <a:ln>
+                  <a:noFill/>
+                </a:ln>
+                <a:solidFill>
+                  <a:prstClr val="black"/>
+                </a:solidFill>
+                <a:effectLst/>
+                <a:uLnTx/>
+                <a:uFillTx/>
+              </a:rPr>
+              <a:t>Ara</a:t>
+            </a:r>
+          </a:p>
+        </p:txBody>
+      </p:sp>
+      <p:sp>
+        <p:nvSpPr>
+          <p:cNvPr id="24" name="Regular Pentagon 23">
+            <a:extLst>
+              <a:ext uri="{FF2B5EF4-FFF2-40B4-BE49-F238E27FC236}">
+                <a16:creationId xmlns:a16="http://schemas.microsoft.com/office/drawing/2014/main" id="{3829286B-B000-7245-B0A2-6E7534626E54}"/>
+              </a:ext>
+            </a:extLst>
+          </p:cNvPr>
+          <p:cNvSpPr/>
+          <p:nvPr/>
+        </p:nvSpPr>
+        <p:spPr>
+          <a:xfrm>
+            <a:off x="4145263" y="2589396"/>
+            <a:ext cx="230915" cy="219919"/>
+          </a:xfrm>
+          <a:prstGeom prst="pentagon">
+            <a:avLst/>
+          </a:prstGeom>
+          <a:solidFill>
+            <a:srgbClr val="70AD47"/>
+          </a:solidFill>
+          <a:ln w="12700" cap="flat" cmpd="sng" algn="ctr">
+            <a:solidFill>
+              <a:srgbClr val="4472C4">
+                <a:shade val="50000"/>
+              </a:srgbClr>
+            </a:solidFill>
+            <a:prstDash val="solid"/>
+            <a:miter lim="800000"/>
+          </a:ln>
+          <a:effectLst/>
+        </p:spPr>
+        <p:txBody>
+          <a:bodyPr rtlCol="0" anchor="ctr"/>
+          <a:lstStyle/>
+          <a:p>
+            <a:pPr marL="0" marR="0" lvl="0" indent="0" algn="ctr" defTabSz="914400" eaLnBrk="1" fontAlgn="auto" latinLnBrk="0" hangingPunct="1">
+              <a:lnSpc>
+                <a:spcPct val="100000"/>
+              </a:lnSpc>
+              <a:spcBef>
+                <a:spcPts val="0"/>
+              </a:spcBef>
+              <a:spcAft>
+                <a:spcPts val="0"/>
+              </a:spcAft>
+              <a:buClrTx/>
+              <a:buSzTx/>
+              <a:buFontTx/>
+              <a:buNone/>
+              <a:tabLst/>
+              <a:defRPr/>
+            </a:pPr>
+            <a:endParaRPr kumimoji="0" lang="en-US" sz="1800" b="0" i="0" u="none" strike="noStrike" kern="0" cap="none" spc="0" normalizeH="0" baseline="0" noProof="0">
+              <a:ln>
+                <a:noFill/>
+              </a:ln>
+              <a:solidFill>
+                <a:prstClr val="white"/>
+              </a:solidFill>
+              <a:effectLst/>
+              <a:uLnTx/>
+              <a:uFillTx/>
+              <a:latin typeface="Calibri" panose="020F0502020204030204"/>
+              <a:ea typeface="+mn-ea"/>
+              <a:cs typeface="+mn-cs"/>
+            </a:endParaRPr>
+          </a:p>
+        </p:txBody>
+      </p:sp>
+      <p:sp>
+        <p:nvSpPr>
+          <p:cNvPr id="25" name="Regular Pentagon 24">
+            <a:extLst>
+              <a:ext uri="{FF2B5EF4-FFF2-40B4-BE49-F238E27FC236}">
+                <a16:creationId xmlns:a16="http://schemas.microsoft.com/office/drawing/2014/main" id="{17A61F14-5A32-FF4C-B73E-D89E09031BC0}"/>
+              </a:ext>
+            </a:extLst>
+          </p:cNvPr>
+          <p:cNvSpPr/>
+          <p:nvPr/>
+        </p:nvSpPr>
+        <p:spPr>
+          <a:xfrm>
+            <a:off x="5153302" y="3222674"/>
+            <a:ext cx="230915" cy="219919"/>
+          </a:xfrm>
+          <a:prstGeom prst="pentagon">
+            <a:avLst/>
+          </a:prstGeom>
+          <a:solidFill>
+            <a:srgbClr val="70AD47"/>
+          </a:solidFill>
+          <a:ln w="12700" cap="flat" cmpd="sng" algn="ctr">
+            <a:solidFill>
+              <a:srgbClr val="4472C4">
+                <a:shade val="50000"/>
+              </a:srgbClr>
+            </a:solidFill>
+            <a:prstDash val="solid"/>
+            <a:miter lim="800000"/>
+          </a:ln>
+          <a:effectLst/>
+        </p:spPr>
+        <p:txBody>
+          <a:bodyPr rtlCol="0" anchor="ctr"/>
+          <a:lstStyle/>
+          <a:p>
+            <a:pPr marL="0" marR="0" lvl="0" indent="0" algn="ctr" defTabSz="914400" eaLnBrk="1" fontAlgn="auto" latinLnBrk="0" hangingPunct="1">
+              <a:lnSpc>
+                <a:spcPct val="100000"/>
+              </a:lnSpc>
+              <a:spcBef>
+                <a:spcPts val="0"/>
+              </a:spcBef>
+              <a:spcAft>
+                <a:spcPts val="0"/>
+              </a:spcAft>
+              <a:buClrTx/>
+              <a:buSzTx/>
+              <a:buFontTx/>
+              <a:buNone/>
+              <a:tabLst/>
+              <a:defRPr/>
+            </a:pPr>
+            <a:endParaRPr kumimoji="0" lang="en-US" sz="1800" b="0" i="0" u="none" strike="noStrike" kern="0" cap="none" spc="0" normalizeH="0" baseline="0" noProof="0">
+              <a:ln>
+                <a:noFill/>
+              </a:ln>
+              <a:solidFill>
+                <a:prstClr val="white"/>
+              </a:solidFill>
+              <a:effectLst/>
+              <a:uLnTx/>
+              <a:uFillTx/>
+              <a:latin typeface="Calibri" panose="020F0502020204030204"/>
+              <a:ea typeface="+mn-ea"/>
+              <a:cs typeface="+mn-cs"/>
+            </a:endParaRPr>
+          </a:p>
+        </p:txBody>
+      </p:sp>
+    </p:spTree>
+    <p:extLst>
+      <p:ext uri="{BB962C8B-B14F-4D97-AF65-F5344CB8AC3E}">
+        <p14:creationId xmlns:p14="http://schemas.microsoft.com/office/powerpoint/2010/main" val="2552426364"/>
+      </p:ext>
+    </p:extLst>
+  </p:cSld>
+  <p:clrMapOvr>
+    <a:masterClrMapping/>
+  </p:clrMapOvr>
+</p:sld>
+</file>
+
 <file path=ppt/slides/slide2.xml><?xml version="1.0" encoding="utf-8"?>
 <p:sld xmlns:a="http://schemas.openxmlformats.org/drawingml/2006/main" xmlns:r="http://schemas.openxmlformats.org/officeDocument/2006/relationships" xmlns:p="http://schemas.openxmlformats.org/presentationml/2006/main">
   <p:cSld>

</xml_diff>

<commit_message>
fixed all non-recommended usages in examples
</commit_message>
<xml_diff>
--- a/specification/imgsrc/examples.pptx
+++ b/specification/imgsrc/examples.pptx
@@ -224,7 +224,7 @@
           <a:p>
             <a:fld id="{A5398B87-931F-0F48-BDB8-4235032D88C0}" type="datetimeFigureOut">
               <a:rPr lang="en-US" smtClean="0"/>
-              <a:t>11/5/20</a:t>
+              <a:t>11/10/20</a:t>
             </a:fld>
             <a:endParaRPr lang="en-US"/>
           </a:p>
@@ -670,7 +670,7 @@
           <a:p>
             <a:fld id="{B519623D-D8C4-D246-A1F7-180DFBDF806B}" type="datetimeFigureOut">
               <a:rPr lang="en-US" smtClean="0"/>
-              <a:t>11/5/20</a:t>
+              <a:t>11/10/20</a:t>
             </a:fld>
             <a:endParaRPr lang="en-US"/>
           </a:p>
@@ -838,7 +838,7 @@
           <a:p>
             <a:fld id="{B519623D-D8C4-D246-A1F7-180DFBDF806B}" type="datetimeFigureOut">
               <a:rPr lang="en-US" smtClean="0"/>
-              <a:t>11/5/20</a:t>
+              <a:t>11/10/20</a:t>
             </a:fld>
             <a:endParaRPr lang="en-US"/>
           </a:p>
@@ -1016,7 +1016,7 @@
           <a:p>
             <a:fld id="{B519623D-D8C4-D246-A1F7-180DFBDF806B}" type="datetimeFigureOut">
               <a:rPr lang="en-US" smtClean="0"/>
-              <a:t>11/5/20</a:t>
+              <a:t>11/10/20</a:t>
             </a:fld>
             <a:endParaRPr lang="en-US"/>
           </a:p>
@@ -1184,7 +1184,7 @@
           <a:p>
             <a:fld id="{B519623D-D8C4-D246-A1F7-180DFBDF806B}" type="datetimeFigureOut">
               <a:rPr lang="en-US" smtClean="0"/>
-              <a:t>11/5/20</a:t>
+              <a:t>11/10/20</a:t>
             </a:fld>
             <a:endParaRPr lang="en-US"/>
           </a:p>
@@ -1429,7 +1429,7 @@
           <a:p>
             <a:fld id="{B519623D-D8C4-D246-A1F7-180DFBDF806B}" type="datetimeFigureOut">
               <a:rPr lang="en-US" smtClean="0"/>
-              <a:t>11/5/20</a:t>
+              <a:t>11/10/20</a:t>
             </a:fld>
             <a:endParaRPr lang="en-US"/>
           </a:p>
@@ -1714,7 +1714,7 @@
           <a:p>
             <a:fld id="{B519623D-D8C4-D246-A1F7-180DFBDF806B}" type="datetimeFigureOut">
               <a:rPr lang="en-US" smtClean="0"/>
-              <a:t>11/5/20</a:t>
+              <a:t>11/10/20</a:t>
             </a:fld>
             <a:endParaRPr lang="en-US"/>
           </a:p>
@@ -2133,7 +2133,7 @@
           <a:p>
             <a:fld id="{B519623D-D8C4-D246-A1F7-180DFBDF806B}" type="datetimeFigureOut">
               <a:rPr lang="en-US" smtClean="0"/>
-              <a:t>11/5/20</a:t>
+              <a:t>11/10/20</a:t>
             </a:fld>
             <a:endParaRPr lang="en-US"/>
           </a:p>
@@ -2250,7 +2250,7 @@
           <a:p>
             <a:fld id="{B519623D-D8C4-D246-A1F7-180DFBDF806B}" type="datetimeFigureOut">
               <a:rPr lang="en-US" smtClean="0"/>
-              <a:t>11/5/20</a:t>
+              <a:t>11/10/20</a:t>
             </a:fld>
             <a:endParaRPr lang="en-US"/>
           </a:p>
@@ -2345,7 +2345,7 @@
           <a:p>
             <a:fld id="{B519623D-D8C4-D246-A1F7-180DFBDF806B}" type="datetimeFigureOut">
               <a:rPr lang="en-US" smtClean="0"/>
-              <a:t>11/5/20</a:t>
+              <a:t>11/10/20</a:t>
             </a:fld>
             <a:endParaRPr lang="en-US"/>
           </a:p>
@@ -2620,7 +2620,7 @@
           <a:p>
             <a:fld id="{B519623D-D8C4-D246-A1F7-180DFBDF806B}" type="datetimeFigureOut">
               <a:rPr lang="en-US" smtClean="0"/>
-              <a:t>11/5/20</a:t>
+              <a:t>11/10/20</a:t>
             </a:fld>
             <a:endParaRPr lang="en-US"/>
           </a:p>
@@ -2872,7 +2872,7 @@
           <a:p>
             <a:fld id="{B519623D-D8C4-D246-A1F7-180DFBDF806B}" type="datetimeFigureOut">
               <a:rPr lang="en-US" smtClean="0"/>
-              <a:t>11/5/20</a:t>
+              <a:t>11/10/20</a:t>
             </a:fld>
             <a:endParaRPr lang="en-US"/>
           </a:p>
@@ -3083,7 +3083,7 @@
           <a:p>
             <a:fld id="{B519623D-D8C4-D246-A1F7-180DFBDF806B}" type="datetimeFigureOut">
               <a:rPr lang="en-US" smtClean="0"/>
-              <a:t>11/5/20</a:t>
+              <a:t>11/10/20</a:t>
             </a:fld>
             <a:endParaRPr lang="en-US"/>
           </a:p>
@@ -4244,6 +4244,52 @@
       </p:grpSpPr>
       <p:sp>
         <p:nvSpPr>
+          <p:cNvPr id="4" name="Rounded Rectangle 3">
+            <a:extLst>
+              <a:ext uri="{FF2B5EF4-FFF2-40B4-BE49-F238E27FC236}">
+                <a16:creationId xmlns:a16="http://schemas.microsoft.com/office/drawing/2014/main" id="{D08233AE-8C95-9E47-8F4D-34AF036ED3FB}"/>
+              </a:ext>
+            </a:extLst>
+          </p:cNvPr>
+          <p:cNvSpPr/>
+          <p:nvPr/>
+        </p:nvSpPr>
+        <p:spPr>
+          <a:xfrm>
+            <a:off x="2546727" y="881610"/>
+            <a:ext cx="818663" cy="369332"/>
+          </a:xfrm>
+          <a:prstGeom prst="roundRect">
+            <a:avLst>
+              <a:gd name="adj" fmla="val 50000"/>
+            </a:avLst>
+          </a:prstGeom>
+        </p:spPr>
+        <p:style>
+          <a:lnRef idx="2">
+            <a:schemeClr val="dk1"/>
+          </a:lnRef>
+          <a:fillRef idx="1">
+            <a:schemeClr val="lt1"/>
+          </a:fillRef>
+          <a:effectRef idx="0">
+            <a:schemeClr val="dk1"/>
+          </a:effectRef>
+          <a:fontRef idx="minor">
+            <a:schemeClr val="dk1"/>
+          </a:fontRef>
+        </p:style>
+        <p:txBody>
+          <a:bodyPr rtlCol="0" anchor="ctr"/>
+          <a:lstStyle/>
+          <a:p>
+            <a:pPr algn="ctr"/>
+            <a:endParaRPr lang="en-US"/>
+          </a:p>
+        </p:txBody>
+      </p:sp>
+      <p:sp>
+        <p:nvSpPr>
           <p:cNvPr id="37" name="Rectangle 36"/>
           <p:cNvSpPr/>
           <p:nvPr/>
@@ -4780,36 +4826,6 @@
           </a:fontRef>
         </p:style>
       </p:cxnSp>
-      <p:pic>
-        <p:nvPicPr>
-          <p:cNvPr id="21" name="Picture 20"/>
-          <p:cNvPicPr>
-            <a:picLocks noChangeAspect="1"/>
-          </p:cNvPicPr>
-          <p:nvPr/>
-        </p:nvPicPr>
-        <p:blipFill>
-          <a:blip r:embed="rId5">
-            <a:extLst>
-              <a:ext uri="{28A0092B-C50C-407E-A947-70E740481C1C}">
-                <a14:useLocalDpi xmlns:a14="http://schemas.microsoft.com/office/drawing/2010/main" val="0"/>
-              </a:ext>
-            </a:extLst>
-          </a:blip>
-          <a:stretch>
-            <a:fillRect/>
-          </a:stretch>
-        </p:blipFill>
-        <p:spPr>
-          <a:xfrm>
-            <a:off x="2278494" y="376852"/>
-            <a:ext cx="1305339" cy="1305339"/>
-          </a:xfrm>
-          <a:prstGeom prst="rect">
-            <a:avLst/>
-          </a:prstGeom>
-        </p:spPr>
-      </p:pic>
       <p:sp>
         <p:nvSpPr>
           <p:cNvPr id="22" name="TextBox 21"/>
@@ -4818,7 +4834,7 @@
         </p:nvSpPr>
         <p:spPr>
           <a:xfrm>
-            <a:off x="2722406" y="819966"/>
+            <a:off x="2712132" y="881610"/>
             <a:ext cx="465192" cy="369332"/>
           </a:xfrm>
           <a:prstGeom prst="rect">
@@ -6526,67 +6542,63 @@
           </a:p>
         </p:txBody>
       </p:sp>
-      <p:pic>
-        <p:nvPicPr>
-          <p:cNvPr id="33" name="Picture 32"/>
-          <p:cNvPicPr>
-            <a:picLocks noChangeAspect="1"/>
-          </p:cNvPicPr>
-          <p:nvPr/>
-        </p:nvPicPr>
-        <p:blipFill>
-          <a:blip r:embed="rId3">
-            <a:duotone>
-              <a:schemeClr val="accent3">
-                <a:shade val="45000"/>
-                <a:satMod val="135000"/>
-              </a:schemeClr>
-              <a:prstClr val="white"/>
-            </a:duotone>
+      <p:sp>
+        <p:nvSpPr>
+          <p:cNvPr id="34" name="Rounded Rectangle 33">
             <a:extLst>
-              <a:ext uri="{28A0092B-C50C-407E-A947-70E740481C1C}">
-                <a14:useLocalDpi xmlns:a14="http://schemas.microsoft.com/office/drawing/2010/main" val="0"/>
+              <a:ext uri="{FF2B5EF4-FFF2-40B4-BE49-F238E27FC236}">
+                <a16:creationId xmlns:a16="http://schemas.microsoft.com/office/drawing/2014/main" id="{B1E2CB82-E54B-D749-9036-F082CFFCC483}"/>
               </a:ext>
             </a:extLst>
-          </a:blip>
-          <a:stretch>
-            <a:fillRect/>
-          </a:stretch>
-        </p:blipFill>
-        <p:spPr>
-          <a:xfrm>
-            <a:off x="5713681" y="2950228"/>
-            <a:ext cx="1305339" cy="1305339"/>
-          </a:xfrm>
-          <a:prstGeom prst="rect">
-            <a:avLst/>
-          </a:prstGeom>
-        </p:spPr>
-      </p:pic>
-      <p:sp>
-        <p:nvSpPr>
-          <p:cNvPr id="21" name="TextBox 20"/>
-          <p:cNvSpPr txBox="1"/>
+          </p:cNvPr>
+          <p:cNvSpPr/>
           <p:nvPr/>
         </p:nvSpPr>
         <p:spPr>
           <a:xfrm>
-            <a:off x="6107835" y="3407635"/>
-            <a:ext cx="554960" cy="369332"/>
-          </a:xfrm>
-          <a:prstGeom prst="rect">
-            <a:avLst/>
+            <a:off x="5995727" y="3407635"/>
+            <a:ext cx="818663" cy="369332"/>
+          </a:xfrm>
+          <a:prstGeom prst="roundRect">
+            <a:avLst>
+              <a:gd name="adj" fmla="val 50000"/>
+            </a:avLst>
           </a:prstGeom>
-          <a:noFill/>
-        </p:spPr>
+          <a:ln>
+            <a:solidFill>
+              <a:schemeClr val="accent3">
+                <a:lumMod val="75000"/>
+              </a:schemeClr>
+            </a:solidFill>
+          </a:ln>
+        </p:spPr>
+        <p:style>
+          <a:lnRef idx="2">
+            <a:schemeClr val="dk1"/>
+          </a:lnRef>
+          <a:fillRef idx="1">
+            <a:schemeClr val="lt1"/>
+          </a:fillRef>
+          <a:effectRef idx="0">
+            <a:schemeClr val="dk1"/>
+          </a:effectRef>
+          <a:fontRef idx="minor">
+            <a:schemeClr val="dk1"/>
+          </a:fontRef>
+        </p:style>
         <p:txBody>
-          <a:bodyPr wrap="none" rtlCol="0">
-            <a:spAutoFit/>
-          </a:bodyPr>
+          <a:bodyPr rtlCol="0" anchor="ctr"/>
           <a:lstStyle/>
           <a:p>
+            <a:pPr algn="ctr"/>
             <a:r>
-              <a:rPr lang="en-US"/>
+              <a:rPr lang="en-US" dirty="0">
+                <a:solidFill>
+                  <a:schemeClr val="accent3">
+                    <a:lumMod val="50000"/>
+                  </a:schemeClr>
+                </a:solidFill>
+              </a:rPr>
               <a:t>GFP</a:t>
             </a:r>
           </a:p>
@@ -7555,7 +7567,7 @@
         </p:nvCxnSpPr>
         <p:spPr>
           <a:xfrm>
-            <a:off x="5797108" y="2864760"/>
+            <a:off x="5797108" y="2754590"/>
             <a:ext cx="0" cy="355161"/>
           </a:xfrm>
           <a:prstGeom prst="line">
@@ -7565,6 +7577,7 @@
             <a:solidFill>
               <a:srgbClr val="0070C0"/>
             </a:solidFill>
+            <a:tailEnd type="diamond" w="lg" len="lg"/>
           </a:ln>
           <a:effectLst/>
         </p:spPr>
@@ -7690,42 +7703,63 @@
           </a:p>
         </p:txBody>
       </p:sp>
-      <p:pic>
-        <p:nvPicPr>
-          <p:cNvPr id="64" name="Picture 63">
+      <p:sp>
+        <p:nvSpPr>
+          <p:cNvPr id="27" name="Rounded Rectangle 26">
             <a:extLst>
               <a:ext uri="{FF2B5EF4-FFF2-40B4-BE49-F238E27FC236}">
-                <a16:creationId xmlns:a16="http://schemas.microsoft.com/office/drawing/2014/main" id="{C8BEF8E5-C0AD-4842-A669-088D04FD60C1}"/>
+                <a16:creationId xmlns:a16="http://schemas.microsoft.com/office/drawing/2014/main" id="{2A7FDF56-7A1B-D74F-9475-B83FF3538D09}"/>
               </a:ext>
             </a:extLst>
           </p:cNvPr>
-          <p:cNvPicPr>
-            <a:picLocks noChangeAspect="1"/>
-          </p:cNvPicPr>
+          <p:cNvSpPr/>
           <p:nvPr/>
-        </p:nvPicPr>
-        <p:blipFill>
-          <a:blip r:embed="rId4">
-            <a:extLst>
-              <a:ext uri="{28A0092B-C50C-407E-A947-70E740481C1C}">
-                <a14:useLocalDpi xmlns:a14="http://schemas.microsoft.com/office/drawing/2010/main" val="0"/>
-              </a:ext>
-            </a:extLst>
-          </a:blip>
-          <a:stretch>
-            <a:fillRect/>
-          </a:stretch>
-        </p:blipFill>
+        </p:nvSpPr>
         <p:spPr>
           <a:xfrm>
-            <a:off x="5211508" y="2016748"/>
-            <a:ext cx="1120399" cy="1120399"/>
-          </a:xfrm>
-          <a:prstGeom prst="rect">
-            <a:avLst/>
+            <a:off x="5373158" y="2489360"/>
+            <a:ext cx="818663" cy="369332"/>
+          </a:xfrm>
+          <a:prstGeom prst="roundRect">
+            <a:avLst>
+              <a:gd name="adj" fmla="val 50000"/>
+            </a:avLst>
           </a:prstGeom>
-        </p:spPr>
-      </p:pic>
+          <a:ln>
+            <a:solidFill>
+              <a:schemeClr val="tx1"/>
+            </a:solidFill>
+          </a:ln>
+        </p:spPr>
+        <p:style>
+          <a:lnRef idx="2">
+            <a:schemeClr val="dk1"/>
+          </a:lnRef>
+          <a:fillRef idx="1">
+            <a:schemeClr val="lt1"/>
+          </a:fillRef>
+          <a:effectRef idx="0">
+            <a:schemeClr val="dk1"/>
+          </a:effectRef>
+          <a:fontRef idx="minor">
+            <a:schemeClr val="dk1"/>
+          </a:fontRef>
+        </p:style>
+        <p:txBody>
+          <a:bodyPr rtlCol="0" anchor="ctr"/>
+          <a:lstStyle/>
+          <a:p>
+            <a:pPr algn="ctr"/>
+            <a:endParaRPr lang="en-US" dirty="0">
+              <a:solidFill>
+                <a:schemeClr val="accent3">
+                  <a:lumMod val="50000"/>
+                </a:schemeClr>
+              </a:solidFill>
+            </a:endParaRPr>
+          </a:p>
+        </p:txBody>
+      </p:sp>
     </p:spTree>
     <p:extLst>
       <p:ext uri="{BB962C8B-B14F-4D97-AF65-F5344CB8AC3E}">
@@ -13977,62 +14011,68 @@
       </p:sp>
       <p:pic>
         <p:nvPicPr>
-          <p:cNvPr id="17" name="Picture 16" descr="five-prime-sticky-restriction-site.pdf"/>
+          <p:cNvPr id="5" name="Picture 4">
+            <a:extLst>
+              <a:ext uri="{FF2B5EF4-FFF2-40B4-BE49-F238E27FC236}">
+                <a16:creationId xmlns:a16="http://schemas.microsoft.com/office/drawing/2014/main" id="{887020F2-5423-4148-8B20-74D4CAB42857}"/>
+              </a:ext>
+            </a:extLst>
+          </p:cNvPr>
           <p:cNvPicPr>
             <a:picLocks noChangeAspect="1"/>
           </p:cNvPicPr>
           <p:nvPr/>
         </p:nvPicPr>
         <p:blipFill>
-          <a:blip r:embed="rId3">
-            <a:extLst>
-              <a:ext uri="{28A0092B-C50C-407E-A947-70E740481C1C}">
-                <a14:useLocalDpi xmlns:a14="http://schemas.microsoft.com/office/drawing/2010/main" val="0"/>
-              </a:ext>
-            </a:extLst>
-          </a:blip>
+          <a:blip r:embed="rId3"/>
           <a:stretch>
             <a:fillRect/>
           </a:stretch>
         </p:blipFill>
         <p:spPr>
           <a:xfrm>
-            <a:off x="1896633" y="2336800"/>
-            <a:ext cx="635000" cy="1270000"/>
+            <a:off x="1968994" y="2712377"/>
+            <a:ext cx="516727" cy="516727"/>
           </a:xfrm>
           <a:prstGeom prst="rect">
             <a:avLst/>
           </a:prstGeom>
+          <a:solidFill>
+            <a:schemeClr val="bg1"/>
+          </a:solidFill>
         </p:spPr>
       </p:pic>
       <p:pic>
         <p:nvPicPr>
-          <p:cNvPr id="20" name="Picture 19" descr="three-prime-sticky-restriction-site.pdf"/>
+          <p:cNvPr id="14" name="Picture 13">
+            <a:extLst>
+              <a:ext uri="{FF2B5EF4-FFF2-40B4-BE49-F238E27FC236}">
+                <a16:creationId xmlns:a16="http://schemas.microsoft.com/office/drawing/2014/main" id="{2F50FE20-A9DF-5D4F-98A3-94D9C905B313}"/>
+              </a:ext>
+            </a:extLst>
+          </p:cNvPr>
           <p:cNvPicPr>
             <a:picLocks noChangeAspect="1"/>
           </p:cNvPicPr>
           <p:nvPr/>
         </p:nvPicPr>
         <p:blipFill>
-          <a:blip r:embed="rId4">
-            <a:extLst>
-              <a:ext uri="{28A0092B-C50C-407E-A947-70E740481C1C}">
-                <a14:useLocalDpi xmlns:a14="http://schemas.microsoft.com/office/drawing/2010/main" val="0"/>
-              </a:ext>
-            </a:extLst>
-          </a:blip>
+          <a:blip r:embed="rId3"/>
           <a:stretch>
             <a:fillRect/>
           </a:stretch>
         </p:blipFill>
         <p:spPr>
-          <a:xfrm>
-            <a:off x="3530600" y="2336800"/>
-            <a:ext cx="635000" cy="1270000"/>
+          <a:xfrm flipH="1">
+            <a:off x="3620775" y="2721772"/>
+            <a:ext cx="516727" cy="516727"/>
           </a:xfrm>
           <a:prstGeom prst="rect">
             <a:avLst/>
           </a:prstGeom>
+          <a:solidFill>
+            <a:schemeClr val="bg1"/>
+          </a:solidFill>
         </p:spPr>
       </p:pic>
     </p:spTree>

</xml_diff>

<commit_message>
add last missing example
</commit_message>
<xml_diff>
--- a/specification/imgsrc/examples.pptx
+++ b/specification/imgsrc/examples.pptx
@@ -5,7 +5,7 @@
     <p:sldMasterId id="2147483648" r:id="rId1"/>
   </p:sldMasterIdLst>
   <p:notesMasterIdLst>
-    <p:notesMasterId r:id="rId19"/>
+    <p:notesMasterId r:id="rId20"/>
   </p:notesMasterIdLst>
   <p:sldIdLst>
     <p:sldId id="257" r:id="rId2"/>
@@ -25,6 +25,7 @@
     <p:sldId id="274" r:id="rId16"/>
     <p:sldId id="272" r:id="rId17"/>
     <p:sldId id="273" r:id="rId18"/>
+    <p:sldId id="275" r:id="rId19"/>
   </p:sldIdLst>
   <p:sldSz cx="9144000" cy="6858000" type="screen4x3"/>
   <p:notesSz cx="6858000" cy="9144000"/>
@@ -13094,6 +13095,410 @@
 </p:sld>
 </file>
 
+<file path=ppt/slides/slide18.xml><?xml version="1.0" encoding="utf-8"?>
+<p:sld xmlns:a="http://schemas.openxmlformats.org/drawingml/2006/main" xmlns:r="http://schemas.openxmlformats.org/officeDocument/2006/relationships" xmlns:p="http://schemas.openxmlformats.org/presentationml/2006/main">
+  <p:cSld>
+    <p:spTree>
+      <p:nvGrpSpPr>
+        <p:cNvPr id="1" name=""/>
+        <p:cNvGrpSpPr/>
+        <p:nvPr/>
+      </p:nvGrpSpPr>
+      <p:grpSpPr>
+        <a:xfrm>
+          <a:off x="0" y="0"/>
+          <a:ext cx="0" cy="0"/>
+          <a:chOff x="0" y="0"/>
+          <a:chExt cx="0" cy="0"/>
+        </a:xfrm>
+      </p:grpSpPr>
+      <p:sp>
+        <p:nvSpPr>
+          <p:cNvPr id="37" name="Rectangle 36"/>
+          <p:cNvSpPr/>
+          <p:nvPr/>
+        </p:nvSpPr>
+        <p:spPr>
+          <a:xfrm>
+            <a:off x="2679700" y="2884704"/>
+            <a:ext cx="275302" cy="221921"/>
+          </a:xfrm>
+          <a:prstGeom prst="rect">
+            <a:avLst/>
+          </a:prstGeom>
+          <a:solidFill>
+            <a:schemeClr val="bg1"/>
+          </a:solidFill>
+          <a:ln>
+            <a:noFill/>
+          </a:ln>
+          <a:effectLst/>
+        </p:spPr>
+        <p:style>
+          <a:lnRef idx="1">
+            <a:schemeClr val="accent1"/>
+          </a:lnRef>
+          <a:fillRef idx="3">
+            <a:schemeClr val="accent1"/>
+          </a:fillRef>
+          <a:effectRef idx="2">
+            <a:schemeClr val="accent1"/>
+          </a:effectRef>
+          <a:fontRef idx="minor">
+            <a:schemeClr val="lt1"/>
+          </a:fontRef>
+        </p:style>
+        <p:txBody>
+          <a:bodyPr rtlCol="0" anchor="ctr"/>
+          <a:lstStyle/>
+          <a:p>
+            <a:pPr algn="ctr"/>
+            <a:endParaRPr lang="en-US" dirty="0"/>
+          </a:p>
+        </p:txBody>
+      </p:sp>
+      <p:cxnSp>
+        <p:nvCxnSpPr>
+          <p:cNvPr id="6" name="Straight Connector 5"/>
+          <p:cNvCxnSpPr/>
+          <p:nvPr/>
+        </p:nvCxnSpPr>
+        <p:spPr>
+          <a:xfrm>
+            <a:off x="2387824" y="2974184"/>
+            <a:ext cx="4191000" cy="0"/>
+          </a:xfrm>
+          <a:prstGeom prst="line">
+            <a:avLst/>
+          </a:prstGeom>
+          <a:ln w="38100" cap="flat" cmpd="sng" algn="ctr">
+            <a:solidFill>
+              <a:srgbClr val="000000"/>
+            </a:solidFill>
+            <a:prstDash val="solid"/>
+            <a:round/>
+            <a:headEnd type="none" w="med" len="med"/>
+            <a:tailEnd type="none" w="med" len="med"/>
+          </a:ln>
+        </p:spPr>
+        <p:style>
+          <a:lnRef idx="2">
+            <a:schemeClr val="accent1"/>
+          </a:lnRef>
+          <a:fillRef idx="0">
+            <a:schemeClr val="accent1"/>
+          </a:fillRef>
+          <a:effectRef idx="1">
+            <a:schemeClr val="accent1"/>
+          </a:effectRef>
+          <a:fontRef idx="minor">
+            <a:schemeClr val="tx1"/>
+          </a:fontRef>
+        </p:style>
+      </p:cxnSp>
+      <p:sp>
+        <p:nvSpPr>
+          <p:cNvPr id="10" name="Bent Arrow 9"/>
+          <p:cNvSpPr/>
+          <p:nvPr/>
+        </p:nvSpPr>
+        <p:spPr>
+          <a:xfrm>
+            <a:off x="2696733" y="2155732"/>
+            <a:ext cx="889000" cy="820040"/>
+          </a:xfrm>
+          <a:prstGeom prst="bentArrow">
+            <a:avLst/>
+          </a:prstGeom>
+          <a:solidFill>
+            <a:schemeClr val="tx2">
+              <a:lumMod val="60000"/>
+              <a:lumOff val="40000"/>
+            </a:schemeClr>
+          </a:solidFill>
+          <a:ln w="38100" cap="flat" cmpd="sng" algn="ctr">
+            <a:solidFill>
+              <a:srgbClr val="000000"/>
+            </a:solidFill>
+            <a:prstDash val="solid"/>
+            <a:round/>
+            <a:headEnd type="none" w="med" len="med"/>
+            <a:tailEnd type="none" w="med" len="med"/>
+          </a:ln>
+        </p:spPr>
+        <p:style>
+          <a:lnRef idx="1">
+            <a:schemeClr val="accent1"/>
+          </a:lnRef>
+          <a:fillRef idx="3">
+            <a:schemeClr val="accent1"/>
+          </a:fillRef>
+          <a:effectRef idx="2">
+            <a:schemeClr val="accent1"/>
+          </a:effectRef>
+          <a:fontRef idx="minor">
+            <a:schemeClr val="lt1"/>
+          </a:fontRef>
+        </p:style>
+        <p:txBody>
+          <a:bodyPr rtlCol="0" anchor="ctr"/>
+          <a:lstStyle/>
+          <a:p>
+            <a:pPr algn="ctr"/>
+            <a:endParaRPr lang="en-US">
+              <a:solidFill>
+                <a:schemeClr val="tx1"/>
+              </a:solidFill>
+            </a:endParaRPr>
+          </a:p>
+        </p:txBody>
+      </p:sp>
+      <p:sp>
+        <p:nvSpPr>
+          <p:cNvPr id="38" name="TextBox 37"/>
+          <p:cNvSpPr txBox="1"/>
+          <p:nvPr/>
+        </p:nvSpPr>
+        <p:spPr>
+          <a:xfrm>
+            <a:off x="2911412" y="2906808"/>
+            <a:ext cx="588848" cy="369332"/>
+          </a:xfrm>
+          <a:prstGeom prst="rect">
+            <a:avLst/>
+          </a:prstGeom>
+          <a:noFill/>
+        </p:spPr>
+        <p:txBody>
+          <a:bodyPr wrap="none" rtlCol="0">
+            <a:spAutoFit/>
+          </a:bodyPr>
+          <a:lstStyle/>
+          <a:p>
+            <a:r>
+              <a:rPr lang="en-US" dirty="0" err="1"/>
+              <a:t>pTet</a:t>
+            </a:r>
+            <a:endParaRPr lang="en-US" dirty="0"/>
+          </a:p>
+        </p:txBody>
+      </p:sp>
+      <p:sp>
+        <p:nvSpPr>
+          <p:cNvPr id="2" name="Chevron 1">
+            <a:extLst>
+              <a:ext uri="{FF2B5EF4-FFF2-40B4-BE49-F238E27FC236}">
+                <a16:creationId xmlns:a16="http://schemas.microsoft.com/office/drawing/2014/main" id="{6A838FE6-9F64-0C4C-82A9-AEEAB434AF00}"/>
+              </a:ext>
+            </a:extLst>
+          </p:cNvPr>
+          <p:cNvSpPr/>
+          <p:nvPr/>
+        </p:nvSpPr>
+        <p:spPr>
+          <a:xfrm>
+            <a:off x="4881147" y="2786260"/>
+            <a:ext cx="726437" cy="347472"/>
+          </a:xfrm>
+          <a:prstGeom prst="chevron">
+            <a:avLst/>
+          </a:prstGeom>
+          <a:solidFill>
+            <a:schemeClr val="bg1"/>
+          </a:solidFill>
+          <a:ln w="38100">
+            <a:solidFill>
+              <a:schemeClr val="tx1"/>
+            </a:solidFill>
+            <a:prstDash val="sysDash"/>
+          </a:ln>
+        </p:spPr>
+        <p:style>
+          <a:lnRef idx="1">
+            <a:schemeClr val="accent1"/>
+          </a:lnRef>
+          <a:fillRef idx="3">
+            <a:schemeClr val="accent1"/>
+          </a:fillRef>
+          <a:effectRef idx="2">
+            <a:schemeClr val="accent1"/>
+          </a:effectRef>
+          <a:fontRef idx="minor">
+            <a:schemeClr val="lt1"/>
+          </a:fontRef>
+        </p:style>
+        <p:txBody>
+          <a:bodyPr wrap="none" rtlCol="0" anchor="ctr"/>
+          <a:lstStyle/>
+          <a:p>
+            <a:pPr algn="ctr"/>
+            <a:r>
+              <a:rPr lang="en-US" dirty="0">
+                <a:solidFill>
+                  <a:schemeClr val="tx1"/>
+                </a:solidFill>
+              </a:rPr>
+              <a:t>2A</a:t>
+            </a:r>
+          </a:p>
+        </p:txBody>
+      </p:sp>
+      <p:sp>
+        <p:nvSpPr>
+          <p:cNvPr id="13" name="Chevron 12">
+            <a:extLst>
+              <a:ext uri="{FF2B5EF4-FFF2-40B4-BE49-F238E27FC236}">
+                <a16:creationId xmlns:a16="http://schemas.microsoft.com/office/drawing/2014/main" id="{028CA542-5EB8-984D-95D8-7C8610972B48}"/>
+              </a:ext>
+            </a:extLst>
+          </p:cNvPr>
+          <p:cNvSpPr/>
+          <p:nvPr/>
+        </p:nvSpPr>
+        <p:spPr>
+          <a:xfrm>
+            <a:off x="5354197" y="2786260"/>
+            <a:ext cx="989434" cy="347472"/>
+          </a:xfrm>
+          <a:prstGeom prst="chevron">
+            <a:avLst/>
+          </a:prstGeom>
+          <a:solidFill>
+            <a:srgbClr val="FF0000"/>
+          </a:solidFill>
+          <a:ln w="38100">
+            <a:solidFill>
+              <a:schemeClr val="tx1"/>
+            </a:solidFill>
+          </a:ln>
+        </p:spPr>
+        <p:style>
+          <a:lnRef idx="1">
+            <a:schemeClr val="accent1"/>
+          </a:lnRef>
+          <a:fillRef idx="3">
+            <a:schemeClr val="accent1"/>
+          </a:fillRef>
+          <a:effectRef idx="2">
+            <a:schemeClr val="accent1"/>
+          </a:effectRef>
+          <a:fontRef idx="minor">
+            <a:schemeClr val="lt1"/>
+          </a:fontRef>
+        </p:style>
+        <p:txBody>
+          <a:bodyPr wrap="none" rtlCol="0" anchor="ctr"/>
+          <a:lstStyle/>
+          <a:p>
+            <a:pPr algn="ctr"/>
+            <a:r>
+              <a:rPr lang="en-US" i="1" dirty="0" err="1">
+                <a:solidFill>
+                  <a:schemeClr val="tx1"/>
+                </a:solidFill>
+              </a:rPr>
+              <a:t>rfp</a:t>
+            </a:r>
+            <a:endParaRPr lang="en-US" i="1" dirty="0">
+              <a:solidFill>
+                <a:schemeClr val="tx1"/>
+              </a:solidFill>
+            </a:endParaRPr>
+          </a:p>
+        </p:txBody>
+      </p:sp>
+      <p:sp>
+        <p:nvSpPr>
+          <p:cNvPr id="11" name="Right Arrow 10">
+            <a:extLst>
+              <a:ext uri="{FF2B5EF4-FFF2-40B4-BE49-F238E27FC236}">
+                <a16:creationId xmlns:a16="http://schemas.microsoft.com/office/drawing/2014/main" id="{15A5A02D-CA4F-AC44-9B72-4385FE03ADCB}"/>
+              </a:ext>
+            </a:extLst>
+          </p:cNvPr>
+          <p:cNvSpPr/>
+          <p:nvPr/>
+        </p:nvSpPr>
+        <p:spPr>
+          <a:xfrm>
+            <a:off x="3889851" y="2786260"/>
+            <a:ext cx="1168400" cy="350140"/>
+          </a:xfrm>
+          <a:prstGeom prst="rightArrow">
+            <a:avLst>
+              <a:gd name="adj1" fmla="val 100000"/>
+              <a:gd name="adj2" fmla="val 52194"/>
+            </a:avLst>
+          </a:prstGeom>
+          <a:solidFill>
+            <a:srgbClr val="008000"/>
+          </a:solidFill>
+          <a:ln w="38100" cap="flat" cmpd="sng" algn="ctr">
+            <a:solidFill>
+              <a:srgbClr val="000000"/>
+            </a:solidFill>
+            <a:prstDash val="solid"/>
+            <a:round/>
+            <a:headEnd type="none" w="med" len="med"/>
+            <a:tailEnd type="none" w="med" len="med"/>
+          </a:ln>
+        </p:spPr>
+        <p:style>
+          <a:lnRef idx="1">
+            <a:schemeClr val="accent1"/>
+          </a:lnRef>
+          <a:fillRef idx="3">
+            <a:schemeClr val="accent1"/>
+          </a:fillRef>
+          <a:effectRef idx="2">
+            <a:schemeClr val="accent1"/>
+          </a:effectRef>
+          <a:fontRef idx="minor">
+            <a:schemeClr val="lt1"/>
+          </a:fontRef>
+        </p:style>
+        <p:txBody>
+          <a:bodyPr rtlCol="0" anchor="ctr"/>
+          <a:lstStyle/>
+          <a:p>
+            <a:pPr algn="ctr"/>
+            <a:r>
+              <a:rPr lang="en-US" i="1" dirty="0">
+                <a:solidFill>
+                  <a:schemeClr val="tx1"/>
+                </a:solidFill>
+              </a:rPr>
+              <a:t>   </a:t>
+            </a:r>
+            <a:r>
+              <a:rPr lang="en-US" i="1" dirty="0" err="1">
+                <a:solidFill>
+                  <a:schemeClr val="tx1"/>
+                </a:solidFill>
+              </a:rPr>
+              <a:t>gfp</a:t>
+            </a:r>
+            <a:endParaRPr lang="en-US" i="1" dirty="0">
+              <a:solidFill>
+                <a:schemeClr val="tx1"/>
+              </a:solidFill>
+            </a:endParaRPr>
+          </a:p>
+        </p:txBody>
+      </p:sp>
+    </p:spTree>
+    <p:extLst>
+      <p:ext uri="{BB962C8B-B14F-4D97-AF65-F5344CB8AC3E}">
+        <p14:creationId xmlns:p14="http://schemas.microsoft.com/office/powerpoint/2010/main" val="3217879619"/>
+      </p:ext>
+    </p:extLst>
+  </p:cSld>
+  <p:clrMapOvr>
+    <a:masterClrMapping/>
+  </p:clrMapOvr>
+</p:sld>
+</file>
+
 <file path=ppt/slides/slide2.xml><?xml version="1.0" encoding="utf-8"?>
 <p:sld xmlns:a="http://schemas.openxmlformats.org/drawingml/2006/main" xmlns:r="http://schemas.openxmlformats.org/officeDocument/2006/relationships" xmlns:p="http://schemas.openxmlformats.org/presentationml/2006/main">
   <p:cSld>

</xml_diff>

<commit_message>
Update glyph specs and examples for 3.0
</commit_message>
<xml_diff>
--- a/specification/imgsrc/examples.pptx
+++ b/specification/imgsrc/examples.pptx
@@ -225,7 +225,7 @@
           <a:p>
             <a:fld id="{A5398B87-931F-0F48-BDB8-4235032D88C0}" type="datetimeFigureOut">
               <a:rPr lang="en-US" smtClean="0"/>
-              <a:t>11/10/20</a:t>
+              <a:t>3/22/21</a:t>
             </a:fld>
             <a:endParaRPr lang="en-US"/>
           </a:p>
@@ -671,7 +671,7 @@
           <a:p>
             <a:fld id="{B519623D-D8C4-D246-A1F7-180DFBDF806B}" type="datetimeFigureOut">
               <a:rPr lang="en-US" smtClean="0"/>
-              <a:t>11/10/20</a:t>
+              <a:t>3/22/21</a:t>
             </a:fld>
             <a:endParaRPr lang="en-US"/>
           </a:p>
@@ -839,7 +839,7 @@
           <a:p>
             <a:fld id="{B519623D-D8C4-D246-A1F7-180DFBDF806B}" type="datetimeFigureOut">
               <a:rPr lang="en-US" smtClean="0"/>
-              <a:t>11/10/20</a:t>
+              <a:t>3/22/21</a:t>
             </a:fld>
             <a:endParaRPr lang="en-US"/>
           </a:p>
@@ -1017,7 +1017,7 @@
           <a:p>
             <a:fld id="{B519623D-D8C4-D246-A1F7-180DFBDF806B}" type="datetimeFigureOut">
               <a:rPr lang="en-US" smtClean="0"/>
-              <a:t>11/10/20</a:t>
+              <a:t>3/22/21</a:t>
             </a:fld>
             <a:endParaRPr lang="en-US"/>
           </a:p>
@@ -1185,7 +1185,7 @@
           <a:p>
             <a:fld id="{B519623D-D8C4-D246-A1F7-180DFBDF806B}" type="datetimeFigureOut">
               <a:rPr lang="en-US" smtClean="0"/>
-              <a:t>11/10/20</a:t>
+              <a:t>3/22/21</a:t>
             </a:fld>
             <a:endParaRPr lang="en-US"/>
           </a:p>
@@ -1430,7 +1430,7 @@
           <a:p>
             <a:fld id="{B519623D-D8C4-D246-A1F7-180DFBDF806B}" type="datetimeFigureOut">
               <a:rPr lang="en-US" smtClean="0"/>
-              <a:t>11/10/20</a:t>
+              <a:t>3/22/21</a:t>
             </a:fld>
             <a:endParaRPr lang="en-US"/>
           </a:p>
@@ -1715,7 +1715,7 @@
           <a:p>
             <a:fld id="{B519623D-D8C4-D246-A1F7-180DFBDF806B}" type="datetimeFigureOut">
               <a:rPr lang="en-US" smtClean="0"/>
-              <a:t>11/10/20</a:t>
+              <a:t>3/22/21</a:t>
             </a:fld>
             <a:endParaRPr lang="en-US"/>
           </a:p>
@@ -2134,7 +2134,7 @@
           <a:p>
             <a:fld id="{B519623D-D8C4-D246-A1F7-180DFBDF806B}" type="datetimeFigureOut">
               <a:rPr lang="en-US" smtClean="0"/>
-              <a:t>11/10/20</a:t>
+              <a:t>3/22/21</a:t>
             </a:fld>
             <a:endParaRPr lang="en-US"/>
           </a:p>
@@ -2251,7 +2251,7 @@
           <a:p>
             <a:fld id="{B519623D-D8C4-D246-A1F7-180DFBDF806B}" type="datetimeFigureOut">
               <a:rPr lang="en-US" smtClean="0"/>
-              <a:t>11/10/20</a:t>
+              <a:t>3/22/21</a:t>
             </a:fld>
             <a:endParaRPr lang="en-US"/>
           </a:p>
@@ -2346,7 +2346,7 @@
           <a:p>
             <a:fld id="{B519623D-D8C4-D246-A1F7-180DFBDF806B}" type="datetimeFigureOut">
               <a:rPr lang="en-US" smtClean="0"/>
-              <a:t>11/10/20</a:t>
+              <a:t>3/22/21</a:t>
             </a:fld>
             <a:endParaRPr lang="en-US"/>
           </a:p>
@@ -2621,7 +2621,7 @@
           <a:p>
             <a:fld id="{B519623D-D8C4-D246-A1F7-180DFBDF806B}" type="datetimeFigureOut">
               <a:rPr lang="en-US" smtClean="0"/>
-              <a:t>11/10/20</a:t>
+              <a:t>3/22/21</a:t>
             </a:fld>
             <a:endParaRPr lang="en-US"/>
           </a:p>
@@ -2873,7 +2873,7 @@
           <a:p>
             <a:fld id="{B519623D-D8C4-D246-A1F7-180DFBDF806B}" type="datetimeFigureOut">
               <a:rPr lang="en-US" smtClean="0"/>
-              <a:t>11/10/20</a:t>
+              <a:t>3/22/21</a:t>
             </a:fld>
             <a:endParaRPr lang="en-US"/>
           </a:p>
@@ -3084,7 +3084,7 @@
           <a:p>
             <a:fld id="{B519623D-D8C4-D246-A1F7-180DFBDF806B}" type="datetimeFigureOut">
               <a:rPr lang="en-US" smtClean="0"/>
-              <a:t>11/10/20</a:t>
+              <a:t>3/22/21</a:t>
             </a:fld>
             <a:endParaRPr lang="en-US"/>
           </a:p>
@@ -15563,46 +15563,18 @@
           </a:p>
         </p:txBody>
       </p:sp>
-      <p:pic>
-        <p:nvPicPr>
-          <p:cNvPr id="2" name="Picture 1" descr="insulator.pdf"/>
-          <p:cNvPicPr>
-            <a:picLocks noChangeAspect="1"/>
-          </p:cNvPicPr>
-          <p:nvPr/>
-        </p:nvPicPr>
-        <p:blipFill>
-          <a:blip r:embed="rId2">
-            <a:extLst>
-              <a:ext uri="{28A0092B-C50C-407E-A947-70E740481C1C}">
-                <a14:useLocalDpi xmlns:a14="http://schemas.microsoft.com/office/drawing/2010/main" val="0"/>
-              </a:ext>
-            </a:extLst>
-          </a:blip>
-          <a:stretch>
-            <a:fillRect/>
-          </a:stretch>
-        </p:blipFill>
-        <p:spPr>
-          <a:xfrm>
-            <a:off x="1409700" y="2158540"/>
-            <a:ext cx="635000" cy="1270000"/>
-          </a:xfrm>
-          <a:prstGeom prst="rect">
-            <a:avLst/>
-          </a:prstGeom>
-        </p:spPr>
-      </p:pic>
       <p:cxnSp>
         <p:nvCxnSpPr>
           <p:cNvPr id="18" name="Straight Connector 17"/>
-          <p:cNvCxnSpPr/>
+          <p:cNvCxnSpPr>
+            <a:cxnSpLocks/>
+          </p:cNvCxnSpPr>
           <p:nvPr/>
         </p:nvCxnSpPr>
         <p:spPr>
           <a:xfrm>
-            <a:off x="1155700" y="2974184"/>
-            <a:ext cx="3429000" cy="0"/>
+            <a:off x="1756881" y="2974184"/>
+            <a:ext cx="2321959" cy="0"/>
           </a:xfrm>
           <a:prstGeom prst="line">
             <a:avLst/>
@@ -15632,36 +15604,6 @@
           </a:fontRef>
         </p:style>
       </p:cxnSp>
-      <p:pic>
-        <p:nvPicPr>
-          <p:cNvPr id="20" name="Picture 19" descr="insulator.pdf"/>
-          <p:cNvPicPr>
-            <a:picLocks noChangeAspect="1"/>
-          </p:cNvPicPr>
-          <p:nvPr/>
-        </p:nvPicPr>
-        <p:blipFill>
-          <a:blip r:embed="rId2">
-            <a:extLst>
-              <a:ext uri="{28A0092B-C50C-407E-A947-70E740481C1C}">
-                <a14:useLocalDpi xmlns:a14="http://schemas.microsoft.com/office/drawing/2010/main" val="0"/>
-              </a:ext>
-            </a:extLst>
-          </a:blip>
-          <a:stretch>
-            <a:fillRect/>
-          </a:stretch>
-        </p:blipFill>
-        <p:spPr>
-          <a:xfrm>
-            <a:off x="3767802" y="2148684"/>
-            <a:ext cx="635000" cy="1270000"/>
-          </a:xfrm>
-          <a:prstGeom prst="rect">
-            <a:avLst/>
-          </a:prstGeom>
-        </p:spPr>
-      </p:pic>
       <p:grpSp>
         <p:nvGrpSpPr>
           <p:cNvPr id="6" name="Group 5"/>
@@ -15730,7 +15672,7 @@
             <p:nvPr/>
           </p:nvPicPr>
           <p:blipFill>
-            <a:blip r:embed="rId3">
+            <a:blip r:embed="rId2">
               <a:extLst>
                 <a:ext uri="{28A0092B-C50C-407E-A947-70E740481C1C}">
                   <a14:useLocalDpi xmlns:a14="http://schemas.microsoft.com/office/drawing/2010/main" val="0"/>
@@ -15820,7 +15762,7 @@
             <p:nvPr/>
           </p:nvPicPr>
           <p:blipFill>
-            <a:blip r:embed="rId3">
+            <a:blip r:embed="rId2">
               <a:extLst>
                 <a:ext uri="{28A0092B-C50C-407E-A947-70E740481C1C}">
                   <a14:useLocalDpi xmlns:a14="http://schemas.microsoft.com/office/drawing/2010/main" val="0"/>

</xml_diff>